<commit_message>
add raw agenda as an outline
</commit_message>
<xml_diff>
--- a/urlinfo_presentation.pptx
+++ b/urlinfo_presentation.pptx
@@ -3150,7 +3150,11 @@
         <p:txBody>
           <a:bodyPr/>
           <a:p>
-            <a:endParaRPr lang="zh-CN" altLang="en-US"/>
+            <a:r>
+              <a:rPr lang="x-none" altLang="zh-CN"/>
+              <a:t>Agenda</a:t>
+            </a:r>
+            <a:endParaRPr lang="x-none" altLang="zh-CN"/>
           </a:p>
         </p:txBody>
       </p:sp>
@@ -3168,7 +3172,66 @@
         <p:txBody>
           <a:bodyPr/>
           <a:p>
-            <a:endParaRPr lang="zh-CN" altLang="en-US"/>
+            <a:r>
+              <a:rPr lang="x-none" altLang="zh-CN"/>
+              <a:t>What's Avast Urlinfo Service?</a:t>
+            </a:r>
+            <a:endParaRPr lang="x-none" altLang="zh-CN"/>
+          </a:p>
+          <a:p>
+            <a:r>
+              <a:rPr lang="x-none" altLang="zh-CN">
+                <a:sym typeface="+mn-ea"/>
+              </a:rPr>
+              <a:t>What benefits come with the service?</a:t>
+            </a:r>
+            <a:endParaRPr lang="x-none" altLang="zh-CN"/>
+          </a:p>
+          <a:p>
+            <a:r>
+              <a:rPr lang="x-none" altLang="zh-CN">
+                <a:sym typeface="+mn-ea"/>
+              </a:rPr>
+              <a:t>What do you need to do from client side? How to implement.</a:t>
+            </a:r>
+            <a:endParaRPr lang="x-none" altLang="zh-CN"/>
+          </a:p>
+          <a:p>
+            <a:r>
+              <a:rPr lang="x-none" altLang="zh-CN"/>
+              <a:t>What else </a:t>
+            </a:r>
+            <a:r>
+              <a:rPr lang="x-none" altLang="zh-CN">
+                <a:sym typeface="+mn-ea"/>
+              </a:rPr>
+              <a:t>similar </a:t>
+            </a:r>
+            <a:r>
+              <a:rPr lang="x-none" altLang="zh-CN"/>
+              <a:t>in the market? </a:t>
+            </a:r>
+            <a:endParaRPr lang="x-none" altLang="zh-CN"/>
+          </a:p>
+          <a:p>
+            <a:r>
+              <a:rPr lang="x-none" altLang="zh-CN"/>
+              <a:t>Why Avast is the best to you?</a:t>
+            </a:r>
+            <a:endParaRPr lang="x-none" altLang="zh-CN"/>
+          </a:p>
+          <a:p>
+            <a:r>
+              <a:rPr lang="x-none" altLang="zh-CN"/>
+              <a:t>Questions.</a:t>
+            </a:r>
+            <a:endParaRPr lang="x-none" altLang="zh-CN"/>
+          </a:p>
+          <a:p>
+            <a:endParaRPr lang="x-none" altLang="zh-CN"/>
+          </a:p>
+          <a:p>
+            <a:endParaRPr lang="x-none" altLang="zh-CN"/>
           </a:p>
         </p:txBody>
       </p:sp>

</xml_diff>

<commit_message>
change PPT Agenda to ensure a clearer roadmap for potential clients
</commit_message>
<xml_diff>
--- a/urlinfo_presentation.pptx
+++ b/urlinfo_presentation.pptx
@@ -3118,6 +3118,30 @@
           </a:p>
         </p:txBody>
       </p:sp>
+      <p:pic>
+        <p:nvPicPr>
+          <p:cNvPr id="6" name="图片 5" descr="logo"/>
+          <p:cNvPicPr>
+            <a:picLocks noChangeAspect="1"/>
+          </p:cNvPicPr>
+          <p:nvPr/>
+        </p:nvPicPr>
+        <p:blipFill>
+          <a:blip r:embed="rId2"/>
+          <a:stretch>
+            <a:fillRect/>
+          </a:stretch>
+        </p:blipFill>
+        <p:spPr>
+          <a:xfrm>
+            <a:off x="10020300" y="5948680"/>
+            <a:ext cx="2045335" cy="891540"/>
+          </a:xfrm>
+          <a:prstGeom prst="rect">
+            <a:avLst/>
+          </a:prstGeom>
+        </p:spPr>
+      </p:pic>
     </p:spTree>
   </p:cSld>
   <p:clrMapOvr>
@@ -3170,46 +3194,87 @@
         </p:nvSpPr>
         <p:spPr/>
         <p:txBody>
-          <a:bodyPr/>
+          <a:bodyPr>
+            <a:normAutofit/>
+          </a:bodyPr>
           <a:p>
             <a:r>
               <a:rPr lang="x-none" altLang="zh-CN"/>
-              <a:t>What's Avast Urlinfo Service?</a:t>
+              <a:t>Avast Urlinfo Service introduction</a:t>
             </a:r>
             <a:endParaRPr lang="x-none" altLang="zh-CN"/>
           </a:p>
           <a:p>
+            <a:pPr lvl="1"/>
+            <a:r>
+              <a:rPr lang="x-none" altLang="zh-CN" sz="2400"/>
+              <a:t>features</a:t>
+            </a:r>
+            <a:endParaRPr lang="x-none" altLang="zh-CN" sz="2400"/>
+          </a:p>
+          <a:p>
+            <a:pPr lvl="1"/>
+            <a:r>
+              <a:rPr lang="x-none" altLang="zh-CN" sz="2400"/>
+              <a:t>advantages</a:t>
+            </a:r>
+            <a:endParaRPr lang="x-none" altLang="zh-CN" sz="2400"/>
+          </a:p>
+          <a:p>
+            <a:pPr lvl="0"/>
             <a:r>
               <a:rPr lang="x-none" altLang="zh-CN">
                 <a:sym typeface="+mn-ea"/>
               </a:rPr>
-              <a:t>What benefits come with the service?</a:t>
-            </a:r>
-            <a:endParaRPr lang="x-none" altLang="zh-CN"/>
-          </a:p>
-          <a:p>
+              <a:t>Benefits come with the service.</a:t>
+            </a:r>
+            <a:endParaRPr lang="x-none" altLang="zh-CN">
+              <a:sym typeface="+mn-ea"/>
+            </a:endParaRPr>
+          </a:p>
+          <a:p>
+            <a:pPr lvl="0"/>
             <a:r>
               <a:rPr lang="x-none" altLang="zh-CN">
                 <a:sym typeface="+mn-ea"/>
               </a:rPr>
-              <a:t>What do you need to do from client side? How to implement.</a:t>
-            </a:r>
-            <a:endParaRPr lang="x-none" altLang="zh-CN"/>
-          </a:p>
-          <a:p>
-            <a:r>
-              <a:rPr lang="x-none" altLang="zh-CN"/>
-              <a:t>What else </a:t>
-            </a:r>
+              <a:t>What do you need to do from client side? </a:t>
+            </a:r>
+            <a:endParaRPr lang="x-none" altLang="zh-CN">
+              <a:sym typeface="+mn-ea"/>
+            </a:endParaRPr>
+          </a:p>
+          <a:p>
+            <a:pPr lvl="0"/>
             <a:r>
               <a:rPr lang="x-none" altLang="zh-CN">
                 <a:sym typeface="+mn-ea"/>
               </a:rPr>
-              <a:t>similar </a:t>
-            </a:r>
-            <a:r>
-              <a:rPr lang="x-none" altLang="zh-CN"/>
-              <a:t>in the market? </a:t>
+              <a:t>S</a:t>
+            </a:r>
+            <a:r>
+              <a:rPr lang="x-none" altLang="zh-CN">
+                <a:sym typeface="+mn-ea"/>
+              </a:rPr>
+              <a:t>imilar solutions </a:t>
+            </a:r>
+            <a:r>
+              <a:rPr lang="x-none" altLang="zh-CN">
+                <a:sym typeface="+mn-ea"/>
+              </a:rPr>
+              <a:t>in the market.</a:t>
+            </a:r>
+            <a:endParaRPr lang="x-none" altLang="zh-CN">
+              <a:sym typeface="+mn-ea"/>
+            </a:endParaRPr>
+          </a:p>
+          <a:p>
+            <a:pPr lvl="1"/>
+            <a:r>
+              <a:rPr lang="x-none" altLang="zh-CN">
+                <a:sym typeface="+mn-ea"/>
+              </a:rPr>
+              <a:t>Bechmark compitition between them.</a:t>
             </a:r>
             <a:endParaRPr lang="x-none" altLang="zh-CN"/>
           </a:p>
@@ -3225,12 +3290,6 @@
               <a:rPr lang="x-none" altLang="zh-CN"/>
               <a:t>Questions.</a:t>
             </a:r>
-            <a:endParaRPr lang="x-none" altLang="zh-CN"/>
-          </a:p>
-          <a:p>
-            <a:endParaRPr lang="x-none" altLang="zh-CN"/>
-          </a:p>
-          <a:p>
             <a:endParaRPr lang="x-none" altLang="zh-CN"/>
           </a:p>
         </p:txBody>

</xml_diff>

<commit_message>
add a template to PPT
</commit_message>
<xml_diff>
--- a/urlinfo_presentation.pptx
+++ b/urlinfo_presentation.pptx
@@ -1,12 +1,13 @@
 
 <file path=ppt/presentation.xml><?xml version="1.0" encoding="utf-8"?>
-<p:presentation xmlns:a="http://schemas.openxmlformats.org/drawingml/2006/main" xmlns:r="http://schemas.openxmlformats.org/officeDocument/2006/relationships" xmlns:p="http://schemas.openxmlformats.org/presentationml/2006/main" saveSubsetFonts="1">
+<p:presentation xmlns:a="http://schemas.openxmlformats.org/drawingml/2006/main" xmlns:r="http://schemas.openxmlformats.org/officeDocument/2006/relationships" xmlns:p="http://schemas.openxmlformats.org/presentationml/2006/main">
   <p:sldMasterIdLst>
     <p:sldMasterId id="2147483648" r:id="rId1"/>
   </p:sldMasterIdLst>
   <p:sldIdLst>
     <p:sldId id="256" r:id="rId3"/>
     <p:sldId id="257" r:id="rId4"/>
+    <p:sldId id="258" r:id="rId5"/>
   </p:sldIdLst>
   <p:sldSz cx="12192000" cy="6858000"/>
   <p:notesSz cx="6858000" cy="9144000"/>
@@ -109,6 +110,758 @@
 </file>
 
 <file path=ppt/slideLayouts/slideLayout1.xml><?xml version="1.0" encoding="utf-8"?>
+<p:sldLayout xmlns:a="http://schemas.openxmlformats.org/drawingml/2006/main" xmlns:r="http://schemas.openxmlformats.org/officeDocument/2006/relationships" xmlns:p="http://schemas.openxmlformats.org/presentationml/2006/main" preserve="1" userDrawn="1">
+  <p:cSld name="自定义版式">
+    <p:bg>
+      <p:bgPr>
+        <a:blipFill dpi="0" rotWithShape="1">
+          <a:blip r:embed="rId2">
+            <a:lum/>
+          </a:blip>
+          <a:srcRect/>
+          <a:stretch>
+            <a:fillRect/>
+          </a:stretch>
+        </a:blipFill>
+        <a:effectLst/>
+      </p:bgPr>
+    </p:bg>
+    <p:spTree>
+      <p:nvGrpSpPr>
+        <p:cNvPr id="1" name=""/>
+        <p:cNvGrpSpPr/>
+        <p:nvPr/>
+      </p:nvGrpSpPr>
+      <p:grpSpPr>
+        <a:xfrm>
+          <a:off x="0" y="0"/>
+          <a:ext cx="0" cy="0"/>
+          <a:chOff x="0" y="0"/>
+          <a:chExt cx="0" cy="0"/>
+        </a:xfrm>
+      </p:grpSpPr>
+      <p:sp>
+        <p:nvSpPr>
+          <p:cNvPr id="3" name="日期占位符 2"/>
+          <p:cNvSpPr>
+            <a:spLocks noGrp="1"/>
+          </p:cNvSpPr>
+          <p:nvPr>
+            <p:ph type="dt" sz="half" idx="10"/>
+          </p:nvPr>
+        </p:nvSpPr>
+        <p:spPr/>
+        <p:txBody>
+          <a:bodyPr/>
+          <a:lstStyle/>
+          <a:p>
+            <a:fld id="{BEA18431-54C4-4585-82AD-D4BDE8FCC787}" type="datetimeFigureOut">
+              <a:rPr lang="zh-HK" altLang="en-US" smtClean="0"/>
+            </a:fld>
+            <a:endParaRPr lang="zh-HK" altLang="en-US"/>
+          </a:p>
+        </p:txBody>
+      </p:sp>
+      <p:sp>
+        <p:nvSpPr>
+          <p:cNvPr id="4" name="页脚占位符 3"/>
+          <p:cNvSpPr>
+            <a:spLocks noGrp="1"/>
+          </p:cNvSpPr>
+          <p:nvPr>
+            <p:ph type="ftr" sz="quarter" idx="11"/>
+          </p:nvPr>
+        </p:nvSpPr>
+        <p:spPr/>
+        <p:txBody>
+          <a:bodyPr/>
+          <a:lstStyle/>
+          <a:p>
+            <a:endParaRPr lang="zh-HK" altLang="en-US"/>
+          </a:p>
+        </p:txBody>
+      </p:sp>
+      <p:sp>
+        <p:nvSpPr>
+          <p:cNvPr id="5" name="灯片编号占位符 4"/>
+          <p:cNvSpPr>
+            <a:spLocks noGrp="1"/>
+          </p:cNvSpPr>
+          <p:nvPr>
+            <p:ph type="sldNum" sz="quarter" idx="12"/>
+          </p:nvPr>
+        </p:nvSpPr>
+        <p:spPr/>
+        <p:txBody>
+          <a:bodyPr/>
+          <a:lstStyle/>
+          <a:p>
+            <a:fld id="{8592E714-8771-4256-B120-A1444CD7D5F3}" type="slidenum">
+              <a:rPr lang="zh-HK" altLang="en-US" smtClean="0"/>
+            </a:fld>
+            <a:endParaRPr lang="zh-HK" altLang="en-US"/>
+          </a:p>
+        </p:txBody>
+      </p:sp>
+      <p:sp>
+        <p:nvSpPr>
+          <p:cNvPr id="6" name="Title 1"/>
+          <p:cNvSpPr>
+            <a:spLocks noGrp="1"/>
+          </p:cNvSpPr>
+          <p:nvPr>
+            <p:ph type="ctrTitle"/>
+          </p:nvPr>
+        </p:nvSpPr>
+        <p:spPr>
+          <a:xfrm>
+            <a:off x="251520" y="1700808"/>
+            <a:ext cx="7772400" cy="1470025"/>
+          </a:xfrm>
+        </p:spPr>
+        <p:txBody>
+          <a:bodyPr/>
+          <a:p>
+            <a:endParaRPr lang="cs-CZ" dirty="0"/>
+          </a:p>
+        </p:txBody>
+      </p:sp>
+    </p:spTree>
+  </p:cSld>
+  <p:clrMapOvr>
+    <a:masterClrMapping/>
+  </p:clrMapOvr>
+  <mc:AlternateContent xmlns:mc="http://schemas.openxmlformats.org/markup-compatibility/2006">
+    <mc:Choice xmlns:p14="http://schemas.microsoft.com/office/powerpoint/2010/main" Requires="p14">
+      <p:transition p14:dur="500"/>
+    </mc:Choice>
+    <mc:Fallback>
+      <p:transition/>
+    </mc:Fallback>
+  </mc:AlternateContent>
+</p:sldLayout>
+</file>
+
+<file path=ppt/slideLayouts/slideLayout10.xml><?xml version="1.0" encoding="utf-8"?>
+<p:sldLayout xmlns:a="http://schemas.openxmlformats.org/drawingml/2006/main" xmlns:r="http://schemas.openxmlformats.org/officeDocument/2006/relationships" xmlns:p="http://schemas.openxmlformats.org/presentationml/2006/main" type="picTx" preserve="1">
+  <p:cSld name="图片与标题">
+    <p:spTree>
+      <p:nvGrpSpPr>
+        <p:cNvPr id="1" name=""/>
+        <p:cNvGrpSpPr/>
+        <p:nvPr/>
+      </p:nvGrpSpPr>
+      <p:grpSpPr>
+        <a:xfrm>
+          <a:off x="0" y="0"/>
+          <a:ext cx="0" cy="0"/>
+          <a:chOff x="0" y="0"/>
+          <a:chExt cx="0" cy="0"/>
+        </a:xfrm>
+      </p:grpSpPr>
+      <p:sp>
+        <p:nvSpPr>
+          <p:cNvPr id="2" name="Title 1"/>
+          <p:cNvSpPr>
+            <a:spLocks noGrp="1"/>
+          </p:cNvSpPr>
+          <p:nvPr>
+            <p:ph type="title"/>
+          </p:nvPr>
+        </p:nvSpPr>
+        <p:spPr>
+          <a:xfrm>
+            <a:off x="839788" y="457200"/>
+            <a:ext cx="3932237" cy="1600200"/>
+          </a:xfrm>
+        </p:spPr>
+        <p:txBody>
+          <a:bodyPr anchor="b"/>
+          <a:lstStyle>
+            <a:lvl1pPr>
+              <a:defRPr sz="3200"/>
+            </a:lvl1pPr>
+          </a:lstStyle>
+          <a:p>
+            <a:r>
+              <a:rPr lang="zh-CN" altLang="en-US" smtClean="0"/>
+              <a:t>单击此处编辑母版标题样式</a:t>
+            </a:r>
+            <a:endParaRPr lang="en-US" dirty="0"/>
+          </a:p>
+        </p:txBody>
+      </p:sp>
+      <p:sp>
+        <p:nvSpPr>
+          <p:cNvPr id="3" name="Picture Placeholder 2"/>
+          <p:cNvSpPr>
+            <a:spLocks noGrp="1" noChangeAspect="1"/>
+          </p:cNvSpPr>
+          <p:nvPr>
+            <p:ph type="pic" idx="1"/>
+          </p:nvPr>
+        </p:nvSpPr>
+        <p:spPr>
+          <a:xfrm>
+            <a:off x="5183188" y="987425"/>
+            <a:ext cx="6172200" cy="4873625"/>
+          </a:xfrm>
+        </p:spPr>
+        <p:txBody>
+          <a:bodyPr anchor="t"/>
+          <a:lstStyle>
+            <a:lvl1pPr marL="0" indent="0">
+              <a:buNone/>
+              <a:defRPr sz="3200"/>
+            </a:lvl1pPr>
+            <a:lvl2pPr marL="457200" indent="0">
+              <a:buNone/>
+              <a:defRPr sz="2800"/>
+            </a:lvl2pPr>
+            <a:lvl3pPr marL="914400" indent="0">
+              <a:buNone/>
+              <a:defRPr sz="2400"/>
+            </a:lvl3pPr>
+            <a:lvl4pPr marL="1371600" indent="0">
+              <a:buNone/>
+              <a:defRPr sz="2000"/>
+            </a:lvl4pPr>
+            <a:lvl5pPr marL="1828800" indent="0">
+              <a:buNone/>
+              <a:defRPr sz="2000"/>
+            </a:lvl5pPr>
+            <a:lvl6pPr marL="2286000" indent="0">
+              <a:buNone/>
+              <a:defRPr sz="2000"/>
+            </a:lvl6pPr>
+            <a:lvl7pPr marL="2743200" indent="0">
+              <a:buNone/>
+              <a:defRPr sz="2000"/>
+            </a:lvl7pPr>
+            <a:lvl8pPr marL="3200400" indent="0">
+              <a:buNone/>
+              <a:defRPr sz="2000"/>
+            </a:lvl8pPr>
+            <a:lvl9pPr marL="3657600" indent="0">
+              <a:buNone/>
+              <a:defRPr sz="2000"/>
+            </a:lvl9pPr>
+          </a:lstStyle>
+          <a:p>
+            <a:r>
+              <a:rPr lang="zh-CN" altLang="en-US" smtClean="0"/>
+              <a:t>单击图标添加图片</a:t>
+            </a:r>
+            <a:endParaRPr lang="en-US" dirty="0"/>
+          </a:p>
+        </p:txBody>
+      </p:sp>
+      <p:sp>
+        <p:nvSpPr>
+          <p:cNvPr id="4" name="Text Placeholder 3"/>
+          <p:cNvSpPr>
+            <a:spLocks noGrp="1"/>
+          </p:cNvSpPr>
+          <p:nvPr>
+            <p:ph type="body" sz="half" idx="2"/>
+          </p:nvPr>
+        </p:nvSpPr>
+        <p:spPr>
+          <a:xfrm>
+            <a:off x="839788" y="2057400"/>
+            <a:ext cx="3932237" cy="3811588"/>
+          </a:xfrm>
+        </p:spPr>
+        <p:txBody>
+          <a:bodyPr/>
+          <a:lstStyle>
+            <a:lvl1pPr marL="0" indent="0">
+              <a:buNone/>
+              <a:defRPr sz="1600"/>
+            </a:lvl1pPr>
+            <a:lvl2pPr marL="457200" indent="0">
+              <a:buNone/>
+              <a:defRPr sz="1400"/>
+            </a:lvl2pPr>
+            <a:lvl3pPr marL="914400" indent="0">
+              <a:buNone/>
+              <a:defRPr sz="1200"/>
+            </a:lvl3pPr>
+            <a:lvl4pPr marL="1371600" indent="0">
+              <a:buNone/>
+              <a:defRPr sz="1000"/>
+            </a:lvl4pPr>
+            <a:lvl5pPr marL="1828800" indent="0">
+              <a:buNone/>
+              <a:defRPr sz="1000"/>
+            </a:lvl5pPr>
+            <a:lvl6pPr marL="2286000" indent="0">
+              <a:buNone/>
+              <a:defRPr sz="1000"/>
+            </a:lvl6pPr>
+            <a:lvl7pPr marL="2743200" indent="0">
+              <a:buNone/>
+              <a:defRPr sz="1000"/>
+            </a:lvl7pPr>
+            <a:lvl8pPr marL="3200400" indent="0">
+              <a:buNone/>
+              <a:defRPr sz="1000"/>
+            </a:lvl8pPr>
+            <a:lvl9pPr marL="3657600" indent="0">
+              <a:buNone/>
+              <a:defRPr sz="1000"/>
+            </a:lvl9pPr>
+          </a:lstStyle>
+          <a:p>
+            <a:pPr lvl="0"/>
+            <a:r>
+              <a:rPr lang="zh-CN" altLang="en-US" smtClean="0"/>
+              <a:t>单击此处编辑母版文本样式</a:t>
+            </a:r>
+            <a:endParaRPr lang="zh-CN" altLang="en-US" smtClean="0"/>
+          </a:p>
+        </p:txBody>
+      </p:sp>
+      <p:sp>
+        <p:nvSpPr>
+          <p:cNvPr id="5" name="Date Placeholder 4"/>
+          <p:cNvSpPr>
+            <a:spLocks noGrp="1"/>
+          </p:cNvSpPr>
+          <p:nvPr>
+            <p:ph type="dt" sz="half" idx="10"/>
+          </p:nvPr>
+        </p:nvSpPr>
+        <p:spPr/>
+        <p:txBody>
+          <a:bodyPr/>
+          <a:lstStyle/>
+          <a:p>
+            <a:fld id="{BEA18431-54C4-4585-82AD-D4BDE8FCC787}" type="datetimeFigureOut">
+              <a:rPr lang="zh-HK" altLang="en-US" smtClean="0"/>
+            </a:fld>
+            <a:endParaRPr lang="zh-HK" altLang="en-US"/>
+          </a:p>
+        </p:txBody>
+      </p:sp>
+      <p:sp>
+        <p:nvSpPr>
+          <p:cNvPr id="6" name="Footer Placeholder 5"/>
+          <p:cNvSpPr>
+            <a:spLocks noGrp="1"/>
+          </p:cNvSpPr>
+          <p:nvPr>
+            <p:ph type="ftr" sz="quarter" idx="11"/>
+          </p:nvPr>
+        </p:nvSpPr>
+        <p:spPr/>
+        <p:txBody>
+          <a:bodyPr/>
+          <a:lstStyle/>
+          <a:p>
+            <a:endParaRPr lang="zh-HK" altLang="en-US"/>
+          </a:p>
+        </p:txBody>
+      </p:sp>
+      <p:sp>
+        <p:nvSpPr>
+          <p:cNvPr id="7" name="Slide Number Placeholder 6"/>
+          <p:cNvSpPr>
+            <a:spLocks noGrp="1"/>
+          </p:cNvSpPr>
+          <p:nvPr>
+            <p:ph type="sldNum" sz="quarter" idx="12"/>
+          </p:nvPr>
+        </p:nvSpPr>
+        <p:spPr/>
+        <p:txBody>
+          <a:bodyPr/>
+          <a:lstStyle/>
+          <a:p>
+            <a:fld id="{8592E714-8771-4256-B120-A1444CD7D5F3}" type="slidenum">
+              <a:rPr lang="zh-HK" altLang="en-US" smtClean="0"/>
+            </a:fld>
+            <a:endParaRPr lang="zh-HK" altLang="en-US"/>
+          </a:p>
+        </p:txBody>
+      </p:sp>
+    </p:spTree>
+  </p:cSld>
+  <p:clrMapOvr>
+    <a:masterClrMapping/>
+  </p:clrMapOvr>
+  <mc:AlternateContent xmlns:mc="http://schemas.openxmlformats.org/markup-compatibility/2006">
+    <mc:Choice xmlns:p14="http://schemas.microsoft.com/office/powerpoint/2010/main" Requires="p14">
+      <p:transition p14:dur="500"/>
+    </mc:Choice>
+    <mc:Fallback>
+      <p:transition/>
+    </mc:Fallback>
+  </mc:AlternateContent>
+</p:sldLayout>
+</file>
+
+<file path=ppt/slideLayouts/slideLayout11.xml><?xml version="1.0" encoding="utf-8"?>
+<p:sldLayout xmlns:a="http://schemas.openxmlformats.org/drawingml/2006/main" xmlns:r="http://schemas.openxmlformats.org/officeDocument/2006/relationships" xmlns:p="http://schemas.openxmlformats.org/presentationml/2006/main" type="vertTx" preserve="1">
+  <p:cSld name="标题和竖排文字">
+    <p:spTree>
+      <p:nvGrpSpPr>
+        <p:cNvPr id="1" name=""/>
+        <p:cNvGrpSpPr/>
+        <p:nvPr/>
+      </p:nvGrpSpPr>
+      <p:grpSpPr>
+        <a:xfrm>
+          <a:off x="0" y="0"/>
+          <a:ext cx="0" cy="0"/>
+          <a:chOff x="0" y="0"/>
+          <a:chExt cx="0" cy="0"/>
+        </a:xfrm>
+      </p:grpSpPr>
+      <p:sp>
+        <p:nvSpPr>
+          <p:cNvPr id="2" name="Title 1"/>
+          <p:cNvSpPr>
+            <a:spLocks noGrp="1"/>
+          </p:cNvSpPr>
+          <p:nvPr>
+            <p:ph type="title"/>
+          </p:nvPr>
+        </p:nvSpPr>
+        <p:spPr/>
+        <p:txBody>
+          <a:bodyPr/>
+          <a:lstStyle/>
+          <a:p>
+            <a:r>
+              <a:rPr lang="zh-CN" altLang="en-US" smtClean="0"/>
+              <a:t>单击此处编辑母版标题样式</a:t>
+            </a:r>
+            <a:endParaRPr lang="en-US" dirty="0"/>
+          </a:p>
+        </p:txBody>
+      </p:sp>
+      <p:sp>
+        <p:nvSpPr>
+          <p:cNvPr id="3" name="Vertical Text Placeholder 2"/>
+          <p:cNvSpPr>
+            <a:spLocks noGrp="1"/>
+          </p:cNvSpPr>
+          <p:nvPr>
+            <p:ph type="body" orient="vert" idx="1"/>
+          </p:nvPr>
+        </p:nvSpPr>
+        <p:spPr/>
+        <p:txBody>
+          <a:bodyPr vert="eaVert"/>
+          <a:lstStyle/>
+          <a:p>
+            <a:pPr lvl="0"/>
+            <a:r>
+              <a:rPr lang="zh-CN" altLang="en-US" smtClean="0"/>
+              <a:t>单击此处编辑母版文本样式</a:t>
+            </a:r>
+            <a:endParaRPr lang="zh-CN" altLang="en-US" smtClean="0"/>
+          </a:p>
+          <a:p>
+            <a:pPr lvl="1"/>
+            <a:r>
+              <a:rPr lang="zh-CN" altLang="en-US" smtClean="0"/>
+              <a:t>第二级</a:t>
+            </a:r>
+            <a:endParaRPr lang="zh-CN" altLang="en-US" smtClean="0"/>
+          </a:p>
+          <a:p>
+            <a:pPr lvl="2"/>
+            <a:r>
+              <a:rPr lang="zh-CN" altLang="en-US" smtClean="0"/>
+              <a:t>第三级</a:t>
+            </a:r>
+            <a:endParaRPr lang="zh-CN" altLang="en-US" smtClean="0"/>
+          </a:p>
+          <a:p>
+            <a:pPr lvl="3"/>
+            <a:r>
+              <a:rPr lang="zh-CN" altLang="en-US" smtClean="0"/>
+              <a:t>第四级</a:t>
+            </a:r>
+            <a:endParaRPr lang="zh-CN" altLang="en-US" smtClean="0"/>
+          </a:p>
+          <a:p>
+            <a:pPr lvl="4"/>
+            <a:r>
+              <a:rPr lang="zh-CN" altLang="en-US" smtClean="0"/>
+              <a:t>第五级</a:t>
+            </a:r>
+            <a:endParaRPr lang="en-US" dirty="0"/>
+          </a:p>
+        </p:txBody>
+      </p:sp>
+      <p:sp>
+        <p:nvSpPr>
+          <p:cNvPr id="4" name="Date Placeholder 3"/>
+          <p:cNvSpPr>
+            <a:spLocks noGrp="1"/>
+          </p:cNvSpPr>
+          <p:nvPr>
+            <p:ph type="dt" sz="half" idx="10"/>
+          </p:nvPr>
+        </p:nvSpPr>
+        <p:spPr/>
+        <p:txBody>
+          <a:bodyPr/>
+          <a:lstStyle/>
+          <a:p>
+            <a:fld id="{BEA18431-54C4-4585-82AD-D4BDE8FCC787}" type="datetimeFigureOut">
+              <a:rPr lang="zh-HK" altLang="en-US" smtClean="0"/>
+            </a:fld>
+            <a:endParaRPr lang="zh-HK" altLang="en-US"/>
+          </a:p>
+        </p:txBody>
+      </p:sp>
+      <p:sp>
+        <p:nvSpPr>
+          <p:cNvPr id="5" name="Footer Placeholder 4"/>
+          <p:cNvSpPr>
+            <a:spLocks noGrp="1"/>
+          </p:cNvSpPr>
+          <p:nvPr>
+            <p:ph type="ftr" sz="quarter" idx="11"/>
+          </p:nvPr>
+        </p:nvSpPr>
+        <p:spPr/>
+        <p:txBody>
+          <a:bodyPr/>
+          <a:lstStyle/>
+          <a:p>
+            <a:endParaRPr lang="zh-HK" altLang="en-US"/>
+          </a:p>
+        </p:txBody>
+      </p:sp>
+      <p:sp>
+        <p:nvSpPr>
+          <p:cNvPr id="6" name="Slide Number Placeholder 5"/>
+          <p:cNvSpPr>
+            <a:spLocks noGrp="1"/>
+          </p:cNvSpPr>
+          <p:nvPr>
+            <p:ph type="sldNum" sz="quarter" idx="12"/>
+          </p:nvPr>
+        </p:nvSpPr>
+        <p:spPr/>
+        <p:txBody>
+          <a:bodyPr/>
+          <a:lstStyle/>
+          <a:p>
+            <a:fld id="{8592E714-8771-4256-B120-A1444CD7D5F3}" type="slidenum">
+              <a:rPr lang="zh-HK" altLang="en-US" smtClean="0"/>
+            </a:fld>
+            <a:endParaRPr lang="zh-HK" altLang="en-US"/>
+          </a:p>
+        </p:txBody>
+      </p:sp>
+    </p:spTree>
+  </p:cSld>
+  <p:clrMapOvr>
+    <a:masterClrMapping/>
+  </p:clrMapOvr>
+  <mc:AlternateContent xmlns:mc="http://schemas.openxmlformats.org/markup-compatibility/2006">
+    <mc:Choice xmlns:p14="http://schemas.microsoft.com/office/powerpoint/2010/main" Requires="p14">
+      <p:transition p14:dur="500"/>
+    </mc:Choice>
+    <mc:Fallback>
+      <p:transition/>
+    </mc:Fallback>
+  </mc:AlternateContent>
+</p:sldLayout>
+</file>
+
+<file path=ppt/slideLayouts/slideLayout12.xml><?xml version="1.0" encoding="utf-8"?>
+<p:sldLayout xmlns:a="http://schemas.openxmlformats.org/drawingml/2006/main" xmlns:r="http://schemas.openxmlformats.org/officeDocument/2006/relationships" xmlns:p="http://schemas.openxmlformats.org/presentationml/2006/main" type="vertTitleAndTx" preserve="1">
+  <p:cSld name="垂直排列标题与&#10;文本">
+    <p:spTree>
+      <p:nvGrpSpPr>
+        <p:cNvPr id="1" name=""/>
+        <p:cNvGrpSpPr/>
+        <p:nvPr/>
+      </p:nvGrpSpPr>
+      <p:grpSpPr>
+        <a:xfrm>
+          <a:off x="0" y="0"/>
+          <a:ext cx="0" cy="0"/>
+          <a:chOff x="0" y="0"/>
+          <a:chExt cx="0" cy="0"/>
+        </a:xfrm>
+      </p:grpSpPr>
+      <p:sp>
+        <p:nvSpPr>
+          <p:cNvPr id="2" name="Vertical Title 1"/>
+          <p:cNvSpPr>
+            <a:spLocks noGrp="1"/>
+          </p:cNvSpPr>
+          <p:nvPr>
+            <p:ph type="title" orient="vert"/>
+          </p:nvPr>
+        </p:nvSpPr>
+        <p:spPr>
+          <a:xfrm>
+            <a:off x="8724900" y="365125"/>
+            <a:ext cx="2628900" cy="5811838"/>
+          </a:xfrm>
+        </p:spPr>
+        <p:txBody>
+          <a:bodyPr vert="eaVert"/>
+          <a:lstStyle/>
+          <a:p>
+            <a:r>
+              <a:rPr lang="zh-CN" altLang="en-US" smtClean="0"/>
+              <a:t>单击此处编辑母版标题样式</a:t>
+            </a:r>
+            <a:endParaRPr lang="en-US" dirty="0"/>
+          </a:p>
+        </p:txBody>
+      </p:sp>
+      <p:sp>
+        <p:nvSpPr>
+          <p:cNvPr id="3" name="Vertical Text Placeholder 2"/>
+          <p:cNvSpPr>
+            <a:spLocks noGrp="1"/>
+          </p:cNvSpPr>
+          <p:nvPr>
+            <p:ph type="body" orient="vert" idx="1"/>
+          </p:nvPr>
+        </p:nvSpPr>
+        <p:spPr>
+          <a:xfrm>
+            <a:off x="838200" y="365125"/>
+            <a:ext cx="7734300" cy="5811838"/>
+          </a:xfrm>
+        </p:spPr>
+        <p:txBody>
+          <a:bodyPr vert="eaVert"/>
+          <a:lstStyle/>
+          <a:p>
+            <a:pPr lvl="0"/>
+            <a:r>
+              <a:rPr lang="zh-CN" altLang="en-US" smtClean="0"/>
+              <a:t>单击此处编辑母版文本样式</a:t>
+            </a:r>
+            <a:endParaRPr lang="zh-CN" altLang="en-US" smtClean="0"/>
+          </a:p>
+          <a:p>
+            <a:pPr lvl="1"/>
+            <a:r>
+              <a:rPr lang="zh-CN" altLang="en-US" smtClean="0"/>
+              <a:t>第二级</a:t>
+            </a:r>
+            <a:endParaRPr lang="zh-CN" altLang="en-US" smtClean="0"/>
+          </a:p>
+          <a:p>
+            <a:pPr lvl="2"/>
+            <a:r>
+              <a:rPr lang="zh-CN" altLang="en-US" smtClean="0"/>
+              <a:t>第三级</a:t>
+            </a:r>
+            <a:endParaRPr lang="zh-CN" altLang="en-US" smtClean="0"/>
+          </a:p>
+          <a:p>
+            <a:pPr lvl="3"/>
+            <a:r>
+              <a:rPr lang="zh-CN" altLang="en-US" smtClean="0"/>
+              <a:t>第四级</a:t>
+            </a:r>
+            <a:endParaRPr lang="zh-CN" altLang="en-US" smtClean="0"/>
+          </a:p>
+          <a:p>
+            <a:pPr lvl="4"/>
+            <a:r>
+              <a:rPr lang="zh-CN" altLang="en-US" smtClean="0"/>
+              <a:t>第五级</a:t>
+            </a:r>
+            <a:endParaRPr lang="en-US" dirty="0"/>
+          </a:p>
+        </p:txBody>
+      </p:sp>
+      <p:sp>
+        <p:nvSpPr>
+          <p:cNvPr id="4" name="Date Placeholder 3"/>
+          <p:cNvSpPr>
+            <a:spLocks noGrp="1"/>
+          </p:cNvSpPr>
+          <p:nvPr>
+            <p:ph type="dt" sz="half" idx="10"/>
+          </p:nvPr>
+        </p:nvSpPr>
+        <p:spPr/>
+        <p:txBody>
+          <a:bodyPr/>
+          <a:lstStyle/>
+          <a:p>
+            <a:fld id="{BEA18431-54C4-4585-82AD-D4BDE8FCC787}" type="datetimeFigureOut">
+              <a:rPr lang="zh-HK" altLang="en-US" smtClean="0"/>
+            </a:fld>
+            <a:endParaRPr lang="zh-HK" altLang="en-US"/>
+          </a:p>
+        </p:txBody>
+      </p:sp>
+      <p:sp>
+        <p:nvSpPr>
+          <p:cNvPr id="5" name="Footer Placeholder 4"/>
+          <p:cNvSpPr>
+            <a:spLocks noGrp="1"/>
+          </p:cNvSpPr>
+          <p:nvPr>
+            <p:ph type="ftr" sz="quarter" idx="11"/>
+          </p:nvPr>
+        </p:nvSpPr>
+        <p:spPr/>
+        <p:txBody>
+          <a:bodyPr/>
+          <a:lstStyle/>
+          <a:p>
+            <a:endParaRPr lang="zh-HK" altLang="en-US"/>
+          </a:p>
+        </p:txBody>
+      </p:sp>
+      <p:sp>
+        <p:nvSpPr>
+          <p:cNvPr id="6" name="Slide Number Placeholder 5"/>
+          <p:cNvSpPr>
+            <a:spLocks noGrp="1"/>
+          </p:cNvSpPr>
+          <p:nvPr>
+            <p:ph type="sldNum" sz="quarter" idx="12"/>
+          </p:nvPr>
+        </p:nvSpPr>
+        <p:spPr/>
+        <p:txBody>
+          <a:bodyPr/>
+          <a:lstStyle/>
+          <a:p>
+            <a:fld id="{8592E714-8771-4256-B120-A1444CD7D5F3}" type="slidenum">
+              <a:rPr lang="zh-HK" altLang="en-US" smtClean="0"/>
+            </a:fld>
+            <a:endParaRPr lang="zh-HK" altLang="en-US"/>
+          </a:p>
+        </p:txBody>
+      </p:sp>
+    </p:spTree>
+  </p:cSld>
+  <p:clrMapOvr>
+    <a:masterClrMapping/>
+  </p:clrMapOvr>
+  <mc:AlternateContent xmlns:mc="http://schemas.openxmlformats.org/markup-compatibility/2006">
+    <mc:Choice xmlns:p14="http://schemas.microsoft.com/office/powerpoint/2010/main" Requires="p14">
+      <p:transition p14:dur="500"/>
+    </mc:Choice>
+    <mc:Fallback>
+      <p:transition/>
+    </mc:Fallback>
+  </mc:AlternateContent>
+</p:sldLayout>
+</file>
+
+<file path=ppt/slideLayouts/slideLayout2.xml><?xml version="1.0" encoding="utf-8"?>
 <p:sldLayout xmlns:a="http://schemas.openxmlformats.org/drawingml/2006/main" xmlns:r="http://schemas.openxmlformats.org/officeDocument/2006/relationships" xmlns:p="http://schemas.openxmlformats.org/presentationml/2006/main" type="title" preserve="1">
   <p:cSld name="标题幻灯片">
     <p:spTree>
@@ -127,7 +880,7 @@
       </p:grpSpPr>
       <p:sp>
         <p:nvSpPr>
-          <p:cNvPr id="2" name="标题 1"/>
+          <p:cNvPr id="2" name="Title 1"/>
           <p:cNvSpPr>
             <a:spLocks noGrp="1"/>
           </p:cNvSpPr>
@@ -153,13 +906,13 @@
               <a:rPr lang="zh-CN" altLang="en-US" smtClean="0"/>
               <a:t>单击此处编辑母版标题样式</a:t>
             </a:r>
-            <a:endParaRPr lang="zh-CN" altLang="en-US"/>
-          </a:p>
-        </p:txBody>
-      </p:sp>
-      <p:sp>
-        <p:nvSpPr>
-          <p:cNvPr id="3" name="副标题 2"/>
+            <a:endParaRPr lang="en-US" dirty="0"/>
+          </a:p>
+        </p:txBody>
+      </p:sp>
+      <p:sp>
+        <p:nvSpPr>
+          <p:cNvPr id="3" name="Subtitle 2"/>
           <p:cNvSpPr>
             <a:spLocks noGrp="1"/>
           </p:cNvSpPr>
@@ -218,13 +971,13 @@
               <a:rPr lang="zh-CN" altLang="en-US" smtClean="0"/>
               <a:t>单击此处编辑母版副标题样式</a:t>
             </a:r>
-            <a:endParaRPr lang="zh-CN" altLang="en-US"/>
-          </a:p>
-        </p:txBody>
-      </p:sp>
-      <p:sp>
-        <p:nvSpPr>
-          <p:cNvPr id="4" name="日期占位符 3"/>
+            <a:endParaRPr lang="en-US" dirty="0"/>
+          </a:p>
+        </p:txBody>
+      </p:sp>
+      <p:sp>
+        <p:nvSpPr>
+          <p:cNvPr id="4" name="Date Placeholder 3"/>
           <p:cNvSpPr>
             <a:spLocks noGrp="1"/>
           </p:cNvSpPr>
@@ -237,16 +990,16 @@
           <a:bodyPr/>
           <a:lstStyle/>
           <a:p>
-            <a:fld id="{82F288E0-7875-42C4-84C8-98DBBD3BF4D2}" type="datetimeFigureOut">
-              <a:rPr lang="zh-CN" altLang="en-US" smtClean="0"/>
+            <a:fld id="{BEA18431-54C4-4585-82AD-D4BDE8FCC787}" type="datetimeFigureOut">
+              <a:rPr lang="zh-HK" altLang="en-US" smtClean="0"/>
             </a:fld>
-            <a:endParaRPr lang="zh-CN" altLang="en-US"/>
-          </a:p>
-        </p:txBody>
-      </p:sp>
-      <p:sp>
-        <p:nvSpPr>
-          <p:cNvPr id="5" name="页脚占位符 4"/>
+            <a:endParaRPr lang="zh-HK" altLang="en-US"/>
+          </a:p>
+        </p:txBody>
+      </p:sp>
+      <p:sp>
+        <p:nvSpPr>
+          <p:cNvPr id="5" name="Footer Placeholder 4"/>
           <p:cNvSpPr>
             <a:spLocks noGrp="1"/>
           </p:cNvSpPr>
@@ -259,13 +1012,13 @@
           <a:bodyPr/>
           <a:lstStyle/>
           <a:p>
-            <a:endParaRPr lang="zh-CN" altLang="en-US"/>
-          </a:p>
-        </p:txBody>
-      </p:sp>
-      <p:sp>
-        <p:nvSpPr>
-          <p:cNvPr id="6" name="灯片编号占位符 5"/>
+            <a:endParaRPr lang="zh-HK" altLang="en-US"/>
+          </a:p>
+        </p:txBody>
+      </p:sp>
+      <p:sp>
+        <p:nvSpPr>
+          <p:cNvPr id="6" name="Slide Number Placeholder 5"/>
           <p:cNvSpPr>
             <a:spLocks noGrp="1"/>
           </p:cNvSpPr>
@@ -278,10 +1031,10 @@
           <a:bodyPr/>
           <a:lstStyle/>
           <a:p>
-            <a:fld id="{7D9BB5D0-35E4-459D-AEF3-FE4D7C45CC19}" type="slidenum">
-              <a:rPr lang="zh-CN" altLang="en-US" smtClean="0"/>
+            <a:fld id="{8592E714-8771-4256-B120-A1444CD7D5F3}" type="slidenum">
+              <a:rPr lang="zh-HK" altLang="en-US" smtClean="0"/>
             </a:fld>
-            <a:endParaRPr lang="zh-CN" altLang="en-US"/>
+            <a:endParaRPr lang="zh-HK" altLang="en-US"/>
           </a:p>
         </p:txBody>
       </p:sp>
@@ -290,354 +1043,18 @@
   <p:clrMapOvr>
     <a:masterClrMapping/>
   </p:clrMapOvr>
+  <mc:AlternateContent xmlns:mc="http://schemas.openxmlformats.org/markup-compatibility/2006">
+    <mc:Choice xmlns:p14="http://schemas.microsoft.com/office/powerpoint/2010/main" Requires="p14">
+      <p:transition p14:dur="500"/>
+    </mc:Choice>
+    <mc:Fallback>
+      <p:transition/>
+    </mc:Fallback>
+  </mc:AlternateContent>
 </p:sldLayout>
 </file>
 
-<file path=ppt/slideLayouts/slideLayout10.xml><?xml version="1.0" encoding="utf-8"?>
-<p:sldLayout xmlns:a="http://schemas.openxmlformats.org/drawingml/2006/main" xmlns:r="http://schemas.openxmlformats.org/officeDocument/2006/relationships" xmlns:p="http://schemas.openxmlformats.org/presentationml/2006/main" type="vertTx" preserve="1">
-  <p:cSld name="标题和竖排文字">
-    <p:spTree>
-      <p:nvGrpSpPr>
-        <p:cNvPr id="1" name=""/>
-        <p:cNvGrpSpPr/>
-        <p:nvPr/>
-      </p:nvGrpSpPr>
-      <p:grpSpPr>
-        <a:xfrm>
-          <a:off x="0" y="0"/>
-          <a:ext cx="0" cy="0"/>
-          <a:chOff x="0" y="0"/>
-          <a:chExt cx="0" cy="0"/>
-        </a:xfrm>
-      </p:grpSpPr>
-      <p:sp>
-        <p:nvSpPr>
-          <p:cNvPr id="2" name="标题 1"/>
-          <p:cNvSpPr>
-            <a:spLocks noGrp="1"/>
-          </p:cNvSpPr>
-          <p:nvPr>
-            <p:ph type="title"/>
-          </p:nvPr>
-        </p:nvSpPr>
-        <p:spPr/>
-        <p:txBody>
-          <a:bodyPr/>
-          <a:lstStyle/>
-          <a:p>
-            <a:r>
-              <a:rPr lang="zh-CN" altLang="en-US" smtClean="0"/>
-              <a:t>单击此处编辑母版标题样式</a:t>
-            </a:r>
-            <a:endParaRPr lang="zh-CN" altLang="en-US"/>
-          </a:p>
-        </p:txBody>
-      </p:sp>
-      <p:sp>
-        <p:nvSpPr>
-          <p:cNvPr id="3" name="竖排文字占位符 2"/>
-          <p:cNvSpPr>
-            <a:spLocks noGrp="1"/>
-          </p:cNvSpPr>
-          <p:nvPr>
-            <p:ph type="body" orient="vert" idx="1"/>
-          </p:nvPr>
-        </p:nvSpPr>
-        <p:spPr/>
-        <p:txBody>
-          <a:bodyPr vert="eaVert"/>
-          <a:lstStyle/>
-          <a:p>
-            <a:pPr lvl="0"/>
-            <a:r>
-              <a:rPr lang="zh-CN" altLang="en-US" smtClean="0"/>
-              <a:t>单击此处编辑母版文本样式</a:t>
-            </a:r>
-            <a:endParaRPr lang="zh-CN" altLang="en-US" smtClean="0"/>
-          </a:p>
-          <a:p>
-            <a:pPr lvl="1"/>
-            <a:r>
-              <a:rPr lang="zh-CN" altLang="en-US" smtClean="0"/>
-              <a:t>第二级</a:t>
-            </a:r>
-            <a:endParaRPr lang="zh-CN" altLang="en-US" smtClean="0"/>
-          </a:p>
-          <a:p>
-            <a:pPr lvl="2"/>
-            <a:r>
-              <a:rPr lang="zh-CN" altLang="en-US" smtClean="0"/>
-              <a:t>第三级</a:t>
-            </a:r>
-            <a:endParaRPr lang="zh-CN" altLang="en-US" smtClean="0"/>
-          </a:p>
-          <a:p>
-            <a:pPr lvl="3"/>
-            <a:r>
-              <a:rPr lang="zh-CN" altLang="en-US" smtClean="0"/>
-              <a:t>第四级</a:t>
-            </a:r>
-            <a:endParaRPr lang="zh-CN" altLang="en-US" smtClean="0"/>
-          </a:p>
-          <a:p>
-            <a:pPr lvl="4"/>
-            <a:r>
-              <a:rPr lang="zh-CN" altLang="en-US" smtClean="0"/>
-              <a:t>第五级</a:t>
-            </a:r>
-            <a:endParaRPr lang="zh-CN" altLang="en-US"/>
-          </a:p>
-        </p:txBody>
-      </p:sp>
-      <p:sp>
-        <p:nvSpPr>
-          <p:cNvPr id="4" name="日期占位符 3"/>
-          <p:cNvSpPr>
-            <a:spLocks noGrp="1"/>
-          </p:cNvSpPr>
-          <p:nvPr>
-            <p:ph type="dt" sz="half" idx="10"/>
-          </p:nvPr>
-        </p:nvSpPr>
-        <p:spPr/>
-        <p:txBody>
-          <a:bodyPr/>
-          <a:lstStyle/>
-          <a:p>
-            <a:fld id="{82F288E0-7875-42C4-84C8-98DBBD3BF4D2}" type="datetimeFigureOut">
-              <a:rPr lang="zh-CN" altLang="en-US" smtClean="0"/>
-            </a:fld>
-            <a:endParaRPr lang="zh-CN" altLang="en-US"/>
-          </a:p>
-        </p:txBody>
-      </p:sp>
-      <p:sp>
-        <p:nvSpPr>
-          <p:cNvPr id="5" name="页脚占位符 4"/>
-          <p:cNvSpPr>
-            <a:spLocks noGrp="1"/>
-          </p:cNvSpPr>
-          <p:nvPr>
-            <p:ph type="ftr" sz="quarter" idx="11"/>
-          </p:nvPr>
-        </p:nvSpPr>
-        <p:spPr/>
-        <p:txBody>
-          <a:bodyPr/>
-          <a:lstStyle/>
-          <a:p>
-            <a:endParaRPr lang="zh-CN" altLang="en-US"/>
-          </a:p>
-        </p:txBody>
-      </p:sp>
-      <p:sp>
-        <p:nvSpPr>
-          <p:cNvPr id="6" name="灯片编号占位符 5"/>
-          <p:cNvSpPr>
-            <a:spLocks noGrp="1"/>
-          </p:cNvSpPr>
-          <p:nvPr>
-            <p:ph type="sldNum" sz="quarter" idx="12"/>
-          </p:nvPr>
-        </p:nvSpPr>
-        <p:spPr/>
-        <p:txBody>
-          <a:bodyPr/>
-          <a:lstStyle/>
-          <a:p>
-            <a:fld id="{7D9BB5D0-35E4-459D-AEF3-FE4D7C45CC19}" type="slidenum">
-              <a:rPr lang="zh-CN" altLang="en-US" smtClean="0"/>
-            </a:fld>
-            <a:endParaRPr lang="zh-CN" altLang="en-US"/>
-          </a:p>
-        </p:txBody>
-      </p:sp>
-    </p:spTree>
-  </p:cSld>
-  <p:clrMapOvr>
-    <a:masterClrMapping/>
-  </p:clrMapOvr>
-</p:sldLayout>
-</file>
-
-<file path=ppt/slideLayouts/slideLayout11.xml><?xml version="1.0" encoding="utf-8"?>
-<p:sldLayout xmlns:a="http://schemas.openxmlformats.org/drawingml/2006/main" xmlns:r="http://schemas.openxmlformats.org/officeDocument/2006/relationships" xmlns:p="http://schemas.openxmlformats.org/presentationml/2006/main" type="vertTitleAndTx" preserve="1">
-  <p:cSld name="垂直排列标题与&#10;文本">
-    <p:spTree>
-      <p:nvGrpSpPr>
-        <p:cNvPr id="1" name=""/>
-        <p:cNvGrpSpPr/>
-        <p:nvPr/>
-      </p:nvGrpSpPr>
-      <p:grpSpPr>
-        <a:xfrm>
-          <a:off x="0" y="0"/>
-          <a:ext cx="0" cy="0"/>
-          <a:chOff x="0" y="0"/>
-          <a:chExt cx="0" cy="0"/>
-        </a:xfrm>
-      </p:grpSpPr>
-      <p:sp>
-        <p:nvSpPr>
-          <p:cNvPr id="2" name="竖排标题 1"/>
-          <p:cNvSpPr>
-            <a:spLocks noGrp="1"/>
-          </p:cNvSpPr>
-          <p:nvPr>
-            <p:ph type="title" orient="vert"/>
-          </p:nvPr>
-        </p:nvSpPr>
-        <p:spPr>
-          <a:xfrm>
-            <a:off x="8724900" y="365125"/>
-            <a:ext cx="2628900" cy="5811838"/>
-          </a:xfrm>
-        </p:spPr>
-        <p:txBody>
-          <a:bodyPr vert="eaVert"/>
-          <a:lstStyle/>
-          <a:p>
-            <a:r>
-              <a:rPr lang="zh-CN" altLang="en-US" smtClean="0"/>
-              <a:t>单击此处编辑母版标题样式</a:t>
-            </a:r>
-            <a:endParaRPr lang="zh-CN" altLang="en-US"/>
-          </a:p>
-        </p:txBody>
-      </p:sp>
-      <p:sp>
-        <p:nvSpPr>
-          <p:cNvPr id="3" name="竖排文字占位符 2"/>
-          <p:cNvSpPr>
-            <a:spLocks noGrp="1"/>
-          </p:cNvSpPr>
-          <p:nvPr>
-            <p:ph type="body" orient="vert" idx="1"/>
-          </p:nvPr>
-        </p:nvSpPr>
-        <p:spPr>
-          <a:xfrm>
-            <a:off x="838200" y="365125"/>
-            <a:ext cx="7734300" cy="5811838"/>
-          </a:xfrm>
-        </p:spPr>
-        <p:txBody>
-          <a:bodyPr vert="eaVert"/>
-          <a:lstStyle/>
-          <a:p>
-            <a:pPr lvl="0"/>
-            <a:r>
-              <a:rPr lang="zh-CN" altLang="en-US" smtClean="0"/>
-              <a:t>单击此处编辑母版文本样式</a:t>
-            </a:r>
-            <a:endParaRPr lang="zh-CN" altLang="en-US" smtClean="0"/>
-          </a:p>
-          <a:p>
-            <a:pPr lvl="1"/>
-            <a:r>
-              <a:rPr lang="zh-CN" altLang="en-US" smtClean="0"/>
-              <a:t>第二级</a:t>
-            </a:r>
-            <a:endParaRPr lang="zh-CN" altLang="en-US" smtClean="0"/>
-          </a:p>
-          <a:p>
-            <a:pPr lvl="2"/>
-            <a:r>
-              <a:rPr lang="zh-CN" altLang="en-US" smtClean="0"/>
-              <a:t>第三级</a:t>
-            </a:r>
-            <a:endParaRPr lang="zh-CN" altLang="en-US" smtClean="0"/>
-          </a:p>
-          <a:p>
-            <a:pPr lvl="3"/>
-            <a:r>
-              <a:rPr lang="zh-CN" altLang="en-US" smtClean="0"/>
-              <a:t>第四级</a:t>
-            </a:r>
-            <a:endParaRPr lang="zh-CN" altLang="en-US" smtClean="0"/>
-          </a:p>
-          <a:p>
-            <a:pPr lvl="4"/>
-            <a:r>
-              <a:rPr lang="zh-CN" altLang="en-US" smtClean="0"/>
-              <a:t>第五级</a:t>
-            </a:r>
-            <a:endParaRPr lang="zh-CN" altLang="en-US"/>
-          </a:p>
-        </p:txBody>
-      </p:sp>
-      <p:sp>
-        <p:nvSpPr>
-          <p:cNvPr id="4" name="日期占位符 3"/>
-          <p:cNvSpPr>
-            <a:spLocks noGrp="1"/>
-          </p:cNvSpPr>
-          <p:nvPr>
-            <p:ph type="dt" sz="half" idx="10"/>
-          </p:nvPr>
-        </p:nvSpPr>
-        <p:spPr/>
-        <p:txBody>
-          <a:bodyPr/>
-          <a:lstStyle/>
-          <a:p>
-            <a:fld id="{82F288E0-7875-42C4-84C8-98DBBD3BF4D2}" type="datetimeFigureOut">
-              <a:rPr lang="zh-CN" altLang="en-US" smtClean="0"/>
-            </a:fld>
-            <a:endParaRPr lang="zh-CN" altLang="en-US"/>
-          </a:p>
-        </p:txBody>
-      </p:sp>
-      <p:sp>
-        <p:nvSpPr>
-          <p:cNvPr id="5" name="页脚占位符 4"/>
-          <p:cNvSpPr>
-            <a:spLocks noGrp="1"/>
-          </p:cNvSpPr>
-          <p:nvPr>
-            <p:ph type="ftr" sz="quarter" idx="11"/>
-          </p:nvPr>
-        </p:nvSpPr>
-        <p:spPr/>
-        <p:txBody>
-          <a:bodyPr/>
-          <a:lstStyle/>
-          <a:p>
-            <a:endParaRPr lang="zh-CN" altLang="en-US"/>
-          </a:p>
-        </p:txBody>
-      </p:sp>
-      <p:sp>
-        <p:nvSpPr>
-          <p:cNvPr id="6" name="灯片编号占位符 5"/>
-          <p:cNvSpPr>
-            <a:spLocks noGrp="1"/>
-          </p:cNvSpPr>
-          <p:nvPr>
-            <p:ph type="sldNum" sz="quarter" idx="12"/>
-          </p:nvPr>
-        </p:nvSpPr>
-        <p:spPr/>
-        <p:txBody>
-          <a:bodyPr/>
-          <a:lstStyle/>
-          <a:p>
-            <a:fld id="{7D9BB5D0-35E4-459D-AEF3-FE4D7C45CC19}" type="slidenum">
-              <a:rPr lang="zh-CN" altLang="en-US" smtClean="0"/>
-            </a:fld>
-            <a:endParaRPr lang="zh-CN" altLang="en-US"/>
-          </a:p>
-        </p:txBody>
-      </p:sp>
-    </p:spTree>
-  </p:cSld>
-  <p:clrMapOvr>
-    <a:masterClrMapping/>
-  </p:clrMapOvr>
-</p:sldLayout>
-</file>
-
-<file path=ppt/slideLayouts/slideLayout2.xml><?xml version="1.0" encoding="utf-8"?>
+<file path=ppt/slideLayouts/slideLayout3.xml><?xml version="1.0" encoding="utf-8"?>
 <p:sldLayout xmlns:a="http://schemas.openxmlformats.org/drawingml/2006/main" xmlns:r="http://schemas.openxmlformats.org/officeDocument/2006/relationships" xmlns:p="http://schemas.openxmlformats.org/presentationml/2006/main" type="obj" preserve="1">
   <p:cSld name="标题和内容">
     <p:spTree>
@@ -656,7 +1073,7 @@
       </p:grpSpPr>
       <p:sp>
         <p:nvSpPr>
-          <p:cNvPr id="2" name="标题 1"/>
+          <p:cNvPr id="2" name="Title 1"/>
           <p:cNvSpPr>
             <a:spLocks noGrp="1"/>
           </p:cNvSpPr>
@@ -673,13 +1090,13 @@
               <a:rPr lang="zh-CN" altLang="en-US" smtClean="0"/>
               <a:t>单击此处编辑母版标题样式</a:t>
             </a:r>
-            <a:endParaRPr lang="zh-CN" altLang="en-US"/>
-          </a:p>
-        </p:txBody>
-      </p:sp>
-      <p:sp>
-        <p:nvSpPr>
-          <p:cNvPr id="3" name="内容占位符 2"/>
+            <a:endParaRPr lang="en-US" dirty="0"/>
+          </a:p>
+        </p:txBody>
+      </p:sp>
+      <p:sp>
+        <p:nvSpPr>
+          <p:cNvPr id="3" name="Content Placeholder 2"/>
           <p:cNvSpPr>
             <a:spLocks noGrp="1"/>
           </p:cNvSpPr>
@@ -729,13 +1146,13 @@
               <a:rPr lang="zh-CN" altLang="en-US" smtClean="0"/>
               <a:t>第五级</a:t>
             </a:r>
-            <a:endParaRPr lang="zh-CN" altLang="en-US"/>
-          </a:p>
-        </p:txBody>
-      </p:sp>
-      <p:sp>
-        <p:nvSpPr>
-          <p:cNvPr id="4" name="日期占位符 3"/>
+            <a:endParaRPr lang="en-US" dirty="0"/>
+          </a:p>
+        </p:txBody>
+      </p:sp>
+      <p:sp>
+        <p:nvSpPr>
+          <p:cNvPr id="4" name="Date Placeholder 3"/>
           <p:cNvSpPr>
             <a:spLocks noGrp="1"/>
           </p:cNvSpPr>
@@ -748,16 +1165,16 @@
           <a:bodyPr/>
           <a:lstStyle/>
           <a:p>
-            <a:fld id="{82F288E0-7875-42C4-84C8-98DBBD3BF4D2}" type="datetimeFigureOut">
-              <a:rPr lang="zh-CN" altLang="en-US" smtClean="0"/>
+            <a:fld id="{BEA18431-54C4-4585-82AD-D4BDE8FCC787}" type="datetimeFigureOut">
+              <a:rPr lang="zh-HK" altLang="en-US" smtClean="0"/>
             </a:fld>
-            <a:endParaRPr lang="zh-CN" altLang="en-US"/>
-          </a:p>
-        </p:txBody>
-      </p:sp>
-      <p:sp>
-        <p:nvSpPr>
-          <p:cNvPr id="5" name="页脚占位符 4"/>
+            <a:endParaRPr lang="zh-HK" altLang="en-US"/>
+          </a:p>
+        </p:txBody>
+      </p:sp>
+      <p:sp>
+        <p:nvSpPr>
+          <p:cNvPr id="5" name="Footer Placeholder 4"/>
           <p:cNvSpPr>
             <a:spLocks noGrp="1"/>
           </p:cNvSpPr>
@@ -770,13 +1187,13 @@
           <a:bodyPr/>
           <a:lstStyle/>
           <a:p>
-            <a:endParaRPr lang="zh-CN" altLang="en-US"/>
-          </a:p>
-        </p:txBody>
-      </p:sp>
-      <p:sp>
-        <p:nvSpPr>
-          <p:cNvPr id="6" name="灯片编号占位符 5"/>
+            <a:endParaRPr lang="zh-HK" altLang="en-US"/>
+          </a:p>
+        </p:txBody>
+      </p:sp>
+      <p:sp>
+        <p:nvSpPr>
+          <p:cNvPr id="6" name="Slide Number Placeholder 5"/>
           <p:cNvSpPr>
             <a:spLocks noGrp="1"/>
           </p:cNvSpPr>
@@ -789,10 +1206,10 @@
           <a:bodyPr/>
           <a:lstStyle/>
           <a:p>
-            <a:fld id="{7D9BB5D0-35E4-459D-AEF3-FE4D7C45CC19}" type="slidenum">
-              <a:rPr lang="zh-CN" altLang="en-US" smtClean="0"/>
+            <a:fld id="{8592E714-8771-4256-B120-A1444CD7D5F3}" type="slidenum">
+              <a:rPr lang="zh-HK" altLang="en-US" smtClean="0"/>
             </a:fld>
-            <a:endParaRPr lang="zh-CN" altLang="en-US"/>
+            <a:endParaRPr lang="zh-HK" altLang="en-US"/>
           </a:p>
         </p:txBody>
       </p:sp>
@@ -801,10 +1218,18 @@
   <p:clrMapOvr>
     <a:masterClrMapping/>
   </p:clrMapOvr>
+  <mc:AlternateContent xmlns:mc="http://schemas.openxmlformats.org/markup-compatibility/2006">
+    <mc:Choice xmlns:p14="http://schemas.microsoft.com/office/powerpoint/2010/main" Requires="p14">
+      <p:transition p14:dur="500"/>
+    </mc:Choice>
+    <mc:Fallback>
+      <p:transition/>
+    </mc:Fallback>
+  </mc:AlternateContent>
 </p:sldLayout>
 </file>
 
-<file path=ppt/slideLayouts/slideLayout3.xml><?xml version="1.0" encoding="utf-8"?>
+<file path=ppt/slideLayouts/slideLayout4.xml><?xml version="1.0" encoding="utf-8"?>
 <p:sldLayout xmlns:a="http://schemas.openxmlformats.org/drawingml/2006/main" xmlns:r="http://schemas.openxmlformats.org/officeDocument/2006/relationships" xmlns:p="http://schemas.openxmlformats.org/presentationml/2006/main" type="secHead" preserve="1">
   <p:cSld name="节标题">
     <p:spTree>
@@ -823,7 +1248,7 @@
       </p:grpSpPr>
       <p:sp>
         <p:nvSpPr>
-          <p:cNvPr id="2" name="标题 1"/>
+          <p:cNvPr id="7" name="Title 1"/>
           <p:cNvSpPr>
             <a:spLocks noGrp="1"/>
           </p:cNvSpPr>
@@ -833,205 +1258,18 @@
         </p:nvSpPr>
         <p:spPr>
           <a:xfrm>
-            <a:off x="831850" y="1709738"/>
-            <a:ext cx="10515600" cy="2852737"/>
+            <a:off x="72390" y="162560"/>
+            <a:ext cx="10515600" cy="1123315"/>
           </a:xfrm>
         </p:spPr>
         <p:txBody>
-          <a:bodyPr anchor="b"/>
-          <a:lstStyle>
-            <a:lvl1pPr>
-              <a:defRPr sz="6000"/>
-            </a:lvl1pPr>
-          </a:lstStyle>
+          <a:bodyPr/>
           <a:p>
             <a:r>
               <a:rPr lang="zh-CN" altLang="en-US" smtClean="0"/>
               <a:t>单击此处编辑母版标题样式</a:t>
             </a:r>
-            <a:endParaRPr lang="zh-CN" altLang="en-US"/>
-          </a:p>
-        </p:txBody>
-      </p:sp>
-      <p:sp>
-        <p:nvSpPr>
-          <p:cNvPr id="3" name="文本占位符 2"/>
-          <p:cNvSpPr>
-            <a:spLocks noGrp="1"/>
-          </p:cNvSpPr>
-          <p:nvPr>
-            <p:ph type="body" idx="1"/>
-          </p:nvPr>
-        </p:nvSpPr>
-        <p:spPr>
-          <a:xfrm>
-            <a:off x="831850" y="4589463"/>
-            <a:ext cx="10515600" cy="1500187"/>
-          </a:xfrm>
-        </p:spPr>
-        <p:txBody>
-          <a:bodyPr/>
-          <a:lstStyle>
-            <a:lvl1pPr marL="0" indent="0">
-              <a:buNone/>
-              <a:defRPr sz="2400">
-                <a:solidFill>
-                  <a:schemeClr val="tx1">
-                    <a:tint val="75000"/>
-                  </a:schemeClr>
-                </a:solidFill>
-              </a:defRPr>
-            </a:lvl1pPr>
-            <a:lvl2pPr marL="457200" indent="0">
-              <a:buNone/>
-              <a:defRPr sz="2000">
-                <a:solidFill>
-                  <a:schemeClr val="tx1">
-                    <a:tint val="75000"/>
-                  </a:schemeClr>
-                </a:solidFill>
-              </a:defRPr>
-            </a:lvl2pPr>
-            <a:lvl3pPr marL="914400" indent="0">
-              <a:buNone/>
-              <a:defRPr sz="1800">
-                <a:solidFill>
-                  <a:schemeClr val="tx1">
-                    <a:tint val="75000"/>
-                  </a:schemeClr>
-                </a:solidFill>
-              </a:defRPr>
-            </a:lvl3pPr>
-            <a:lvl4pPr marL="1371600" indent="0">
-              <a:buNone/>
-              <a:defRPr sz="1600">
-                <a:solidFill>
-                  <a:schemeClr val="tx1">
-                    <a:tint val="75000"/>
-                  </a:schemeClr>
-                </a:solidFill>
-              </a:defRPr>
-            </a:lvl4pPr>
-            <a:lvl5pPr marL="1828800" indent="0">
-              <a:buNone/>
-              <a:defRPr sz="1600">
-                <a:solidFill>
-                  <a:schemeClr val="tx1">
-                    <a:tint val="75000"/>
-                  </a:schemeClr>
-                </a:solidFill>
-              </a:defRPr>
-            </a:lvl5pPr>
-            <a:lvl6pPr marL="2286000" indent="0">
-              <a:buNone/>
-              <a:defRPr sz="1600">
-                <a:solidFill>
-                  <a:schemeClr val="tx1">
-                    <a:tint val="75000"/>
-                  </a:schemeClr>
-                </a:solidFill>
-              </a:defRPr>
-            </a:lvl6pPr>
-            <a:lvl7pPr marL="2743200" indent="0">
-              <a:buNone/>
-              <a:defRPr sz="1600">
-                <a:solidFill>
-                  <a:schemeClr val="tx1">
-                    <a:tint val="75000"/>
-                  </a:schemeClr>
-                </a:solidFill>
-              </a:defRPr>
-            </a:lvl7pPr>
-            <a:lvl8pPr marL="3200400" indent="0">
-              <a:buNone/>
-              <a:defRPr sz="1600">
-                <a:solidFill>
-                  <a:schemeClr val="tx1">
-                    <a:tint val="75000"/>
-                  </a:schemeClr>
-                </a:solidFill>
-              </a:defRPr>
-            </a:lvl8pPr>
-            <a:lvl9pPr marL="3657600" indent="0">
-              <a:buNone/>
-              <a:defRPr sz="1600">
-                <a:solidFill>
-                  <a:schemeClr val="tx1">
-                    <a:tint val="75000"/>
-                  </a:schemeClr>
-                </a:solidFill>
-              </a:defRPr>
-            </a:lvl9pPr>
-          </a:lstStyle>
-          <a:p>
-            <a:pPr lvl="0"/>
-            <a:r>
-              <a:rPr lang="zh-CN" altLang="en-US" smtClean="0"/>
-              <a:t>单击此处编辑母版文本样式</a:t>
-            </a:r>
-          </a:p>
-        </p:txBody>
-      </p:sp>
-      <p:sp>
-        <p:nvSpPr>
-          <p:cNvPr id="4" name="日期占位符 3"/>
-          <p:cNvSpPr>
-            <a:spLocks noGrp="1"/>
-          </p:cNvSpPr>
-          <p:nvPr>
-            <p:ph type="dt" sz="half" idx="10"/>
-          </p:nvPr>
-        </p:nvSpPr>
-        <p:spPr/>
-        <p:txBody>
-          <a:bodyPr/>
-          <a:lstStyle/>
-          <a:p>
-            <a:fld id="{82F288E0-7875-42C4-84C8-98DBBD3BF4D2}" type="datetimeFigureOut">
-              <a:rPr lang="zh-CN" altLang="en-US" smtClean="0"/>
-            </a:fld>
-            <a:endParaRPr lang="zh-CN" altLang="en-US"/>
-          </a:p>
-        </p:txBody>
-      </p:sp>
-      <p:sp>
-        <p:nvSpPr>
-          <p:cNvPr id="5" name="页脚占位符 4"/>
-          <p:cNvSpPr>
-            <a:spLocks noGrp="1"/>
-          </p:cNvSpPr>
-          <p:nvPr>
-            <p:ph type="ftr" sz="quarter" idx="11"/>
-          </p:nvPr>
-        </p:nvSpPr>
-        <p:spPr/>
-        <p:txBody>
-          <a:bodyPr/>
-          <a:lstStyle/>
-          <a:p>
-            <a:endParaRPr lang="zh-CN" altLang="en-US"/>
-          </a:p>
-        </p:txBody>
-      </p:sp>
-      <p:sp>
-        <p:nvSpPr>
-          <p:cNvPr id="6" name="灯片编号占位符 5"/>
-          <p:cNvSpPr>
-            <a:spLocks noGrp="1"/>
-          </p:cNvSpPr>
-          <p:nvPr>
-            <p:ph type="sldNum" sz="quarter" idx="12"/>
-          </p:nvPr>
-        </p:nvSpPr>
-        <p:spPr/>
-        <p:txBody>
-          <a:bodyPr/>
-          <a:lstStyle/>
-          <a:p>
-            <a:fld id="{7D9BB5D0-35E4-459D-AEF3-FE4D7C45CC19}" type="slidenum">
-              <a:rPr lang="zh-CN" altLang="en-US" smtClean="0"/>
-            </a:fld>
-            <a:endParaRPr lang="zh-CN" altLang="en-US"/>
+            <a:endParaRPr lang="en-US" dirty="0"/>
           </a:p>
         </p:txBody>
       </p:sp>
@@ -1040,10 +1278,18 @@
   <p:clrMapOvr>
     <a:masterClrMapping/>
   </p:clrMapOvr>
+  <mc:AlternateContent xmlns:mc="http://schemas.openxmlformats.org/markup-compatibility/2006">
+    <mc:Choice xmlns:p14="http://schemas.microsoft.com/office/powerpoint/2010/main" Requires="p14">
+      <p:transition p14:dur="500"/>
+    </mc:Choice>
+    <mc:Fallback>
+      <p:transition/>
+    </mc:Fallback>
+  </mc:AlternateContent>
 </p:sldLayout>
 </file>
 
-<file path=ppt/slideLayouts/slideLayout4.xml><?xml version="1.0" encoding="utf-8"?>
+<file path=ppt/slideLayouts/slideLayout5.xml><?xml version="1.0" encoding="utf-8"?>
 <p:sldLayout xmlns:a="http://schemas.openxmlformats.org/drawingml/2006/main" xmlns:r="http://schemas.openxmlformats.org/officeDocument/2006/relationships" xmlns:p="http://schemas.openxmlformats.org/presentationml/2006/main" type="twoObj" preserve="1">
   <p:cSld name="两栏内容">
     <p:spTree>
@@ -1062,7 +1308,7 @@
       </p:grpSpPr>
       <p:sp>
         <p:nvSpPr>
-          <p:cNvPr id="2" name="标题 1"/>
+          <p:cNvPr id="2" name="Title 1"/>
           <p:cNvSpPr>
             <a:spLocks noGrp="1"/>
           </p:cNvSpPr>
@@ -1079,13 +1325,13 @@
               <a:rPr lang="zh-CN" altLang="en-US" smtClean="0"/>
               <a:t>单击此处编辑母版标题样式</a:t>
             </a:r>
-            <a:endParaRPr lang="zh-CN" altLang="en-US"/>
-          </a:p>
-        </p:txBody>
-      </p:sp>
-      <p:sp>
-        <p:nvSpPr>
-          <p:cNvPr id="3" name="内容占位符 2"/>
+            <a:endParaRPr lang="en-US" dirty="0"/>
+          </a:p>
+        </p:txBody>
+      </p:sp>
+      <p:sp>
+        <p:nvSpPr>
+          <p:cNvPr id="3" name="Content Placeholder 2"/>
           <p:cNvSpPr>
             <a:spLocks noGrp="1"/>
           </p:cNvSpPr>
@@ -1140,13 +1386,13 @@
               <a:rPr lang="zh-CN" altLang="en-US" smtClean="0"/>
               <a:t>第五级</a:t>
             </a:r>
-            <a:endParaRPr lang="zh-CN" altLang="en-US"/>
-          </a:p>
-        </p:txBody>
-      </p:sp>
-      <p:sp>
-        <p:nvSpPr>
-          <p:cNvPr id="4" name="内容占位符 3"/>
+            <a:endParaRPr lang="en-US" dirty="0"/>
+          </a:p>
+        </p:txBody>
+      </p:sp>
+      <p:sp>
+        <p:nvSpPr>
+          <p:cNvPr id="4" name="Content Placeholder 3"/>
           <p:cNvSpPr>
             <a:spLocks noGrp="1"/>
           </p:cNvSpPr>
@@ -1201,13 +1447,13 @@
               <a:rPr lang="zh-CN" altLang="en-US" smtClean="0"/>
               <a:t>第五级</a:t>
             </a:r>
-            <a:endParaRPr lang="zh-CN" altLang="en-US"/>
-          </a:p>
-        </p:txBody>
-      </p:sp>
-      <p:sp>
-        <p:nvSpPr>
-          <p:cNvPr id="5" name="日期占位符 4"/>
+            <a:endParaRPr lang="en-US" dirty="0"/>
+          </a:p>
+        </p:txBody>
+      </p:sp>
+      <p:sp>
+        <p:nvSpPr>
+          <p:cNvPr id="5" name="Date Placeholder 4"/>
           <p:cNvSpPr>
             <a:spLocks noGrp="1"/>
           </p:cNvSpPr>
@@ -1220,16 +1466,16 @@
           <a:bodyPr/>
           <a:lstStyle/>
           <a:p>
-            <a:fld id="{82F288E0-7875-42C4-84C8-98DBBD3BF4D2}" type="datetimeFigureOut">
-              <a:rPr lang="zh-CN" altLang="en-US" smtClean="0"/>
+            <a:fld id="{BEA18431-54C4-4585-82AD-D4BDE8FCC787}" type="datetimeFigureOut">
+              <a:rPr lang="zh-HK" altLang="en-US" smtClean="0"/>
             </a:fld>
-            <a:endParaRPr lang="zh-CN" altLang="en-US"/>
-          </a:p>
-        </p:txBody>
-      </p:sp>
-      <p:sp>
-        <p:nvSpPr>
-          <p:cNvPr id="6" name="页脚占位符 5"/>
+            <a:endParaRPr lang="zh-HK" altLang="en-US"/>
+          </a:p>
+        </p:txBody>
+      </p:sp>
+      <p:sp>
+        <p:nvSpPr>
+          <p:cNvPr id="6" name="Footer Placeholder 5"/>
           <p:cNvSpPr>
             <a:spLocks noGrp="1"/>
           </p:cNvSpPr>
@@ -1242,13 +1488,13 @@
           <a:bodyPr/>
           <a:lstStyle/>
           <a:p>
-            <a:endParaRPr lang="zh-CN" altLang="en-US"/>
-          </a:p>
-        </p:txBody>
-      </p:sp>
-      <p:sp>
-        <p:nvSpPr>
-          <p:cNvPr id="7" name="灯片编号占位符 6"/>
+            <a:endParaRPr lang="zh-HK" altLang="en-US"/>
+          </a:p>
+        </p:txBody>
+      </p:sp>
+      <p:sp>
+        <p:nvSpPr>
+          <p:cNvPr id="7" name="Slide Number Placeholder 6"/>
           <p:cNvSpPr>
             <a:spLocks noGrp="1"/>
           </p:cNvSpPr>
@@ -1261,10 +1507,10 @@
           <a:bodyPr/>
           <a:lstStyle/>
           <a:p>
-            <a:fld id="{7D9BB5D0-35E4-459D-AEF3-FE4D7C45CC19}" type="slidenum">
-              <a:rPr lang="zh-CN" altLang="en-US" smtClean="0"/>
+            <a:fld id="{8592E714-8771-4256-B120-A1444CD7D5F3}" type="slidenum">
+              <a:rPr lang="zh-HK" altLang="en-US" smtClean="0"/>
             </a:fld>
-            <a:endParaRPr lang="zh-CN" altLang="en-US"/>
+            <a:endParaRPr lang="zh-HK" altLang="en-US"/>
           </a:p>
         </p:txBody>
       </p:sp>
@@ -1273,10 +1519,18 @@
   <p:clrMapOvr>
     <a:masterClrMapping/>
   </p:clrMapOvr>
+  <mc:AlternateContent xmlns:mc="http://schemas.openxmlformats.org/markup-compatibility/2006">
+    <mc:Choice xmlns:p14="http://schemas.microsoft.com/office/powerpoint/2010/main" Requires="p14">
+      <p:transition p14:dur="500"/>
+    </mc:Choice>
+    <mc:Fallback>
+      <p:transition/>
+    </mc:Fallback>
+  </mc:AlternateContent>
 </p:sldLayout>
 </file>
 
-<file path=ppt/slideLayouts/slideLayout5.xml><?xml version="1.0" encoding="utf-8"?>
+<file path=ppt/slideLayouts/slideLayout6.xml><?xml version="1.0" encoding="utf-8"?>
 <p:sldLayout xmlns:a="http://schemas.openxmlformats.org/drawingml/2006/main" xmlns:r="http://schemas.openxmlformats.org/officeDocument/2006/relationships" xmlns:p="http://schemas.openxmlformats.org/presentationml/2006/main" type="twoTxTwoObj" preserve="1">
   <p:cSld name="比较">
     <p:spTree>
@@ -1295,7 +1549,7 @@
       </p:grpSpPr>
       <p:sp>
         <p:nvSpPr>
-          <p:cNvPr id="2" name="标题 1"/>
+          <p:cNvPr id="2" name="Title 1"/>
           <p:cNvSpPr>
             <a:spLocks noGrp="1"/>
           </p:cNvSpPr>
@@ -1317,13 +1571,13 @@
               <a:rPr lang="zh-CN" altLang="en-US" smtClean="0"/>
               <a:t>单击此处编辑母版标题样式</a:t>
             </a:r>
-            <a:endParaRPr lang="zh-CN" altLang="en-US"/>
-          </a:p>
-        </p:txBody>
-      </p:sp>
-      <p:sp>
-        <p:nvSpPr>
-          <p:cNvPr id="3" name="文本占位符 2"/>
+            <a:endParaRPr lang="en-US" dirty="0"/>
+          </a:p>
+        </p:txBody>
+      </p:sp>
+      <p:sp>
+        <p:nvSpPr>
+          <p:cNvPr id="3" name="Text Placeholder 2"/>
           <p:cNvSpPr>
             <a:spLocks noGrp="1"/>
           </p:cNvSpPr>
@@ -1383,12 +1637,13 @@
               <a:rPr lang="zh-CN" altLang="en-US" smtClean="0"/>
               <a:t>单击此处编辑母版文本样式</a:t>
             </a:r>
-          </a:p>
-        </p:txBody>
-      </p:sp>
-      <p:sp>
-        <p:nvSpPr>
-          <p:cNvPr id="4" name="内容占位符 3"/>
+            <a:endParaRPr lang="zh-CN" altLang="en-US" smtClean="0"/>
+          </a:p>
+        </p:txBody>
+      </p:sp>
+      <p:sp>
+        <p:nvSpPr>
+          <p:cNvPr id="4" name="Content Placeholder 3"/>
           <p:cNvSpPr>
             <a:spLocks noGrp="1"/>
           </p:cNvSpPr>
@@ -1443,13 +1698,13 @@
               <a:rPr lang="zh-CN" altLang="en-US" smtClean="0"/>
               <a:t>第五级</a:t>
             </a:r>
-            <a:endParaRPr lang="zh-CN" altLang="en-US"/>
-          </a:p>
-        </p:txBody>
-      </p:sp>
-      <p:sp>
-        <p:nvSpPr>
-          <p:cNvPr id="5" name="文本占位符 4"/>
+            <a:endParaRPr lang="en-US" dirty="0"/>
+          </a:p>
+        </p:txBody>
+      </p:sp>
+      <p:sp>
+        <p:nvSpPr>
+          <p:cNvPr id="5" name="Text Placeholder 4"/>
           <p:cNvSpPr>
             <a:spLocks noGrp="1"/>
           </p:cNvSpPr>
@@ -1509,12 +1764,13 @@
               <a:rPr lang="zh-CN" altLang="en-US" smtClean="0"/>
               <a:t>单击此处编辑母版文本样式</a:t>
             </a:r>
-          </a:p>
-        </p:txBody>
-      </p:sp>
-      <p:sp>
-        <p:nvSpPr>
-          <p:cNvPr id="6" name="内容占位符 5"/>
+            <a:endParaRPr lang="zh-CN" altLang="en-US" smtClean="0"/>
+          </a:p>
+        </p:txBody>
+      </p:sp>
+      <p:sp>
+        <p:nvSpPr>
+          <p:cNvPr id="6" name="Content Placeholder 5"/>
           <p:cNvSpPr>
             <a:spLocks noGrp="1"/>
           </p:cNvSpPr>
@@ -1569,13 +1825,13 @@
               <a:rPr lang="zh-CN" altLang="en-US" smtClean="0"/>
               <a:t>第五级</a:t>
             </a:r>
-            <a:endParaRPr lang="zh-CN" altLang="en-US"/>
-          </a:p>
-        </p:txBody>
-      </p:sp>
-      <p:sp>
-        <p:nvSpPr>
-          <p:cNvPr id="7" name="日期占位符 6"/>
+            <a:endParaRPr lang="en-US" dirty="0"/>
+          </a:p>
+        </p:txBody>
+      </p:sp>
+      <p:sp>
+        <p:nvSpPr>
+          <p:cNvPr id="7" name="Date Placeholder 6"/>
           <p:cNvSpPr>
             <a:spLocks noGrp="1"/>
           </p:cNvSpPr>
@@ -1588,16 +1844,16 @@
           <a:bodyPr/>
           <a:lstStyle/>
           <a:p>
-            <a:fld id="{82F288E0-7875-42C4-84C8-98DBBD3BF4D2}" type="datetimeFigureOut">
-              <a:rPr lang="zh-CN" altLang="en-US" smtClean="0"/>
+            <a:fld id="{BEA18431-54C4-4585-82AD-D4BDE8FCC787}" type="datetimeFigureOut">
+              <a:rPr lang="zh-HK" altLang="en-US" smtClean="0"/>
             </a:fld>
-            <a:endParaRPr lang="zh-CN" altLang="en-US"/>
-          </a:p>
-        </p:txBody>
-      </p:sp>
-      <p:sp>
-        <p:nvSpPr>
-          <p:cNvPr id="8" name="页脚占位符 7"/>
+            <a:endParaRPr lang="zh-HK" altLang="en-US"/>
+          </a:p>
+        </p:txBody>
+      </p:sp>
+      <p:sp>
+        <p:nvSpPr>
+          <p:cNvPr id="8" name="Footer Placeholder 7"/>
           <p:cNvSpPr>
             <a:spLocks noGrp="1"/>
           </p:cNvSpPr>
@@ -1610,13 +1866,13 @@
           <a:bodyPr/>
           <a:lstStyle/>
           <a:p>
-            <a:endParaRPr lang="zh-CN" altLang="en-US"/>
-          </a:p>
-        </p:txBody>
-      </p:sp>
-      <p:sp>
-        <p:nvSpPr>
-          <p:cNvPr id="9" name="灯片编号占位符 8"/>
+            <a:endParaRPr lang="zh-HK" altLang="en-US"/>
+          </a:p>
+        </p:txBody>
+      </p:sp>
+      <p:sp>
+        <p:nvSpPr>
+          <p:cNvPr id="9" name="Slide Number Placeholder 8"/>
           <p:cNvSpPr>
             <a:spLocks noGrp="1"/>
           </p:cNvSpPr>
@@ -1629,10 +1885,10 @@
           <a:bodyPr/>
           <a:lstStyle/>
           <a:p>
-            <a:fld id="{7D9BB5D0-35E4-459D-AEF3-FE4D7C45CC19}" type="slidenum">
-              <a:rPr lang="zh-CN" altLang="en-US" smtClean="0"/>
+            <a:fld id="{8592E714-8771-4256-B120-A1444CD7D5F3}" type="slidenum">
+              <a:rPr lang="zh-HK" altLang="en-US" smtClean="0"/>
             </a:fld>
-            <a:endParaRPr lang="zh-CN" altLang="en-US"/>
+            <a:endParaRPr lang="zh-HK" altLang="en-US"/>
           </a:p>
         </p:txBody>
       </p:sp>
@@ -1641,10 +1897,18 @@
   <p:clrMapOvr>
     <a:masterClrMapping/>
   </p:clrMapOvr>
+  <mc:AlternateContent xmlns:mc="http://schemas.openxmlformats.org/markup-compatibility/2006">
+    <mc:Choice xmlns:p14="http://schemas.microsoft.com/office/powerpoint/2010/main" Requires="p14">
+      <p:transition p14:dur="500"/>
+    </mc:Choice>
+    <mc:Fallback>
+      <p:transition/>
+    </mc:Fallback>
+  </mc:AlternateContent>
 </p:sldLayout>
 </file>
 
-<file path=ppt/slideLayouts/slideLayout6.xml><?xml version="1.0" encoding="utf-8"?>
+<file path=ppt/slideLayouts/slideLayout7.xml><?xml version="1.0" encoding="utf-8"?>
 <p:sldLayout xmlns:a="http://schemas.openxmlformats.org/drawingml/2006/main" xmlns:r="http://schemas.openxmlformats.org/officeDocument/2006/relationships" xmlns:p="http://schemas.openxmlformats.org/presentationml/2006/main" type="titleOnly" preserve="1">
   <p:cSld name="仅标题">
     <p:spTree>
@@ -1663,7 +1927,7 @@
       </p:grpSpPr>
       <p:sp>
         <p:nvSpPr>
-          <p:cNvPr id="2" name="标题 1"/>
+          <p:cNvPr id="2" name="Title 1"/>
           <p:cNvSpPr>
             <a:spLocks noGrp="1"/>
           </p:cNvSpPr>
@@ -1680,13 +1944,13 @@
               <a:rPr lang="zh-CN" altLang="en-US" smtClean="0"/>
               <a:t>单击此处编辑母版标题样式</a:t>
             </a:r>
-            <a:endParaRPr lang="zh-CN" altLang="en-US"/>
-          </a:p>
-        </p:txBody>
-      </p:sp>
-      <p:sp>
-        <p:nvSpPr>
-          <p:cNvPr id="3" name="日期占位符 2"/>
+            <a:endParaRPr lang="en-US" dirty="0"/>
+          </a:p>
+        </p:txBody>
+      </p:sp>
+      <p:sp>
+        <p:nvSpPr>
+          <p:cNvPr id="3" name="Date Placeholder 2"/>
           <p:cNvSpPr>
             <a:spLocks noGrp="1"/>
           </p:cNvSpPr>
@@ -1699,16 +1963,16 @@
           <a:bodyPr/>
           <a:lstStyle/>
           <a:p>
-            <a:fld id="{82F288E0-7875-42C4-84C8-98DBBD3BF4D2}" type="datetimeFigureOut">
-              <a:rPr lang="zh-CN" altLang="en-US" smtClean="0"/>
+            <a:fld id="{BEA18431-54C4-4585-82AD-D4BDE8FCC787}" type="datetimeFigureOut">
+              <a:rPr lang="zh-HK" altLang="en-US" smtClean="0"/>
             </a:fld>
-            <a:endParaRPr lang="zh-CN" altLang="en-US"/>
-          </a:p>
-        </p:txBody>
-      </p:sp>
-      <p:sp>
-        <p:nvSpPr>
-          <p:cNvPr id="4" name="页脚占位符 3"/>
+            <a:endParaRPr lang="zh-HK" altLang="en-US"/>
+          </a:p>
+        </p:txBody>
+      </p:sp>
+      <p:sp>
+        <p:nvSpPr>
+          <p:cNvPr id="4" name="Footer Placeholder 3"/>
           <p:cNvSpPr>
             <a:spLocks noGrp="1"/>
           </p:cNvSpPr>
@@ -1721,13 +1985,13 @@
           <a:bodyPr/>
           <a:lstStyle/>
           <a:p>
-            <a:endParaRPr lang="zh-CN" altLang="en-US"/>
-          </a:p>
-        </p:txBody>
-      </p:sp>
-      <p:sp>
-        <p:nvSpPr>
-          <p:cNvPr id="5" name="灯片编号占位符 4"/>
+            <a:endParaRPr lang="zh-HK" altLang="en-US"/>
+          </a:p>
+        </p:txBody>
+      </p:sp>
+      <p:sp>
+        <p:nvSpPr>
+          <p:cNvPr id="5" name="Slide Number Placeholder 4"/>
           <p:cNvSpPr>
             <a:spLocks noGrp="1"/>
           </p:cNvSpPr>
@@ -1740,10 +2004,10 @@
           <a:bodyPr/>
           <a:lstStyle/>
           <a:p>
-            <a:fld id="{7D9BB5D0-35E4-459D-AEF3-FE4D7C45CC19}" type="slidenum">
-              <a:rPr lang="zh-CN" altLang="en-US" smtClean="0"/>
+            <a:fld id="{8592E714-8771-4256-B120-A1444CD7D5F3}" type="slidenum">
+              <a:rPr lang="zh-HK" altLang="en-US" smtClean="0"/>
             </a:fld>
-            <a:endParaRPr lang="zh-CN" altLang="en-US"/>
+            <a:endParaRPr lang="zh-HK" altLang="en-US"/>
           </a:p>
         </p:txBody>
       </p:sp>
@@ -1752,10 +2016,18 @@
   <p:clrMapOvr>
     <a:masterClrMapping/>
   </p:clrMapOvr>
+  <mc:AlternateContent xmlns:mc="http://schemas.openxmlformats.org/markup-compatibility/2006">
+    <mc:Choice xmlns:p14="http://schemas.microsoft.com/office/powerpoint/2010/main" Requires="p14">
+      <p:transition p14:dur="500"/>
+    </mc:Choice>
+    <mc:Fallback>
+      <p:transition/>
+    </mc:Fallback>
+  </mc:AlternateContent>
 </p:sldLayout>
 </file>
 
-<file path=ppt/slideLayouts/slideLayout7.xml><?xml version="1.0" encoding="utf-8"?>
+<file path=ppt/slideLayouts/slideLayout8.xml><?xml version="1.0" encoding="utf-8"?>
 <p:sldLayout xmlns:a="http://schemas.openxmlformats.org/drawingml/2006/main" xmlns:r="http://schemas.openxmlformats.org/officeDocument/2006/relationships" xmlns:p="http://schemas.openxmlformats.org/presentationml/2006/main" type="blank" preserve="1">
   <p:cSld name="空白">
     <p:spTree>
@@ -1774,7 +2046,7 @@
       </p:grpSpPr>
       <p:sp>
         <p:nvSpPr>
-          <p:cNvPr id="2" name="日期占位符 1"/>
+          <p:cNvPr id="2" name="Date Placeholder 1"/>
           <p:cNvSpPr>
             <a:spLocks noGrp="1"/>
           </p:cNvSpPr>
@@ -1787,16 +2059,16 @@
           <a:bodyPr/>
           <a:lstStyle/>
           <a:p>
-            <a:fld id="{82F288E0-7875-42C4-84C8-98DBBD3BF4D2}" type="datetimeFigureOut">
-              <a:rPr lang="zh-CN" altLang="en-US" smtClean="0"/>
+            <a:fld id="{BEA18431-54C4-4585-82AD-D4BDE8FCC787}" type="datetimeFigureOut">
+              <a:rPr lang="zh-HK" altLang="en-US" smtClean="0"/>
             </a:fld>
-            <a:endParaRPr lang="zh-CN" altLang="en-US"/>
-          </a:p>
-        </p:txBody>
-      </p:sp>
-      <p:sp>
-        <p:nvSpPr>
-          <p:cNvPr id="3" name="页脚占位符 2"/>
+            <a:endParaRPr lang="zh-HK" altLang="en-US"/>
+          </a:p>
+        </p:txBody>
+      </p:sp>
+      <p:sp>
+        <p:nvSpPr>
+          <p:cNvPr id="3" name="Footer Placeholder 2"/>
           <p:cNvSpPr>
             <a:spLocks noGrp="1"/>
           </p:cNvSpPr>
@@ -1809,13 +2081,13 @@
           <a:bodyPr/>
           <a:lstStyle/>
           <a:p>
-            <a:endParaRPr lang="zh-CN" altLang="en-US"/>
-          </a:p>
-        </p:txBody>
-      </p:sp>
-      <p:sp>
-        <p:nvSpPr>
-          <p:cNvPr id="4" name="灯片编号占位符 3"/>
+            <a:endParaRPr lang="zh-HK" altLang="en-US"/>
+          </a:p>
+        </p:txBody>
+      </p:sp>
+      <p:sp>
+        <p:nvSpPr>
+          <p:cNvPr id="4" name="Slide Number Placeholder 3"/>
           <p:cNvSpPr>
             <a:spLocks noGrp="1"/>
           </p:cNvSpPr>
@@ -1828,22 +2100,54 @@
           <a:bodyPr/>
           <a:lstStyle/>
           <a:p>
-            <a:fld id="{7D9BB5D0-35E4-459D-AEF3-FE4D7C45CC19}" type="slidenum">
-              <a:rPr lang="zh-CN" altLang="en-US" smtClean="0"/>
+            <a:fld id="{8592E714-8771-4256-B120-A1444CD7D5F3}" type="slidenum">
+              <a:rPr lang="zh-HK" altLang="en-US" smtClean="0"/>
             </a:fld>
-            <a:endParaRPr lang="zh-CN" altLang="en-US"/>
-          </a:p>
-        </p:txBody>
-      </p:sp>
+            <a:endParaRPr lang="zh-HK" altLang="en-US"/>
+          </a:p>
+        </p:txBody>
+      </p:sp>
+      <p:pic>
+        <p:nvPicPr>
+          <p:cNvPr id="6" name="图片 5" descr="logo"/>
+          <p:cNvPicPr>
+            <a:picLocks noChangeAspect="1"/>
+          </p:cNvPicPr>
+          <p:nvPr userDrawn="1"/>
+        </p:nvPicPr>
+        <p:blipFill>
+          <a:blip r:embed="rId2"/>
+          <a:stretch>
+            <a:fillRect/>
+          </a:stretch>
+        </p:blipFill>
+        <p:spPr>
+          <a:xfrm>
+            <a:off x="10020300" y="5948680"/>
+            <a:ext cx="2045335" cy="891540"/>
+          </a:xfrm>
+          <a:prstGeom prst="rect">
+            <a:avLst/>
+          </a:prstGeom>
+        </p:spPr>
+      </p:pic>
     </p:spTree>
   </p:cSld>
   <p:clrMapOvr>
     <a:masterClrMapping/>
   </p:clrMapOvr>
+  <mc:AlternateContent xmlns:mc="http://schemas.openxmlformats.org/markup-compatibility/2006">
+    <mc:Choice xmlns:p14="http://schemas.microsoft.com/office/powerpoint/2010/main" Requires="p14">
+      <p:transition p14:dur="500"/>
+    </mc:Choice>
+    <mc:Fallback>
+      <p:transition/>
+    </mc:Fallback>
+  </mc:AlternateContent>
 </p:sldLayout>
 </file>
 
-<file path=ppt/slideLayouts/slideLayout8.xml><?xml version="1.0" encoding="utf-8"?>
+<file path=ppt/slideLayouts/slideLayout9.xml><?xml version="1.0" encoding="utf-8"?>
 <p:sldLayout xmlns:a="http://schemas.openxmlformats.org/drawingml/2006/main" xmlns:r="http://schemas.openxmlformats.org/officeDocument/2006/relationships" xmlns:p="http://schemas.openxmlformats.org/presentationml/2006/main" type="objTx" preserve="1">
   <p:cSld name="内容与标题">
     <p:spTree>
@@ -1862,7 +2166,7 @@
       </p:grpSpPr>
       <p:sp>
         <p:nvSpPr>
-          <p:cNvPr id="2" name="标题 1"/>
+          <p:cNvPr id="2" name="Title 1"/>
           <p:cNvSpPr>
             <a:spLocks noGrp="1"/>
           </p:cNvSpPr>
@@ -1888,13 +2192,13 @@
               <a:rPr lang="zh-CN" altLang="en-US" smtClean="0"/>
               <a:t>单击此处编辑母版标题样式</a:t>
             </a:r>
-            <a:endParaRPr lang="zh-CN" altLang="en-US"/>
-          </a:p>
-        </p:txBody>
-      </p:sp>
-      <p:sp>
-        <p:nvSpPr>
-          <p:cNvPr id="3" name="内容占位符 2"/>
+            <a:endParaRPr lang="en-US" dirty="0"/>
+          </a:p>
+        </p:txBody>
+      </p:sp>
+      <p:sp>
+        <p:nvSpPr>
+          <p:cNvPr id="3" name="Content Placeholder 2"/>
           <p:cNvSpPr>
             <a:spLocks noGrp="1"/>
           </p:cNvSpPr>
@@ -1977,13 +2281,13 @@
               <a:rPr lang="zh-CN" altLang="en-US" smtClean="0"/>
               <a:t>第五级</a:t>
             </a:r>
-            <a:endParaRPr lang="zh-CN" altLang="en-US"/>
-          </a:p>
-        </p:txBody>
-      </p:sp>
-      <p:sp>
-        <p:nvSpPr>
-          <p:cNvPr id="4" name="文本占位符 3"/>
+            <a:endParaRPr lang="en-US" dirty="0"/>
+          </a:p>
+        </p:txBody>
+      </p:sp>
+      <p:sp>
+        <p:nvSpPr>
+          <p:cNvPr id="4" name="Text Placeholder 3"/>
           <p:cNvSpPr>
             <a:spLocks noGrp="1"/>
           </p:cNvSpPr>
@@ -2043,12 +2347,13 @@
               <a:rPr lang="zh-CN" altLang="en-US" smtClean="0"/>
               <a:t>单击此处编辑母版文本样式</a:t>
             </a:r>
-          </a:p>
-        </p:txBody>
-      </p:sp>
-      <p:sp>
-        <p:nvSpPr>
-          <p:cNvPr id="5" name="日期占位符 4"/>
+            <a:endParaRPr lang="zh-CN" altLang="en-US" smtClean="0"/>
+          </a:p>
+        </p:txBody>
+      </p:sp>
+      <p:sp>
+        <p:nvSpPr>
+          <p:cNvPr id="5" name="Date Placeholder 4"/>
           <p:cNvSpPr>
             <a:spLocks noGrp="1"/>
           </p:cNvSpPr>
@@ -2061,16 +2366,16 @@
           <a:bodyPr/>
           <a:lstStyle/>
           <a:p>
-            <a:fld id="{82F288E0-7875-42C4-84C8-98DBBD3BF4D2}" type="datetimeFigureOut">
-              <a:rPr lang="zh-CN" altLang="en-US" smtClean="0"/>
+            <a:fld id="{BEA18431-54C4-4585-82AD-D4BDE8FCC787}" type="datetimeFigureOut">
+              <a:rPr lang="zh-HK" altLang="en-US" smtClean="0"/>
             </a:fld>
-            <a:endParaRPr lang="zh-CN" altLang="en-US"/>
-          </a:p>
-        </p:txBody>
-      </p:sp>
-      <p:sp>
-        <p:nvSpPr>
-          <p:cNvPr id="6" name="页脚占位符 5"/>
+            <a:endParaRPr lang="zh-HK" altLang="en-US"/>
+          </a:p>
+        </p:txBody>
+      </p:sp>
+      <p:sp>
+        <p:nvSpPr>
+          <p:cNvPr id="6" name="Footer Placeholder 5"/>
           <p:cNvSpPr>
             <a:spLocks noGrp="1"/>
           </p:cNvSpPr>
@@ -2083,13 +2388,13 @@
           <a:bodyPr/>
           <a:lstStyle/>
           <a:p>
-            <a:endParaRPr lang="zh-CN" altLang="en-US"/>
-          </a:p>
-        </p:txBody>
-      </p:sp>
-      <p:sp>
-        <p:nvSpPr>
-          <p:cNvPr id="7" name="灯片编号占位符 6"/>
+            <a:endParaRPr lang="zh-HK" altLang="en-US"/>
+          </a:p>
+        </p:txBody>
+      </p:sp>
+      <p:sp>
+        <p:nvSpPr>
+          <p:cNvPr id="7" name="Slide Number Placeholder 6"/>
           <p:cNvSpPr>
             <a:spLocks noGrp="1"/>
           </p:cNvSpPr>
@@ -2102,10 +2407,10 @@
           <a:bodyPr/>
           <a:lstStyle/>
           <a:p>
-            <a:fld id="{7D9BB5D0-35E4-459D-AEF3-FE4D7C45CC19}" type="slidenum">
-              <a:rPr lang="zh-CN" altLang="en-US" smtClean="0"/>
+            <a:fld id="{8592E714-8771-4256-B120-A1444CD7D5F3}" type="slidenum">
+              <a:rPr lang="zh-HK" altLang="en-US" smtClean="0"/>
             </a:fld>
-            <a:endParaRPr lang="zh-CN" altLang="en-US"/>
+            <a:endParaRPr lang="zh-HK" altLang="en-US"/>
           </a:p>
         </p:txBody>
       </p:sp>
@@ -2114,262 +2419,33 @@
   <p:clrMapOvr>
     <a:masterClrMapping/>
   </p:clrMapOvr>
-</p:sldLayout>
-</file>
-
-<file path=ppt/slideLayouts/slideLayout9.xml><?xml version="1.0" encoding="utf-8"?>
-<p:sldLayout xmlns:a="http://schemas.openxmlformats.org/drawingml/2006/main" xmlns:r="http://schemas.openxmlformats.org/officeDocument/2006/relationships" xmlns:p="http://schemas.openxmlformats.org/presentationml/2006/main" type="picTx" preserve="1">
-  <p:cSld name="图片与标题">
-    <p:spTree>
-      <p:nvGrpSpPr>
-        <p:cNvPr id="1" name=""/>
-        <p:cNvGrpSpPr/>
-        <p:nvPr/>
-      </p:nvGrpSpPr>
-      <p:grpSpPr>
-        <a:xfrm>
-          <a:off x="0" y="0"/>
-          <a:ext cx="0" cy="0"/>
-          <a:chOff x="0" y="0"/>
-          <a:chExt cx="0" cy="0"/>
-        </a:xfrm>
-      </p:grpSpPr>
-      <p:sp>
-        <p:nvSpPr>
-          <p:cNvPr id="2" name="标题 1"/>
-          <p:cNvSpPr>
-            <a:spLocks noGrp="1"/>
-          </p:cNvSpPr>
-          <p:nvPr>
-            <p:ph type="title"/>
-          </p:nvPr>
-        </p:nvSpPr>
-        <p:spPr>
-          <a:xfrm>
-            <a:off x="839788" y="457200"/>
-            <a:ext cx="3932237" cy="1600200"/>
-          </a:xfrm>
-        </p:spPr>
-        <p:txBody>
-          <a:bodyPr anchor="b"/>
-          <a:lstStyle>
-            <a:lvl1pPr>
-              <a:defRPr sz="3200"/>
-            </a:lvl1pPr>
-          </a:lstStyle>
-          <a:p>
-            <a:r>
-              <a:rPr lang="zh-CN" altLang="en-US" smtClean="0"/>
-              <a:t>单击此处编辑母版标题样式</a:t>
-            </a:r>
-            <a:endParaRPr lang="zh-CN" altLang="en-US"/>
-          </a:p>
-        </p:txBody>
-      </p:sp>
-      <p:sp>
-        <p:nvSpPr>
-          <p:cNvPr id="3" name="图片占位符 2"/>
-          <p:cNvSpPr>
-            <a:spLocks noGrp="1"/>
-          </p:cNvSpPr>
-          <p:nvPr>
-            <p:ph type="pic" idx="1"/>
-          </p:nvPr>
-        </p:nvSpPr>
-        <p:spPr>
-          <a:xfrm>
-            <a:off x="5183188" y="987425"/>
-            <a:ext cx="6172200" cy="4873625"/>
-          </a:xfrm>
-        </p:spPr>
-        <p:txBody>
-          <a:bodyPr/>
-          <a:lstStyle>
-            <a:lvl1pPr marL="0" indent="0">
-              <a:buNone/>
-              <a:defRPr sz="3200"/>
-            </a:lvl1pPr>
-            <a:lvl2pPr marL="457200" indent="0">
-              <a:buNone/>
-              <a:defRPr sz="2800"/>
-            </a:lvl2pPr>
-            <a:lvl3pPr marL="914400" indent="0">
-              <a:buNone/>
-              <a:defRPr sz="2400"/>
-            </a:lvl3pPr>
-            <a:lvl4pPr marL="1371600" indent="0">
-              <a:buNone/>
-              <a:defRPr sz="2000"/>
-            </a:lvl4pPr>
-            <a:lvl5pPr marL="1828800" indent="0">
-              <a:buNone/>
-              <a:defRPr sz="2000"/>
-            </a:lvl5pPr>
-            <a:lvl6pPr marL="2286000" indent="0">
-              <a:buNone/>
-              <a:defRPr sz="2000"/>
-            </a:lvl6pPr>
-            <a:lvl7pPr marL="2743200" indent="0">
-              <a:buNone/>
-              <a:defRPr sz="2000"/>
-            </a:lvl7pPr>
-            <a:lvl8pPr marL="3200400" indent="0">
-              <a:buNone/>
-              <a:defRPr sz="2000"/>
-            </a:lvl8pPr>
-            <a:lvl9pPr marL="3657600" indent="0">
-              <a:buNone/>
-              <a:defRPr sz="2000"/>
-            </a:lvl9pPr>
-          </a:lstStyle>
-          <a:p>
-            <a:endParaRPr lang="zh-CN" altLang="en-US"/>
-          </a:p>
-        </p:txBody>
-      </p:sp>
-      <p:sp>
-        <p:nvSpPr>
-          <p:cNvPr id="4" name="文本占位符 3"/>
-          <p:cNvSpPr>
-            <a:spLocks noGrp="1"/>
-          </p:cNvSpPr>
-          <p:nvPr>
-            <p:ph type="body" sz="half" idx="2"/>
-          </p:nvPr>
-        </p:nvSpPr>
-        <p:spPr>
-          <a:xfrm>
-            <a:off x="839788" y="2057400"/>
-            <a:ext cx="3932237" cy="3811588"/>
-          </a:xfrm>
-        </p:spPr>
-        <p:txBody>
-          <a:bodyPr/>
-          <a:lstStyle>
-            <a:lvl1pPr marL="0" indent="0">
-              <a:buNone/>
-              <a:defRPr sz="1600"/>
-            </a:lvl1pPr>
-            <a:lvl2pPr marL="457200" indent="0">
-              <a:buNone/>
-              <a:defRPr sz="1400"/>
-            </a:lvl2pPr>
-            <a:lvl3pPr marL="914400" indent="0">
-              <a:buNone/>
-              <a:defRPr sz="1200"/>
-            </a:lvl3pPr>
-            <a:lvl4pPr marL="1371600" indent="0">
-              <a:buNone/>
-              <a:defRPr sz="1000"/>
-            </a:lvl4pPr>
-            <a:lvl5pPr marL="1828800" indent="0">
-              <a:buNone/>
-              <a:defRPr sz="1000"/>
-            </a:lvl5pPr>
-            <a:lvl6pPr marL="2286000" indent="0">
-              <a:buNone/>
-              <a:defRPr sz="1000"/>
-            </a:lvl6pPr>
-            <a:lvl7pPr marL="2743200" indent="0">
-              <a:buNone/>
-              <a:defRPr sz="1000"/>
-            </a:lvl7pPr>
-            <a:lvl8pPr marL="3200400" indent="0">
-              <a:buNone/>
-              <a:defRPr sz="1000"/>
-            </a:lvl8pPr>
-            <a:lvl9pPr marL="3657600" indent="0">
-              <a:buNone/>
-              <a:defRPr sz="1000"/>
-            </a:lvl9pPr>
-          </a:lstStyle>
-          <a:p>
-            <a:pPr lvl="0"/>
-            <a:r>
-              <a:rPr lang="zh-CN" altLang="en-US" smtClean="0"/>
-              <a:t>单击此处编辑母版文本样式</a:t>
-            </a:r>
-          </a:p>
-        </p:txBody>
-      </p:sp>
-      <p:sp>
-        <p:nvSpPr>
-          <p:cNvPr id="5" name="日期占位符 4"/>
-          <p:cNvSpPr>
-            <a:spLocks noGrp="1"/>
-          </p:cNvSpPr>
-          <p:nvPr>
-            <p:ph type="dt" sz="half" idx="10"/>
-          </p:nvPr>
-        </p:nvSpPr>
-        <p:spPr/>
-        <p:txBody>
-          <a:bodyPr/>
-          <a:lstStyle/>
-          <a:p>
-            <a:fld id="{82F288E0-7875-42C4-84C8-98DBBD3BF4D2}" type="datetimeFigureOut">
-              <a:rPr lang="zh-CN" altLang="en-US" smtClean="0"/>
-            </a:fld>
-            <a:endParaRPr lang="zh-CN" altLang="en-US"/>
-          </a:p>
-        </p:txBody>
-      </p:sp>
-      <p:sp>
-        <p:nvSpPr>
-          <p:cNvPr id="6" name="页脚占位符 5"/>
-          <p:cNvSpPr>
-            <a:spLocks noGrp="1"/>
-          </p:cNvSpPr>
-          <p:nvPr>
-            <p:ph type="ftr" sz="quarter" idx="11"/>
-          </p:nvPr>
-        </p:nvSpPr>
-        <p:spPr/>
-        <p:txBody>
-          <a:bodyPr/>
-          <a:lstStyle/>
-          <a:p>
-            <a:endParaRPr lang="zh-CN" altLang="en-US"/>
-          </a:p>
-        </p:txBody>
-      </p:sp>
-      <p:sp>
-        <p:nvSpPr>
-          <p:cNvPr id="7" name="灯片编号占位符 6"/>
-          <p:cNvSpPr>
-            <a:spLocks noGrp="1"/>
-          </p:cNvSpPr>
-          <p:nvPr>
-            <p:ph type="sldNum" sz="quarter" idx="12"/>
-          </p:nvPr>
-        </p:nvSpPr>
-        <p:spPr/>
-        <p:txBody>
-          <a:bodyPr/>
-          <a:lstStyle/>
-          <a:p>
-            <a:fld id="{7D9BB5D0-35E4-459D-AEF3-FE4D7C45CC19}" type="slidenum">
-              <a:rPr lang="zh-CN" altLang="en-US" smtClean="0"/>
-            </a:fld>
-            <a:endParaRPr lang="zh-CN" altLang="en-US"/>
-          </a:p>
-        </p:txBody>
-      </p:sp>
-    </p:spTree>
-  </p:cSld>
-  <p:clrMapOvr>
-    <a:masterClrMapping/>
-  </p:clrMapOvr>
+  <mc:AlternateContent xmlns:mc="http://schemas.openxmlformats.org/markup-compatibility/2006">
+    <mc:Choice xmlns:p14="http://schemas.microsoft.com/office/powerpoint/2010/main" Requires="p14">
+      <p:transition p14:dur="500"/>
+    </mc:Choice>
+    <mc:Fallback>
+      <p:transition/>
+    </mc:Fallback>
+  </mc:AlternateContent>
 </p:sldLayout>
 </file>
 
 <file path=ppt/slideMasters/slideMaster1.xml><?xml version="1.0" encoding="utf-8"?>
-<p:sldMaster xmlns:a="http://schemas.openxmlformats.org/drawingml/2006/main" xmlns:r="http://schemas.openxmlformats.org/officeDocument/2006/relationships" xmlns:p="http://schemas.openxmlformats.org/presentationml/2006/main">
+<p:sldMaster xmlns:a="http://schemas.openxmlformats.org/drawingml/2006/main" xmlns:r="http://schemas.openxmlformats.org/officeDocument/2006/relationships" xmlns:p="http://schemas.openxmlformats.org/presentationml/2006/main" preserve="1">
   <p:cSld>
     <p:bg>
-      <p:bgRef idx="1001">
-        <a:schemeClr val="bg1"/>
-      </p:bgRef>
+      <p:bgPr>
+        <a:blipFill dpi="0" rotWithShape="1">
+          <a:blip r:embed="rId13">
+            <a:lum/>
+          </a:blip>
+          <a:srcRect/>
+          <a:stretch>
+            <a:fillRect/>
+          </a:stretch>
+        </a:blipFill>
+        <a:effectLst/>
+      </p:bgPr>
     </p:bg>
     <p:spTree>
       <p:nvGrpSpPr>
@@ -2387,7 +2463,7 @@
       </p:grpSpPr>
       <p:sp>
         <p:nvSpPr>
-          <p:cNvPr id="2" name="标题占位符 1"/>
+          <p:cNvPr id="2" name="Title Placeholder 1"/>
           <p:cNvSpPr>
             <a:spLocks noGrp="1"/>
           </p:cNvSpPr>
@@ -2414,13 +2490,13 @@
               <a:rPr lang="zh-CN" altLang="en-US" smtClean="0"/>
               <a:t>单击此处编辑母版标题样式</a:t>
             </a:r>
-            <a:endParaRPr lang="zh-CN" altLang="en-US"/>
-          </a:p>
-        </p:txBody>
-      </p:sp>
-      <p:sp>
-        <p:nvSpPr>
-          <p:cNvPr id="3" name="文本占位符 2"/>
+            <a:endParaRPr lang="en-US" dirty="0"/>
+          </a:p>
+        </p:txBody>
+      </p:sp>
+      <p:sp>
+        <p:nvSpPr>
+          <p:cNvPr id="3" name="Text Placeholder 2"/>
           <p:cNvSpPr>
             <a:spLocks noGrp="1"/>
           </p:cNvSpPr>
@@ -2480,13 +2556,13 @@
               <a:rPr lang="zh-CN" altLang="en-US" smtClean="0"/>
               <a:t>第五级</a:t>
             </a:r>
-            <a:endParaRPr lang="zh-CN" altLang="en-US"/>
-          </a:p>
-        </p:txBody>
-      </p:sp>
-      <p:sp>
-        <p:nvSpPr>
-          <p:cNvPr id="4" name="日期占位符 3"/>
+            <a:endParaRPr lang="en-US" dirty="0"/>
+          </a:p>
+        </p:txBody>
+      </p:sp>
+      <p:sp>
+        <p:nvSpPr>
+          <p:cNvPr id="4" name="Date Placeholder 3"/>
           <p:cNvSpPr>
             <a:spLocks noGrp="1"/>
           </p:cNvSpPr>
@@ -2517,16 +2593,16 @@
             </a:lvl1pPr>
           </a:lstStyle>
           <a:p>
-            <a:fld id="{82F288E0-7875-42C4-84C8-98DBBD3BF4D2}" type="datetimeFigureOut">
-              <a:rPr lang="zh-CN" altLang="en-US" smtClean="0"/>
+            <a:fld id="{BEA18431-54C4-4585-82AD-D4BDE8FCC787}" type="datetimeFigureOut">
+              <a:rPr lang="zh-HK" altLang="en-US" smtClean="0"/>
             </a:fld>
-            <a:endParaRPr lang="zh-CN" altLang="en-US"/>
-          </a:p>
-        </p:txBody>
-      </p:sp>
-      <p:sp>
-        <p:nvSpPr>
-          <p:cNvPr id="5" name="页脚占位符 4"/>
+            <a:endParaRPr lang="zh-HK" altLang="en-US"/>
+          </a:p>
+        </p:txBody>
+      </p:sp>
+      <p:sp>
+        <p:nvSpPr>
+          <p:cNvPr id="5" name="Footer Placeholder 4"/>
           <p:cNvSpPr>
             <a:spLocks noGrp="1"/>
           </p:cNvSpPr>
@@ -2557,13 +2633,13 @@
             </a:lvl1pPr>
           </a:lstStyle>
           <a:p>
-            <a:endParaRPr lang="zh-CN" altLang="en-US"/>
-          </a:p>
-        </p:txBody>
-      </p:sp>
-      <p:sp>
-        <p:nvSpPr>
-          <p:cNvPr id="6" name="灯片编号占位符 5"/>
+            <a:endParaRPr lang="zh-HK" altLang="en-US"/>
+          </a:p>
+        </p:txBody>
+      </p:sp>
+      <p:sp>
+        <p:nvSpPr>
+          <p:cNvPr id="6" name="Slide Number Placeholder 5"/>
           <p:cNvSpPr>
             <a:spLocks noGrp="1"/>
           </p:cNvSpPr>
@@ -2594,13 +2670,37 @@
             </a:lvl1pPr>
           </a:lstStyle>
           <a:p>
-            <a:fld id="{7D9BB5D0-35E4-459D-AEF3-FE4D7C45CC19}" type="slidenum">
-              <a:rPr lang="zh-CN" altLang="en-US" smtClean="0"/>
+            <a:fld id="{8592E714-8771-4256-B120-A1444CD7D5F3}" type="slidenum">
+              <a:rPr lang="zh-HK" altLang="en-US" smtClean="0"/>
             </a:fld>
-            <a:endParaRPr lang="zh-CN" altLang="en-US"/>
-          </a:p>
-        </p:txBody>
-      </p:sp>
+            <a:endParaRPr lang="zh-HK" altLang="en-US"/>
+          </a:p>
+        </p:txBody>
+      </p:sp>
+      <p:pic>
+        <p:nvPicPr>
+          <p:cNvPr id="7" name="图片 6" descr="logo"/>
+          <p:cNvPicPr>
+            <a:picLocks noChangeAspect="1"/>
+          </p:cNvPicPr>
+          <p:nvPr userDrawn="1"/>
+        </p:nvPicPr>
+        <p:blipFill>
+          <a:blip r:embed="rId14"/>
+          <a:stretch>
+            <a:fillRect/>
+          </a:stretch>
+        </p:blipFill>
+        <p:spPr>
+          <a:xfrm>
+            <a:off x="10020300" y="5948680"/>
+            <a:ext cx="2045335" cy="891540"/>
+          </a:xfrm>
+          <a:prstGeom prst="rect">
+            <a:avLst/>
+          </a:prstGeom>
+        </p:spPr>
+      </p:pic>
     </p:spTree>
   </p:cSld>
   <p:clrMap bg1="lt1" tx1="dk1" bg2="lt2" tx2="dk2" accent1="accent1" accent2="accent2" accent3="accent3" accent4="accent4" accent5="accent5" accent6="accent6" hlink="hlink" folHlink="folHlink"/>
@@ -2616,7 +2716,16 @@
     <p:sldLayoutId id="2147483657" r:id="rId9"/>
     <p:sldLayoutId id="2147483658" r:id="rId10"/>
     <p:sldLayoutId id="2147483659" r:id="rId11"/>
+    <p:sldLayoutId id="2147483660" r:id="rId12"/>
   </p:sldLayoutIdLst>
+  <mc:AlternateContent xmlns:mc="http://schemas.openxmlformats.org/markup-compatibility/2006">
+    <mc:Choice xmlns:p14="http://schemas.microsoft.com/office/powerpoint/2010/main" Requires="p14">
+      <p:transition p14:dur="500"/>
+    </mc:Choice>
+    <mc:Fallback>
+      <p:transition/>
+    </mc:Fallback>
+  </mc:AlternateContent>
   <p:txStyles>
     <p:titleStyle>
       <a:lvl1pPr algn="l" defTabSz="914400" rtl="0" eaLnBrk="1" latinLnBrk="0" hangingPunct="1">
@@ -2645,7 +2754,7 @@
         <a:spcBef>
           <a:spcPts val="1000"/>
         </a:spcBef>
-        <a:buFont typeface="Arial" charset="0"/>
+        <a:buFont typeface="Arial" panose="020B0604020202020204" pitchFamily="34" charset="0"/>
         <a:buChar char="•"/>
         <a:defRPr sz="2800" kern="1200">
           <a:solidFill>
@@ -2663,7 +2772,7 @@
         <a:spcBef>
           <a:spcPts val="500"/>
         </a:spcBef>
-        <a:buFont typeface="Arial" charset="0"/>
+        <a:buFont typeface="Arial" panose="020B0604020202020204" pitchFamily="34" charset="0"/>
         <a:buChar char="•"/>
         <a:defRPr sz="2400" kern="1200">
           <a:solidFill>
@@ -2681,7 +2790,7 @@
         <a:spcBef>
           <a:spcPts val="500"/>
         </a:spcBef>
-        <a:buFont typeface="Arial" charset="0"/>
+        <a:buFont typeface="Arial" panose="020B0604020202020204" pitchFamily="34" charset="0"/>
         <a:buChar char="•"/>
         <a:defRPr sz="2000" kern="1200">
           <a:solidFill>
@@ -2699,7 +2808,7 @@
         <a:spcBef>
           <a:spcPts val="500"/>
         </a:spcBef>
-        <a:buFont typeface="Arial" charset="0"/>
+        <a:buFont typeface="Arial" panose="020B0604020202020204" pitchFamily="34" charset="0"/>
         <a:buChar char="•"/>
         <a:defRPr sz="1800" kern="1200">
           <a:solidFill>
@@ -2717,7 +2826,7 @@
         <a:spcBef>
           <a:spcPts val="500"/>
         </a:spcBef>
-        <a:buFont typeface="Arial" charset="0"/>
+        <a:buFont typeface="Arial" panose="020B0604020202020204" pitchFamily="34" charset="0"/>
         <a:buChar char="•"/>
         <a:defRPr sz="1800" kern="1200">
           <a:solidFill>
@@ -2735,7 +2844,7 @@
         <a:spcBef>
           <a:spcPts val="500"/>
         </a:spcBef>
-        <a:buFont typeface="Arial" charset="0"/>
+        <a:buFont typeface="Arial" panose="020B0604020202020204" pitchFamily="34" charset="0"/>
         <a:buChar char="•"/>
         <a:defRPr sz="1800" kern="1200">
           <a:solidFill>
@@ -2753,7 +2862,7 @@
         <a:spcBef>
           <a:spcPts val="500"/>
         </a:spcBef>
-        <a:buFont typeface="Arial" charset="0"/>
+        <a:buFont typeface="Arial" panose="020B0604020202020204" pitchFamily="34" charset="0"/>
         <a:buChar char="•"/>
         <a:defRPr sz="1800" kern="1200">
           <a:solidFill>
@@ -2771,7 +2880,7 @@
         <a:spcBef>
           <a:spcPts val="500"/>
         </a:spcBef>
-        <a:buFont typeface="Arial" charset="0"/>
+        <a:buFont typeface="Arial" panose="020B0604020202020204" pitchFamily="34" charset="0"/>
         <a:buChar char="•"/>
         <a:defRPr sz="1800" kern="1200">
           <a:solidFill>
@@ -2789,7 +2898,7 @@
         <a:spcBef>
           <a:spcPts val="500"/>
         </a:spcBef>
-        <a:buFont typeface="Arial" charset="0"/>
+        <a:buFont typeface="Arial" panose="020B0604020202020204" pitchFamily="34" charset="0"/>
         <a:buChar char="•"/>
         <a:defRPr sz="1800" kern="1200">
           <a:solidFill>
@@ -2803,7 +2912,7 @@
     </p:bodyStyle>
     <p:otherStyle>
       <a:defPPr>
-        <a:defRPr lang="zh-CN"/>
+        <a:defRPr lang="en-US"/>
       </a:defPPr>
       <a:lvl1pPr marL="0" algn="l" defTabSz="914400" rtl="0" eaLnBrk="1" latinLnBrk="0" hangingPunct="1">
         <a:defRPr sz="1800" kern="1200">
@@ -3017,7 +3126,7 @@
                 <a:solidFill>
                   <a:srgbClr val="FFC000"/>
                 </a:solidFill>
-                <a:latin typeface="Arial" charset="0"/>
+                <a:latin typeface="Arial" panose="020B0604020202020204" pitchFamily="34" charset="0"/>
                 <a:ea typeface="Sans Serif" charset="0"/>
               </a:rPr>
               <a:t>Avast</a:t>
@@ -3027,7 +3136,7 @@
                 <a:solidFill>
                   <a:srgbClr val="FFC000"/>
                 </a:solidFill>
-                <a:latin typeface="Arial" charset="0"/>
+                <a:latin typeface="Arial" panose="020B0604020202020204" pitchFamily="34" charset="0"/>
                 <a:ea typeface="Sans Serif" charset="0"/>
               </a:rPr>
               <a:t> </a:t>
@@ -3037,7 +3146,7 @@
                 <a:solidFill>
                   <a:srgbClr val="FFC000"/>
                 </a:solidFill>
-                <a:latin typeface="Arial" charset="0"/>
+                <a:latin typeface="Arial" panose="020B0604020202020204" pitchFamily="34" charset="0"/>
                 <a:ea typeface="Sans Serif" charset="0"/>
               </a:rPr>
               <a:t>Urlinfo</a:t>
@@ -3047,13 +3156,13 @@
                 <a:solidFill>
                   <a:srgbClr val="FFC000"/>
                 </a:solidFill>
-                <a:latin typeface="Arial" charset="0"/>
+                <a:latin typeface="Arial" panose="020B0604020202020204" pitchFamily="34" charset="0"/>
                 <a:ea typeface="Sans Serif" charset="0"/>
               </a:rPr>
               <a:t> Service</a:t>
             </a:r>
             <a:endParaRPr>
-              <a:latin typeface="Arial" charset="0"/>
+              <a:latin typeface="Arial" panose="020B0604020202020204" pitchFamily="34" charset="0"/>
               <a:ea typeface="Sans Serif" charset="0"/>
             </a:endParaRPr>
           </a:p>
@@ -3102,17 +3211,27 @@
           <a:p>
             <a:pPr algn="l"/>
             <a:r>
+              <a:rPr lang="en-US" altLang="x-none" sz="2400" b="1" dirty="0" err="1">
+                <a:solidFill>
+                  <a:srgbClr val="FFC000"/>
+                </a:solidFill>
+                <a:latin typeface="Arial" panose="020B0604020202020204" pitchFamily="34" charset="0"/>
+                <a:ea typeface="Sans Serif" charset="0"/>
+              </a:rPr>
+              <a:t>October</a:t>
+            </a:r>
+            <a:r>
               <a:rPr lang="x-none" sz="2400" b="1" dirty="0" err="1">
                 <a:solidFill>
                   <a:srgbClr val="FFC000"/>
                 </a:solidFill>
-                <a:latin typeface="Arial" charset="0"/>
+                <a:latin typeface="Arial" panose="020B0604020202020204" pitchFamily="34" charset="0"/>
                 <a:ea typeface="Sans Serif" charset="0"/>
               </a:rPr>
-              <a:t>September 2018</a:t>
+              <a:t> 2018</a:t>
             </a:r>
             <a:endParaRPr lang="x-none" sz="2400">
-              <a:latin typeface="Arial" charset="0"/>
+              <a:latin typeface="Arial" panose="020B0604020202020204" pitchFamily="34" charset="0"/>
               <a:ea typeface="Sans Serif" charset="0"/>
             </a:endParaRPr>
           </a:p>
@@ -3147,6 +3266,14 @@
   <p:clrMapOvr>
     <a:masterClrMapping/>
   </p:clrMapOvr>
+  <mc:AlternateContent xmlns:mc="http://schemas.openxmlformats.org/markup-compatibility/2006">
+    <mc:Choice xmlns:p14="http://schemas.microsoft.com/office/powerpoint/2010/main" Requires="p14">
+      <p:transition p14:dur="500"/>
+    </mc:Choice>
+    <mc:Fallback>
+      <p:transition/>
+    </mc:Fallback>
+  </mc:AlternateContent>
 </p:sld>
 </file>
 
@@ -3162,28 +3289,6 @@
       <p:grpSpPr/>
       <p:sp>
         <p:nvSpPr>
-          <p:cNvPr id="2" name="标题 1"/>
-          <p:cNvSpPr>
-            <a:spLocks noGrp="1"/>
-          </p:cNvSpPr>
-          <p:nvPr>
-            <p:ph type="title"/>
-          </p:nvPr>
-        </p:nvSpPr>
-        <p:spPr/>
-        <p:txBody>
-          <a:bodyPr/>
-          <a:p>
-            <a:r>
-              <a:rPr lang="x-none" altLang="zh-CN"/>
-              <a:t>Agenda</a:t>
-            </a:r>
-            <a:endParaRPr lang="x-none" altLang="zh-CN"/>
-          </a:p>
-        </p:txBody>
-      </p:sp>
-      <p:sp>
-        <p:nvSpPr>
           <p:cNvPr id="3" name="内容占位符 2"/>
           <p:cNvSpPr>
             <a:spLocks noGrp="1"/>
@@ -3192,33 +3297,70 @@
             <p:ph idx="1"/>
           </p:nvPr>
         </p:nvSpPr>
-        <p:spPr/>
+        <p:spPr>
+          <a:xfrm>
+            <a:off x="898525" y="1741170"/>
+            <a:ext cx="10515600" cy="4351338"/>
+          </a:xfrm>
+        </p:spPr>
         <p:txBody>
           <a:bodyPr>
             <a:normAutofit/>
           </a:bodyPr>
           <a:p>
             <a:r>
-              <a:rPr lang="x-none" altLang="zh-CN"/>
+              <a:rPr lang="x-none" altLang="zh-CN">
+                <a:solidFill>
+                  <a:srgbClr val="FF923F"/>
+                </a:solidFill>
+                <a:latin typeface="Arial" panose="020B0604020202020204" pitchFamily="34" charset="0"/>
+                <a:cs typeface="Arial" panose="020B0604020202020204" pitchFamily="34" charset="0"/>
+              </a:rPr>
               <a:t>Avast Urlinfo Service introduction</a:t>
             </a:r>
-            <a:endParaRPr lang="x-none" altLang="zh-CN"/>
+            <a:endParaRPr lang="x-none" altLang="zh-CN">
+              <a:solidFill>
+                <a:srgbClr val="FF923F"/>
+              </a:solidFill>
+            </a:endParaRPr>
           </a:p>
           <a:p>
             <a:pPr lvl="1"/>
             <a:r>
-              <a:rPr lang="x-none" altLang="zh-CN" sz="2400"/>
+              <a:rPr lang="x-none" altLang="zh-CN" sz="2400">
+                <a:solidFill>
+                  <a:srgbClr val="FF923F"/>
+                </a:solidFill>
+                <a:latin typeface="Arial" panose="020B0604020202020204" pitchFamily="34" charset="0"/>
+                <a:cs typeface="Arial" panose="020B0604020202020204" pitchFamily="34" charset="0"/>
+              </a:rPr>
               <a:t>features</a:t>
             </a:r>
-            <a:endParaRPr lang="x-none" altLang="zh-CN" sz="2400"/>
+            <a:endParaRPr lang="x-none" altLang="zh-CN" sz="2400">
+              <a:solidFill>
+                <a:srgbClr val="FF923F"/>
+              </a:solidFill>
+              <a:latin typeface="Arial" panose="020B0604020202020204" pitchFamily="34" charset="0"/>
+              <a:cs typeface="Arial" panose="020B0604020202020204" pitchFamily="34" charset="0"/>
+            </a:endParaRPr>
           </a:p>
           <a:p>
             <a:pPr lvl="1"/>
             <a:r>
-              <a:rPr lang="x-none" altLang="zh-CN" sz="2400"/>
+              <a:rPr lang="x-none" altLang="zh-CN" sz="2400">
+                <a:solidFill>
+                  <a:srgbClr val="FF923F"/>
+                </a:solidFill>
+                <a:latin typeface="Arial" panose="020B0604020202020204" pitchFamily="34" charset="0"/>
+                <a:cs typeface="Arial" panose="020B0604020202020204" pitchFamily="34" charset="0"/>
+              </a:rPr>
               <a:t>advantages</a:t>
             </a:r>
-            <a:endParaRPr lang="x-none" altLang="zh-CN" sz="2400"/>
+            <a:endParaRPr lang="x-none" altLang="zh-CN" sz="2400">
+              <a:solidFill>
+                <a:srgbClr val="FF923F"/>
+              </a:solidFill>
+            </a:endParaRPr>
           </a:p>
           <a:p>
             <a:pPr lvl="0"/>
@@ -3250,19 +3392,7 @@
               <a:rPr lang="x-none" altLang="zh-CN">
                 <a:sym typeface="+mn-ea"/>
               </a:rPr>
-              <a:t>S</a:t>
-            </a:r>
-            <a:r>
-              <a:rPr lang="x-none" altLang="zh-CN">
-                <a:sym typeface="+mn-ea"/>
-              </a:rPr>
-              <a:t>imilar solutions </a:t>
-            </a:r>
-            <a:r>
-              <a:rPr lang="x-none" altLang="zh-CN">
-                <a:sym typeface="+mn-ea"/>
-              </a:rPr>
-              <a:t>in the market.</a:t>
+              <a:t>Similar solutions in the market.</a:t>
             </a:r>
             <a:endParaRPr lang="x-none" altLang="zh-CN">
               <a:sym typeface="+mn-ea"/>
@@ -3291,6 +3421,135 @@
               <a:t>Questions.</a:t>
             </a:r>
             <a:endParaRPr lang="x-none" altLang="zh-CN"/>
+          </a:p>
+        </p:txBody>
+      </p:sp>
+      <p:grpSp>
+        <p:nvGrpSpPr>
+          <p:cNvPr id="24" name="组合 23"/>
+          <p:cNvGrpSpPr/>
+          <p:nvPr/>
+        </p:nvGrpSpPr>
+        <p:grpSpPr>
+          <a:xfrm>
+            <a:off x="903605" y="311785"/>
+            <a:ext cx="10624820" cy="723265"/>
+            <a:chOff x="4071938" y="642938"/>
+            <a:chExt cx="2386012" cy="614362"/>
+          </a:xfrm>
+        </p:grpSpPr>
+        <p:cxnSp>
+          <p:nvCxnSpPr>
+            <p:cNvPr id="9" name="直接连接符 8"/>
+            <p:cNvCxnSpPr/>
+            <p:nvPr/>
+          </p:nvCxnSpPr>
+          <p:spPr>
+            <a:xfrm>
+              <a:off x="4071938" y="642938"/>
+              <a:ext cx="2386012" cy="0"/>
+            </a:xfrm>
+            <a:prstGeom prst="line">
+              <a:avLst/>
+            </a:prstGeom>
+            <a:ln>
+              <a:solidFill>
+                <a:srgbClr val="484848"/>
+              </a:solidFill>
+              <a:prstDash val="dash"/>
+            </a:ln>
+          </p:spPr>
+          <p:style>
+            <a:lnRef idx="1">
+              <a:schemeClr val="accent1"/>
+            </a:lnRef>
+            <a:fillRef idx="0">
+              <a:schemeClr val="accent1"/>
+            </a:fillRef>
+            <a:effectRef idx="0">
+              <a:schemeClr val="accent1"/>
+            </a:effectRef>
+            <a:fontRef idx="minor">
+              <a:schemeClr val="tx1"/>
+            </a:fontRef>
+          </p:style>
+        </p:cxnSp>
+        <p:cxnSp>
+          <p:nvCxnSpPr>
+            <p:cNvPr id="21" name="直接连接符 20"/>
+            <p:cNvCxnSpPr/>
+            <p:nvPr/>
+          </p:nvCxnSpPr>
+          <p:spPr>
+            <a:xfrm>
+              <a:off x="4071938" y="1257300"/>
+              <a:ext cx="2386012" cy="0"/>
+            </a:xfrm>
+            <a:prstGeom prst="line">
+              <a:avLst/>
+            </a:prstGeom>
+            <a:ln>
+              <a:solidFill>
+                <a:srgbClr val="484848"/>
+              </a:solidFill>
+              <a:prstDash val="dash"/>
+            </a:ln>
+          </p:spPr>
+          <p:style>
+            <a:lnRef idx="1">
+              <a:schemeClr val="accent1"/>
+            </a:lnRef>
+            <a:fillRef idx="0">
+              <a:schemeClr val="accent1"/>
+            </a:fillRef>
+            <a:effectRef idx="0">
+              <a:schemeClr val="accent1"/>
+            </a:effectRef>
+            <a:fontRef idx="minor">
+              <a:schemeClr val="tx1"/>
+            </a:fontRef>
+          </p:style>
+        </p:cxnSp>
+      </p:grpSp>
+      <p:sp>
+        <p:nvSpPr>
+          <p:cNvPr id="10" name="文本框 9"/>
+          <p:cNvSpPr txBox="1"/>
+          <p:nvPr/>
+        </p:nvSpPr>
+        <p:spPr>
+          <a:xfrm>
+            <a:off x="3860800" y="367665"/>
+            <a:ext cx="4774565" cy="643890"/>
+          </a:xfrm>
+          <a:prstGeom prst="rect">
+            <a:avLst/>
+          </a:prstGeom>
+          <a:noFill/>
+        </p:spPr>
+        <p:txBody>
+          <a:bodyPr wrap="square" rtlCol="0">
+            <a:spAutoFit/>
+          </a:bodyPr>
+          <a:p>
+            <a:pPr algn="ctr"/>
+            <a:r>
+              <a:rPr lang="x-none" altLang="en-US" sz="3600" b="1" dirty="0" err="1" smtClean="0">
+                <a:solidFill>
+                  <a:srgbClr val="FF923F"/>
+                </a:solidFill>
+                <a:latin typeface="微软雅黑" panose="020B0503020204020204" pitchFamily="34" charset="-122"/>
+                <a:ea typeface="微软雅黑" panose="020B0503020204020204" pitchFamily="34" charset="-122"/>
+              </a:rPr>
+              <a:t>Agenda</a:t>
+            </a:r>
+            <a:endParaRPr lang="x-none" altLang="en-US" sz="3600" b="1" dirty="0" err="1" smtClean="0">
+              <a:solidFill>
+                <a:srgbClr val="FF923F"/>
+              </a:solidFill>
+              <a:latin typeface="微软雅黑" panose="020B0503020204020204" pitchFamily="34" charset="-122"/>
+              <a:ea typeface="微软雅黑" panose="020B0503020204020204" pitchFamily="34" charset="-122"/>
+            </a:endParaRPr>
           </a:p>
         </p:txBody>
       </p:sp>
@@ -3299,13 +3558,277 @@
   <p:clrMapOvr>
     <a:masterClrMapping/>
   </p:clrMapOvr>
+  <mc:AlternateContent xmlns:mc="http://schemas.openxmlformats.org/markup-compatibility/2006">
+    <mc:Choice xmlns:p14="http://schemas.microsoft.com/office/powerpoint/2010/main" Requires="p14">
+      <p:transition p14:dur="500"/>
+    </mc:Choice>
+    <mc:Fallback>
+      <p:transition/>
+    </mc:Fallback>
+  </mc:AlternateContent>
+</p:sld>
+</file>
+
+<file path=ppt/slides/slide3.xml><?xml version="1.0" encoding="utf-8"?>
+<p:sld xmlns:a="http://schemas.openxmlformats.org/drawingml/2006/main" xmlns:r="http://schemas.openxmlformats.org/officeDocument/2006/relationships" xmlns:p="http://schemas.openxmlformats.org/presentationml/2006/main">
+  <p:cSld>
+    <p:spTree>
+      <p:nvGrpSpPr>
+        <p:cNvPr id="1" name=""/>
+        <p:cNvGrpSpPr/>
+        <p:nvPr/>
+      </p:nvGrpSpPr>
+      <p:grpSpPr/>
+      <p:sp>
+        <p:nvSpPr>
+          <p:cNvPr id="3" name="内容占位符 2"/>
+          <p:cNvSpPr>
+            <a:spLocks noGrp="1"/>
+          </p:cNvSpPr>
+          <p:nvPr>
+            <p:ph idx="1"/>
+          </p:nvPr>
+        </p:nvSpPr>
+        <p:spPr/>
+        <p:txBody>
+          <a:bodyPr/>
+          <a:p>
+            <a:endParaRPr lang="zh-CN" altLang="en-US"/>
+          </a:p>
+        </p:txBody>
+      </p:sp>
+      <p:grpSp>
+        <p:nvGrpSpPr>
+          <p:cNvPr id="2" name="组合 1"/>
+          <p:cNvGrpSpPr/>
+          <p:nvPr/>
+        </p:nvGrpSpPr>
+        <p:grpSpPr>
+          <a:xfrm>
+            <a:off x="184785" y="74295"/>
+            <a:ext cx="10236835" cy="1010285"/>
+            <a:chOff x="291" y="117"/>
+            <a:chExt cx="16121" cy="1591"/>
+          </a:xfrm>
+        </p:grpSpPr>
+        <p:sp>
+          <p:nvSpPr>
+            <p:cNvPr id="35" name="文本框 34"/>
+            <p:cNvSpPr txBox="1"/>
+            <p:nvPr/>
+          </p:nvSpPr>
+          <p:spPr>
+            <a:xfrm>
+              <a:off x="693" y="117"/>
+              <a:ext cx="15719" cy="1016"/>
+            </a:xfrm>
+            <a:prstGeom prst="rect">
+              <a:avLst/>
+            </a:prstGeom>
+            <a:noFill/>
+          </p:spPr>
+          <p:txBody>
+            <a:bodyPr wrap="square" rtlCol="0">
+              <a:spAutoFit/>
+            </a:bodyPr>
+            <a:p>
+              <a:r>
+                <a:rPr lang="x-none" altLang="zh-CN" sz="3600" b="1">
+                  <a:solidFill>
+                    <a:srgbClr val="FF923F"/>
+                  </a:solidFill>
+                  <a:latin typeface="Arial" panose="020B0604020202020204" pitchFamily="34" charset="0"/>
+                  <a:ea typeface="文泉驿正黑" panose="02000603000000000000" charset="-122"/>
+                  <a:cs typeface="Arial" panose="020B0604020202020204" pitchFamily="34" charset="0"/>
+                  <a:sym typeface="+mn-ea"/>
+                </a:rPr>
+                <a:t>A</a:t>
+              </a:r>
+              <a:r>
+                <a:rPr lang="en-US" altLang="x-none" sz="3600" b="1">
+                  <a:solidFill>
+                    <a:srgbClr val="FF923F"/>
+                  </a:solidFill>
+                  <a:latin typeface="Arial" panose="020B0604020202020204" pitchFamily="34" charset="0"/>
+                  <a:ea typeface="文泉驿正黑" panose="02000603000000000000" charset="-122"/>
+                  <a:cs typeface="Arial" panose="020B0604020202020204" pitchFamily="34" charset="0"/>
+                  <a:sym typeface="+mn-ea"/>
+                </a:rPr>
+                <a:t>VAST</a:t>
+              </a:r>
+              <a:r>
+                <a:rPr lang="x-none" altLang="zh-CN" sz="3600" b="1">
+                  <a:solidFill>
+                    <a:srgbClr val="FF923F"/>
+                  </a:solidFill>
+                  <a:latin typeface="Arial" panose="020B0604020202020204" pitchFamily="34" charset="0"/>
+                  <a:ea typeface="文泉驿正黑" panose="02000603000000000000" charset="-122"/>
+                  <a:cs typeface="Arial" panose="020B0604020202020204" pitchFamily="34" charset="0"/>
+                  <a:sym typeface="+mn-ea"/>
+                </a:rPr>
+                <a:t> </a:t>
+              </a:r>
+              <a:r>
+                <a:rPr lang="en-US" altLang="x-none" sz="3600" b="1">
+                  <a:solidFill>
+                    <a:srgbClr val="FF923F"/>
+                  </a:solidFill>
+                  <a:latin typeface="Arial" panose="020B0604020202020204" pitchFamily="34" charset="0"/>
+                  <a:ea typeface="文泉驿正黑" panose="02000603000000000000" charset="-122"/>
+                  <a:cs typeface="Arial" panose="020B0604020202020204" pitchFamily="34" charset="0"/>
+                  <a:sym typeface="+mn-ea"/>
+                </a:rPr>
+                <a:t>URLINFO</a:t>
+              </a:r>
+              <a:r>
+                <a:rPr lang="x-none" altLang="zh-CN" sz="3600" b="1">
+                  <a:solidFill>
+                    <a:srgbClr val="FF923F"/>
+                  </a:solidFill>
+                  <a:latin typeface="Arial" panose="020B0604020202020204" pitchFamily="34" charset="0"/>
+                  <a:ea typeface="文泉驿正黑" panose="02000603000000000000" charset="-122"/>
+                  <a:cs typeface="Arial" panose="020B0604020202020204" pitchFamily="34" charset="0"/>
+                  <a:sym typeface="+mn-ea"/>
+                </a:rPr>
+                <a:t> </a:t>
+              </a:r>
+              <a:r>
+                <a:rPr lang="en-US" altLang="x-none" sz="3600" b="1">
+                  <a:solidFill>
+                    <a:srgbClr val="FF923F"/>
+                  </a:solidFill>
+                  <a:latin typeface="Arial" panose="020B0604020202020204" pitchFamily="34" charset="0"/>
+                  <a:ea typeface="文泉驿正黑" panose="02000603000000000000" charset="-122"/>
+                  <a:cs typeface="Arial" panose="020B0604020202020204" pitchFamily="34" charset="0"/>
+                  <a:sym typeface="+mn-ea"/>
+                </a:rPr>
+                <a:t>SERVICE </a:t>
+              </a:r>
+              <a:endParaRPr lang="en-US" altLang="x-none" sz="3600" b="1" spc="300" dirty="0" smtClean="0">
+                <a:solidFill>
+                  <a:srgbClr val="FF923F"/>
+                </a:solidFill>
+                <a:latin typeface="Arial" panose="020B0604020202020204" pitchFamily="34" charset="0"/>
+                <a:ea typeface="文泉驿正黑" panose="02000603000000000000" charset="-122"/>
+                <a:cs typeface="Arial" panose="020B0604020202020204" pitchFamily="34" charset="0"/>
+                <a:sym typeface="+mn-ea"/>
+              </a:endParaRPr>
+            </a:p>
+          </p:txBody>
+        </p:sp>
+        <p:sp>
+          <p:nvSpPr>
+            <p:cNvPr id="37" name="矩形 36"/>
+            <p:cNvSpPr/>
+            <p:nvPr/>
+          </p:nvSpPr>
+          <p:spPr>
+            <a:xfrm>
+              <a:off x="291" y="273"/>
+              <a:ext cx="317" cy="1310"/>
+            </a:xfrm>
+            <a:prstGeom prst="rect">
+              <a:avLst/>
+            </a:prstGeom>
+            <a:solidFill>
+              <a:srgbClr val="FF9200"/>
+            </a:solidFill>
+            <a:ln>
+              <a:noFill/>
+            </a:ln>
+          </p:spPr>
+          <p:style>
+            <a:lnRef idx="2">
+              <a:schemeClr val="accent1">
+                <a:shade val="50000"/>
+              </a:schemeClr>
+            </a:lnRef>
+            <a:fillRef idx="1">
+              <a:schemeClr val="accent1"/>
+            </a:fillRef>
+            <a:effectRef idx="0">
+              <a:schemeClr val="accent1"/>
+            </a:effectRef>
+            <a:fontRef idx="minor">
+              <a:schemeClr val="lt1"/>
+            </a:fontRef>
+          </p:style>
+          <p:txBody>
+            <a:bodyPr rtlCol="0" anchor="ctr"/>
+            <a:p>
+              <a:pPr algn="ctr"/>
+              <a:endParaRPr lang="zh-HK" altLang="en-US">
+                <a:solidFill>
+                  <a:srgbClr val="D7343F"/>
+                </a:solidFill>
+              </a:endParaRPr>
+            </a:p>
+          </p:txBody>
+        </p:sp>
+        <p:sp>
+          <p:nvSpPr>
+            <p:cNvPr id="4" name="文本框 3"/>
+            <p:cNvSpPr txBox="1"/>
+            <p:nvPr/>
+          </p:nvSpPr>
+          <p:spPr>
+            <a:xfrm>
+              <a:off x="733" y="1080"/>
+              <a:ext cx="9787" cy="628"/>
+            </a:xfrm>
+            <a:prstGeom prst="rect">
+              <a:avLst/>
+            </a:prstGeom>
+            <a:noFill/>
+          </p:spPr>
+          <p:txBody>
+            <a:bodyPr wrap="square" rtlCol="0">
+              <a:spAutoFit/>
+            </a:bodyPr>
+            <a:p>
+              <a:r>
+                <a:rPr lang="en-US" altLang="x-none" sz="2000" b="1" spc="300" dirty="0" smtClean="0">
+                  <a:solidFill>
+                    <a:srgbClr val="485766"/>
+                  </a:solidFill>
+                  <a:latin typeface="Arial" panose="020B0604020202020204" pitchFamily="34" charset="0"/>
+                  <a:ea typeface="微软雅黑" panose="020B0503020204020204" pitchFamily="34" charset="-122"/>
+                  <a:cs typeface="Arial" panose="020B0604020202020204" pitchFamily="34" charset="0"/>
+                </a:rPr>
+                <a:t>INTRODUCTION</a:t>
+              </a:r>
+              <a:endParaRPr lang="en-US" altLang="x-none" sz="2000" b="1" spc="300" dirty="0" smtClean="0">
+                <a:solidFill>
+                  <a:srgbClr val="485766"/>
+                </a:solidFill>
+                <a:latin typeface="Arial" panose="020B0604020202020204" pitchFamily="34" charset="0"/>
+                <a:ea typeface="微软雅黑" panose="020B0503020204020204" pitchFamily="34" charset="-122"/>
+                <a:cs typeface="Arial" panose="020B0604020202020204" pitchFamily="34" charset="0"/>
+              </a:endParaRPr>
+            </a:p>
+          </p:txBody>
+        </p:sp>
+      </p:grpSp>
+    </p:spTree>
+  </p:cSld>
+  <p:clrMapOvr>
+    <a:masterClrMapping/>
+  </p:clrMapOvr>
+  <mc:AlternateContent xmlns:mc="http://schemas.openxmlformats.org/markup-compatibility/2006">
+    <mc:Choice xmlns:p14="http://schemas.microsoft.com/office/powerpoint/2010/main" Requires="p14">
+      <p:transition p14:dur="500"/>
+    </mc:Choice>
+    <mc:Fallback>
+      <p:transition/>
+    </mc:Fallback>
+  </mc:AlternateContent>
 </p:sld>
 </file>
 
 <file path=ppt/theme/theme1.xml><?xml version="1.0" encoding="utf-8"?>
-<a:theme xmlns:a="http://schemas.openxmlformats.org/drawingml/2006/main" name="Office 主题">
+<a:theme xmlns:a="http://schemas.openxmlformats.org/drawingml/2006/main" name="1_Office 主题">
   <a:themeElements>
-    <a:clrScheme name="Office">
+    <a:clrScheme name="Office 主题">
       <a:dk1>
         <a:sysClr val="windowText" lastClr="000000"/>
       </a:dk1>
@@ -3343,7 +3866,7 @@
         <a:srgbClr val="954F72"/>
       </a:folHlink>
     </a:clrScheme>
-    <a:fontScheme name="Office">
+    <a:fontScheme name="Office 主题">
       <a:majorFont>
         <a:latin typeface="Calibri Light"/>
         <a:ea typeface=""/>
@@ -3415,7 +3938,7 @@
         <a:font script="Geor" typeface="Sylfaen"/>
       </a:minorFont>
     </a:fontScheme>
-    <a:fmtScheme name="Office">
+    <a:fmtScheme name="Office 主题">
       <a:fillStyleLst>
         <a:solidFill>
           <a:schemeClr val="phClr"/>
@@ -3553,8 +4076,6 @@
       </a:bgFillStyleLst>
     </a:fmtScheme>
   </a:themeElements>
-  <a:objectDefaults/>
-  <a:extraClrSchemeLst/>
   <a:extLst>
     <a:ext uri="{05A4C25C-085E-4340-85A3-A5531E510DB2}">
       <thm15:themeFamily xmlns:thm15="http://schemas.microsoft.com/office/thememl/2012/main" name="Office Theme" id="{62F939B6-93AF-4DB8-9C6B-D6C7DFDC589F}" vid="{4A3C46E8-61CC-4603-A589-7422A47A8E4A}"/>

</xml_diff>

<commit_message>
add screenshot of web security statistic from SB, add more reference matierials going to put them on PPT
</commit_message>
<xml_diff>
--- a/urlinfo_presentation.pptx
+++ b/urlinfo_presentation.pptx
@@ -7,7 +7,11 @@
   <p:sldIdLst>
     <p:sldId id="256" r:id="rId3"/>
     <p:sldId id="257" r:id="rId4"/>
-    <p:sldId id="258" r:id="rId5"/>
+    <p:sldId id="260" r:id="rId5"/>
+    <p:sldId id="261" r:id="rId6"/>
+    <p:sldId id="262" r:id="rId7"/>
+    <p:sldId id="258" r:id="rId8"/>
+    <p:sldId id="259" r:id="rId9"/>
   </p:sldIdLst>
   <p:sldSz cx="12192000" cy="6858000"/>
   <p:notesSz cx="6858000" cy="9144000"/>
@@ -3089,7 +3093,7 @@
         </p:nvSpPr>
         <p:spPr>
           <a:xfrm>
-            <a:off x="488315" y="2704465"/>
+            <a:off x="628015" y="2122170"/>
             <a:ext cx="8505825" cy="1251585"/>
           </a:xfrm>
           <a:prstGeom prst="rect">
@@ -3178,7 +3182,7 @@
         </p:nvSpPr>
         <p:spPr>
           <a:xfrm>
-            <a:off x="507365" y="4024630"/>
+            <a:off x="2748280" y="5600700"/>
             <a:ext cx="3590925" cy="613410"/>
           </a:xfrm>
           <a:prstGeom prst="rect">
@@ -3261,6 +3265,65 @@
           </a:prstGeom>
         </p:spPr>
       </p:pic>
+      <p:sp>
+        <p:nvSpPr>
+          <p:cNvPr id="4" name="Title 5"/>
+          <p:cNvSpPr>
+            <a:spLocks noGrp="1"/>
+          </p:cNvSpPr>
+          <p:nvPr/>
+        </p:nvSpPr>
+        <p:spPr>
+          <a:xfrm>
+            <a:off x="628015" y="3510280"/>
+            <a:ext cx="3590925" cy="613410"/>
+          </a:xfrm>
+          <a:prstGeom prst="rect">
+            <a:avLst/>
+          </a:prstGeom>
+        </p:spPr>
+        <p:txBody>
+          <a:bodyPr vert="horz" lIns="91440" tIns="45720" rIns="91440" bIns="45720" rtlCol="0" anchor="b">
+            <a:noAutofit/>
+          </a:bodyPr>
+          <a:lstStyle>
+            <a:lvl1pPr algn="ctr" defTabSz="914400" rtl="0" eaLnBrk="1" latinLnBrk="0" hangingPunct="1">
+              <a:lnSpc>
+                <a:spcPct val="90000"/>
+              </a:lnSpc>
+              <a:spcBef>
+                <a:spcPct val="0"/>
+              </a:spcBef>
+              <a:buNone/>
+              <a:defRPr sz="6000" kern="1200">
+                <a:solidFill>
+                  <a:schemeClr val="tx1"/>
+                </a:solidFill>
+                <a:latin typeface="+mj-lt"/>
+                <a:ea typeface="+mj-ea"/>
+                <a:cs typeface="+mj-cs"/>
+              </a:defRPr>
+            </a:lvl1pPr>
+          </a:lstStyle>
+          <a:p>
+            <a:pPr algn="l"/>
+            <a:r>
+              <a:rPr lang="en-US" sz="2400" b="1" dirty="0" err="1">
+                <a:solidFill>
+                  <a:srgbClr val="FFC000"/>
+                </a:solidFill>
+                <a:latin typeface="Arial" panose="020B0604020202020204" pitchFamily="34" charset="0"/>
+                <a:ea typeface="Sans Serif" charset="0"/>
+              </a:rPr>
+              <a:t>Jacob Leung </a:t>
+            </a:r>
+            <a:endParaRPr lang="en-US" sz="2400">
+              <a:latin typeface="Arial" panose="020B0604020202020204" pitchFamily="34" charset="0"/>
+              <a:ea typeface="Sans Serif" charset="0"/>
+            </a:endParaRPr>
+          </a:p>
+        </p:txBody>
+      </p:sp>
     </p:spTree>
   </p:cSld>
   <p:clrMapOvr>
@@ -3581,6 +3644,28 @@
       <p:grpSpPr/>
       <p:sp>
         <p:nvSpPr>
+          <p:cNvPr id="2" name="标题 1"/>
+          <p:cNvSpPr>
+            <a:spLocks noGrp="1"/>
+          </p:cNvSpPr>
+          <p:nvPr>
+            <p:ph type="title"/>
+          </p:nvPr>
+        </p:nvSpPr>
+        <p:spPr/>
+        <p:txBody>
+          <a:bodyPr/>
+          <a:p>
+            <a:r>
+              <a:rPr lang="en-US" altLang="zh-CN"/>
+              <a:t>Web application security background</a:t>
+            </a:r>
+            <a:endParaRPr lang="en-US" altLang="zh-CN"/>
+          </a:p>
+        </p:txBody>
+      </p:sp>
+      <p:sp>
+        <p:nvSpPr>
           <p:cNvPr id="3" name="内容占位符 2"/>
           <p:cNvSpPr>
             <a:spLocks noGrp="1"/>
@@ -3594,6 +3679,186 @@
           <a:bodyPr/>
           <a:p>
             <a:endParaRPr lang="zh-CN" altLang="en-US"/>
+          </a:p>
+        </p:txBody>
+      </p:sp>
+    </p:spTree>
+  </p:cSld>
+  <p:clrMapOvr>
+    <a:masterClrMapping/>
+  </p:clrMapOvr>
+  <mc:AlternateContent xmlns:mc="http://schemas.openxmlformats.org/markup-compatibility/2006">
+    <mc:Choice xmlns:p14="http://schemas.microsoft.com/office/powerpoint/2010/main" Requires="p14">
+      <p:transition p14:dur="500"/>
+    </mc:Choice>
+    <mc:Fallback>
+      <p:transition/>
+    </mc:Fallback>
+  </mc:AlternateContent>
+</p:sld>
+</file>
+
+<file path=ppt/slides/slide4.xml><?xml version="1.0" encoding="utf-8"?>
+<p:sld xmlns:a="http://schemas.openxmlformats.org/drawingml/2006/main" xmlns:r="http://schemas.openxmlformats.org/officeDocument/2006/relationships" xmlns:p="http://schemas.openxmlformats.org/presentationml/2006/main">
+  <p:cSld>
+    <p:spTree>
+      <p:nvGrpSpPr>
+        <p:cNvPr id="1" name=""/>
+        <p:cNvGrpSpPr/>
+        <p:nvPr/>
+      </p:nvGrpSpPr>
+      <p:grpSpPr/>
+      <p:sp>
+        <p:nvSpPr>
+          <p:cNvPr id="2" name="标题 1"/>
+          <p:cNvSpPr>
+            <a:spLocks noGrp="1"/>
+          </p:cNvSpPr>
+          <p:nvPr>
+            <p:ph type="title"/>
+          </p:nvPr>
+        </p:nvSpPr>
+        <p:spPr/>
+        <p:txBody>
+          <a:bodyPr/>
+          <a:p>
+            <a:r>
+              <a:rPr lang="en-US" altLang="zh-CN"/>
+              <a:t>Attacking vectors</a:t>
+            </a:r>
+            <a:endParaRPr lang="en-US" altLang="zh-CN"/>
+          </a:p>
+        </p:txBody>
+      </p:sp>
+      <p:sp>
+        <p:nvSpPr>
+          <p:cNvPr id="3" name="内容占位符 2"/>
+          <p:cNvSpPr>
+            <a:spLocks noGrp="1"/>
+          </p:cNvSpPr>
+          <p:nvPr>
+            <p:ph idx="1"/>
+          </p:nvPr>
+        </p:nvSpPr>
+        <p:spPr/>
+        <p:txBody>
+          <a:bodyPr/>
+          <a:p>
+            <a:endParaRPr lang="zh-CN" altLang="en-US"/>
+          </a:p>
+        </p:txBody>
+      </p:sp>
+    </p:spTree>
+  </p:cSld>
+  <p:clrMapOvr>
+    <a:masterClrMapping/>
+  </p:clrMapOvr>
+  <mc:AlternateContent xmlns:mc="http://schemas.openxmlformats.org/markup-compatibility/2006">
+    <mc:Choice xmlns:p14="http://schemas.microsoft.com/office/powerpoint/2010/main" Requires="p14">
+      <p:transition p14:dur="500"/>
+    </mc:Choice>
+    <mc:Fallback>
+      <p:transition/>
+    </mc:Fallback>
+  </mc:AlternateContent>
+</p:sld>
+</file>
+
+<file path=ppt/slides/slide5.xml><?xml version="1.0" encoding="utf-8"?>
+<p:sld xmlns:a="http://schemas.openxmlformats.org/drawingml/2006/main" xmlns:r="http://schemas.openxmlformats.org/officeDocument/2006/relationships" xmlns:p="http://schemas.openxmlformats.org/presentationml/2006/main">
+  <p:cSld>
+    <p:spTree>
+      <p:nvGrpSpPr>
+        <p:cNvPr id="1" name=""/>
+        <p:cNvGrpSpPr/>
+        <p:nvPr/>
+      </p:nvGrpSpPr>
+      <p:grpSpPr/>
+      <p:sp>
+        <p:nvSpPr>
+          <p:cNvPr id="2" name="标题 1"/>
+          <p:cNvSpPr>
+            <a:spLocks noGrp="1"/>
+          </p:cNvSpPr>
+          <p:nvPr>
+            <p:ph type="title"/>
+          </p:nvPr>
+        </p:nvSpPr>
+        <p:spPr/>
+        <p:txBody>
+          <a:bodyPr/>
+          <a:p>
+            <a:r>
+              <a:rPr lang="zh-CN" altLang="en-US"/>
+              <a:t>impacts </a:t>
+            </a:r>
+            <a:r>
+              <a:rPr lang="en-US" altLang="zh-CN"/>
+              <a:t>after being compromised</a:t>
+            </a:r>
+            <a:endParaRPr lang="en-US" altLang="zh-CN"/>
+          </a:p>
+        </p:txBody>
+      </p:sp>
+      <p:sp>
+        <p:nvSpPr>
+          <p:cNvPr id="3" name="内容占位符 2"/>
+          <p:cNvSpPr>
+            <a:spLocks noGrp="1"/>
+          </p:cNvSpPr>
+          <p:nvPr>
+            <p:ph idx="1"/>
+          </p:nvPr>
+        </p:nvSpPr>
+        <p:spPr/>
+        <p:txBody>
+          <a:bodyPr/>
+          <a:p>
+            <a:endParaRPr lang="zh-CN" altLang="en-US"/>
+          </a:p>
+        </p:txBody>
+      </p:sp>
+    </p:spTree>
+  </p:cSld>
+  <p:clrMapOvr>
+    <a:masterClrMapping/>
+  </p:clrMapOvr>
+  <mc:AlternateContent xmlns:mc="http://schemas.openxmlformats.org/markup-compatibility/2006">
+    <mc:Choice xmlns:p14="http://schemas.microsoft.com/office/powerpoint/2010/main" Requires="p14">
+      <p:transition p14:dur="500"/>
+    </mc:Choice>
+    <mc:Fallback>
+      <p:transition/>
+    </mc:Fallback>
+  </mc:AlternateContent>
+</p:sld>
+</file>
+
+<file path=ppt/slides/slide6.xml><?xml version="1.0" encoding="utf-8"?>
+<p:sld xmlns:a="http://schemas.openxmlformats.org/drawingml/2006/main" xmlns:r="http://schemas.openxmlformats.org/officeDocument/2006/relationships" xmlns:p="http://schemas.openxmlformats.org/presentationml/2006/main">
+  <p:cSld>
+    <p:spTree>
+      <p:nvGrpSpPr>
+        <p:cNvPr id="1" name=""/>
+        <p:cNvGrpSpPr/>
+        <p:nvPr/>
+      </p:nvGrpSpPr>
+      <p:grpSpPr/>
+      <p:sp>
+        <p:nvSpPr>
+          <p:cNvPr id="3" name="内容占位符 2"/>
+          <p:cNvSpPr>
+            <a:spLocks noGrp="1"/>
+          </p:cNvSpPr>
+          <p:nvPr>
+            <p:ph idx="1"/>
+          </p:nvPr>
+        </p:nvSpPr>
+        <p:spPr/>
+        <p:txBody>
+          <a:bodyPr/>
+          <a:p>
+            <a:endParaRPr lang="en-US" altLang="zh-CN"/>
           </a:p>
         </p:txBody>
       </p:sp>
@@ -3809,6 +4074,72 @@
           </p:txBody>
         </p:sp>
       </p:grpSp>
+    </p:spTree>
+  </p:cSld>
+  <p:clrMapOvr>
+    <a:masterClrMapping/>
+  </p:clrMapOvr>
+  <mc:AlternateContent xmlns:mc="http://schemas.openxmlformats.org/markup-compatibility/2006">
+    <mc:Choice xmlns:p14="http://schemas.microsoft.com/office/powerpoint/2010/main" Requires="p14">
+      <p:transition p14:dur="500"/>
+    </mc:Choice>
+    <mc:Fallback>
+      <p:transition/>
+    </mc:Fallback>
+  </mc:AlternateContent>
+</p:sld>
+</file>
+
+<file path=ppt/slides/slide7.xml><?xml version="1.0" encoding="utf-8"?>
+<p:sld xmlns:a="http://schemas.openxmlformats.org/drawingml/2006/main" xmlns:r="http://schemas.openxmlformats.org/officeDocument/2006/relationships" xmlns:p="http://schemas.openxmlformats.org/presentationml/2006/main">
+  <p:cSld>
+    <p:spTree>
+      <p:nvGrpSpPr>
+        <p:cNvPr id="1" name=""/>
+        <p:cNvGrpSpPr/>
+        <p:nvPr/>
+      </p:nvGrpSpPr>
+      <p:grpSpPr/>
+      <p:sp>
+        <p:nvSpPr>
+          <p:cNvPr id="2" name="标题 1"/>
+          <p:cNvSpPr>
+            <a:spLocks noGrp="1"/>
+          </p:cNvSpPr>
+          <p:nvPr>
+            <p:ph type="title"/>
+          </p:nvPr>
+        </p:nvSpPr>
+        <p:spPr/>
+        <p:txBody>
+          <a:bodyPr/>
+          <a:p>
+            <a:r>
+              <a:rPr lang="en-US" altLang="zh-CN"/>
+              <a:t>Architecture</a:t>
+            </a:r>
+            <a:endParaRPr lang="en-US" altLang="zh-CN"/>
+          </a:p>
+        </p:txBody>
+      </p:sp>
+      <p:sp>
+        <p:nvSpPr>
+          <p:cNvPr id="3" name="内容占位符 2"/>
+          <p:cNvSpPr>
+            <a:spLocks noGrp="1"/>
+          </p:cNvSpPr>
+          <p:nvPr>
+            <p:ph idx="1"/>
+          </p:nvPr>
+        </p:nvSpPr>
+        <p:spPr/>
+        <p:txBody>
+          <a:bodyPr/>
+          <a:p>
+            <a:endParaRPr lang="zh-CN" altLang="en-US"/>
+          </a:p>
+        </p:txBody>
+      </p:sp>
     </p:spTree>
   </p:cSld>
   <p:clrMapOvr>

</xml_diff>

<commit_message>
final outline of PPT, near finishing text materials.
</commit_message>
<xml_diff>
--- a/urlinfo_presentation.pptx
+++ b/urlinfo_presentation.pptx
@@ -4,14 +4,34 @@
   <p:sldMasterIdLst>
     <p:sldMasterId id="2147483648" r:id="rId1"/>
   </p:sldMasterIdLst>
+  <p:notesMasterIdLst>
+    <p:notesMasterId r:id="rId5"/>
+  </p:notesMasterIdLst>
   <p:sldIdLst>
     <p:sldId id="256" r:id="rId3"/>
     <p:sldId id="257" r:id="rId4"/>
-    <p:sldId id="260" r:id="rId5"/>
-    <p:sldId id="261" r:id="rId6"/>
-    <p:sldId id="262" r:id="rId7"/>
-    <p:sldId id="258" r:id="rId8"/>
-    <p:sldId id="259" r:id="rId9"/>
+    <p:sldId id="260" r:id="rId6"/>
+    <p:sldId id="261" r:id="rId7"/>
+    <p:sldId id="264" r:id="rId8"/>
+    <p:sldId id="262" r:id="rId9"/>
+    <p:sldId id="263" r:id="rId10"/>
+    <p:sldId id="280" r:id="rId11"/>
+    <p:sldId id="258" r:id="rId12"/>
+    <p:sldId id="259" r:id="rId13"/>
+    <p:sldId id="265" r:id="rId14"/>
+    <p:sldId id="266" r:id="rId15"/>
+    <p:sldId id="273" r:id="rId16"/>
+    <p:sldId id="272" r:id="rId17"/>
+    <p:sldId id="268" r:id="rId18"/>
+    <p:sldId id="269" r:id="rId19"/>
+    <p:sldId id="270" r:id="rId20"/>
+    <p:sldId id="271" r:id="rId21"/>
+    <p:sldId id="274" r:id="rId22"/>
+    <p:sldId id="275" r:id="rId23"/>
+    <p:sldId id="276" r:id="rId24"/>
+    <p:sldId id="278" r:id="rId25"/>
+    <p:sldId id="277" r:id="rId26"/>
+    <p:sldId id="279" r:id="rId27"/>
   </p:sldIdLst>
   <p:sldSz cx="12192000" cy="6858000"/>
   <p:notesSz cx="6858000" cy="9144000"/>
@@ -113,6 +133,533 @@
 </p:presentation>
 </file>
 
+<file path=ppt/notesMasters/notesMaster1.xml><?xml version="1.0" encoding="utf-8"?>
+<p:notesMaster xmlns:a="http://schemas.openxmlformats.org/drawingml/2006/main" xmlns:r="http://schemas.openxmlformats.org/officeDocument/2006/relationships" xmlns:p="http://schemas.openxmlformats.org/presentationml/2006/main">
+  <p:cSld>
+    <p:bg>
+      <p:bgRef idx="1001">
+        <a:schemeClr val="bg1"/>
+      </p:bgRef>
+    </p:bg>
+    <p:spTree>
+      <p:nvGrpSpPr>
+        <p:cNvPr id="1" name=""/>
+        <p:cNvGrpSpPr/>
+        <p:nvPr/>
+      </p:nvGrpSpPr>
+      <p:grpSpPr>
+        <a:xfrm>
+          <a:off x="0" y="0"/>
+          <a:ext cx="0" cy="0"/>
+          <a:chOff x="0" y="0"/>
+          <a:chExt cx="0" cy="0"/>
+        </a:xfrm>
+      </p:grpSpPr>
+      <p:sp>
+        <p:nvSpPr>
+          <p:cNvPr id="2" name="页眉占位符 1"/>
+          <p:cNvSpPr>
+            <a:spLocks noGrp="1"/>
+          </p:cNvSpPr>
+          <p:nvPr>
+            <p:ph type="hdr" sz="quarter"/>
+          </p:nvPr>
+        </p:nvSpPr>
+        <p:spPr>
+          <a:xfrm>
+            <a:off x="0" y="0"/>
+            <a:ext cx="2971800" cy="458788"/>
+          </a:xfrm>
+          <a:prstGeom prst="rect">
+            <a:avLst/>
+          </a:prstGeom>
+        </p:spPr>
+        <p:txBody>
+          <a:bodyPr vert="horz" lIns="91440" tIns="45720" rIns="91440" bIns="45720" rtlCol="0"/>
+          <a:lstStyle>
+            <a:lvl1pPr algn="l">
+              <a:defRPr sz="1200"/>
+            </a:lvl1pPr>
+          </a:lstStyle>
+          <a:p>
+            <a:endParaRPr lang="zh-CN" altLang="en-US"/>
+          </a:p>
+        </p:txBody>
+      </p:sp>
+      <p:sp>
+        <p:nvSpPr>
+          <p:cNvPr id="3" name="日期占位符 2"/>
+          <p:cNvSpPr>
+            <a:spLocks noGrp="1"/>
+          </p:cNvSpPr>
+          <p:nvPr>
+            <p:ph type="dt" idx="1"/>
+          </p:nvPr>
+        </p:nvSpPr>
+        <p:spPr>
+          <a:xfrm>
+            <a:off x="3884613" y="0"/>
+            <a:ext cx="2971800" cy="458788"/>
+          </a:xfrm>
+          <a:prstGeom prst="rect">
+            <a:avLst/>
+          </a:prstGeom>
+        </p:spPr>
+        <p:txBody>
+          <a:bodyPr vert="horz" lIns="91440" tIns="45720" rIns="91440" bIns="45720" rtlCol="0"/>
+          <a:lstStyle>
+            <a:lvl1pPr algn="r">
+              <a:defRPr sz="1200"/>
+            </a:lvl1pPr>
+          </a:lstStyle>
+          <a:p>
+            <a:fld id="{D2A48B96-639E-45A3-A0BA-2464DFDB1FAA}" type="datetimeFigureOut">
+              <a:rPr lang="zh-CN" altLang="en-US" smtClean="0"/>
+            </a:fld>
+            <a:endParaRPr lang="zh-CN" altLang="en-US"/>
+          </a:p>
+        </p:txBody>
+      </p:sp>
+      <p:sp>
+        <p:nvSpPr>
+          <p:cNvPr id="4" name="幻灯片图像占位符 3"/>
+          <p:cNvSpPr>
+            <a:spLocks noGrp="1" noRot="1" noChangeAspect="1"/>
+          </p:cNvSpPr>
+          <p:nvPr>
+            <p:ph type="sldImg" idx="2"/>
+          </p:nvPr>
+        </p:nvSpPr>
+        <p:spPr>
+          <a:xfrm>
+            <a:off x="685800" y="1143000"/>
+            <a:ext cx="5486400" cy="3086100"/>
+          </a:xfrm>
+          <a:prstGeom prst="rect">
+            <a:avLst/>
+          </a:prstGeom>
+          <a:noFill/>
+          <a:ln w="12700">
+            <a:solidFill>
+              <a:prstClr val="black"/>
+            </a:solidFill>
+          </a:ln>
+        </p:spPr>
+        <p:txBody>
+          <a:bodyPr vert="horz" lIns="91440" tIns="45720" rIns="91440" bIns="45720" rtlCol="0" anchor="ctr"/>
+          <a:lstStyle/>
+          <a:p>
+            <a:endParaRPr lang="zh-CN" altLang="en-US"/>
+          </a:p>
+        </p:txBody>
+      </p:sp>
+      <p:sp>
+        <p:nvSpPr>
+          <p:cNvPr id="5" name="备注占位符 4"/>
+          <p:cNvSpPr>
+            <a:spLocks noGrp="1"/>
+          </p:cNvSpPr>
+          <p:nvPr>
+            <p:ph type="body" sz="quarter" idx="3"/>
+          </p:nvPr>
+        </p:nvSpPr>
+        <p:spPr>
+          <a:xfrm>
+            <a:off x="685800" y="4400550"/>
+            <a:ext cx="5486400" cy="3600450"/>
+          </a:xfrm>
+          <a:prstGeom prst="rect">
+            <a:avLst/>
+          </a:prstGeom>
+        </p:spPr>
+        <p:txBody>
+          <a:bodyPr vert="horz" lIns="91440" tIns="45720" rIns="91440" bIns="45720" rtlCol="0"/>
+          <a:lstStyle/>
+          <a:p>
+            <a:pPr lvl="0"/>
+            <a:r>
+              <a:rPr lang="zh-CN" altLang="en-US" smtClean="0"/>
+              <a:t>单击此处编辑母版文本样式</a:t>
+            </a:r>
+            <a:endParaRPr lang="zh-CN" altLang="en-US" smtClean="0"/>
+          </a:p>
+          <a:p>
+            <a:pPr lvl="1"/>
+            <a:r>
+              <a:rPr lang="zh-CN" altLang="en-US" smtClean="0"/>
+              <a:t>第二级</a:t>
+            </a:r>
+            <a:endParaRPr lang="zh-CN" altLang="en-US" smtClean="0"/>
+          </a:p>
+          <a:p>
+            <a:pPr lvl="2"/>
+            <a:r>
+              <a:rPr lang="zh-CN" altLang="en-US" smtClean="0"/>
+              <a:t>第三级</a:t>
+            </a:r>
+            <a:endParaRPr lang="zh-CN" altLang="en-US" smtClean="0"/>
+          </a:p>
+          <a:p>
+            <a:pPr lvl="3"/>
+            <a:r>
+              <a:rPr lang="zh-CN" altLang="en-US" smtClean="0"/>
+              <a:t>第四级</a:t>
+            </a:r>
+            <a:endParaRPr lang="zh-CN" altLang="en-US" smtClean="0"/>
+          </a:p>
+          <a:p>
+            <a:pPr lvl="4"/>
+            <a:r>
+              <a:rPr lang="zh-CN" altLang="en-US" smtClean="0"/>
+              <a:t>第五级</a:t>
+            </a:r>
+            <a:endParaRPr lang="zh-CN" altLang="en-US"/>
+          </a:p>
+        </p:txBody>
+      </p:sp>
+      <p:sp>
+        <p:nvSpPr>
+          <p:cNvPr id="6" name="页脚占位符 5"/>
+          <p:cNvSpPr>
+            <a:spLocks noGrp="1"/>
+          </p:cNvSpPr>
+          <p:nvPr>
+            <p:ph type="ftr" sz="quarter" idx="4"/>
+          </p:nvPr>
+        </p:nvSpPr>
+        <p:spPr>
+          <a:xfrm>
+            <a:off x="0" y="8685213"/>
+            <a:ext cx="2971800" cy="458787"/>
+          </a:xfrm>
+          <a:prstGeom prst="rect">
+            <a:avLst/>
+          </a:prstGeom>
+        </p:spPr>
+        <p:txBody>
+          <a:bodyPr vert="horz" lIns="91440" tIns="45720" rIns="91440" bIns="45720" rtlCol="0" anchor="b"/>
+          <a:lstStyle>
+            <a:lvl1pPr algn="l">
+              <a:defRPr sz="1200"/>
+            </a:lvl1pPr>
+          </a:lstStyle>
+          <a:p>
+            <a:endParaRPr lang="zh-CN" altLang="en-US"/>
+          </a:p>
+        </p:txBody>
+      </p:sp>
+      <p:sp>
+        <p:nvSpPr>
+          <p:cNvPr id="7" name="灯片编号占位符 6"/>
+          <p:cNvSpPr>
+            <a:spLocks noGrp="1"/>
+          </p:cNvSpPr>
+          <p:nvPr>
+            <p:ph type="sldNum" sz="quarter" idx="5"/>
+          </p:nvPr>
+        </p:nvSpPr>
+        <p:spPr>
+          <a:xfrm>
+            <a:off x="3884613" y="8685213"/>
+            <a:ext cx="2971800" cy="458787"/>
+          </a:xfrm>
+          <a:prstGeom prst="rect">
+            <a:avLst/>
+          </a:prstGeom>
+        </p:spPr>
+        <p:txBody>
+          <a:bodyPr vert="horz" lIns="91440" tIns="45720" rIns="91440" bIns="45720" rtlCol="0" anchor="b"/>
+          <a:lstStyle>
+            <a:lvl1pPr algn="r">
+              <a:defRPr sz="1200"/>
+            </a:lvl1pPr>
+          </a:lstStyle>
+          <a:p>
+            <a:fld id="{A6837353-30EB-4A48-80EB-173D804AEFBD}" type="slidenum">
+              <a:rPr lang="zh-CN" altLang="en-US" smtClean="0"/>
+            </a:fld>
+            <a:endParaRPr lang="zh-CN" altLang="en-US"/>
+          </a:p>
+        </p:txBody>
+      </p:sp>
+    </p:spTree>
+  </p:cSld>
+  <p:clrMap bg1="lt1" tx1="dk1" bg2="lt2" tx2="dk2" accent1="accent1" accent2="accent2" accent3="accent3" accent4="accent4" accent5="accent5" accent6="accent6" hlink="hlink" folHlink="folHlink"/>
+  <p:notesStyle>
+    <a:lvl1pPr marL="0" algn="l" defTabSz="914400" rtl="0" eaLnBrk="1" latinLnBrk="0" hangingPunct="1">
+      <a:defRPr sz="1200" kern="1200">
+        <a:solidFill>
+          <a:schemeClr val="tx1"/>
+        </a:solidFill>
+        <a:latin typeface="+mn-lt"/>
+        <a:ea typeface="+mn-ea"/>
+        <a:cs typeface="+mn-cs"/>
+      </a:defRPr>
+    </a:lvl1pPr>
+    <a:lvl2pPr marL="457200" algn="l" defTabSz="914400" rtl="0" eaLnBrk="1" latinLnBrk="0" hangingPunct="1">
+      <a:defRPr sz="1200" kern="1200">
+        <a:solidFill>
+          <a:schemeClr val="tx1"/>
+        </a:solidFill>
+        <a:latin typeface="+mn-lt"/>
+        <a:ea typeface="+mn-ea"/>
+        <a:cs typeface="+mn-cs"/>
+      </a:defRPr>
+    </a:lvl2pPr>
+    <a:lvl3pPr marL="914400" algn="l" defTabSz="914400" rtl="0" eaLnBrk="1" latinLnBrk="0" hangingPunct="1">
+      <a:defRPr sz="1200" kern="1200">
+        <a:solidFill>
+          <a:schemeClr val="tx1"/>
+        </a:solidFill>
+        <a:latin typeface="+mn-lt"/>
+        <a:ea typeface="+mn-ea"/>
+        <a:cs typeface="+mn-cs"/>
+      </a:defRPr>
+    </a:lvl3pPr>
+    <a:lvl4pPr marL="1371600" algn="l" defTabSz="914400" rtl="0" eaLnBrk="1" latinLnBrk="0" hangingPunct="1">
+      <a:defRPr sz="1200" kern="1200">
+        <a:solidFill>
+          <a:schemeClr val="tx1"/>
+        </a:solidFill>
+        <a:latin typeface="+mn-lt"/>
+        <a:ea typeface="+mn-ea"/>
+        <a:cs typeface="+mn-cs"/>
+      </a:defRPr>
+    </a:lvl4pPr>
+    <a:lvl5pPr marL="1828800" algn="l" defTabSz="914400" rtl="0" eaLnBrk="1" latinLnBrk="0" hangingPunct="1">
+      <a:defRPr sz="1200" kern="1200">
+        <a:solidFill>
+          <a:schemeClr val="tx1"/>
+        </a:solidFill>
+        <a:latin typeface="+mn-lt"/>
+        <a:ea typeface="+mn-ea"/>
+        <a:cs typeface="+mn-cs"/>
+      </a:defRPr>
+    </a:lvl5pPr>
+    <a:lvl6pPr marL="2286000" algn="l" defTabSz="914400" rtl="0" eaLnBrk="1" latinLnBrk="0" hangingPunct="1">
+      <a:defRPr sz="1200" kern="1200">
+        <a:solidFill>
+          <a:schemeClr val="tx1"/>
+        </a:solidFill>
+        <a:latin typeface="+mn-lt"/>
+        <a:ea typeface="+mn-ea"/>
+        <a:cs typeface="+mn-cs"/>
+      </a:defRPr>
+    </a:lvl6pPr>
+    <a:lvl7pPr marL="2743200" algn="l" defTabSz="914400" rtl="0" eaLnBrk="1" latinLnBrk="0" hangingPunct="1">
+      <a:defRPr sz="1200" kern="1200">
+        <a:solidFill>
+          <a:schemeClr val="tx1"/>
+        </a:solidFill>
+        <a:latin typeface="+mn-lt"/>
+        <a:ea typeface="+mn-ea"/>
+        <a:cs typeface="+mn-cs"/>
+      </a:defRPr>
+    </a:lvl7pPr>
+    <a:lvl8pPr marL="3200400" algn="l" defTabSz="914400" rtl="0" eaLnBrk="1" latinLnBrk="0" hangingPunct="1">
+      <a:defRPr sz="1200" kern="1200">
+        <a:solidFill>
+          <a:schemeClr val="tx1"/>
+        </a:solidFill>
+        <a:latin typeface="+mn-lt"/>
+        <a:ea typeface="+mn-ea"/>
+        <a:cs typeface="+mn-cs"/>
+      </a:defRPr>
+    </a:lvl8pPr>
+    <a:lvl9pPr marL="3657600" algn="l" defTabSz="914400" rtl="0" eaLnBrk="1" latinLnBrk="0" hangingPunct="1">
+      <a:defRPr sz="1200" kern="1200">
+        <a:solidFill>
+          <a:schemeClr val="tx1"/>
+        </a:solidFill>
+        <a:latin typeface="+mn-lt"/>
+        <a:ea typeface="+mn-ea"/>
+        <a:cs typeface="+mn-cs"/>
+      </a:defRPr>
+    </a:lvl9pPr>
+  </p:notesStyle>
+</p:notesMaster>
+</file>
+
+<file path=ppt/notesSlides/notesSlide1.xml><?xml version="1.0" encoding="utf-8"?>
+<p:notes xmlns:a="http://schemas.openxmlformats.org/drawingml/2006/main" xmlns:r="http://schemas.openxmlformats.org/officeDocument/2006/relationships" xmlns:p="http://schemas.openxmlformats.org/presentationml/2006/main">
+  <p:cSld>
+    <p:spTree>
+      <p:nvGrpSpPr>
+        <p:cNvPr id="1" name=""/>
+        <p:cNvGrpSpPr/>
+        <p:nvPr/>
+      </p:nvGrpSpPr>
+      <p:grpSpPr/>
+      <p:sp>
+        <p:nvSpPr>
+          <p:cNvPr id="2" name="幻灯片图像占位符 1"/>
+          <p:cNvSpPr/>
+          <p:nvPr>
+            <p:ph type="sldImg" idx="2"/>
+          </p:nvPr>
+        </p:nvSpPr>
+        <p:spPr/>
+      </p:sp>
+      <p:sp>
+        <p:nvSpPr>
+          <p:cNvPr id="3" name="文本占位符 2"/>
+          <p:cNvSpPr/>
+          <p:nvPr>
+            <p:ph type="body" idx="3"/>
+          </p:nvPr>
+        </p:nvSpPr>
+        <p:spPr/>
+        <p:txBody>
+          <a:bodyPr/>
+          <a:p>
+            <a:endParaRPr lang="zh-CN" altLang="en-US"/>
+          </a:p>
+        </p:txBody>
+      </p:sp>
+    </p:spTree>
+  </p:cSld>
+  <p:clrMapOvr>
+    <a:masterClrMapping/>
+  </p:clrMapOvr>
+</p:notes>
+</file>
+
+<file path=ppt/notesSlides/notesSlide2.xml><?xml version="1.0" encoding="utf-8"?>
+<p:notes xmlns:a="http://schemas.openxmlformats.org/drawingml/2006/main" xmlns:r="http://schemas.openxmlformats.org/officeDocument/2006/relationships" xmlns:p="http://schemas.openxmlformats.org/presentationml/2006/main">
+  <p:cSld>
+    <p:spTree>
+      <p:nvGrpSpPr>
+        <p:cNvPr id="1" name=""/>
+        <p:cNvGrpSpPr/>
+        <p:nvPr/>
+      </p:nvGrpSpPr>
+      <p:grpSpPr/>
+      <p:sp>
+        <p:nvSpPr>
+          <p:cNvPr id="2" name="幻灯片图像占位符 1"/>
+          <p:cNvSpPr/>
+          <p:nvPr>
+            <p:ph type="sldImg" idx="2"/>
+          </p:nvPr>
+        </p:nvSpPr>
+        <p:spPr/>
+      </p:sp>
+      <p:sp>
+        <p:nvSpPr>
+          <p:cNvPr id="3" name="文本占位符 2"/>
+          <p:cNvSpPr/>
+          <p:nvPr>
+            <p:ph type="body" idx="3"/>
+          </p:nvPr>
+        </p:nvSpPr>
+        <p:spPr/>
+        <p:txBody>
+          <a:bodyPr/>
+          <a:p>
+            <a:r>
+              <a:rPr lang="en-US" altLang="zh-CN"/>
+              <a:t>What can happen if your device or a website was hacked. </a:t>
+            </a:r>
+            <a:endParaRPr lang="en-US" altLang="zh-CN"/>
+          </a:p>
+        </p:txBody>
+      </p:sp>
+    </p:spTree>
+  </p:cSld>
+  <p:clrMapOvr>
+    <a:masterClrMapping/>
+  </p:clrMapOvr>
+</p:notes>
+</file>
+
+<file path=ppt/notesSlides/notesSlide3.xml><?xml version="1.0" encoding="utf-8"?>
+<p:notes xmlns:a="http://schemas.openxmlformats.org/drawingml/2006/main" xmlns:r="http://schemas.openxmlformats.org/officeDocument/2006/relationships" xmlns:p="http://schemas.openxmlformats.org/presentationml/2006/main">
+  <p:cSld>
+    <p:spTree>
+      <p:nvGrpSpPr>
+        <p:cNvPr id="1" name=""/>
+        <p:cNvGrpSpPr/>
+        <p:nvPr/>
+      </p:nvGrpSpPr>
+      <p:grpSpPr/>
+      <p:sp>
+        <p:nvSpPr>
+          <p:cNvPr id="2" name="幻灯片图像占位符 1"/>
+          <p:cNvSpPr/>
+          <p:nvPr>
+            <p:ph type="sldImg" idx="2"/>
+          </p:nvPr>
+        </p:nvSpPr>
+        <p:spPr/>
+      </p:sp>
+      <p:sp>
+        <p:nvSpPr>
+          <p:cNvPr id="3" name="文本占位符 2"/>
+          <p:cNvSpPr/>
+          <p:nvPr>
+            <p:ph type="body" idx="3"/>
+          </p:nvPr>
+        </p:nvSpPr>
+        <p:spPr/>
+        <p:txBody>
+          <a:bodyPr/>
+          <a:p>
+            <a:endParaRPr lang="zh-CN" altLang="en-US"/>
+          </a:p>
+        </p:txBody>
+      </p:sp>
+    </p:spTree>
+  </p:cSld>
+  <p:clrMapOvr>
+    <a:masterClrMapping/>
+  </p:clrMapOvr>
+</p:notes>
+</file>
+
+<file path=ppt/notesSlides/notesSlide4.xml><?xml version="1.0" encoding="utf-8"?>
+<p:notes xmlns:a="http://schemas.openxmlformats.org/drawingml/2006/main" xmlns:r="http://schemas.openxmlformats.org/officeDocument/2006/relationships" xmlns:p="http://schemas.openxmlformats.org/presentationml/2006/main">
+  <p:cSld>
+    <p:spTree>
+      <p:nvGrpSpPr>
+        <p:cNvPr id="1" name=""/>
+        <p:cNvGrpSpPr/>
+        <p:nvPr/>
+      </p:nvGrpSpPr>
+      <p:grpSpPr/>
+      <p:sp>
+        <p:nvSpPr>
+          <p:cNvPr id="2" name="幻灯片图像占位符 1"/>
+          <p:cNvSpPr/>
+          <p:nvPr>
+            <p:ph type="sldImg" idx="2"/>
+          </p:nvPr>
+        </p:nvSpPr>
+        <p:spPr/>
+      </p:sp>
+      <p:sp>
+        <p:nvSpPr>
+          <p:cNvPr id="3" name="文本占位符 2"/>
+          <p:cNvSpPr/>
+          <p:nvPr>
+            <p:ph type="body" idx="3"/>
+          </p:nvPr>
+        </p:nvSpPr>
+        <p:spPr/>
+        <p:txBody>
+          <a:bodyPr/>
+          <a:p>
+            <a:endParaRPr lang="zh-CN" altLang="en-US"/>
+          </a:p>
+        </p:txBody>
+      </p:sp>
+    </p:spTree>
+  </p:cSld>
+  <p:clrMapOvr>
+    <a:masterClrMapping/>
+  </p:clrMapOvr>
+</p:notes>
+</file>
+
 <file path=ppt/slideLayouts/slideLayout1.xml><?xml version="1.0" encoding="utf-8"?>
 <p:sldLayout xmlns:a="http://schemas.openxmlformats.org/drawingml/2006/main" xmlns:r="http://schemas.openxmlformats.org/officeDocument/2006/relationships" xmlns:p="http://schemas.openxmlformats.org/presentationml/2006/main" preserve="1" userDrawn="1">
   <p:cSld name="自定义版式">
@@ -247,6 +794,289 @@
 </file>
 
 <file path=ppt/slideLayouts/slideLayout10.xml><?xml version="1.0" encoding="utf-8"?>
+<p:sldLayout xmlns:a="http://schemas.openxmlformats.org/drawingml/2006/main" xmlns:r="http://schemas.openxmlformats.org/officeDocument/2006/relationships" xmlns:p="http://schemas.openxmlformats.org/presentationml/2006/main" type="objTx" preserve="1">
+  <p:cSld name="内容与标题">
+    <p:spTree>
+      <p:nvGrpSpPr>
+        <p:cNvPr id="1" name=""/>
+        <p:cNvGrpSpPr/>
+        <p:nvPr/>
+      </p:nvGrpSpPr>
+      <p:grpSpPr>
+        <a:xfrm>
+          <a:off x="0" y="0"/>
+          <a:ext cx="0" cy="0"/>
+          <a:chOff x="0" y="0"/>
+          <a:chExt cx="0" cy="0"/>
+        </a:xfrm>
+      </p:grpSpPr>
+      <p:sp>
+        <p:nvSpPr>
+          <p:cNvPr id="2" name="Title 1"/>
+          <p:cNvSpPr>
+            <a:spLocks noGrp="1"/>
+          </p:cNvSpPr>
+          <p:nvPr>
+            <p:ph type="title"/>
+          </p:nvPr>
+        </p:nvSpPr>
+        <p:spPr>
+          <a:xfrm>
+            <a:off x="839788" y="457200"/>
+            <a:ext cx="3932237" cy="1600200"/>
+          </a:xfrm>
+        </p:spPr>
+        <p:txBody>
+          <a:bodyPr anchor="b"/>
+          <a:lstStyle>
+            <a:lvl1pPr>
+              <a:defRPr sz="3200"/>
+            </a:lvl1pPr>
+          </a:lstStyle>
+          <a:p>
+            <a:r>
+              <a:rPr lang="zh-CN" altLang="en-US" smtClean="0"/>
+              <a:t>单击此处编辑母版标题样式</a:t>
+            </a:r>
+            <a:endParaRPr lang="en-US" dirty="0"/>
+          </a:p>
+        </p:txBody>
+      </p:sp>
+      <p:sp>
+        <p:nvSpPr>
+          <p:cNvPr id="3" name="Content Placeholder 2"/>
+          <p:cNvSpPr>
+            <a:spLocks noGrp="1"/>
+          </p:cNvSpPr>
+          <p:nvPr>
+            <p:ph idx="1"/>
+          </p:nvPr>
+        </p:nvSpPr>
+        <p:spPr>
+          <a:xfrm>
+            <a:off x="5183188" y="987425"/>
+            <a:ext cx="6172200" cy="4873625"/>
+          </a:xfrm>
+        </p:spPr>
+        <p:txBody>
+          <a:bodyPr/>
+          <a:lstStyle>
+            <a:lvl1pPr>
+              <a:defRPr sz="3200"/>
+            </a:lvl1pPr>
+            <a:lvl2pPr>
+              <a:defRPr sz="2800"/>
+            </a:lvl2pPr>
+            <a:lvl3pPr>
+              <a:defRPr sz="2400"/>
+            </a:lvl3pPr>
+            <a:lvl4pPr>
+              <a:defRPr sz="2000"/>
+            </a:lvl4pPr>
+            <a:lvl5pPr>
+              <a:defRPr sz="2000"/>
+            </a:lvl5pPr>
+            <a:lvl6pPr>
+              <a:defRPr sz="2000"/>
+            </a:lvl6pPr>
+            <a:lvl7pPr>
+              <a:defRPr sz="2000"/>
+            </a:lvl7pPr>
+            <a:lvl8pPr>
+              <a:defRPr sz="2000"/>
+            </a:lvl8pPr>
+            <a:lvl9pPr>
+              <a:defRPr sz="2000"/>
+            </a:lvl9pPr>
+          </a:lstStyle>
+          <a:p>
+            <a:pPr lvl="0"/>
+            <a:r>
+              <a:rPr lang="zh-CN" altLang="en-US" smtClean="0"/>
+              <a:t>单击此处编辑母版文本样式</a:t>
+            </a:r>
+            <a:endParaRPr lang="zh-CN" altLang="en-US" smtClean="0"/>
+          </a:p>
+          <a:p>
+            <a:pPr lvl="1"/>
+            <a:r>
+              <a:rPr lang="zh-CN" altLang="en-US" smtClean="0"/>
+              <a:t>第二级</a:t>
+            </a:r>
+            <a:endParaRPr lang="zh-CN" altLang="en-US" smtClean="0"/>
+          </a:p>
+          <a:p>
+            <a:pPr lvl="2"/>
+            <a:r>
+              <a:rPr lang="zh-CN" altLang="en-US" smtClean="0"/>
+              <a:t>第三级</a:t>
+            </a:r>
+            <a:endParaRPr lang="zh-CN" altLang="en-US" smtClean="0"/>
+          </a:p>
+          <a:p>
+            <a:pPr lvl="3"/>
+            <a:r>
+              <a:rPr lang="zh-CN" altLang="en-US" smtClean="0"/>
+              <a:t>第四级</a:t>
+            </a:r>
+            <a:endParaRPr lang="zh-CN" altLang="en-US" smtClean="0"/>
+          </a:p>
+          <a:p>
+            <a:pPr lvl="4"/>
+            <a:r>
+              <a:rPr lang="zh-CN" altLang="en-US" smtClean="0"/>
+              <a:t>第五级</a:t>
+            </a:r>
+            <a:endParaRPr lang="en-US" dirty="0"/>
+          </a:p>
+        </p:txBody>
+      </p:sp>
+      <p:sp>
+        <p:nvSpPr>
+          <p:cNvPr id="4" name="Text Placeholder 3"/>
+          <p:cNvSpPr>
+            <a:spLocks noGrp="1"/>
+          </p:cNvSpPr>
+          <p:nvPr>
+            <p:ph type="body" sz="half" idx="2"/>
+          </p:nvPr>
+        </p:nvSpPr>
+        <p:spPr>
+          <a:xfrm>
+            <a:off x="839788" y="2057400"/>
+            <a:ext cx="3932237" cy="3811588"/>
+          </a:xfrm>
+        </p:spPr>
+        <p:txBody>
+          <a:bodyPr/>
+          <a:lstStyle>
+            <a:lvl1pPr marL="0" indent="0">
+              <a:buNone/>
+              <a:defRPr sz="1600"/>
+            </a:lvl1pPr>
+            <a:lvl2pPr marL="457200" indent="0">
+              <a:buNone/>
+              <a:defRPr sz="1400"/>
+            </a:lvl2pPr>
+            <a:lvl3pPr marL="914400" indent="0">
+              <a:buNone/>
+              <a:defRPr sz="1200"/>
+            </a:lvl3pPr>
+            <a:lvl4pPr marL="1371600" indent="0">
+              <a:buNone/>
+              <a:defRPr sz="1000"/>
+            </a:lvl4pPr>
+            <a:lvl5pPr marL="1828800" indent="0">
+              <a:buNone/>
+              <a:defRPr sz="1000"/>
+            </a:lvl5pPr>
+            <a:lvl6pPr marL="2286000" indent="0">
+              <a:buNone/>
+              <a:defRPr sz="1000"/>
+            </a:lvl6pPr>
+            <a:lvl7pPr marL="2743200" indent="0">
+              <a:buNone/>
+              <a:defRPr sz="1000"/>
+            </a:lvl7pPr>
+            <a:lvl8pPr marL="3200400" indent="0">
+              <a:buNone/>
+              <a:defRPr sz="1000"/>
+            </a:lvl8pPr>
+            <a:lvl9pPr marL="3657600" indent="0">
+              <a:buNone/>
+              <a:defRPr sz="1000"/>
+            </a:lvl9pPr>
+          </a:lstStyle>
+          <a:p>
+            <a:pPr lvl="0"/>
+            <a:r>
+              <a:rPr lang="zh-CN" altLang="en-US" smtClean="0"/>
+              <a:t>单击此处编辑母版文本样式</a:t>
+            </a:r>
+            <a:endParaRPr lang="zh-CN" altLang="en-US" smtClean="0"/>
+          </a:p>
+        </p:txBody>
+      </p:sp>
+      <p:sp>
+        <p:nvSpPr>
+          <p:cNvPr id="5" name="Date Placeholder 4"/>
+          <p:cNvSpPr>
+            <a:spLocks noGrp="1"/>
+          </p:cNvSpPr>
+          <p:nvPr>
+            <p:ph type="dt" sz="half" idx="10"/>
+          </p:nvPr>
+        </p:nvSpPr>
+        <p:spPr/>
+        <p:txBody>
+          <a:bodyPr/>
+          <a:lstStyle/>
+          <a:p>
+            <a:fld id="{BEA18431-54C4-4585-82AD-D4BDE8FCC787}" type="datetimeFigureOut">
+              <a:rPr lang="zh-HK" altLang="en-US" smtClean="0"/>
+            </a:fld>
+            <a:endParaRPr lang="zh-HK" altLang="en-US"/>
+          </a:p>
+        </p:txBody>
+      </p:sp>
+      <p:sp>
+        <p:nvSpPr>
+          <p:cNvPr id="6" name="Footer Placeholder 5"/>
+          <p:cNvSpPr>
+            <a:spLocks noGrp="1"/>
+          </p:cNvSpPr>
+          <p:nvPr>
+            <p:ph type="ftr" sz="quarter" idx="11"/>
+          </p:nvPr>
+        </p:nvSpPr>
+        <p:spPr/>
+        <p:txBody>
+          <a:bodyPr/>
+          <a:lstStyle/>
+          <a:p>
+            <a:endParaRPr lang="zh-HK" altLang="en-US"/>
+          </a:p>
+        </p:txBody>
+      </p:sp>
+      <p:sp>
+        <p:nvSpPr>
+          <p:cNvPr id="7" name="Slide Number Placeholder 6"/>
+          <p:cNvSpPr>
+            <a:spLocks noGrp="1"/>
+          </p:cNvSpPr>
+          <p:nvPr>
+            <p:ph type="sldNum" sz="quarter" idx="12"/>
+          </p:nvPr>
+        </p:nvSpPr>
+        <p:spPr/>
+        <p:txBody>
+          <a:bodyPr/>
+          <a:lstStyle/>
+          <a:p>
+            <a:fld id="{8592E714-8771-4256-B120-A1444CD7D5F3}" type="slidenum">
+              <a:rPr lang="zh-HK" altLang="en-US" smtClean="0"/>
+            </a:fld>
+            <a:endParaRPr lang="zh-HK" altLang="en-US"/>
+          </a:p>
+        </p:txBody>
+      </p:sp>
+    </p:spTree>
+  </p:cSld>
+  <p:clrMapOvr>
+    <a:masterClrMapping/>
+  </p:clrMapOvr>
+  <mc:AlternateContent xmlns:mc="http://schemas.openxmlformats.org/markup-compatibility/2006">
+    <mc:Choice xmlns:p14="http://schemas.microsoft.com/office/powerpoint/2010/main" Requires="p14">
+      <p:transition p14:dur="500"/>
+    </mc:Choice>
+    <mc:Fallback>
+      <p:transition/>
+    </mc:Fallback>
+  </mc:AlternateContent>
+</p:sldLayout>
+</file>
+
+<file path=ppt/slideLayouts/slideLayout11.xml><?xml version="1.0" encoding="utf-8"?>
 <p:sldLayout xmlns:a="http://schemas.openxmlformats.org/drawingml/2006/main" xmlns:r="http://schemas.openxmlformats.org/officeDocument/2006/relationships" xmlns:p="http://schemas.openxmlformats.org/presentationml/2006/main" type="picTx" preserve="1">
   <p:cSld name="图片与标题">
     <p:spTree>
@@ -505,7 +1335,7 @@
 </p:sldLayout>
 </file>
 
-<file path=ppt/slideLayouts/slideLayout11.xml><?xml version="1.0" encoding="utf-8"?>
+<file path=ppt/slideLayouts/slideLayout12.xml><?xml version="1.0" encoding="utf-8"?>
 <p:sldLayout xmlns:a="http://schemas.openxmlformats.org/drawingml/2006/main" xmlns:r="http://schemas.openxmlformats.org/officeDocument/2006/relationships" xmlns:p="http://schemas.openxmlformats.org/presentationml/2006/main" type="vertTx" preserve="1">
   <p:cSld name="标题和竖排文字">
     <p:spTree>
@@ -680,7 +1510,7 @@
 </p:sldLayout>
 </file>
 
-<file path=ppt/slideLayouts/slideLayout12.xml><?xml version="1.0" encoding="utf-8"?>
+<file path=ppt/slideLayouts/slideLayout13.xml><?xml version="1.0" encoding="utf-8"?>
 <p:sldLayout xmlns:a="http://schemas.openxmlformats.org/drawingml/2006/main" xmlns:r="http://schemas.openxmlformats.org/officeDocument/2006/relationships" xmlns:p="http://schemas.openxmlformats.org/presentationml/2006/main" type="vertTitleAndTx" preserve="1">
   <p:cSld name="垂直排列标题与&#10;文本">
     <p:spTree>
@@ -1234,8 +2064,22 @@
 </file>
 
 <file path=ppt/slideLayouts/slideLayout4.xml><?xml version="1.0" encoding="utf-8"?>
-<p:sldLayout xmlns:a="http://schemas.openxmlformats.org/drawingml/2006/main" xmlns:r="http://schemas.openxmlformats.org/officeDocument/2006/relationships" xmlns:p="http://schemas.openxmlformats.org/presentationml/2006/main" type="secHead" preserve="1">
-  <p:cSld name="节标题">
+<p:sldLayout xmlns:a="http://schemas.openxmlformats.org/drawingml/2006/main" xmlns:r="http://schemas.openxmlformats.org/officeDocument/2006/relationships" xmlns:p="http://schemas.openxmlformats.org/presentationml/2006/main" type="obj" preserve="1">
+  <p:cSld name="1_标题和内容">
+    <p:bg>
+      <p:bgPr>
+        <a:blipFill dpi="0" rotWithShape="1">
+          <a:blip r:embed="rId2">
+            <a:lum/>
+          </a:blip>
+          <a:srcRect/>
+          <a:stretch>
+            <a:fillRect/>
+          </a:stretch>
+        </a:blipFill>
+        <a:effectLst/>
+      </p:bgPr>
+    </p:bg>
     <p:spTree>
       <p:nvGrpSpPr>
         <p:cNvPr id="1" name=""/>
@@ -1252,7 +2096,7 @@
       </p:grpSpPr>
       <p:sp>
         <p:nvSpPr>
-          <p:cNvPr id="7" name="Title 1"/>
+          <p:cNvPr id="2" name="Title 1"/>
           <p:cNvSpPr>
             <a:spLocks noGrp="1"/>
           </p:cNvSpPr>
@@ -1260,20 +2104,135 @@
             <p:ph type="title"/>
           </p:nvPr>
         </p:nvSpPr>
-        <p:spPr>
-          <a:xfrm>
-            <a:off x="72390" y="162560"/>
-            <a:ext cx="10515600" cy="1123315"/>
-          </a:xfrm>
-        </p:spPr>
-        <p:txBody>
-          <a:bodyPr/>
+        <p:spPr/>
+        <p:txBody>
+          <a:bodyPr/>
+          <a:lstStyle/>
           <a:p>
             <a:r>
               <a:rPr lang="zh-CN" altLang="en-US" smtClean="0"/>
               <a:t>单击此处编辑母版标题样式</a:t>
             </a:r>
             <a:endParaRPr lang="en-US" dirty="0"/>
+          </a:p>
+        </p:txBody>
+      </p:sp>
+      <p:sp>
+        <p:nvSpPr>
+          <p:cNvPr id="3" name="Content Placeholder 2"/>
+          <p:cNvSpPr>
+            <a:spLocks noGrp="1"/>
+          </p:cNvSpPr>
+          <p:nvPr>
+            <p:ph idx="1"/>
+          </p:nvPr>
+        </p:nvSpPr>
+        <p:spPr/>
+        <p:txBody>
+          <a:bodyPr/>
+          <a:lstStyle/>
+          <a:p>
+            <a:pPr lvl="0"/>
+            <a:r>
+              <a:rPr lang="zh-CN" altLang="en-US" smtClean="0"/>
+              <a:t>单击此处编辑母版文本样式</a:t>
+            </a:r>
+            <a:endParaRPr lang="zh-CN" altLang="en-US" smtClean="0"/>
+          </a:p>
+          <a:p>
+            <a:pPr lvl="1"/>
+            <a:r>
+              <a:rPr lang="zh-CN" altLang="en-US" smtClean="0"/>
+              <a:t>第二级</a:t>
+            </a:r>
+            <a:endParaRPr lang="zh-CN" altLang="en-US" smtClean="0"/>
+          </a:p>
+          <a:p>
+            <a:pPr lvl="2"/>
+            <a:r>
+              <a:rPr lang="zh-CN" altLang="en-US" smtClean="0"/>
+              <a:t>第三级</a:t>
+            </a:r>
+            <a:endParaRPr lang="zh-CN" altLang="en-US" smtClean="0"/>
+          </a:p>
+          <a:p>
+            <a:pPr lvl="3"/>
+            <a:r>
+              <a:rPr lang="zh-CN" altLang="en-US" smtClean="0"/>
+              <a:t>第四级</a:t>
+            </a:r>
+            <a:endParaRPr lang="zh-CN" altLang="en-US" smtClean="0"/>
+          </a:p>
+          <a:p>
+            <a:pPr lvl="4"/>
+            <a:r>
+              <a:rPr lang="zh-CN" altLang="en-US" smtClean="0"/>
+              <a:t>第五级</a:t>
+            </a:r>
+            <a:endParaRPr lang="en-US" dirty="0"/>
+          </a:p>
+        </p:txBody>
+      </p:sp>
+      <p:sp>
+        <p:nvSpPr>
+          <p:cNvPr id="4" name="Date Placeholder 3"/>
+          <p:cNvSpPr>
+            <a:spLocks noGrp="1"/>
+          </p:cNvSpPr>
+          <p:nvPr>
+            <p:ph type="dt" sz="half" idx="10"/>
+          </p:nvPr>
+        </p:nvSpPr>
+        <p:spPr/>
+        <p:txBody>
+          <a:bodyPr/>
+          <a:lstStyle/>
+          <a:p>
+            <a:fld id="{BEA18431-54C4-4585-82AD-D4BDE8FCC787}" type="datetimeFigureOut">
+              <a:rPr lang="zh-HK" altLang="en-US" smtClean="0"/>
+            </a:fld>
+            <a:endParaRPr lang="zh-HK" altLang="en-US"/>
+          </a:p>
+        </p:txBody>
+      </p:sp>
+      <p:sp>
+        <p:nvSpPr>
+          <p:cNvPr id="5" name="Footer Placeholder 4"/>
+          <p:cNvSpPr>
+            <a:spLocks noGrp="1"/>
+          </p:cNvSpPr>
+          <p:nvPr>
+            <p:ph type="ftr" sz="quarter" idx="11"/>
+          </p:nvPr>
+        </p:nvSpPr>
+        <p:spPr/>
+        <p:txBody>
+          <a:bodyPr/>
+          <a:lstStyle/>
+          <a:p>
+            <a:endParaRPr lang="zh-HK" altLang="en-US"/>
+          </a:p>
+        </p:txBody>
+      </p:sp>
+      <p:sp>
+        <p:nvSpPr>
+          <p:cNvPr id="6" name="Slide Number Placeholder 5"/>
+          <p:cNvSpPr>
+            <a:spLocks noGrp="1"/>
+          </p:cNvSpPr>
+          <p:nvPr>
+            <p:ph type="sldNum" sz="quarter" idx="12"/>
+          </p:nvPr>
+        </p:nvSpPr>
+        <p:spPr/>
+        <p:txBody>
+          <a:bodyPr/>
+          <a:lstStyle/>
+          <a:p>
+            <a:fld id="{8592E714-8771-4256-B120-A1444CD7D5F3}" type="slidenum">
+              <a:rPr lang="zh-HK" altLang="en-US" smtClean="0"/>
+            </a:fld>
+            <a:endParaRPr lang="zh-HK" altLang="en-US"/>
           </a:p>
         </p:txBody>
       </p:sp>
@@ -1294,8 +2253,8 @@
 </file>
 
 <file path=ppt/slideLayouts/slideLayout5.xml><?xml version="1.0" encoding="utf-8"?>
-<p:sldLayout xmlns:a="http://schemas.openxmlformats.org/drawingml/2006/main" xmlns:r="http://schemas.openxmlformats.org/officeDocument/2006/relationships" xmlns:p="http://schemas.openxmlformats.org/presentationml/2006/main" type="twoObj" preserve="1">
-  <p:cSld name="两栏内容">
+<p:sldLayout xmlns:a="http://schemas.openxmlformats.org/drawingml/2006/main" xmlns:r="http://schemas.openxmlformats.org/officeDocument/2006/relationships" xmlns:p="http://schemas.openxmlformats.org/presentationml/2006/main" type="secHead" preserve="1">
+  <p:cSld name="节标题">
     <p:spTree>
       <p:nvGrpSpPr>
         <p:cNvPr id="1" name=""/>
@@ -1312,209 +2271,28 @@
       </p:grpSpPr>
       <p:sp>
         <p:nvSpPr>
-          <p:cNvPr id="2" name="Title 1"/>
+          <p:cNvPr id="7" name="Title 1"/>
           <p:cNvSpPr>
             <a:spLocks noGrp="1"/>
           </p:cNvSpPr>
           <p:nvPr>
             <p:ph type="title"/>
-          </p:nvPr>
-        </p:nvSpPr>
-        <p:spPr/>
-        <p:txBody>
-          <a:bodyPr/>
-          <a:lstStyle/>
-          <a:p>
-            <a:r>
-              <a:rPr lang="zh-CN" altLang="en-US" smtClean="0"/>
-              <a:t>单击此处编辑母版标题样式</a:t>
-            </a:r>
-            <a:endParaRPr lang="en-US" dirty="0"/>
-          </a:p>
-        </p:txBody>
-      </p:sp>
-      <p:sp>
-        <p:nvSpPr>
-          <p:cNvPr id="3" name="Content Placeholder 2"/>
-          <p:cNvSpPr>
-            <a:spLocks noGrp="1"/>
-          </p:cNvSpPr>
-          <p:nvPr>
-            <p:ph sz="half" idx="1"/>
           </p:nvPr>
         </p:nvSpPr>
         <p:spPr>
           <a:xfrm>
-            <a:off x="838200" y="1825625"/>
-            <a:ext cx="5181600" cy="4351338"/>
+            <a:off x="72390" y="162560"/>
+            <a:ext cx="10515600" cy="1123315"/>
           </a:xfrm>
         </p:spPr>
         <p:txBody>
           <a:bodyPr/>
-          <a:lstStyle/>
-          <a:p>
-            <a:pPr lvl="0"/>
-            <a:r>
-              <a:rPr lang="zh-CN" altLang="en-US" smtClean="0"/>
-              <a:t>单击此处编辑母版文本样式</a:t>
-            </a:r>
-            <a:endParaRPr lang="zh-CN" altLang="en-US" smtClean="0"/>
-          </a:p>
-          <a:p>
-            <a:pPr lvl="1"/>
-            <a:r>
-              <a:rPr lang="zh-CN" altLang="en-US" smtClean="0"/>
-              <a:t>第二级</a:t>
-            </a:r>
-            <a:endParaRPr lang="zh-CN" altLang="en-US" smtClean="0"/>
-          </a:p>
-          <a:p>
-            <a:pPr lvl="2"/>
-            <a:r>
-              <a:rPr lang="zh-CN" altLang="en-US" smtClean="0"/>
-              <a:t>第三级</a:t>
-            </a:r>
-            <a:endParaRPr lang="zh-CN" altLang="en-US" smtClean="0"/>
-          </a:p>
-          <a:p>
-            <a:pPr lvl="3"/>
-            <a:r>
-              <a:rPr lang="zh-CN" altLang="en-US" smtClean="0"/>
-              <a:t>第四级</a:t>
-            </a:r>
-            <a:endParaRPr lang="zh-CN" altLang="en-US" smtClean="0"/>
-          </a:p>
-          <a:p>
-            <a:pPr lvl="4"/>
-            <a:r>
-              <a:rPr lang="zh-CN" altLang="en-US" smtClean="0"/>
-              <a:t>第五级</a:t>
+          <a:p>
+            <a:r>
+              <a:rPr lang="zh-CN" altLang="en-US" smtClean="0"/>
+              <a:t>单击此处编辑母版标题样式</a:t>
             </a:r>
             <a:endParaRPr lang="en-US" dirty="0"/>
-          </a:p>
-        </p:txBody>
-      </p:sp>
-      <p:sp>
-        <p:nvSpPr>
-          <p:cNvPr id="4" name="Content Placeholder 3"/>
-          <p:cNvSpPr>
-            <a:spLocks noGrp="1"/>
-          </p:cNvSpPr>
-          <p:nvPr>
-            <p:ph sz="half" idx="2"/>
-          </p:nvPr>
-        </p:nvSpPr>
-        <p:spPr>
-          <a:xfrm>
-            <a:off x="6172200" y="1825625"/>
-            <a:ext cx="5181600" cy="4351338"/>
-          </a:xfrm>
-        </p:spPr>
-        <p:txBody>
-          <a:bodyPr/>
-          <a:lstStyle/>
-          <a:p>
-            <a:pPr lvl="0"/>
-            <a:r>
-              <a:rPr lang="zh-CN" altLang="en-US" smtClean="0"/>
-              <a:t>单击此处编辑母版文本样式</a:t>
-            </a:r>
-            <a:endParaRPr lang="zh-CN" altLang="en-US" smtClean="0"/>
-          </a:p>
-          <a:p>
-            <a:pPr lvl="1"/>
-            <a:r>
-              <a:rPr lang="zh-CN" altLang="en-US" smtClean="0"/>
-              <a:t>第二级</a:t>
-            </a:r>
-            <a:endParaRPr lang="zh-CN" altLang="en-US" smtClean="0"/>
-          </a:p>
-          <a:p>
-            <a:pPr lvl="2"/>
-            <a:r>
-              <a:rPr lang="zh-CN" altLang="en-US" smtClean="0"/>
-              <a:t>第三级</a:t>
-            </a:r>
-            <a:endParaRPr lang="zh-CN" altLang="en-US" smtClean="0"/>
-          </a:p>
-          <a:p>
-            <a:pPr lvl="3"/>
-            <a:r>
-              <a:rPr lang="zh-CN" altLang="en-US" smtClean="0"/>
-              <a:t>第四级</a:t>
-            </a:r>
-            <a:endParaRPr lang="zh-CN" altLang="en-US" smtClean="0"/>
-          </a:p>
-          <a:p>
-            <a:pPr lvl="4"/>
-            <a:r>
-              <a:rPr lang="zh-CN" altLang="en-US" smtClean="0"/>
-              <a:t>第五级</a:t>
-            </a:r>
-            <a:endParaRPr lang="en-US" dirty="0"/>
-          </a:p>
-        </p:txBody>
-      </p:sp>
-      <p:sp>
-        <p:nvSpPr>
-          <p:cNvPr id="5" name="Date Placeholder 4"/>
-          <p:cNvSpPr>
-            <a:spLocks noGrp="1"/>
-          </p:cNvSpPr>
-          <p:nvPr>
-            <p:ph type="dt" sz="half" idx="10"/>
-          </p:nvPr>
-        </p:nvSpPr>
-        <p:spPr/>
-        <p:txBody>
-          <a:bodyPr/>
-          <a:lstStyle/>
-          <a:p>
-            <a:fld id="{BEA18431-54C4-4585-82AD-D4BDE8FCC787}" type="datetimeFigureOut">
-              <a:rPr lang="zh-HK" altLang="en-US" smtClean="0"/>
-            </a:fld>
-            <a:endParaRPr lang="zh-HK" altLang="en-US"/>
-          </a:p>
-        </p:txBody>
-      </p:sp>
-      <p:sp>
-        <p:nvSpPr>
-          <p:cNvPr id="6" name="Footer Placeholder 5"/>
-          <p:cNvSpPr>
-            <a:spLocks noGrp="1"/>
-          </p:cNvSpPr>
-          <p:nvPr>
-            <p:ph type="ftr" sz="quarter" idx="11"/>
-          </p:nvPr>
-        </p:nvSpPr>
-        <p:spPr/>
-        <p:txBody>
-          <a:bodyPr/>
-          <a:lstStyle/>
-          <a:p>
-            <a:endParaRPr lang="zh-HK" altLang="en-US"/>
-          </a:p>
-        </p:txBody>
-      </p:sp>
-      <p:sp>
-        <p:nvSpPr>
-          <p:cNvPr id="7" name="Slide Number Placeholder 6"/>
-          <p:cNvSpPr>
-            <a:spLocks noGrp="1"/>
-          </p:cNvSpPr>
-          <p:nvPr>
-            <p:ph type="sldNum" sz="quarter" idx="12"/>
-          </p:nvPr>
-        </p:nvSpPr>
-        <p:spPr/>
-        <p:txBody>
-          <a:bodyPr/>
-          <a:lstStyle/>
-          <a:p>
-            <a:fld id="{8592E714-8771-4256-B120-A1444CD7D5F3}" type="slidenum">
-              <a:rPr lang="zh-HK" altLang="en-US" smtClean="0"/>
-            </a:fld>
-            <a:endParaRPr lang="zh-HK" altLang="en-US"/>
           </a:p>
         </p:txBody>
       </p:sp>
@@ -1535,6 +2313,247 @@
 </file>
 
 <file path=ppt/slideLayouts/slideLayout6.xml><?xml version="1.0" encoding="utf-8"?>
+<p:sldLayout xmlns:a="http://schemas.openxmlformats.org/drawingml/2006/main" xmlns:r="http://schemas.openxmlformats.org/officeDocument/2006/relationships" xmlns:p="http://schemas.openxmlformats.org/presentationml/2006/main" type="twoObj" preserve="1">
+  <p:cSld name="两栏内容">
+    <p:spTree>
+      <p:nvGrpSpPr>
+        <p:cNvPr id="1" name=""/>
+        <p:cNvGrpSpPr/>
+        <p:nvPr/>
+      </p:nvGrpSpPr>
+      <p:grpSpPr>
+        <a:xfrm>
+          <a:off x="0" y="0"/>
+          <a:ext cx="0" cy="0"/>
+          <a:chOff x="0" y="0"/>
+          <a:chExt cx="0" cy="0"/>
+        </a:xfrm>
+      </p:grpSpPr>
+      <p:sp>
+        <p:nvSpPr>
+          <p:cNvPr id="2" name="Title 1"/>
+          <p:cNvSpPr>
+            <a:spLocks noGrp="1"/>
+          </p:cNvSpPr>
+          <p:nvPr>
+            <p:ph type="title"/>
+          </p:nvPr>
+        </p:nvSpPr>
+        <p:spPr/>
+        <p:txBody>
+          <a:bodyPr/>
+          <a:lstStyle/>
+          <a:p>
+            <a:r>
+              <a:rPr lang="zh-CN" altLang="en-US" smtClean="0"/>
+              <a:t>单击此处编辑母版标题样式</a:t>
+            </a:r>
+            <a:endParaRPr lang="en-US" dirty="0"/>
+          </a:p>
+        </p:txBody>
+      </p:sp>
+      <p:sp>
+        <p:nvSpPr>
+          <p:cNvPr id="3" name="Content Placeholder 2"/>
+          <p:cNvSpPr>
+            <a:spLocks noGrp="1"/>
+          </p:cNvSpPr>
+          <p:nvPr>
+            <p:ph sz="half" idx="1"/>
+          </p:nvPr>
+        </p:nvSpPr>
+        <p:spPr>
+          <a:xfrm>
+            <a:off x="838200" y="1825625"/>
+            <a:ext cx="5181600" cy="4351338"/>
+          </a:xfrm>
+        </p:spPr>
+        <p:txBody>
+          <a:bodyPr/>
+          <a:lstStyle/>
+          <a:p>
+            <a:pPr lvl="0"/>
+            <a:r>
+              <a:rPr lang="zh-CN" altLang="en-US" smtClean="0"/>
+              <a:t>单击此处编辑母版文本样式</a:t>
+            </a:r>
+            <a:endParaRPr lang="zh-CN" altLang="en-US" smtClean="0"/>
+          </a:p>
+          <a:p>
+            <a:pPr lvl="1"/>
+            <a:r>
+              <a:rPr lang="zh-CN" altLang="en-US" smtClean="0"/>
+              <a:t>第二级</a:t>
+            </a:r>
+            <a:endParaRPr lang="zh-CN" altLang="en-US" smtClean="0"/>
+          </a:p>
+          <a:p>
+            <a:pPr lvl="2"/>
+            <a:r>
+              <a:rPr lang="zh-CN" altLang="en-US" smtClean="0"/>
+              <a:t>第三级</a:t>
+            </a:r>
+            <a:endParaRPr lang="zh-CN" altLang="en-US" smtClean="0"/>
+          </a:p>
+          <a:p>
+            <a:pPr lvl="3"/>
+            <a:r>
+              <a:rPr lang="zh-CN" altLang="en-US" smtClean="0"/>
+              <a:t>第四级</a:t>
+            </a:r>
+            <a:endParaRPr lang="zh-CN" altLang="en-US" smtClean="0"/>
+          </a:p>
+          <a:p>
+            <a:pPr lvl="4"/>
+            <a:r>
+              <a:rPr lang="zh-CN" altLang="en-US" smtClean="0"/>
+              <a:t>第五级</a:t>
+            </a:r>
+            <a:endParaRPr lang="en-US" dirty="0"/>
+          </a:p>
+        </p:txBody>
+      </p:sp>
+      <p:sp>
+        <p:nvSpPr>
+          <p:cNvPr id="4" name="Content Placeholder 3"/>
+          <p:cNvSpPr>
+            <a:spLocks noGrp="1"/>
+          </p:cNvSpPr>
+          <p:nvPr>
+            <p:ph sz="half" idx="2"/>
+          </p:nvPr>
+        </p:nvSpPr>
+        <p:spPr>
+          <a:xfrm>
+            <a:off x="6172200" y="1825625"/>
+            <a:ext cx="5181600" cy="4351338"/>
+          </a:xfrm>
+        </p:spPr>
+        <p:txBody>
+          <a:bodyPr/>
+          <a:lstStyle/>
+          <a:p>
+            <a:pPr lvl="0"/>
+            <a:r>
+              <a:rPr lang="zh-CN" altLang="en-US" smtClean="0"/>
+              <a:t>单击此处编辑母版文本样式</a:t>
+            </a:r>
+            <a:endParaRPr lang="zh-CN" altLang="en-US" smtClean="0"/>
+          </a:p>
+          <a:p>
+            <a:pPr lvl="1"/>
+            <a:r>
+              <a:rPr lang="zh-CN" altLang="en-US" smtClean="0"/>
+              <a:t>第二级</a:t>
+            </a:r>
+            <a:endParaRPr lang="zh-CN" altLang="en-US" smtClean="0"/>
+          </a:p>
+          <a:p>
+            <a:pPr lvl="2"/>
+            <a:r>
+              <a:rPr lang="zh-CN" altLang="en-US" smtClean="0"/>
+              <a:t>第三级</a:t>
+            </a:r>
+            <a:endParaRPr lang="zh-CN" altLang="en-US" smtClean="0"/>
+          </a:p>
+          <a:p>
+            <a:pPr lvl="3"/>
+            <a:r>
+              <a:rPr lang="zh-CN" altLang="en-US" smtClean="0"/>
+              <a:t>第四级</a:t>
+            </a:r>
+            <a:endParaRPr lang="zh-CN" altLang="en-US" smtClean="0"/>
+          </a:p>
+          <a:p>
+            <a:pPr lvl="4"/>
+            <a:r>
+              <a:rPr lang="zh-CN" altLang="en-US" smtClean="0"/>
+              <a:t>第五级</a:t>
+            </a:r>
+            <a:endParaRPr lang="en-US" dirty="0"/>
+          </a:p>
+        </p:txBody>
+      </p:sp>
+      <p:sp>
+        <p:nvSpPr>
+          <p:cNvPr id="5" name="Date Placeholder 4"/>
+          <p:cNvSpPr>
+            <a:spLocks noGrp="1"/>
+          </p:cNvSpPr>
+          <p:nvPr>
+            <p:ph type="dt" sz="half" idx="10"/>
+          </p:nvPr>
+        </p:nvSpPr>
+        <p:spPr/>
+        <p:txBody>
+          <a:bodyPr/>
+          <a:lstStyle/>
+          <a:p>
+            <a:fld id="{BEA18431-54C4-4585-82AD-D4BDE8FCC787}" type="datetimeFigureOut">
+              <a:rPr lang="zh-HK" altLang="en-US" smtClean="0"/>
+            </a:fld>
+            <a:endParaRPr lang="zh-HK" altLang="en-US"/>
+          </a:p>
+        </p:txBody>
+      </p:sp>
+      <p:sp>
+        <p:nvSpPr>
+          <p:cNvPr id="6" name="Footer Placeholder 5"/>
+          <p:cNvSpPr>
+            <a:spLocks noGrp="1"/>
+          </p:cNvSpPr>
+          <p:nvPr>
+            <p:ph type="ftr" sz="quarter" idx="11"/>
+          </p:nvPr>
+        </p:nvSpPr>
+        <p:spPr/>
+        <p:txBody>
+          <a:bodyPr/>
+          <a:lstStyle/>
+          <a:p>
+            <a:endParaRPr lang="zh-HK" altLang="en-US"/>
+          </a:p>
+        </p:txBody>
+      </p:sp>
+      <p:sp>
+        <p:nvSpPr>
+          <p:cNvPr id="7" name="Slide Number Placeholder 6"/>
+          <p:cNvSpPr>
+            <a:spLocks noGrp="1"/>
+          </p:cNvSpPr>
+          <p:nvPr>
+            <p:ph type="sldNum" sz="quarter" idx="12"/>
+          </p:nvPr>
+        </p:nvSpPr>
+        <p:spPr/>
+        <p:txBody>
+          <a:bodyPr/>
+          <a:lstStyle/>
+          <a:p>
+            <a:fld id="{8592E714-8771-4256-B120-A1444CD7D5F3}" type="slidenum">
+              <a:rPr lang="zh-HK" altLang="en-US" smtClean="0"/>
+            </a:fld>
+            <a:endParaRPr lang="zh-HK" altLang="en-US"/>
+          </a:p>
+        </p:txBody>
+      </p:sp>
+    </p:spTree>
+  </p:cSld>
+  <p:clrMapOvr>
+    <a:masterClrMapping/>
+  </p:clrMapOvr>
+  <mc:AlternateContent xmlns:mc="http://schemas.openxmlformats.org/markup-compatibility/2006">
+    <mc:Choice xmlns:p14="http://schemas.microsoft.com/office/powerpoint/2010/main" Requires="p14">
+      <p:transition p14:dur="500"/>
+    </mc:Choice>
+    <mc:Fallback>
+      <p:transition/>
+    </mc:Fallback>
+  </mc:AlternateContent>
+</p:sldLayout>
+</file>
+
+<file path=ppt/slideLayouts/slideLayout7.xml><?xml version="1.0" encoding="utf-8"?>
 <p:sldLayout xmlns:a="http://schemas.openxmlformats.org/drawingml/2006/main" xmlns:r="http://schemas.openxmlformats.org/officeDocument/2006/relationships" xmlns:p="http://schemas.openxmlformats.org/presentationml/2006/main" type="twoTxTwoObj" preserve="1">
   <p:cSld name="比较">
     <p:spTree>
@@ -1912,7 +2931,7 @@
 </p:sldLayout>
 </file>
 
-<file path=ppt/slideLayouts/slideLayout7.xml><?xml version="1.0" encoding="utf-8"?>
+<file path=ppt/slideLayouts/slideLayout8.xml><?xml version="1.0" encoding="utf-8"?>
 <p:sldLayout xmlns:a="http://schemas.openxmlformats.org/drawingml/2006/main" xmlns:r="http://schemas.openxmlformats.org/officeDocument/2006/relationships" xmlns:p="http://schemas.openxmlformats.org/presentationml/2006/main" type="titleOnly" preserve="1">
   <p:cSld name="仅标题">
     <p:spTree>
@@ -2031,7 +3050,7 @@
 </p:sldLayout>
 </file>
 
-<file path=ppt/slideLayouts/slideLayout8.xml><?xml version="1.0" encoding="utf-8"?>
+<file path=ppt/slideLayouts/slideLayout9.xml><?xml version="1.0" encoding="utf-8"?>
 <p:sldLayout xmlns:a="http://schemas.openxmlformats.org/drawingml/2006/main" xmlns:r="http://schemas.openxmlformats.org/officeDocument/2006/relationships" xmlns:p="http://schemas.openxmlformats.org/presentationml/2006/main" type="blank" preserve="1">
   <p:cSld name="空白">
     <p:spTree>
@@ -2151,296 +3170,13 @@
 </p:sldLayout>
 </file>
 
-<file path=ppt/slideLayouts/slideLayout9.xml><?xml version="1.0" encoding="utf-8"?>
-<p:sldLayout xmlns:a="http://schemas.openxmlformats.org/drawingml/2006/main" xmlns:r="http://schemas.openxmlformats.org/officeDocument/2006/relationships" xmlns:p="http://schemas.openxmlformats.org/presentationml/2006/main" type="objTx" preserve="1">
-  <p:cSld name="内容与标题">
-    <p:spTree>
-      <p:nvGrpSpPr>
-        <p:cNvPr id="1" name=""/>
-        <p:cNvGrpSpPr/>
-        <p:nvPr/>
-      </p:nvGrpSpPr>
-      <p:grpSpPr>
-        <a:xfrm>
-          <a:off x="0" y="0"/>
-          <a:ext cx="0" cy="0"/>
-          <a:chOff x="0" y="0"/>
-          <a:chExt cx="0" cy="0"/>
-        </a:xfrm>
-      </p:grpSpPr>
-      <p:sp>
-        <p:nvSpPr>
-          <p:cNvPr id="2" name="Title 1"/>
-          <p:cNvSpPr>
-            <a:spLocks noGrp="1"/>
-          </p:cNvSpPr>
-          <p:nvPr>
-            <p:ph type="title"/>
-          </p:nvPr>
-        </p:nvSpPr>
-        <p:spPr>
-          <a:xfrm>
-            <a:off x="839788" y="457200"/>
-            <a:ext cx="3932237" cy="1600200"/>
-          </a:xfrm>
-        </p:spPr>
-        <p:txBody>
-          <a:bodyPr anchor="b"/>
-          <a:lstStyle>
-            <a:lvl1pPr>
-              <a:defRPr sz="3200"/>
-            </a:lvl1pPr>
-          </a:lstStyle>
-          <a:p>
-            <a:r>
-              <a:rPr lang="zh-CN" altLang="en-US" smtClean="0"/>
-              <a:t>单击此处编辑母版标题样式</a:t>
-            </a:r>
-            <a:endParaRPr lang="en-US" dirty="0"/>
-          </a:p>
-        </p:txBody>
-      </p:sp>
-      <p:sp>
-        <p:nvSpPr>
-          <p:cNvPr id="3" name="Content Placeholder 2"/>
-          <p:cNvSpPr>
-            <a:spLocks noGrp="1"/>
-          </p:cNvSpPr>
-          <p:nvPr>
-            <p:ph idx="1"/>
-          </p:nvPr>
-        </p:nvSpPr>
-        <p:spPr>
-          <a:xfrm>
-            <a:off x="5183188" y="987425"/>
-            <a:ext cx="6172200" cy="4873625"/>
-          </a:xfrm>
-        </p:spPr>
-        <p:txBody>
-          <a:bodyPr/>
-          <a:lstStyle>
-            <a:lvl1pPr>
-              <a:defRPr sz="3200"/>
-            </a:lvl1pPr>
-            <a:lvl2pPr>
-              <a:defRPr sz="2800"/>
-            </a:lvl2pPr>
-            <a:lvl3pPr>
-              <a:defRPr sz="2400"/>
-            </a:lvl3pPr>
-            <a:lvl4pPr>
-              <a:defRPr sz="2000"/>
-            </a:lvl4pPr>
-            <a:lvl5pPr>
-              <a:defRPr sz="2000"/>
-            </a:lvl5pPr>
-            <a:lvl6pPr>
-              <a:defRPr sz="2000"/>
-            </a:lvl6pPr>
-            <a:lvl7pPr>
-              <a:defRPr sz="2000"/>
-            </a:lvl7pPr>
-            <a:lvl8pPr>
-              <a:defRPr sz="2000"/>
-            </a:lvl8pPr>
-            <a:lvl9pPr>
-              <a:defRPr sz="2000"/>
-            </a:lvl9pPr>
-          </a:lstStyle>
-          <a:p>
-            <a:pPr lvl="0"/>
-            <a:r>
-              <a:rPr lang="zh-CN" altLang="en-US" smtClean="0"/>
-              <a:t>单击此处编辑母版文本样式</a:t>
-            </a:r>
-            <a:endParaRPr lang="zh-CN" altLang="en-US" smtClean="0"/>
-          </a:p>
-          <a:p>
-            <a:pPr lvl="1"/>
-            <a:r>
-              <a:rPr lang="zh-CN" altLang="en-US" smtClean="0"/>
-              <a:t>第二级</a:t>
-            </a:r>
-            <a:endParaRPr lang="zh-CN" altLang="en-US" smtClean="0"/>
-          </a:p>
-          <a:p>
-            <a:pPr lvl="2"/>
-            <a:r>
-              <a:rPr lang="zh-CN" altLang="en-US" smtClean="0"/>
-              <a:t>第三级</a:t>
-            </a:r>
-            <a:endParaRPr lang="zh-CN" altLang="en-US" smtClean="0"/>
-          </a:p>
-          <a:p>
-            <a:pPr lvl="3"/>
-            <a:r>
-              <a:rPr lang="zh-CN" altLang="en-US" smtClean="0"/>
-              <a:t>第四级</a:t>
-            </a:r>
-            <a:endParaRPr lang="zh-CN" altLang="en-US" smtClean="0"/>
-          </a:p>
-          <a:p>
-            <a:pPr lvl="4"/>
-            <a:r>
-              <a:rPr lang="zh-CN" altLang="en-US" smtClean="0"/>
-              <a:t>第五级</a:t>
-            </a:r>
-            <a:endParaRPr lang="en-US" dirty="0"/>
-          </a:p>
-        </p:txBody>
-      </p:sp>
-      <p:sp>
-        <p:nvSpPr>
-          <p:cNvPr id="4" name="Text Placeholder 3"/>
-          <p:cNvSpPr>
-            <a:spLocks noGrp="1"/>
-          </p:cNvSpPr>
-          <p:nvPr>
-            <p:ph type="body" sz="half" idx="2"/>
-          </p:nvPr>
-        </p:nvSpPr>
-        <p:spPr>
-          <a:xfrm>
-            <a:off x="839788" y="2057400"/>
-            <a:ext cx="3932237" cy="3811588"/>
-          </a:xfrm>
-        </p:spPr>
-        <p:txBody>
-          <a:bodyPr/>
-          <a:lstStyle>
-            <a:lvl1pPr marL="0" indent="0">
-              <a:buNone/>
-              <a:defRPr sz="1600"/>
-            </a:lvl1pPr>
-            <a:lvl2pPr marL="457200" indent="0">
-              <a:buNone/>
-              <a:defRPr sz="1400"/>
-            </a:lvl2pPr>
-            <a:lvl3pPr marL="914400" indent="0">
-              <a:buNone/>
-              <a:defRPr sz="1200"/>
-            </a:lvl3pPr>
-            <a:lvl4pPr marL="1371600" indent="0">
-              <a:buNone/>
-              <a:defRPr sz="1000"/>
-            </a:lvl4pPr>
-            <a:lvl5pPr marL="1828800" indent="0">
-              <a:buNone/>
-              <a:defRPr sz="1000"/>
-            </a:lvl5pPr>
-            <a:lvl6pPr marL="2286000" indent="0">
-              <a:buNone/>
-              <a:defRPr sz="1000"/>
-            </a:lvl6pPr>
-            <a:lvl7pPr marL="2743200" indent="0">
-              <a:buNone/>
-              <a:defRPr sz="1000"/>
-            </a:lvl7pPr>
-            <a:lvl8pPr marL="3200400" indent="0">
-              <a:buNone/>
-              <a:defRPr sz="1000"/>
-            </a:lvl8pPr>
-            <a:lvl9pPr marL="3657600" indent="0">
-              <a:buNone/>
-              <a:defRPr sz="1000"/>
-            </a:lvl9pPr>
-          </a:lstStyle>
-          <a:p>
-            <a:pPr lvl="0"/>
-            <a:r>
-              <a:rPr lang="zh-CN" altLang="en-US" smtClean="0"/>
-              <a:t>单击此处编辑母版文本样式</a:t>
-            </a:r>
-            <a:endParaRPr lang="zh-CN" altLang="en-US" smtClean="0"/>
-          </a:p>
-        </p:txBody>
-      </p:sp>
-      <p:sp>
-        <p:nvSpPr>
-          <p:cNvPr id="5" name="Date Placeholder 4"/>
-          <p:cNvSpPr>
-            <a:spLocks noGrp="1"/>
-          </p:cNvSpPr>
-          <p:nvPr>
-            <p:ph type="dt" sz="half" idx="10"/>
-          </p:nvPr>
-        </p:nvSpPr>
-        <p:spPr/>
-        <p:txBody>
-          <a:bodyPr/>
-          <a:lstStyle/>
-          <a:p>
-            <a:fld id="{BEA18431-54C4-4585-82AD-D4BDE8FCC787}" type="datetimeFigureOut">
-              <a:rPr lang="zh-HK" altLang="en-US" smtClean="0"/>
-            </a:fld>
-            <a:endParaRPr lang="zh-HK" altLang="en-US"/>
-          </a:p>
-        </p:txBody>
-      </p:sp>
-      <p:sp>
-        <p:nvSpPr>
-          <p:cNvPr id="6" name="Footer Placeholder 5"/>
-          <p:cNvSpPr>
-            <a:spLocks noGrp="1"/>
-          </p:cNvSpPr>
-          <p:nvPr>
-            <p:ph type="ftr" sz="quarter" idx="11"/>
-          </p:nvPr>
-        </p:nvSpPr>
-        <p:spPr/>
-        <p:txBody>
-          <a:bodyPr/>
-          <a:lstStyle/>
-          <a:p>
-            <a:endParaRPr lang="zh-HK" altLang="en-US"/>
-          </a:p>
-        </p:txBody>
-      </p:sp>
-      <p:sp>
-        <p:nvSpPr>
-          <p:cNvPr id="7" name="Slide Number Placeholder 6"/>
-          <p:cNvSpPr>
-            <a:spLocks noGrp="1"/>
-          </p:cNvSpPr>
-          <p:nvPr>
-            <p:ph type="sldNum" sz="quarter" idx="12"/>
-          </p:nvPr>
-        </p:nvSpPr>
-        <p:spPr/>
-        <p:txBody>
-          <a:bodyPr/>
-          <a:lstStyle/>
-          <a:p>
-            <a:fld id="{8592E714-8771-4256-B120-A1444CD7D5F3}" type="slidenum">
-              <a:rPr lang="zh-HK" altLang="en-US" smtClean="0"/>
-            </a:fld>
-            <a:endParaRPr lang="zh-HK" altLang="en-US"/>
-          </a:p>
-        </p:txBody>
-      </p:sp>
-    </p:spTree>
-  </p:cSld>
-  <p:clrMapOvr>
-    <a:masterClrMapping/>
-  </p:clrMapOvr>
-  <mc:AlternateContent xmlns:mc="http://schemas.openxmlformats.org/markup-compatibility/2006">
-    <mc:Choice xmlns:p14="http://schemas.microsoft.com/office/powerpoint/2010/main" Requires="p14">
-      <p:transition p14:dur="500"/>
-    </mc:Choice>
-    <mc:Fallback>
-      <p:transition/>
-    </mc:Fallback>
-  </mc:AlternateContent>
-</p:sldLayout>
-</file>
-
 <file path=ppt/slideMasters/slideMaster1.xml><?xml version="1.0" encoding="utf-8"?>
 <p:sldMaster xmlns:a="http://schemas.openxmlformats.org/drawingml/2006/main" xmlns:r="http://schemas.openxmlformats.org/officeDocument/2006/relationships" xmlns:p="http://schemas.openxmlformats.org/presentationml/2006/main" preserve="1">
   <p:cSld>
     <p:bg>
       <p:bgPr>
         <a:blipFill dpi="0" rotWithShape="1">
-          <a:blip r:embed="rId13">
+          <a:blip r:embed="rId14">
             <a:lum/>
           </a:blip>
           <a:srcRect/>
@@ -2690,7 +3426,7 @@
           <p:nvPr userDrawn="1"/>
         </p:nvPicPr>
         <p:blipFill>
-          <a:blip r:embed="rId14"/>
+          <a:blip r:embed="rId15"/>
           <a:stretch>
             <a:fillRect/>
           </a:stretch>
@@ -2721,6 +3457,7 @@
     <p:sldLayoutId id="2147483658" r:id="rId10"/>
     <p:sldLayoutId id="2147483659" r:id="rId11"/>
     <p:sldLayoutId id="2147483660" r:id="rId12"/>
+    <p:sldLayoutId id="2147483661" r:id="rId13"/>
   </p:sldLayoutIdLst>
   <mc:AlternateContent xmlns:mc="http://schemas.openxmlformats.org/markup-compatibility/2006">
     <mc:Choice xmlns:p14="http://schemas.microsoft.com/office/powerpoint/2010/main" Requires="p14">
@@ -3182,7 +3919,7 @@
         </p:nvSpPr>
         <p:spPr>
           <a:xfrm>
-            <a:off x="2748280" y="5600700"/>
+            <a:off x="628015" y="3749040"/>
             <a:ext cx="3590925" cy="613410"/>
           </a:xfrm>
           <a:prstGeom prst="rect">
@@ -3217,7 +3954,7 @@
             <a:r>
               <a:rPr lang="en-US" altLang="x-none" sz="2400" b="1" dirty="0" err="1">
                 <a:solidFill>
-                  <a:srgbClr val="FFC000"/>
+                  <a:schemeClr val="bg1"/>
                 </a:solidFill>
                 <a:latin typeface="Arial" panose="020B0604020202020204" pitchFamily="34" charset="0"/>
                 <a:ea typeface="Sans Serif" charset="0"/>
@@ -3227,14 +3964,17 @@
             <a:r>
               <a:rPr lang="x-none" sz="2400" b="1" dirty="0" err="1">
                 <a:solidFill>
-                  <a:srgbClr val="FFC000"/>
+                  <a:schemeClr val="bg1"/>
                 </a:solidFill>
                 <a:latin typeface="Arial" panose="020B0604020202020204" pitchFamily="34" charset="0"/>
                 <a:ea typeface="Sans Serif" charset="0"/>
               </a:rPr>
               <a:t> 2018</a:t>
             </a:r>
-            <a:endParaRPr lang="x-none" sz="2400">
+            <a:endParaRPr lang="x-none" sz="2400" b="1" dirty="0" err="1">
+              <a:solidFill>
+                <a:schemeClr val="bg1"/>
+              </a:solidFill>
               <a:latin typeface="Arial" panose="020B0604020202020204" pitchFamily="34" charset="0"/>
               <a:ea typeface="Sans Serif" charset="0"/>
             </a:endParaRPr>
@@ -3275,7 +4015,7 @@
         </p:nvSpPr>
         <p:spPr>
           <a:xfrm>
-            <a:off x="628015" y="3510280"/>
+            <a:off x="628015" y="3373755"/>
             <a:ext cx="3590925" cy="613410"/>
           </a:xfrm>
           <a:prstGeom prst="rect">
@@ -3308,19 +4048,690 @@
           <a:p>
             <a:pPr algn="l"/>
             <a:r>
-              <a:rPr lang="en-US" sz="2400" b="1" dirty="0" err="1">
+              <a:rPr lang="en-US" sz="2800" b="1" dirty="0" err="1">
                 <a:solidFill>
-                  <a:srgbClr val="FFC000"/>
+                  <a:schemeClr val="bg1"/>
                 </a:solidFill>
                 <a:latin typeface="Arial" panose="020B0604020202020204" pitchFamily="34" charset="0"/>
                 <a:ea typeface="Sans Serif" charset="0"/>
               </a:rPr>
               <a:t>Jacob Leung </a:t>
             </a:r>
-            <a:endParaRPr lang="en-US" sz="2400">
+            <a:endParaRPr lang="en-US" sz="2800" b="1" dirty="0" err="1">
+              <a:solidFill>
+                <a:schemeClr val="bg1"/>
+              </a:solidFill>
               <a:latin typeface="Arial" panose="020B0604020202020204" pitchFamily="34" charset="0"/>
               <a:ea typeface="Sans Serif" charset="0"/>
             </a:endParaRPr>
+          </a:p>
+        </p:txBody>
+      </p:sp>
+    </p:spTree>
+  </p:cSld>
+  <p:clrMapOvr>
+    <a:masterClrMapping/>
+  </p:clrMapOvr>
+  <mc:AlternateContent xmlns:mc="http://schemas.openxmlformats.org/markup-compatibility/2006">
+    <mc:Choice xmlns:p14="http://schemas.microsoft.com/office/powerpoint/2010/main" Requires="p14">
+      <p:transition p14:dur="500"/>
+    </mc:Choice>
+    <mc:Fallback>
+      <p:transition/>
+    </mc:Fallback>
+  </mc:AlternateContent>
+</p:sld>
+</file>
+
+<file path=ppt/slides/slide10.xml><?xml version="1.0" encoding="utf-8"?>
+<p:sld xmlns:a="http://schemas.openxmlformats.org/drawingml/2006/main" xmlns:r="http://schemas.openxmlformats.org/officeDocument/2006/relationships" xmlns:p="http://schemas.openxmlformats.org/presentationml/2006/main">
+  <p:cSld>
+    <p:spTree>
+      <p:nvGrpSpPr>
+        <p:cNvPr id="1" name=""/>
+        <p:cNvGrpSpPr/>
+        <p:nvPr/>
+      </p:nvGrpSpPr>
+      <p:grpSpPr/>
+      <p:sp>
+        <p:nvSpPr>
+          <p:cNvPr id="2" name="标题 1"/>
+          <p:cNvSpPr>
+            <a:spLocks noGrp="1"/>
+          </p:cNvSpPr>
+          <p:nvPr>
+            <p:ph type="title"/>
+          </p:nvPr>
+        </p:nvSpPr>
+        <p:spPr/>
+        <p:txBody>
+          <a:bodyPr/>
+          <a:p>
+            <a:r>
+              <a:rPr lang="en-US" altLang="zh-CN"/>
+              <a:t>Architecture overview</a:t>
+            </a:r>
+            <a:endParaRPr lang="en-US" altLang="zh-CN"/>
+          </a:p>
+        </p:txBody>
+      </p:sp>
+      <p:sp>
+        <p:nvSpPr>
+          <p:cNvPr id="3" name="内容占位符 2"/>
+          <p:cNvSpPr>
+            <a:spLocks noGrp="1"/>
+          </p:cNvSpPr>
+          <p:nvPr>
+            <p:ph idx="1"/>
+          </p:nvPr>
+        </p:nvSpPr>
+        <p:spPr/>
+        <p:txBody>
+          <a:bodyPr/>
+          <a:p>
+            <a:endParaRPr lang="zh-CN" altLang="en-US"/>
+          </a:p>
+        </p:txBody>
+      </p:sp>
+    </p:spTree>
+  </p:cSld>
+  <p:clrMapOvr>
+    <a:masterClrMapping/>
+  </p:clrMapOvr>
+  <mc:AlternateContent xmlns:mc="http://schemas.openxmlformats.org/markup-compatibility/2006">
+    <mc:Choice xmlns:p14="http://schemas.microsoft.com/office/powerpoint/2010/main" Requires="p14">
+      <p:transition p14:dur="500"/>
+    </mc:Choice>
+    <mc:Fallback>
+      <p:transition/>
+    </mc:Fallback>
+  </mc:AlternateContent>
+</p:sld>
+</file>
+
+<file path=ppt/slides/slide11.xml><?xml version="1.0" encoding="utf-8"?>
+<p:sld xmlns:a="http://schemas.openxmlformats.org/drawingml/2006/main" xmlns:r="http://schemas.openxmlformats.org/officeDocument/2006/relationships" xmlns:p="http://schemas.openxmlformats.org/presentationml/2006/main">
+  <p:cSld>
+    <p:spTree>
+      <p:nvGrpSpPr>
+        <p:cNvPr id="1" name=""/>
+        <p:cNvGrpSpPr/>
+        <p:nvPr/>
+      </p:nvGrpSpPr>
+      <p:grpSpPr/>
+      <p:sp>
+        <p:nvSpPr>
+          <p:cNvPr id="2" name="标题 1"/>
+          <p:cNvSpPr>
+            <a:spLocks noGrp="1"/>
+          </p:cNvSpPr>
+          <p:nvPr>
+            <p:ph type="title"/>
+          </p:nvPr>
+        </p:nvSpPr>
+        <p:spPr/>
+        <p:txBody>
+          <a:bodyPr/>
+          <a:p>
+            <a:r>
+              <a:rPr lang="en-US" altLang="zh-CN"/>
+              <a:t>Feature: scan Urls for all threats</a:t>
+            </a:r>
+            <a:endParaRPr lang="en-US" altLang="zh-CN"/>
+          </a:p>
+        </p:txBody>
+      </p:sp>
+      <p:sp>
+        <p:nvSpPr>
+          <p:cNvPr id="3" name="内容占位符 2"/>
+          <p:cNvSpPr>
+            <a:spLocks noGrp="1"/>
+          </p:cNvSpPr>
+          <p:nvPr>
+            <p:ph idx="1"/>
+          </p:nvPr>
+        </p:nvSpPr>
+        <p:spPr/>
+        <p:txBody>
+          <a:bodyPr/>
+          <a:p>
+            <a:endParaRPr lang="zh-CN" altLang="en-US"/>
+          </a:p>
+        </p:txBody>
+      </p:sp>
+    </p:spTree>
+  </p:cSld>
+  <p:clrMapOvr>
+    <a:masterClrMapping/>
+  </p:clrMapOvr>
+  <mc:AlternateContent xmlns:mc="http://schemas.openxmlformats.org/markup-compatibility/2006">
+    <mc:Choice xmlns:p14="http://schemas.microsoft.com/office/powerpoint/2010/main" Requires="p14">
+      <p:transition p14:dur="500"/>
+    </mc:Choice>
+    <mc:Fallback>
+      <p:transition/>
+    </mc:Fallback>
+  </mc:AlternateContent>
+</p:sld>
+</file>
+
+<file path=ppt/slides/slide12.xml><?xml version="1.0" encoding="utf-8"?>
+<p:sld xmlns:a="http://schemas.openxmlformats.org/drawingml/2006/main" xmlns:r="http://schemas.openxmlformats.org/officeDocument/2006/relationships" xmlns:p="http://schemas.openxmlformats.org/presentationml/2006/main">
+  <p:cSld>
+    <p:spTree>
+      <p:nvGrpSpPr>
+        <p:cNvPr id="1" name=""/>
+        <p:cNvGrpSpPr/>
+        <p:nvPr/>
+      </p:nvGrpSpPr>
+      <p:grpSpPr/>
+      <p:sp>
+        <p:nvSpPr>
+          <p:cNvPr id="2" name="标题 1"/>
+          <p:cNvSpPr>
+            <a:spLocks noGrp="1"/>
+          </p:cNvSpPr>
+          <p:nvPr>
+            <p:ph type="title"/>
+          </p:nvPr>
+        </p:nvSpPr>
+        <p:spPr/>
+        <p:txBody>
+          <a:bodyPr/>
+          <a:p>
+            <a:r>
+              <a:rPr lang="en-US" altLang="zh-CN"/>
+              <a:t>Our advantages</a:t>
+            </a:r>
+            <a:endParaRPr lang="en-US" altLang="zh-CN"/>
+          </a:p>
+        </p:txBody>
+      </p:sp>
+      <p:sp>
+        <p:nvSpPr>
+          <p:cNvPr id="3" name="内容占位符 2"/>
+          <p:cNvSpPr>
+            <a:spLocks noGrp="1"/>
+          </p:cNvSpPr>
+          <p:nvPr>
+            <p:ph idx="1"/>
+          </p:nvPr>
+        </p:nvSpPr>
+        <p:spPr/>
+        <p:txBody>
+          <a:bodyPr/>
+          <a:p>
+            <a:endParaRPr lang="zh-CN" altLang="en-US"/>
+          </a:p>
+        </p:txBody>
+      </p:sp>
+    </p:spTree>
+  </p:cSld>
+  <p:clrMapOvr>
+    <a:masterClrMapping/>
+  </p:clrMapOvr>
+  <mc:AlternateContent xmlns:mc="http://schemas.openxmlformats.org/markup-compatibility/2006">
+    <mc:Choice xmlns:p14="http://schemas.microsoft.com/office/powerpoint/2010/main" Requires="p14">
+      <p:transition p14:dur="500"/>
+    </mc:Choice>
+    <mc:Fallback>
+      <p:transition/>
+    </mc:Fallback>
+  </mc:AlternateContent>
+</p:sld>
+</file>
+
+<file path=ppt/slides/slide13.xml><?xml version="1.0" encoding="utf-8"?>
+<p:sld xmlns:a="http://schemas.openxmlformats.org/drawingml/2006/main" xmlns:r="http://schemas.openxmlformats.org/officeDocument/2006/relationships" xmlns:p="http://schemas.openxmlformats.org/presentationml/2006/main">
+  <p:cSld>
+    <p:spTree>
+      <p:nvGrpSpPr>
+        <p:cNvPr id="1" name=""/>
+        <p:cNvGrpSpPr/>
+        <p:nvPr/>
+      </p:nvGrpSpPr>
+      <p:grpSpPr/>
+      <p:sp>
+        <p:nvSpPr>
+          <p:cNvPr id="2" name="标题 1"/>
+          <p:cNvSpPr>
+            <a:spLocks noGrp="1"/>
+          </p:cNvSpPr>
+          <p:nvPr>
+            <p:ph type="title"/>
+          </p:nvPr>
+        </p:nvSpPr>
+        <p:spPr/>
+        <p:txBody>
+          <a:bodyPr/>
+          <a:p>
+            <a:r>
+              <a:rPr lang="en-US" altLang="zh-CN"/>
+              <a:t>Agenda</a:t>
+            </a:r>
+            <a:endParaRPr lang="en-US" altLang="zh-CN"/>
+          </a:p>
+        </p:txBody>
+      </p:sp>
+      <p:sp>
+        <p:nvSpPr>
+          <p:cNvPr id="3" name="内容占位符 2"/>
+          <p:cNvSpPr>
+            <a:spLocks noGrp="1"/>
+          </p:cNvSpPr>
+          <p:nvPr>
+            <p:ph idx="1"/>
+          </p:nvPr>
+        </p:nvSpPr>
+        <p:spPr/>
+        <p:txBody>
+          <a:bodyPr/>
+          <a:p>
+            <a:endParaRPr lang="zh-CN" altLang="en-US"/>
+          </a:p>
+        </p:txBody>
+      </p:sp>
+    </p:spTree>
+  </p:cSld>
+  <p:clrMapOvr>
+    <a:masterClrMapping/>
+  </p:clrMapOvr>
+  <mc:AlternateContent xmlns:mc="http://schemas.openxmlformats.org/markup-compatibility/2006">
+    <mc:Choice xmlns:p14="http://schemas.microsoft.com/office/powerpoint/2010/main" Requires="p14">
+      <p:transition p14:dur="500"/>
+    </mc:Choice>
+    <mc:Fallback>
+      <p:transition/>
+    </mc:Fallback>
+  </mc:AlternateContent>
+</p:sld>
+</file>
+
+<file path=ppt/slides/slide14.xml><?xml version="1.0" encoding="utf-8"?>
+<p:sld xmlns:a="http://schemas.openxmlformats.org/drawingml/2006/main" xmlns:r="http://schemas.openxmlformats.org/officeDocument/2006/relationships" xmlns:p="http://schemas.openxmlformats.org/presentationml/2006/main">
+  <p:cSld>
+    <p:spTree>
+      <p:nvGrpSpPr>
+        <p:cNvPr id="1" name=""/>
+        <p:cNvGrpSpPr/>
+        <p:nvPr/>
+      </p:nvGrpSpPr>
+      <p:grpSpPr/>
+      <p:sp>
+        <p:nvSpPr>
+          <p:cNvPr id="2" name="标题 1"/>
+          <p:cNvSpPr>
+            <a:spLocks noGrp="1"/>
+          </p:cNvSpPr>
+          <p:nvPr>
+            <p:ph type="title"/>
+          </p:nvPr>
+        </p:nvSpPr>
+        <p:spPr/>
+        <p:txBody>
+          <a:bodyPr/>
+          <a:p>
+            <a:r>
+              <a:rPr lang="en-US" altLang="zh-CN"/>
+              <a:t>Use cases</a:t>
+            </a:r>
+            <a:endParaRPr lang="en-US" altLang="zh-CN"/>
+          </a:p>
+        </p:txBody>
+      </p:sp>
+      <p:sp>
+        <p:nvSpPr>
+          <p:cNvPr id="3" name="内容占位符 2"/>
+          <p:cNvSpPr>
+            <a:spLocks noGrp="1"/>
+          </p:cNvSpPr>
+          <p:nvPr>
+            <p:ph idx="1"/>
+          </p:nvPr>
+        </p:nvSpPr>
+        <p:spPr/>
+        <p:txBody>
+          <a:bodyPr/>
+          <a:p>
+            <a:endParaRPr lang="zh-CN" altLang="en-US"/>
+          </a:p>
+        </p:txBody>
+      </p:sp>
+    </p:spTree>
+  </p:cSld>
+  <p:clrMapOvr>
+    <a:masterClrMapping/>
+  </p:clrMapOvr>
+  <mc:AlternateContent xmlns:mc="http://schemas.openxmlformats.org/markup-compatibility/2006">
+    <mc:Choice xmlns:p14="http://schemas.microsoft.com/office/powerpoint/2010/main" Requires="p14">
+      <p:transition p14:dur="500"/>
+    </mc:Choice>
+    <mc:Fallback>
+      <p:transition/>
+    </mc:Fallback>
+  </mc:AlternateContent>
+</p:sld>
+</file>
+
+<file path=ppt/slides/slide15.xml><?xml version="1.0" encoding="utf-8"?>
+<p:sld xmlns:a="http://schemas.openxmlformats.org/drawingml/2006/main" xmlns:r="http://schemas.openxmlformats.org/officeDocument/2006/relationships" xmlns:p="http://schemas.openxmlformats.org/presentationml/2006/main">
+  <p:cSld>
+    <p:spTree>
+      <p:nvGrpSpPr>
+        <p:cNvPr id="1" name=""/>
+        <p:cNvGrpSpPr/>
+        <p:nvPr/>
+      </p:nvGrpSpPr>
+      <p:grpSpPr/>
+      <p:sp>
+        <p:nvSpPr>
+          <p:cNvPr id="2" name="标题 1"/>
+          <p:cNvSpPr>
+            <a:spLocks noGrp="1"/>
+          </p:cNvSpPr>
+          <p:nvPr>
+            <p:ph type="title"/>
+          </p:nvPr>
+        </p:nvSpPr>
+        <p:spPr/>
+        <p:txBody>
+          <a:bodyPr/>
+          <a:p>
+            <a:r>
+              <a:rPr lang="en-US" altLang="zh-CN"/>
+              <a:t>Benefit come from this service</a:t>
+            </a:r>
+            <a:endParaRPr lang="en-US" altLang="zh-CN"/>
+          </a:p>
+        </p:txBody>
+      </p:sp>
+      <p:sp>
+        <p:nvSpPr>
+          <p:cNvPr id="3" name="内容占位符 2"/>
+          <p:cNvSpPr>
+            <a:spLocks noGrp="1"/>
+          </p:cNvSpPr>
+          <p:nvPr>
+            <p:ph idx="1"/>
+          </p:nvPr>
+        </p:nvSpPr>
+        <p:spPr/>
+        <p:txBody>
+          <a:bodyPr/>
+          <a:p>
+            <a:endParaRPr lang="zh-CN" altLang="en-US"/>
+          </a:p>
+        </p:txBody>
+      </p:sp>
+    </p:spTree>
+  </p:cSld>
+  <p:clrMapOvr>
+    <a:masterClrMapping/>
+  </p:clrMapOvr>
+  <mc:AlternateContent xmlns:mc="http://schemas.openxmlformats.org/markup-compatibility/2006">
+    <mc:Choice xmlns:p14="http://schemas.microsoft.com/office/powerpoint/2010/main" Requires="p14">
+      <p:transition p14:dur="500"/>
+    </mc:Choice>
+    <mc:Fallback>
+      <p:transition/>
+    </mc:Fallback>
+  </mc:AlternateContent>
+</p:sld>
+</file>
+
+<file path=ppt/slides/slide16.xml><?xml version="1.0" encoding="utf-8"?>
+<p:sld xmlns:a="http://schemas.openxmlformats.org/drawingml/2006/main" xmlns:r="http://schemas.openxmlformats.org/officeDocument/2006/relationships" xmlns:p="http://schemas.openxmlformats.org/presentationml/2006/main">
+  <p:cSld>
+    <p:spTree>
+      <p:nvGrpSpPr>
+        <p:cNvPr id="1" name=""/>
+        <p:cNvGrpSpPr/>
+        <p:nvPr/>
+      </p:nvGrpSpPr>
+      <p:grpSpPr/>
+      <p:sp>
+        <p:nvSpPr>
+          <p:cNvPr id="2" name="标题 1"/>
+          <p:cNvSpPr>
+            <a:spLocks noGrp="1"/>
+          </p:cNvSpPr>
+          <p:nvPr>
+            <p:ph type="title"/>
+          </p:nvPr>
+        </p:nvSpPr>
+        <p:spPr/>
+        <p:txBody>
+          <a:bodyPr/>
+          <a:p>
+            <a:r>
+              <a:rPr lang="en-US" altLang="zh-CN"/>
+              <a:t>Agenda</a:t>
+            </a:r>
+            <a:endParaRPr lang="en-US" altLang="zh-CN"/>
+          </a:p>
+        </p:txBody>
+      </p:sp>
+      <p:sp>
+        <p:nvSpPr>
+          <p:cNvPr id="3" name="内容占位符 2"/>
+          <p:cNvSpPr>
+            <a:spLocks noGrp="1"/>
+          </p:cNvSpPr>
+          <p:nvPr>
+            <p:ph idx="1"/>
+          </p:nvPr>
+        </p:nvSpPr>
+        <p:spPr/>
+        <p:txBody>
+          <a:bodyPr/>
+          <a:p>
+            <a:endParaRPr lang="zh-CN" altLang="en-US"/>
+          </a:p>
+        </p:txBody>
+      </p:sp>
+    </p:spTree>
+  </p:cSld>
+  <p:clrMapOvr>
+    <a:masterClrMapping/>
+  </p:clrMapOvr>
+  <mc:AlternateContent xmlns:mc="http://schemas.openxmlformats.org/markup-compatibility/2006">
+    <mc:Choice xmlns:p14="http://schemas.microsoft.com/office/powerpoint/2010/main" Requires="p14">
+      <p:transition p14:dur="500"/>
+    </mc:Choice>
+    <mc:Fallback>
+      <p:transition/>
+    </mc:Fallback>
+  </mc:AlternateContent>
+</p:sld>
+</file>
+
+<file path=ppt/slides/slide17.xml><?xml version="1.0" encoding="utf-8"?>
+<p:sld xmlns:a="http://schemas.openxmlformats.org/drawingml/2006/main" xmlns:r="http://schemas.openxmlformats.org/officeDocument/2006/relationships" xmlns:p="http://schemas.openxmlformats.org/presentationml/2006/main">
+  <p:cSld>
+    <p:spTree>
+      <p:nvGrpSpPr>
+        <p:cNvPr id="1" name=""/>
+        <p:cNvGrpSpPr/>
+        <p:nvPr/>
+      </p:nvGrpSpPr>
+      <p:grpSpPr/>
+      <p:sp>
+        <p:nvSpPr>
+          <p:cNvPr id="2" name="标题 1"/>
+          <p:cNvSpPr>
+            <a:spLocks noGrp="1"/>
+          </p:cNvSpPr>
+          <p:nvPr>
+            <p:ph type="title"/>
+          </p:nvPr>
+        </p:nvSpPr>
+        <p:spPr/>
+        <p:txBody>
+          <a:bodyPr/>
+          <a:p>
+            <a:r>
+              <a:rPr lang="en-US" altLang="zh-CN">
+                <a:sym typeface="+mn-ea"/>
+              </a:rPr>
+              <a:t>S</a:t>
+            </a:r>
+            <a:r>
+              <a:rPr lang="zh-CN" altLang="en-US">
+                <a:sym typeface="+mn-ea"/>
+              </a:rPr>
+              <a:t>imilar solutions in the market</a:t>
+            </a:r>
+            <a:endParaRPr lang="zh-CN" altLang="en-US"/>
+          </a:p>
+        </p:txBody>
+      </p:sp>
+      <p:sp>
+        <p:nvSpPr>
+          <p:cNvPr id="3" name="内容占位符 2"/>
+          <p:cNvSpPr>
+            <a:spLocks noGrp="1"/>
+          </p:cNvSpPr>
+          <p:nvPr>
+            <p:ph idx="1"/>
+          </p:nvPr>
+        </p:nvSpPr>
+        <p:spPr/>
+        <p:txBody>
+          <a:bodyPr/>
+          <a:p>
+            <a:endParaRPr lang="zh-CN" altLang="en-US"/>
+          </a:p>
+        </p:txBody>
+      </p:sp>
+    </p:spTree>
+  </p:cSld>
+  <p:clrMapOvr>
+    <a:masterClrMapping/>
+  </p:clrMapOvr>
+  <mc:AlternateContent xmlns:mc="http://schemas.openxmlformats.org/markup-compatibility/2006">
+    <mc:Choice xmlns:p14="http://schemas.microsoft.com/office/powerpoint/2010/main" Requires="p14">
+      <p:transition p14:dur="500"/>
+    </mc:Choice>
+    <mc:Fallback>
+      <p:transition/>
+    </mc:Fallback>
+  </mc:AlternateContent>
+</p:sld>
+</file>
+
+<file path=ppt/slides/slide18.xml><?xml version="1.0" encoding="utf-8"?>
+<p:sld xmlns:a="http://schemas.openxmlformats.org/drawingml/2006/main" xmlns:r="http://schemas.openxmlformats.org/officeDocument/2006/relationships" xmlns:p="http://schemas.openxmlformats.org/presentationml/2006/main">
+  <p:cSld>
+    <p:spTree>
+      <p:nvGrpSpPr>
+        <p:cNvPr id="1" name=""/>
+        <p:cNvGrpSpPr/>
+        <p:nvPr/>
+      </p:nvGrpSpPr>
+      <p:grpSpPr/>
+      <p:sp>
+        <p:nvSpPr>
+          <p:cNvPr id="2" name="标题 1"/>
+          <p:cNvSpPr>
+            <a:spLocks noGrp="1"/>
+          </p:cNvSpPr>
+          <p:nvPr>
+            <p:ph type="title"/>
+          </p:nvPr>
+        </p:nvSpPr>
+        <p:spPr/>
+        <p:txBody>
+          <a:bodyPr/>
+          <a:p>
+            <a:r>
+              <a:rPr lang="en-US" altLang="zh-CN"/>
+              <a:t>Difference comparison</a:t>
+            </a:r>
+            <a:endParaRPr lang="en-US" altLang="zh-CN"/>
+          </a:p>
+        </p:txBody>
+      </p:sp>
+      <p:sp>
+        <p:nvSpPr>
+          <p:cNvPr id="3" name="内容占位符 2"/>
+          <p:cNvSpPr>
+            <a:spLocks noGrp="1"/>
+          </p:cNvSpPr>
+          <p:nvPr>
+            <p:ph idx="1"/>
+          </p:nvPr>
+        </p:nvSpPr>
+        <p:spPr/>
+        <p:txBody>
+          <a:bodyPr/>
+          <a:p>
+            <a:endParaRPr lang="zh-CN" altLang="en-US"/>
+          </a:p>
+        </p:txBody>
+      </p:sp>
+    </p:spTree>
+  </p:cSld>
+  <p:clrMapOvr>
+    <a:masterClrMapping/>
+  </p:clrMapOvr>
+  <mc:AlternateContent xmlns:mc="http://schemas.openxmlformats.org/markup-compatibility/2006">
+    <mc:Choice xmlns:p14="http://schemas.microsoft.com/office/powerpoint/2010/main" Requires="p14">
+      <p:transition p14:dur="500"/>
+    </mc:Choice>
+    <mc:Fallback>
+      <p:transition/>
+    </mc:Fallback>
+  </mc:AlternateContent>
+</p:sld>
+</file>
+
+<file path=ppt/slides/slide19.xml><?xml version="1.0" encoding="utf-8"?>
+<p:sld xmlns:a="http://schemas.openxmlformats.org/drawingml/2006/main" xmlns:r="http://schemas.openxmlformats.org/officeDocument/2006/relationships" xmlns:p="http://schemas.openxmlformats.org/presentationml/2006/main">
+  <p:cSld>
+    <p:spTree>
+      <p:nvGrpSpPr>
+        <p:cNvPr id="1" name=""/>
+        <p:cNvGrpSpPr/>
+        <p:nvPr/>
+      </p:nvGrpSpPr>
+      <p:grpSpPr/>
+      <p:sp>
+        <p:nvSpPr>
+          <p:cNvPr id="2" name="标题 1"/>
+          <p:cNvSpPr>
+            <a:spLocks noGrp="1"/>
+          </p:cNvSpPr>
+          <p:nvPr>
+            <p:ph type="title"/>
+          </p:nvPr>
+        </p:nvSpPr>
+        <p:spPr/>
+        <p:txBody>
+          <a:bodyPr/>
+          <a:p>
+            <a:r>
+              <a:rPr lang="en-US" altLang="zh-CN"/>
+              <a:t>Agenda</a:t>
+            </a:r>
+            <a:endParaRPr lang="en-US" altLang="zh-CN"/>
+          </a:p>
+        </p:txBody>
+      </p:sp>
+      <p:sp>
+        <p:nvSpPr>
+          <p:cNvPr id="3" name="内容占位符 2"/>
+          <p:cNvSpPr>
+            <a:spLocks noGrp="1"/>
+          </p:cNvSpPr>
+          <p:nvPr>
+            <p:ph idx="1"/>
+          </p:nvPr>
+        </p:nvSpPr>
+        <p:spPr/>
+        <p:txBody>
+          <a:bodyPr/>
+          <a:p>
+            <a:endParaRPr lang="zh-CN" altLang="en-US"/>
           </a:p>
         </p:txBody>
       </p:sp>
@@ -3352,141 +4763,1008 @@
       <p:grpSpPr/>
       <p:sp>
         <p:nvSpPr>
-          <p:cNvPr id="3" name="内容占位符 2"/>
-          <p:cNvSpPr>
-            <a:spLocks noGrp="1"/>
-          </p:cNvSpPr>
-          <p:nvPr>
-            <p:ph idx="1"/>
-          </p:nvPr>
+          <p:cNvPr id="10" name="文本框 9"/>
+          <p:cNvSpPr txBox="1"/>
+          <p:nvPr/>
         </p:nvSpPr>
         <p:spPr>
           <a:xfrm>
-            <a:off x="903605" y="1529715"/>
-            <a:ext cx="10515600" cy="4351338"/>
+            <a:off x="1512570" y="936625"/>
+            <a:ext cx="3648075" cy="706755"/>
+          </a:xfrm>
+          <a:prstGeom prst="rect">
+            <a:avLst/>
+          </a:prstGeom>
+          <a:noFill/>
+        </p:spPr>
+        <p:txBody>
+          <a:bodyPr wrap="square" rtlCol="0">
+            <a:spAutoFit/>
+          </a:bodyPr>
+          <a:p>
+            <a:pPr algn="l"/>
+            <a:r>
+              <a:rPr lang="en-US" altLang="x-none" sz="4000" b="1" dirty="0" err="1" smtClean="0">
+                <a:solidFill>
+                  <a:srgbClr val="FF923F"/>
+                </a:solidFill>
+                <a:latin typeface="微软雅黑" panose="020B0503020204020204" pitchFamily="34" charset="-122"/>
+                <a:ea typeface="微软雅黑" panose="020B0503020204020204" pitchFamily="34" charset="-122"/>
+              </a:rPr>
+              <a:t>Agenda</a:t>
+            </a:r>
+            <a:endParaRPr lang="en-US" altLang="x-none" sz="4000" b="1" dirty="0" err="1" smtClean="0">
+              <a:solidFill>
+                <a:srgbClr val="FF923F"/>
+              </a:solidFill>
+              <a:latin typeface="微软雅黑" panose="020B0503020204020204" pitchFamily="34" charset="-122"/>
+              <a:ea typeface="微软雅黑" panose="020B0503020204020204" pitchFamily="34" charset="-122"/>
+            </a:endParaRPr>
+          </a:p>
+        </p:txBody>
+      </p:sp>
+      <p:sp>
+        <p:nvSpPr>
+          <p:cNvPr id="2" name="内容占位符 1"/>
+          <p:cNvSpPr>
+            <a:spLocks noGrp="1"/>
+          </p:cNvSpPr>
+          <p:nvPr>
+            <p:ph idx="1"/>
+          </p:nvPr>
+        </p:nvSpPr>
+        <p:spPr>
+          <a:xfrm>
+            <a:off x="1410335" y="1918335"/>
+            <a:ext cx="10515600" cy="3997960"/>
           </a:xfrm>
         </p:spPr>
+        <p:txBody>
+          <a:bodyPr/>
+          <a:p>
+            <a:r>
+              <a:rPr lang="zh-CN" altLang="en-US">
+                <a:solidFill>
+                  <a:srgbClr val="FF923F"/>
+                </a:solidFill>
+              </a:rPr>
+              <a:t>Internet security background</a:t>
+            </a:r>
+            <a:endParaRPr lang="zh-CN" altLang="en-US"/>
+          </a:p>
+          <a:p>
+            <a:r>
+              <a:rPr lang="zh-CN" altLang="en-US"/>
+              <a:t>Avast Urlinfo Service introduction</a:t>
+            </a:r>
+            <a:endParaRPr lang="zh-CN" altLang="en-US"/>
+          </a:p>
+          <a:p>
+            <a:r>
+              <a:rPr lang="zh-CN" altLang="en-US"/>
+              <a:t>Benefits come with the service</a:t>
+            </a:r>
+            <a:endParaRPr lang="zh-CN" altLang="en-US"/>
+          </a:p>
+          <a:p>
+            <a:r>
+              <a:rPr lang="en-US" altLang="zh-CN"/>
+              <a:t>Compare to s</a:t>
+            </a:r>
+            <a:r>
+              <a:rPr lang="zh-CN" altLang="en-US"/>
+              <a:t>imilar solutions in the market</a:t>
+            </a:r>
+            <a:endParaRPr lang="zh-CN" altLang="en-US"/>
+          </a:p>
+          <a:p>
+            <a:r>
+              <a:rPr lang="zh-CN" altLang="en-US">
+                <a:sym typeface="+mn-ea"/>
+              </a:rPr>
+              <a:t>Implement Scans </a:t>
+            </a:r>
+            <a:r>
+              <a:rPr lang="en-US" altLang="zh-CN">
+                <a:sym typeface="+mn-ea"/>
+              </a:rPr>
+              <a:t>for Urlinfo service</a:t>
+            </a:r>
+            <a:endParaRPr lang="zh-CN" altLang="en-US"/>
+          </a:p>
+          <a:p>
+            <a:r>
+              <a:rPr lang="zh-CN" altLang="en-US"/>
+              <a:t>Why Avast is the best to you?</a:t>
+            </a:r>
+            <a:endParaRPr lang="zh-CN" altLang="en-US"/>
+          </a:p>
+          <a:p>
+            <a:r>
+              <a:rPr lang="zh-CN" altLang="en-US"/>
+              <a:t>Questions.</a:t>
+            </a:r>
+            <a:endParaRPr lang="zh-CN" altLang="en-US"/>
+          </a:p>
+        </p:txBody>
+      </p:sp>
+      <p:sp>
+        <p:nvSpPr>
+          <p:cNvPr id="37" name="矩形 36"/>
+          <p:cNvSpPr/>
+          <p:nvPr/>
+        </p:nvSpPr>
+        <p:spPr>
+          <a:xfrm>
+            <a:off x="1055370" y="936625"/>
+            <a:ext cx="138430" cy="4566285"/>
+          </a:xfrm>
+          <a:prstGeom prst="rect">
+            <a:avLst/>
+          </a:prstGeom>
+          <a:solidFill>
+            <a:srgbClr val="FF9200"/>
+          </a:solidFill>
+          <a:ln>
+            <a:noFill/>
+          </a:ln>
+        </p:spPr>
+        <p:style>
+          <a:lnRef idx="2">
+            <a:schemeClr val="accent1">
+              <a:shade val="50000"/>
+            </a:schemeClr>
+          </a:lnRef>
+          <a:fillRef idx="1">
+            <a:schemeClr val="accent1"/>
+          </a:fillRef>
+          <a:effectRef idx="0">
+            <a:schemeClr val="accent1"/>
+          </a:effectRef>
+          <a:fontRef idx="minor">
+            <a:schemeClr val="lt1"/>
+          </a:fontRef>
+        </p:style>
+        <p:txBody>
+          <a:bodyPr rtlCol="0" anchor="ctr"/>
+          <a:p>
+            <a:pPr algn="ctr"/>
+            <a:endParaRPr lang="zh-HK" altLang="en-US">
+              <a:solidFill>
+                <a:srgbClr val="D7343F"/>
+              </a:solidFill>
+            </a:endParaRPr>
+          </a:p>
+        </p:txBody>
+      </p:sp>
+    </p:spTree>
+  </p:cSld>
+  <p:clrMapOvr>
+    <a:masterClrMapping/>
+  </p:clrMapOvr>
+  <mc:AlternateContent xmlns:mc="http://schemas.openxmlformats.org/markup-compatibility/2006">
+    <mc:Choice xmlns:p14="http://schemas.microsoft.com/office/powerpoint/2010/main" Requires="p14">
+      <p:transition p14:dur="500"/>
+    </mc:Choice>
+    <mc:Fallback>
+      <p:transition/>
+    </mc:Fallback>
+  </mc:AlternateContent>
+</p:sld>
+</file>
+
+<file path=ppt/slides/slide20.xml><?xml version="1.0" encoding="utf-8"?>
+<p:sld xmlns:a="http://schemas.openxmlformats.org/drawingml/2006/main" xmlns:r="http://schemas.openxmlformats.org/officeDocument/2006/relationships" xmlns:p="http://schemas.openxmlformats.org/presentationml/2006/main">
+  <p:cSld>
+    <p:spTree>
+      <p:nvGrpSpPr>
+        <p:cNvPr id="1" name=""/>
+        <p:cNvGrpSpPr/>
+        <p:nvPr/>
+      </p:nvGrpSpPr>
+      <p:grpSpPr/>
+      <p:sp>
+        <p:nvSpPr>
+          <p:cNvPr id="2" name="标题 1"/>
+          <p:cNvSpPr>
+            <a:spLocks noGrp="1"/>
+          </p:cNvSpPr>
+          <p:nvPr>
+            <p:ph type="title"/>
+          </p:nvPr>
+        </p:nvSpPr>
+        <p:spPr/>
+        <p:txBody>
+          <a:bodyPr/>
+          <a:p>
+            <a:r>
+              <a:rPr lang="zh-CN" altLang="en-US">
+                <a:sym typeface="+mn-ea"/>
+              </a:rPr>
+              <a:t>Implemen</a:t>
+            </a:r>
+            <a:r>
+              <a:rPr lang="en-US" altLang="zh-CN">
+                <a:sym typeface="+mn-ea"/>
+              </a:rPr>
+              <a:t>ce</a:t>
+            </a:r>
+            <a:r>
+              <a:rPr lang="zh-CN" altLang="en-US">
+                <a:sym typeface="+mn-ea"/>
+              </a:rPr>
+              <a:t> </a:t>
+            </a:r>
+            <a:r>
+              <a:rPr lang="en-US">
+                <a:sym typeface="+mn-ea"/>
+              </a:rPr>
+              <a:t>- In short</a:t>
+            </a:r>
+            <a:endParaRPr lang="en-US"/>
+          </a:p>
+        </p:txBody>
+      </p:sp>
+      <p:sp>
+        <p:nvSpPr>
+          <p:cNvPr id="3" name="内容占位符 2"/>
+          <p:cNvSpPr>
+            <a:spLocks noGrp="1"/>
+          </p:cNvSpPr>
+          <p:nvPr>
+            <p:ph idx="1"/>
+          </p:nvPr>
+        </p:nvSpPr>
+        <p:spPr/>
+        <p:txBody>
+          <a:bodyPr/>
+          <a:p>
+            <a:r>
+              <a:rPr lang="en-US" altLang="zh-CN"/>
+              <a:t>3 steps:</a:t>
+            </a:r>
+            <a:endParaRPr lang="en-US" altLang="zh-CN"/>
+          </a:p>
+          <a:p>
+            <a:r>
+              <a:rPr lang="en-US" altLang="zh-CN"/>
+              <a:t>get key</a:t>
+            </a:r>
+            <a:endParaRPr lang="en-US" altLang="zh-CN"/>
+          </a:p>
+          <a:p>
+            <a:r>
+              <a:rPr lang="en-US" altLang="zh-CN"/>
+              <a:t>send request with key</a:t>
+            </a:r>
+            <a:endParaRPr lang="en-US" altLang="zh-CN"/>
+          </a:p>
+          <a:p>
+            <a:r>
+              <a:rPr lang="en-US" altLang="zh-CN"/>
+              <a:t>get results</a:t>
+            </a:r>
+            <a:endParaRPr lang="en-US" altLang="zh-CN"/>
+          </a:p>
+        </p:txBody>
+      </p:sp>
+    </p:spTree>
+  </p:cSld>
+  <p:clrMapOvr>
+    <a:masterClrMapping/>
+  </p:clrMapOvr>
+  <mc:AlternateContent xmlns:mc="http://schemas.openxmlformats.org/markup-compatibility/2006">
+    <mc:Choice xmlns:p14="http://schemas.microsoft.com/office/powerpoint/2010/main" Requires="p14">
+      <p:transition p14:dur="500"/>
+    </mc:Choice>
+    <mc:Fallback>
+      <p:transition/>
+    </mc:Fallback>
+  </mc:AlternateContent>
+</p:sld>
+</file>
+
+<file path=ppt/slides/slide21.xml><?xml version="1.0" encoding="utf-8"?>
+<p:sld xmlns:a="http://schemas.openxmlformats.org/drawingml/2006/main" xmlns:r="http://schemas.openxmlformats.org/officeDocument/2006/relationships" xmlns:p="http://schemas.openxmlformats.org/presentationml/2006/main">
+  <p:cSld>
+    <p:spTree>
+      <p:nvGrpSpPr>
+        <p:cNvPr id="1" name=""/>
+        <p:cNvGrpSpPr/>
+        <p:nvPr/>
+      </p:nvGrpSpPr>
+      <p:grpSpPr/>
+      <p:sp>
+        <p:nvSpPr>
+          <p:cNvPr id="2" name="标题 1"/>
+          <p:cNvSpPr>
+            <a:spLocks noGrp="1"/>
+          </p:cNvSpPr>
+          <p:nvPr>
+            <p:ph type="title"/>
+          </p:nvPr>
+        </p:nvSpPr>
+        <p:spPr/>
         <p:txBody>
           <a:bodyPr>
             <a:normAutofit/>
           </a:bodyPr>
           <a:p>
             <a:r>
-              <a:rPr lang="x-none" altLang="zh-CN">
-                <a:solidFill>
-                  <a:srgbClr val="FF923F"/>
-                </a:solidFill>
-                <a:latin typeface="Arial" panose="020B0604020202020204" pitchFamily="34" charset="0"/>
-                <a:cs typeface="Arial" panose="020B0604020202020204" pitchFamily="34" charset="0"/>
-              </a:rPr>
-              <a:t>Avast Urlinfo Service introduction</a:t>
-            </a:r>
-            <a:endParaRPr lang="x-none" altLang="zh-CN">
-              <a:solidFill>
-                <a:srgbClr val="FF923F"/>
-              </a:solidFill>
-            </a:endParaRPr>
-          </a:p>
-          <a:p>
-            <a:pPr lvl="1"/>
-            <a:r>
-              <a:rPr lang="x-none" altLang="zh-CN" sz="2400">
-                <a:solidFill>
-                  <a:srgbClr val="FF923F"/>
-                </a:solidFill>
-                <a:latin typeface="Arial" panose="020B0604020202020204" pitchFamily="34" charset="0"/>
-                <a:cs typeface="Arial" panose="020B0604020202020204" pitchFamily="34" charset="0"/>
-              </a:rPr>
-              <a:t>features</a:t>
-            </a:r>
-            <a:endParaRPr lang="x-none" altLang="zh-CN" sz="2400">
-              <a:solidFill>
-                <a:srgbClr val="FF923F"/>
-              </a:solidFill>
-              <a:latin typeface="Arial" panose="020B0604020202020204" pitchFamily="34" charset="0"/>
-              <a:cs typeface="Arial" panose="020B0604020202020204" pitchFamily="34" charset="0"/>
-            </a:endParaRPr>
-          </a:p>
-          <a:p>
-            <a:pPr lvl="1"/>
-            <a:r>
-              <a:rPr lang="x-none" altLang="zh-CN" sz="2400">
-                <a:solidFill>
-                  <a:srgbClr val="FF923F"/>
-                </a:solidFill>
-                <a:latin typeface="Arial" panose="020B0604020202020204" pitchFamily="34" charset="0"/>
-                <a:cs typeface="Arial" panose="020B0604020202020204" pitchFamily="34" charset="0"/>
-              </a:rPr>
-              <a:t>advantages</a:t>
-            </a:r>
-            <a:endParaRPr lang="x-none" altLang="zh-CN" sz="2400">
-              <a:solidFill>
-                <a:srgbClr val="FF923F"/>
-              </a:solidFill>
-            </a:endParaRPr>
-          </a:p>
-          <a:p>
-            <a:pPr lvl="0"/>
-            <a:r>
-              <a:rPr lang="x-none" altLang="zh-CN">
+              <a:rPr lang="zh-CN" altLang="en-US">
                 <a:sym typeface="+mn-ea"/>
               </a:rPr>
-              <a:t>Benefits come with the service.</a:t>
-            </a:r>
-            <a:endParaRPr lang="x-none" altLang="zh-CN">
-              <a:sym typeface="+mn-ea"/>
-            </a:endParaRPr>
-          </a:p>
-          <a:p>
-            <a:pPr lvl="0"/>
-            <a:r>
-              <a:rPr lang="x-none" altLang="zh-CN">
+              <a:t>Implement </a:t>
+            </a:r>
+            <a:r>
+              <a:rPr lang="en-US">
                 <a:sym typeface="+mn-ea"/>
               </a:rPr>
-              <a:t>What do you need to do from client side? </a:t>
-            </a:r>
-            <a:endParaRPr lang="x-none" altLang="zh-CN">
-              <a:sym typeface="+mn-ea"/>
-            </a:endParaRPr>
-          </a:p>
-          <a:p>
-            <a:pPr lvl="0"/>
-            <a:r>
-              <a:rPr lang="x-none" altLang="zh-CN">
+              <a:t>- Details</a:t>
+            </a:r>
+            <a:endParaRPr lang="zh-CN" altLang="en-US"/>
+          </a:p>
+        </p:txBody>
+      </p:sp>
+      <p:sp>
+        <p:nvSpPr>
+          <p:cNvPr id="3" name="内容占位符 2"/>
+          <p:cNvSpPr>
+            <a:spLocks noGrp="1"/>
+          </p:cNvSpPr>
+          <p:nvPr>
+            <p:ph idx="1"/>
+          </p:nvPr>
+        </p:nvSpPr>
+        <p:spPr/>
+        <p:txBody>
+          <a:bodyPr/>
+          <a:p>
+            <a:endParaRPr lang="zh-CN" altLang="en-US"/>
+          </a:p>
+        </p:txBody>
+      </p:sp>
+    </p:spTree>
+  </p:cSld>
+  <p:clrMapOvr>
+    <a:masterClrMapping/>
+  </p:clrMapOvr>
+  <mc:AlternateContent xmlns:mc="http://schemas.openxmlformats.org/markup-compatibility/2006">
+    <mc:Choice xmlns:p14="http://schemas.microsoft.com/office/powerpoint/2010/main" Requires="p14">
+      <p:transition p14:dur="500"/>
+    </mc:Choice>
+    <mc:Fallback>
+      <p:transition/>
+    </mc:Fallback>
+  </mc:AlternateContent>
+</p:sld>
+</file>
+
+<file path=ppt/slides/slide22.xml><?xml version="1.0" encoding="utf-8"?>
+<p:sld xmlns:a="http://schemas.openxmlformats.org/drawingml/2006/main" xmlns:r="http://schemas.openxmlformats.org/officeDocument/2006/relationships" xmlns:p="http://schemas.openxmlformats.org/presentationml/2006/main">
+  <p:cSld>
+    <p:spTree>
+      <p:nvGrpSpPr>
+        <p:cNvPr id="1" name=""/>
+        <p:cNvGrpSpPr/>
+        <p:nvPr/>
+      </p:nvGrpSpPr>
+      <p:grpSpPr/>
+      <p:sp>
+        <p:nvSpPr>
+          <p:cNvPr id="2" name="标题 1"/>
+          <p:cNvSpPr>
+            <a:spLocks noGrp="1"/>
+          </p:cNvSpPr>
+          <p:nvPr>
+            <p:ph type="title"/>
+          </p:nvPr>
+        </p:nvSpPr>
+        <p:spPr/>
+        <p:txBody>
+          <a:bodyPr/>
+          <a:p>
+            <a:r>
+              <a:rPr lang="en-US" altLang="zh-CN"/>
+              <a:t>Agenda</a:t>
+            </a:r>
+            <a:endParaRPr lang="en-US" altLang="zh-CN"/>
+          </a:p>
+        </p:txBody>
+      </p:sp>
+      <p:sp>
+        <p:nvSpPr>
+          <p:cNvPr id="3" name="内容占位符 2"/>
+          <p:cNvSpPr>
+            <a:spLocks noGrp="1"/>
+          </p:cNvSpPr>
+          <p:nvPr>
+            <p:ph idx="1"/>
+          </p:nvPr>
+        </p:nvSpPr>
+        <p:spPr/>
+        <p:txBody>
+          <a:bodyPr/>
+          <a:p>
+            <a:endParaRPr lang="zh-CN" altLang="en-US"/>
+          </a:p>
+        </p:txBody>
+      </p:sp>
+    </p:spTree>
+  </p:cSld>
+  <p:clrMapOvr>
+    <a:masterClrMapping/>
+  </p:clrMapOvr>
+  <mc:AlternateContent xmlns:mc="http://schemas.openxmlformats.org/markup-compatibility/2006">
+    <mc:Choice xmlns:p14="http://schemas.microsoft.com/office/powerpoint/2010/main" Requires="p14">
+      <p:transition p14:dur="500"/>
+    </mc:Choice>
+    <mc:Fallback>
+      <p:transition/>
+    </mc:Fallback>
+  </mc:AlternateContent>
+</p:sld>
+</file>
+
+<file path=ppt/slides/slide23.xml><?xml version="1.0" encoding="utf-8"?>
+<p:sld xmlns:a="http://schemas.openxmlformats.org/drawingml/2006/main" xmlns:r="http://schemas.openxmlformats.org/officeDocument/2006/relationships" xmlns:p="http://schemas.openxmlformats.org/presentationml/2006/main">
+  <p:cSld>
+    <p:spTree>
+      <p:nvGrpSpPr>
+        <p:cNvPr id="1" name=""/>
+        <p:cNvGrpSpPr/>
+        <p:nvPr/>
+      </p:nvGrpSpPr>
+      <p:grpSpPr/>
+      <p:sp>
+        <p:nvSpPr>
+          <p:cNvPr id="2" name="标题 1"/>
+          <p:cNvSpPr>
+            <a:spLocks noGrp="1"/>
+          </p:cNvSpPr>
+          <p:nvPr>
+            <p:ph type="title"/>
+          </p:nvPr>
+        </p:nvSpPr>
+        <p:spPr/>
+        <p:txBody>
+          <a:bodyPr/>
+          <a:p>
+            <a:r>
+              <a:rPr lang="en-US" altLang="zh-CN"/>
+              <a:t>So why </a:t>
+            </a:r>
+            <a:r>
+              <a:rPr lang="zh-CN" altLang="en-US">
                 <a:sym typeface="+mn-ea"/>
               </a:rPr>
-              <a:t>Similar solutions in the market.</a:t>
-            </a:r>
-            <a:endParaRPr lang="x-none" altLang="zh-CN">
-              <a:sym typeface="+mn-ea"/>
+              <a:t>Avast is the best to you?</a:t>
+            </a:r>
+            <a:endParaRPr lang="en-US" altLang="zh-CN"/>
+          </a:p>
+        </p:txBody>
+      </p:sp>
+      <p:sp>
+        <p:nvSpPr>
+          <p:cNvPr id="3" name="内容占位符 2"/>
+          <p:cNvSpPr>
+            <a:spLocks noGrp="1"/>
+          </p:cNvSpPr>
+          <p:nvPr>
+            <p:ph idx="1"/>
+          </p:nvPr>
+        </p:nvSpPr>
+        <p:spPr/>
+        <p:txBody>
+          <a:bodyPr/>
+          <a:p>
+            <a:endParaRPr lang="zh-CN" altLang="en-US"/>
+          </a:p>
+        </p:txBody>
+      </p:sp>
+    </p:spTree>
+  </p:cSld>
+  <p:clrMapOvr>
+    <a:masterClrMapping/>
+  </p:clrMapOvr>
+  <mc:AlternateContent xmlns:mc="http://schemas.openxmlformats.org/markup-compatibility/2006">
+    <mc:Choice xmlns:p14="http://schemas.microsoft.com/office/powerpoint/2010/main" Requires="p14">
+      <p:transition p14:dur="500"/>
+    </mc:Choice>
+    <mc:Fallback>
+      <p:transition/>
+    </mc:Fallback>
+  </mc:AlternateContent>
+</p:sld>
+</file>
+
+<file path=ppt/slides/slide24.xml><?xml version="1.0" encoding="utf-8"?>
+<p:sld xmlns:a="http://schemas.openxmlformats.org/drawingml/2006/main" xmlns:r="http://schemas.openxmlformats.org/officeDocument/2006/relationships" xmlns:p="http://schemas.openxmlformats.org/presentationml/2006/main">
+  <p:cSld>
+    <p:spTree>
+      <p:nvGrpSpPr>
+        <p:cNvPr id="1" name=""/>
+        <p:cNvGrpSpPr/>
+        <p:nvPr/>
+      </p:nvGrpSpPr>
+      <p:grpSpPr/>
+      <p:sp>
+        <p:nvSpPr>
+          <p:cNvPr id="2" name="标题 1"/>
+          <p:cNvSpPr>
+            <a:spLocks noGrp="1"/>
+          </p:cNvSpPr>
+          <p:nvPr>
+            <p:ph type="title"/>
+          </p:nvPr>
+        </p:nvSpPr>
+        <p:spPr/>
+        <p:txBody>
+          <a:bodyPr/>
+          <a:p>
+            <a:r>
+              <a:rPr lang="en-US" altLang="zh-CN"/>
+              <a:t>Questions?</a:t>
+            </a:r>
+            <a:endParaRPr lang="en-US" altLang="zh-CN"/>
+          </a:p>
+        </p:txBody>
+      </p:sp>
+      <p:sp>
+        <p:nvSpPr>
+          <p:cNvPr id="3" name="内容占位符 2"/>
+          <p:cNvSpPr>
+            <a:spLocks noGrp="1"/>
+          </p:cNvSpPr>
+          <p:nvPr>
+            <p:ph idx="1"/>
+          </p:nvPr>
+        </p:nvSpPr>
+        <p:spPr/>
+        <p:txBody>
+          <a:bodyPr/>
+          <a:p>
+            <a:endParaRPr lang="zh-CN" altLang="en-US"/>
+          </a:p>
+        </p:txBody>
+      </p:sp>
+    </p:spTree>
+  </p:cSld>
+  <p:clrMapOvr>
+    <a:masterClrMapping/>
+  </p:clrMapOvr>
+  <mc:AlternateContent xmlns:mc="http://schemas.openxmlformats.org/markup-compatibility/2006">
+    <mc:Choice xmlns:p14="http://schemas.microsoft.com/office/powerpoint/2010/main" Requires="p14">
+      <p:transition p14:dur="500"/>
+    </mc:Choice>
+    <mc:Fallback>
+      <p:transition/>
+    </mc:Fallback>
+  </mc:AlternateContent>
+</p:sld>
+</file>
+
+<file path=ppt/slides/slide3.xml><?xml version="1.0" encoding="utf-8"?>
+<p:sld xmlns:a="http://schemas.openxmlformats.org/drawingml/2006/main" xmlns:r="http://schemas.openxmlformats.org/officeDocument/2006/relationships" xmlns:p="http://schemas.openxmlformats.org/presentationml/2006/main">
+  <p:cSld>
+    <p:spTree>
+      <p:nvGrpSpPr>
+        <p:cNvPr id="1" name=""/>
+        <p:cNvGrpSpPr/>
+        <p:nvPr/>
+      </p:nvGrpSpPr>
+      <p:grpSpPr/>
+      <p:sp>
+        <p:nvSpPr>
+          <p:cNvPr id="2" name="标题 1"/>
+          <p:cNvSpPr>
+            <a:spLocks noGrp="1"/>
+          </p:cNvSpPr>
+          <p:nvPr>
+            <p:ph type="title"/>
+          </p:nvPr>
+        </p:nvSpPr>
+        <p:spPr/>
+        <p:txBody>
+          <a:bodyPr/>
+          <a:p>
+            <a:r>
+              <a:rPr lang="en-US" altLang="zh-CN"/>
+              <a:t>Internet security background</a:t>
+            </a:r>
+            <a:endParaRPr lang="en-US" altLang="zh-CN"/>
+          </a:p>
+        </p:txBody>
+      </p:sp>
+      <p:sp>
+        <p:nvSpPr>
+          <p:cNvPr id="3" name="内容占位符 2"/>
+          <p:cNvSpPr>
+            <a:spLocks noGrp="1"/>
+          </p:cNvSpPr>
+          <p:nvPr>
+            <p:ph idx="1"/>
+          </p:nvPr>
+        </p:nvSpPr>
+        <p:spPr/>
+        <p:txBody>
+          <a:bodyPr/>
+          <a:p>
+            <a:endParaRPr lang="zh-CN" altLang="en-US"/>
+          </a:p>
+        </p:txBody>
+      </p:sp>
+    </p:spTree>
+  </p:cSld>
+  <p:clrMapOvr>
+    <a:masterClrMapping/>
+  </p:clrMapOvr>
+  <mc:AlternateContent xmlns:mc="http://schemas.openxmlformats.org/markup-compatibility/2006">
+    <mc:Choice xmlns:p14="http://schemas.microsoft.com/office/powerpoint/2010/main" Requires="p14">
+      <p:transition p14:dur="500"/>
+    </mc:Choice>
+    <mc:Fallback>
+      <p:transition/>
+    </mc:Fallback>
+  </mc:AlternateContent>
+</p:sld>
+</file>
+
+<file path=ppt/slides/slide4.xml><?xml version="1.0" encoding="utf-8"?>
+<p:sld xmlns:a="http://schemas.openxmlformats.org/drawingml/2006/main" xmlns:r="http://schemas.openxmlformats.org/officeDocument/2006/relationships" xmlns:p="http://schemas.openxmlformats.org/presentationml/2006/main">
+  <p:cSld>
+    <p:spTree>
+      <p:nvGrpSpPr>
+        <p:cNvPr id="1" name=""/>
+        <p:cNvGrpSpPr/>
+        <p:nvPr/>
+      </p:nvGrpSpPr>
+      <p:grpSpPr/>
+      <p:sp>
+        <p:nvSpPr>
+          <p:cNvPr id="2" name="标题 1"/>
+          <p:cNvSpPr>
+            <a:spLocks noGrp="1"/>
+          </p:cNvSpPr>
+          <p:nvPr>
+            <p:ph type="title"/>
+          </p:nvPr>
+        </p:nvSpPr>
+        <p:spPr/>
+        <p:txBody>
+          <a:bodyPr/>
+          <a:p>
+            <a:r>
+              <a:rPr lang="en-US" altLang="zh-CN"/>
+              <a:t>Attacking vectors - client side</a:t>
+            </a:r>
+            <a:endParaRPr lang="en-US" altLang="zh-CN"/>
+          </a:p>
+        </p:txBody>
+      </p:sp>
+      <p:sp>
+        <p:nvSpPr>
+          <p:cNvPr id="3" name="内容占位符 2"/>
+          <p:cNvSpPr>
+            <a:spLocks noGrp="1"/>
+          </p:cNvSpPr>
+          <p:nvPr>
+            <p:ph idx="1"/>
+          </p:nvPr>
+        </p:nvSpPr>
+        <p:spPr/>
+        <p:txBody>
+          <a:bodyPr/>
+          <a:p>
+            <a:endParaRPr lang="zh-CN" altLang="en-US"/>
+          </a:p>
+        </p:txBody>
+      </p:sp>
+    </p:spTree>
+  </p:cSld>
+  <p:clrMapOvr>
+    <a:masterClrMapping/>
+  </p:clrMapOvr>
+  <mc:AlternateContent xmlns:mc="http://schemas.openxmlformats.org/markup-compatibility/2006">
+    <mc:Choice xmlns:p14="http://schemas.microsoft.com/office/powerpoint/2010/main" Requires="p14">
+      <p:transition p14:dur="500"/>
+    </mc:Choice>
+    <mc:Fallback>
+      <p:transition/>
+    </mc:Fallback>
+  </mc:AlternateContent>
+</p:sld>
+</file>
+
+<file path=ppt/slides/slide5.xml><?xml version="1.0" encoding="utf-8"?>
+<p:sld xmlns:a="http://schemas.openxmlformats.org/drawingml/2006/main" xmlns:r="http://schemas.openxmlformats.org/officeDocument/2006/relationships" xmlns:p="http://schemas.openxmlformats.org/presentationml/2006/main">
+  <p:cSld>
+    <p:spTree>
+      <p:nvGrpSpPr>
+        <p:cNvPr id="1" name=""/>
+        <p:cNvGrpSpPr/>
+        <p:nvPr/>
+      </p:nvGrpSpPr>
+      <p:grpSpPr/>
+      <p:sp>
+        <p:nvSpPr>
+          <p:cNvPr id="2" name="标题 1"/>
+          <p:cNvSpPr>
+            <a:spLocks noGrp="1"/>
+          </p:cNvSpPr>
+          <p:nvPr>
+            <p:ph type="title"/>
+          </p:nvPr>
+        </p:nvSpPr>
+        <p:spPr/>
+        <p:txBody>
+          <a:bodyPr/>
+          <a:p>
+            <a:r>
+              <a:rPr lang="en-US" altLang="zh-CN"/>
+              <a:t>Attacking vectors - server side</a:t>
+            </a:r>
+            <a:endParaRPr lang="en-US" altLang="zh-CN"/>
+          </a:p>
+        </p:txBody>
+      </p:sp>
+      <p:sp>
+        <p:nvSpPr>
+          <p:cNvPr id="3" name="内容占位符 2"/>
+          <p:cNvSpPr>
+            <a:spLocks noGrp="1"/>
+          </p:cNvSpPr>
+          <p:nvPr>
+            <p:ph idx="1"/>
+          </p:nvPr>
+        </p:nvSpPr>
+        <p:spPr/>
+        <p:txBody>
+          <a:bodyPr/>
+          <a:p>
+            <a:endParaRPr lang="zh-CN" altLang="en-US"/>
+          </a:p>
+        </p:txBody>
+      </p:sp>
+    </p:spTree>
+  </p:cSld>
+  <p:clrMapOvr>
+    <a:masterClrMapping/>
+  </p:clrMapOvr>
+  <mc:AlternateContent xmlns:mc="http://schemas.openxmlformats.org/markup-compatibility/2006">
+    <mc:Choice xmlns:p14="http://schemas.microsoft.com/office/powerpoint/2010/main" Requires="p14">
+      <p:transition p14:dur="500"/>
+    </mc:Choice>
+    <mc:Fallback>
+      <p:transition/>
+    </mc:Fallback>
+  </mc:AlternateContent>
+</p:sld>
+</file>
+
+<file path=ppt/slides/slide6.xml><?xml version="1.0" encoding="utf-8"?>
+<p:sld xmlns:a="http://schemas.openxmlformats.org/drawingml/2006/main" xmlns:r="http://schemas.openxmlformats.org/officeDocument/2006/relationships" xmlns:p="http://schemas.openxmlformats.org/presentationml/2006/main">
+  <p:cSld>
+    <p:spTree>
+      <p:nvGrpSpPr>
+        <p:cNvPr id="1" name=""/>
+        <p:cNvGrpSpPr/>
+        <p:nvPr/>
+      </p:nvGrpSpPr>
+      <p:grpSpPr/>
+      <p:sp>
+        <p:nvSpPr>
+          <p:cNvPr id="2" name="标题 1"/>
+          <p:cNvSpPr>
+            <a:spLocks noGrp="1"/>
+          </p:cNvSpPr>
+          <p:nvPr>
+            <p:ph type="title"/>
+          </p:nvPr>
+        </p:nvSpPr>
+        <p:spPr/>
+        <p:txBody>
+          <a:bodyPr/>
+          <a:p>
+            <a:r>
+              <a:rPr lang="en-US" altLang="zh-CN"/>
+              <a:t>I</a:t>
+            </a:r>
+            <a:r>
+              <a:rPr lang="zh-CN" altLang="en-US"/>
+              <a:t>mpacts </a:t>
+            </a:r>
+            <a:r>
+              <a:rPr lang="en-US" altLang="zh-CN"/>
+              <a:t>after being compromised</a:t>
+            </a:r>
+            <a:endParaRPr lang="en-US" altLang="zh-CN"/>
+          </a:p>
+        </p:txBody>
+      </p:sp>
+      <p:sp>
+        <p:nvSpPr>
+          <p:cNvPr id="3" name="内容占位符 2"/>
+          <p:cNvSpPr>
+            <a:spLocks noGrp="1"/>
+          </p:cNvSpPr>
+          <p:nvPr>
+            <p:ph idx="1"/>
+          </p:nvPr>
+        </p:nvSpPr>
+        <p:spPr/>
+        <p:txBody>
+          <a:bodyPr/>
+          <a:p>
+            <a:endParaRPr lang="zh-CN" altLang="en-US"/>
+          </a:p>
+        </p:txBody>
+      </p:sp>
+    </p:spTree>
+  </p:cSld>
+  <p:clrMapOvr>
+    <a:masterClrMapping/>
+  </p:clrMapOvr>
+  <mc:AlternateContent xmlns:mc="http://schemas.openxmlformats.org/markup-compatibility/2006">
+    <mc:Choice xmlns:p14="http://schemas.microsoft.com/office/powerpoint/2010/main" Requires="p14">
+      <p:transition p14:dur="500"/>
+    </mc:Choice>
+    <mc:Fallback>
+      <p:transition/>
+    </mc:Fallback>
+  </mc:AlternateContent>
+</p:sld>
+</file>
+
+<file path=ppt/slides/slide7.xml><?xml version="1.0" encoding="utf-8"?>
+<p:sld xmlns:a="http://schemas.openxmlformats.org/drawingml/2006/main" xmlns:r="http://schemas.openxmlformats.org/officeDocument/2006/relationships" xmlns:p="http://schemas.openxmlformats.org/presentationml/2006/main">
+  <p:cSld>
+    <p:spTree>
+      <p:nvGrpSpPr>
+        <p:cNvPr id="1" name=""/>
+        <p:cNvGrpSpPr/>
+        <p:nvPr/>
+      </p:nvGrpSpPr>
+      <p:grpSpPr/>
+      <p:sp>
+        <p:nvSpPr>
+          <p:cNvPr id="2" name="标题 1"/>
+          <p:cNvSpPr>
+            <a:spLocks noGrp="1"/>
+          </p:cNvSpPr>
+          <p:nvPr>
+            <p:ph type="title"/>
+          </p:nvPr>
+        </p:nvSpPr>
+        <p:spPr/>
+        <p:txBody>
+          <a:bodyPr/>
+          <a:p>
+            <a:r>
+              <a:rPr lang="en-US" altLang="zh-CN"/>
+              <a:t>You need a solution against web threats</a:t>
+            </a:r>
+            <a:endParaRPr lang="en-US" altLang="zh-CN"/>
+          </a:p>
+        </p:txBody>
+      </p:sp>
+      <p:pic>
+        <p:nvPicPr>
+          <p:cNvPr id="4" name="图片 3" descr="spartan-warrior"/>
+          <p:cNvPicPr>
+            <a:picLocks noChangeAspect="1"/>
+          </p:cNvPicPr>
+          <p:nvPr/>
+        </p:nvPicPr>
+        <p:blipFill>
+          <a:blip r:embed="rId1"/>
+          <a:stretch>
+            <a:fillRect/>
+          </a:stretch>
+        </p:blipFill>
+        <p:spPr>
+          <a:xfrm>
+            <a:off x="1035050" y="1950720"/>
+            <a:ext cx="4044315" cy="4044315"/>
+          </a:xfrm>
+          <a:prstGeom prst="rect">
+            <a:avLst/>
+          </a:prstGeom>
+          <a:effectLst/>
+        </p:spPr>
+      </p:pic>
+      <p:pic>
+        <p:nvPicPr>
+          <p:cNvPr id="5" name="图片 4" descr="fierce-dragon"/>
+          <p:cNvPicPr>
+            <a:picLocks noChangeAspect="1"/>
+          </p:cNvPicPr>
+          <p:nvPr/>
+        </p:nvPicPr>
+        <p:blipFill>
+          <a:blip r:embed="rId2"/>
+          <a:stretch>
+            <a:fillRect/>
+          </a:stretch>
+        </p:blipFill>
+        <p:spPr>
+          <a:xfrm>
+            <a:off x="7082790" y="1841500"/>
+            <a:ext cx="3561715" cy="4153535"/>
+          </a:xfrm>
+          <a:prstGeom prst="rect">
+            <a:avLst/>
+          </a:prstGeom>
+          <a:effectLst>
+            <a:outerShdw blurRad="50800" dist="38100" dir="2700000" algn="tl" rotWithShape="0">
+              <a:prstClr val="black">
+                <a:alpha val="40000"/>
+              </a:prstClr>
+            </a:outerShdw>
+          </a:effectLst>
+        </p:spPr>
+      </p:pic>
+      <p:sp>
+        <p:nvSpPr>
+          <p:cNvPr id="6" name="文本框 5"/>
+          <p:cNvSpPr txBox="1"/>
+          <p:nvPr/>
+        </p:nvSpPr>
+        <p:spPr>
+          <a:xfrm>
+            <a:off x="5210175" y="3373120"/>
+            <a:ext cx="1772285" cy="1198880"/>
+          </a:xfrm>
+          <a:prstGeom prst="rect">
+            <a:avLst/>
+          </a:prstGeom>
+          <a:noFill/>
+        </p:spPr>
+        <p:txBody>
+          <a:bodyPr wrap="square" rtlCol="0">
+            <a:spAutoFit/>
+          </a:bodyPr>
+          <a:p>
+            <a:r>
+              <a:rPr lang="en-US" altLang="zh-CN" sz="7200">
+                <a:latin typeface="Arial Black" panose="020B0A04020102020204" charset="0"/>
+                <a:cs typeface="Arial Black" panose="020B0A04020102020204" charset="0"/>
+              </a:rPr>
+              <a:t>VS</a:t>
+            </a:r>
+            <a:endParaRPr lang="en-US" altLang="zh-CN" sz="7200">
+              <a:latin typeface="Arial Black" panose="020B0A04020102020204" charset="0"/>
+              <a:cs typeface="Arial Black" panose="020B0A04020102020204" charset="0"/>
             </a:endParaRPr>
           </a:p>
-          <a:p>
-            <a:pPr lvl="1"/>
-            <a:r>
-              <a:rPr lang="x-none" altLang="zh-CN">
-                <a:sym typeface="+mn-ea"/>
-              </a:rPr>
-              <a:t>Bechmark compitition between them.</a:t>
-            </a:r>
-            <a:endParaRPr lang="x-none" altLang="zh-CN"/>
-          </a:p>
-          <a:p>
-            <a:r>
-              <a:rPr lang="x-none" altLang="zh-CN"/>
-              <a:t>Why Avast is the best to you?</a:t>
-            </a:r>
-            <a:endParaRPr lang="x-none" altLang="zh-CN"/>
-          </a:p>
-          <a:p>
-            <a:r>
-              <a:rPr lang="x-none" altLang="zh-CN"/>
-              <a:t>Questions.</a:t>
-            </a:r>
-            <a:endParaRPr lang="x-none" altLang="zh-CN"/>
-          </a:p>
-        </p:txBody>
-      </p:sp>
+        </p:txBody>
+      </p:sp>
+    </p:spTree>
+  </p:cSld>
+  <p:clrMapOvr>
+    <a:masterClrMapping/>
+  </p:clrMapOvr>
+  <mc:AlternateContent xmlns:mc="http://schemas.openxmlformats.org/markup-compatibility/2006">
+    <mc:Choice xmlns:p14="http://schemas.microsoft.com/office/powerpoint/2010/main" Requires="p14">
+      <p:transition p14:dur="500"/>
+    </mc:Choice>
+    <mc:Fallback>
+      <p:transition/>
+    </mc:Fallback>
+  </mc:AlternateContent>
+</p:sld>
+</file>
+
+<file path=ppt/slides/slide8.xml><?xml version="1.0" encoding="utf-8"?>
+<p:sld xmlns:a="http://schemas.openxmlformats.org/drawingml/2006/main" xmlns:r="http://schemas.openxmlformats.org/officeDocument/2006/relationships" xmlns:p="http://schemas.openxmlformats.org/presentationml/2006/main">
+  <p:cSld>
+    <p:spTree>
+      <p:nvGrpSpPr>
+        <p:cNvPr id="1" name=""/>
+        <p:cNvGrpSpPr/>
+        <p:nvPr/>
+      </p:nvGrpSpPr>
+      <p:grpSpPr/>
       <p:grpSp>
         <p:nvGrpSpPr>
           <p:cNvPr id="24" name="组合 23"/>
@@ -3583,7 +5861,7 @@
         <p:spPr>
           <a:xfrm>
             <a:off x="3860800" y="367665"/>
-            <a:ext cx="4774565" cy="643890"/>
+            <a:ext cx="4774565" cy="645160"/>
           </a:xfrm>
           <a:prstGeom prst="rect">
             <a:avLst/>
@@ -3613,6 +5891,95 @@
               <a:latin typeface="微软雅黑" panose="020B0503020204020204" pitchFamily="34" charset="-122"/>
               <a:ea typeface="微软雅黑" panose="020B0503020204020204" pitchFamily="34" charset="-122"/>
             </a:endParaRPr>
+          </a:p>
+        </p:txBody>
+      </p:sp>
+      <p:sp>
+        <p:nvSpPr>
+          <p:cNvPr id="2" name="内容占位符 1"/>
+          <p:cNvSpPr>
+            <a:spLocks noGrp="1"/>
+          </p:cNvSpPr>
+          <p:nvPr>
+            <p:ph idx="1"/>
+          </p:nvPr>
+        </p:nvSpPr>
+        <p:spPr>
+          <a:xfrm>
+            <a:off x="903605" y="1691005"/>
+            <a:ext cx="10515600" cy="4351338"/>
+          </a:xfrm>
+        </p:spPr>
+        <p:txBody>
+          <a:bodyPr/>
+          <a:p>
+            <a:r>
+              <a:rPr lang="zh-CN" altLang="en-US">
+                <a:solidFill>
+                  <a:schemeClr val="tx1"/>
+                </a:solidFill>
+              </a:rPr>
+              <a:t>Internet security background</a:t>
+            </a:r>
+            <a:endParaRPr lang="zh-CN" altLang="en-US"/>
+          </a:p>
+          <a:p>
+            <a:r>
+              <a:rPr lang="zh-CN" altLang="en-US">
+                <a:solidFill>
+                  <a:srgbClr val="FF923F"/>
+                </a:solidFill>
+              </a:rPr>
+              <a:t>Avast Urlinfo Service introduction</a:t>
+            </a:r>
+            <a:endParaRPr lang="zh-CN" altLang="en-US"/>
+          </a:p>
+          <a:p>
+            <a:r>
+              <a:rPr lang="zh-CN" altLang="en-US"/>
+              <a:t>Benefits come with the service</a:t>
+            </a:r>
+            <a:endParaRPr lang="zh-CN" altLang="en-US"/>
+          </a:p>
+          <a:p>
+            <a:r>
+              <a:rPr lang="en-US" altLang="zh-CN"/>
+              <a:t>Compare to s</a:t>
+            </a:r>
+            <a:r>
+              <a:rPr lang="zh-CN" altLang="en-US"/>
+              <a:t>imilar solutions in the market</a:t>
+            </a:r>
+            <a:endParaRPr lang="zh-CN" altLang="en-US"/>
+          </a:p>
+          <a:p>
+            <a:r>
+              <a:rPr lang="zh-CN" altLang="en-US">
+                <a:sym typeface="+mn-ea"/>
+              </a:rPr>
+              <a:t>Implement Scans </a:t>
+            </a:r>
+            <a:r>
+              <a:rPr lang="en-US" altLang="zh-CN">
+                <a:sym typeface="+mn-ea"/>
+              </a:rPr>
+              <a:t>for Urlinfo service</a:t>
+            </a:r>
+            <a:endParaRPr lang="zh-CN" altLang="en-US"/>
+          </a:p>
+          <a:p>
+            <a:r>
+              <a:rPr lang="zh-CN" altLang="en-US"/>
+              <a:t>Why Avast is the best to you?</a:t>
+            </a:r>
+            <a:endParaRPr lang="zh-CN" altLang="en-US"/>
+          </a:p>
+          <a:p>
+            <a:r>
+              <a:rPr lang="zh-CN" altLang="en-US"/>
+              <a:t>Questions.</a:t>
+            </a:r>
+            <a:endParaRPr lang="zh-CN" altLang="en-US"/>
           </a:p>
         </p:txBody>
       </p:sp>
@@ -3632,209 +5999,7 @@
 </p:sld>
 </file>
 
-<file path=ppt/slides/slide3.xml><?xml version="1.0" encoding="utf-8"?>
-<p:sld xmlns:a="http://schemas.openxmlformats.org/drawingml/2006/main" xmlns:r="http://schemas.openxmlformats.org/officeDocument/2006/relationships" xmlns:p="http://schemas.openxmlformats.org/presentationml/2006/main">
-  <p:cSld>
-    <p:spTree>
-      <p:nvGrpSpPr>
-        <p:cNvPr id="1" name=""/>
-        <p:cNvGrpSpPr/>
-        <p:nvPr/>
-      </p:nvGrpSpPr>
-      <p:grpSpPr/>
-      <p:sp>
-        <p:nvSpPr>
-          <p:cNvPr id="2" name="标题 1"/>
-          <p:cNvSpPr>
-            <a:spLocks noGrp="1"/>
-          </p:cNvSpPr>
-          <p:nvPr>
-            <p:ph type="title"/>
-          </p:nvPr>
-        </p:nvSpPr>
-        <p:spPr/>
-        <p:txBody>
-          <a:bodyPr/>
-          <a:p>
-            <a:r>
-              <a:rPr lang="en-US" altLang="zh-CN"/>
-              <a:t>Web application security background</a:t>
-            </a:r>
-            <a:endParaRPr lang="en-US" altLang="zh-CN"/>
-          </a:p>
-        </p:txBody>
-      </p:sp>
-      <p:sp>
-        <p:nvSpPr>
-          <p:cNvPr id="3" name="内容占位符 2"/>
-          <p:cNvSpPr>
-            <a:spLocks noGrp="1"/>
-          </p:cNvSpPr>
-          <p:nvPr>
-            <p:ph idx="1"/>
-          </p:nvPr>
-        </p:nvSpPr>
-        <p:spPr/>
-        <p:txBody>
-          <a:bodyPr/>
-          <a:p>
-            <a:endParaRPr lang="zh-CN" altLang="en-US"/>
-          </a:p>
-        </p:txBody>
-      </p:sp>
-    </p:spTree>
-  </p:cSld>
-  <p:clrMapOvr>
-    <a:masterClrMapping/>
-  </p:clrMapOvr>
-  <mc:AlternateContent xmlns:mc="http://schemas.openxmlformats.org/markup-compatibility/2006">
-    <mc:Choice xmlns:p14="http://schemas.microsoft.com/office/powerpoint/2010/main" Requires="p14">
-      <p:transition p14:dur="500"/>
-    </mc:Choice>
-    <mc:Fallback>
-      <p:transition/>
-    </mc:Fallback>
-  </mc:AlternateContent>
-</p:sld>
-</file>
-
-<file path=ppt/slides/slide4.xml><?xml version="1.0" encoding="utf-8"?>
-<p:sld xmlns:a="http://schemas.openxmlformats.org/drawingml/2006/main" xmlns:r="http://schemas.openxmlformats.org/officeDocument/2006/relationships" xmlns:p="http://schemas.openxmlformats.org/presentationml/2006/main">
-  <p:cSld>
-    <p:spTree>
-      <p:nvGrpSpPr>
-        <p:cNvPr id="1" name=""/>
-        <p:cNvGrpSpPr/>
-        <p:nvPr/>
-      </p:nvGrpSpPr>
-      <p:grpSpPr/>
-      <p:sp>
-        <p:nvSpPr>
-          <p:cNvPr id="2" name="标题 1"/>
-          <p:cNvSpPr>
-            <a:spLocks noGrp="1"/>
-          </p:cNvSpPr>
-          <p:nvPr>
-            <p:ph type="title"/>
-          </p:nvPr>
-        </p:nvSpPr>
-        <p:spPr/>
-        <p:txBody>
-          <a:bodyPr/>
-          <a:p>
-            <a:r>
-              <a:rPr lang="en-US" altLang="zh-CN"/>
-              <a:t>Attacking vectors</a:t>
-            </a:r>
-            <a:endParaRPr lang="en-US" altLang="zh-CN"/>
-          </a:p>
-        </p:txBody>
-      </p:sp>
-      <p:sp>
-        <p:nvSpPr>
-          <p:cNvPr id="3" name="内容占位符 2"/>
-          <p:cNvSpPr>
-            <a:spLocks noGrp="1"/>
-          </p:cNvSpPr>
-          <p:nvPr>
-            <p:ph idx="1"/>
-          </p:nvPr>
-        </p:nvSpPr>
-        <p:spPr/>
-        <p:txBody>
-          <a:bodyPr/>
-          <a:p>
-            <a:endParaRPr lang="zh-CN" altLang="en-US"/>
-          </a:p>
-        </p:txBody>
-      </p:sp>
-    </p:spTree>
-  </p:cSld>
-  <p:clrMapOvr>
-    <a:masterClrMapping/>
-  </p:clrMapOvr>
-  <mc:AlternateContent xmlns:mc="http://schemas.openxmlformats.org/markup-compatibility/2006">
-    <mc:Choice xmlns:p14="http://schemas.microsoft.com/office/powerpoint/2010/main" Requires="p14">
-      <p:transition p14:dur="500"/>
-    </mc:Choice>
-    <mc:Fallback>
-      <p:transition/>
-    </mc:Fallback>
-  </mc:AlternateContent>
-</p:sld>
-</file>
-
-<file path=ppt/slides/slide5.xml><?xml version="1.0" encoding="utf-8"?>
-<p:sld xmlns:a="http://schemas.openxmlformats.org/drawingml/2006/main" xmlns:r="http://schemas.openxmlformats.org/officeDocument/2006/relationships" xmlns:p="http://schemas.openxmlformats.org/presentationml/2006/main">
-  <p:cSld>
-    <p:spTree>
-      <p:nvGrpSpPr>
-        <p:cNvPr id="1" name=""/>
-        <p:cNvGrpSpPr/>
-        <p:nvPr/>
-      </p:nvGrpSpPr>
-      <p:grpSpPr/>
-      <p:sp>
-        <p:nvSpPr>
-          <p:cNvPr id="2" name="标题 1"/>
-          <p:cNvSpPr>
-            <a:spLocks noGrp="1"/>
-          </p:cNvSpPr>
-          <p:nvPr>
-            <p:ph type="title"/>
-          </p:nvPr>
-        </p:nvSpPr>
-        <p:spPr/>
-        <p:txBody>
-          <a:bodyPr/>
-          <a:p>
-            <a:r>
-              <a:rPr lang="zh-CN" altLang="en-US"/>
-              <a:t>impacts </a:t>
-            </a:r>
-            <a:r>
-              <a:rPr lang="en-US" altLang="zh-CN"/>
-              <a:t>after being compromised</a:t>
-            </a:r>
-            <a:endParaRPr lang="en-US" altLang="zh-CN"/>
-          </a:p>
-        </p:txBody>
-      </p:sp>
-      <p:sp>
-        <p:nvSpPr>
-          <p:cNvPr id="3" name="内容占位符 2"/>
-          <p:cNvSpPr>
-            <a:spLocks noGrp="1"/>
-          </p:cNvSpPr>
-          <p:nvPr>
-            <p:ph idx="1"/>
-          </p:nvPr>
-        </p:nvSpPr>
-        <p:spPr/>
-        <p:txBody>
-          <a:bodyPr/>
-          <a:p>
-            <a:endParaRPr lang="zh-CN" altLang="en-US"/>
-          </a:p>
-        </p:txBody>
-      </p:sp>
-    </p:spTree>
-  </p:cSld>
-  <p:clrMapOvr>
-    <a:masterClrMapping/>
-  </p:clrMapOvr>
-  <mc:AlternateContent xmlns:mc="http://schemas.openxmlformats.org/markup-compatibility/2006">
-    <mc:Choice xmlns:p14="http://schemas.microsoft.com/office/powerpoint/2010/main" Requires="p14">
-      <p:transition p14:dur="500"/>
-    </mc:Choice>
-    <mc:Fallback>
-      <p:transition/>
-    </mc:Fallback>
-  </mc:AlternateContent>
-</p:sld>
-</file>
-
-<file path=ppt/slides/slide6.xml><?xml version="1.0" encoding="utf-8"?>
+<file path=ppt/slides/slide9.xml><?xml version="1.0" encoding="utf-8"?>
 <p:sld xmlns:a="http://schemas.openxmlformats.org/drawingml/2006/main" xmlns:r="http://schemas.openxmlformats.org/officeDocument/2006/relationships" xmlns:p="http://schemas.openxmlformats.org/presentationml/2006/main">
   <p:cSld>
     <p:spTree>
@@ -4074,72 +6239,6 @@
           </p:txBody>
         </p:sp>
       </p:grpSp>
-    </p:spTree>
-  </p:cSld>
-  <p:clrMapOvr>
-    <a:masterClrMapping/>
-  </p:clrMapOvr>
-  <mc:AlternateContent xmlns:mc="http://schemas.openxmlformats.org/markup-compatibility/2006">
-    <mc:Choice xmlns:p14="http://schemas.microsoft.com/office/powerpoint/2010/main" Requires="p14">
-      <p:transition p14:dur="500"/>
-    </mc:Choice>
-    <mc:Fallback>
-      <p:transition/>
-    </mc:Fallback>
-  </mc:AlternateContent>
-</p:sld>
-</file>
-
-<file path=ppt/slides/slide7.xml><?xml version="1.0" encoding="utf-8"?>
-<p:sld xmlns:a="http://schemas.openxmlformats.org/drawingml/2006/main" xmlns:r="http://schemas.openxmlformats.org/officeDocument/2006/relationships" xmlns:p="http://schemas.openxmlformats.org/presentationml/2006/main">
-  <p:cSld>
-    <p:spTree>
-      <p:nvGrpSpPr>
-        <p:cNvPr id="1" name=""/>
-        <p:cNvGrpSpPr/>
-        <p:nvPr/>
-      </p:nvGrpSpPr>
-      <p:grpSpPr/>
-      <p:sp>
-        <p:nvSpPr>
-          <p:cNvPr id="2" name="标题 1"/>
-          <p:cNvSpPr>
-            <a:spLocks noGrp="1"/>
-          </p:cNvSpPr>
-          <p:nvPr>
-            <p:ph type="title"/>
-          </p:nvPr>
-        </p:nvSpPr>
-        <p:spPr/>
-        <p:txBody>
-          <a:bodyPr/>
-          <a:p>
-            <a:r>
-              <a:rPr lang="en-US" altLang="zh-CN"/>
-              <a:t>Architecture</a:t>
-            </a:r>
-            <a:endParaRPr lang="en-US" altLang="zh-CN"/>
-          </a:p>
-        </p:txBody>
-      </p:sp>
-      <p:sp>
-        <p:nvSpPr>
-          <p:cNvPr id="3" name="内容占位符 2"/>
-          <p:cNvSpPr>
-            <a:spLocks noGrp="1"/>
-          </p:cNvSpPr>
-          <p:nvPr>
-            <p:ph idx="1"/>
-          </p:nvPr>
-        </p:nvSpPr>
-        <p:spPr/>
-        <p:txBody>
-          <a:bodyPr/>
-          <a:p>
-            <a:endParaRPr lang="zh-CN" altLang="en-US"/>
-          </a:p>
-        </p:txBody>
-      </p:sp>
     </p:spTree>
   </p:cSld>
   <p:clrMapOvr>
@@ -4413,4 +6512,263 @@
     </a:ext>
   </a:extLst>
 </a:theme>
+</file>
+
+<file path=ppt/theme/theme2.xml><?xml version="1.0" encoding="utf-8"?>
+<a:theme xmlns:a="http://schemas.openxmlformats.org/drawingml/2006/main" name="Office 主题">
+  <a:themeElements>
+    <a:clrScheme name="Office">
+      <a:dk1>
+        <a:sysClr val="windowText" lastClr="000000"/>
+      </a:dk1>
+      <a:lt1>
+        <a:sysClr val="window" lastClr="FFFFFF"/>
+      </a:lt1>
+      <a:dk2>
+        <a:srgbClr val="44546A"/>
+      </a:dk2>
+      <a:lt2>
+        <a:srgbClr val="E7E6E6"/>
+      </a:lt2>
+      <a:accent1>
+        <a:srgbClr val="5B9BD5"/>
+      </a:accent1>
+      <a:accent2>
+        <a:srgbClr val="ED7D31"/>
+      </a:accent2>
+      <a:accent3>
+        <a:srgbClr val="A5A5A5"/>
+      </a:accent3>
+      <a:accent4>
+        <a:srgbClr val="FFC000"/>
+      </a:accent4>
+      <a:accent5>
+        <a:srgbClr val="4472C4"/>
+      </a:accent5>
+      <a:accent6>
+        <a:srgbClr val="70AD47"/>
+      </a:accent6>
+      <a:hlink>
+        <a:srgbClr val="0563C1"/>
+      </a:hlink>
+      <a:folHlink>
+        <a:srgbClr val="954F72"/>
+      </a:folHlink>
+    </a:clrScheme>
+    <a:fontScheme name="Office">
+      <a:majorFont>
+        <a:latin typeface="Calibri Light"/>
+        <a:ea typeface=""/>
+        <a:cs typeface=""/>
+        <a:font script="Jpan" typeface="ＭＳ Ｐゴシック"/>
+        <a:font script="Hang" typeface="맑은 고딕"/>
+        <a:font script="Hans" typeface="宋体"/>
+        <a:font script="Hant" typeface="新細明體"/>
+        <a:font script="Arab" typeface="Times New Roman"/>
+        <a:font script="Hebr" typeface="Times New Roman"/>
+        <a:font script="Thai" typeface="Angsana New"/>
+        <a:font script="Ethi" typeface="Nyala"/>
+        <a:font script="Beng" typeface="Vrinda"/>
+        <a:font script="Gujr" typeface="Shruti"/>
+        <a:font script="Khmr" typeface="MoolBoran"/>
+        <a:font script="Knda" typeface="Tunga"/>
+        <a:font script="Guru" typeface="Raavi"/>
+        <a:font script="Cans" typeface="Euphemia"/>
+        <a:font script="Cher" typeface="Plantagenet Cherokee"/>
+        <a:font script="Yiii" typeface="Microsoft Yi Baiti"/>
+        <a:font script="Tibt" typeface="Microsoft Himalaya"/>
+        <a:font script="Thaa" typeface="MV Boli"/>
+        <a:font script="Deva" typeface="Mangal"/>
+        <a:font script="Telu" typeface="Gautami"/>
+        <a:font script="Taml" typeface="Latha"/>
+        <a:font script="Syrc" typeface="Estrangelo Edessa"/>
+        <a:font script="Orya" typeface="Kalinga"/>
+        <a:font script="Mlym" typeface="Kartika"/>
+        <a:font script="Laoo" typeface="DokChampa"/>
+        <a:font script="Sinh" typeface="Iskoola Pota"/>
+        <a:font script="Mong" typeface="Mongolian Baiti"/>
+        <a:font script="Viet" typeface="Times New Roman"/>
+        <a:font script="Uigh" typeface="Microsoft Uighur"/>
+        <a:font script="Geor" typeface="Sylfaen"/>
+      </a:majorFont>
+      <a:minorFont>
+        <a:latin typeface="Calibri"/>
+        <a:ea typeface=""/>
+        <a:cs typeface=""/>
+        <a:font script="Jpan" typeface="ＭＳ Ｐゴシック"/>
+        <a:font script="Hang" typeface="맑은 고딕"/>
+        <a:font script="Hans" typeface="宋体"/>
+        <a:font script="Hant" typeface="新細明體"/>
+        <a:font script="Arab" typeface="Arial"/>
+        <a:font script="Hebr" typeface="Arial"/>
+        <a:font script="Thai" typeface="Cordia New"/>
+        <a:font script="Ethi" typeface="Nyala"/>
+        <a:font script="Beng" typeface="Vrinda"/>
+        <a:font script="Gujr" typeface="Shruti"/>
+        <a:font script="Khmr" typeface="DaunPenh"/>
+        <a:font script="Knda" typeface="Tunga"/>
+        <a:font script="Guru" typeface="Raavi"/>
+        <a:font script="Cans" typeface="Euphemia"/>
+        <a:font script="Cher" typeface="Plantagenet Cherokee"/>
+        <a:font script="Yiii" typeface="Microsoft Yi Baiti"/>
+        <a:font script="Tibt" typeface="Microsoft Himalaya"/>
+        <a:font script="Thaa" typeface="MV Boli"/>
+        <a:font script="Deva" typeface="Mangal"/>
+        <a:font script="Telu" typeface="Gautami"/>
+        <a:font script="Taml" typeface="Latha"/>
+        <a:font script="Syrc" typeface="Estrangelo Edessa"/>
+        <a:font script="Orya" typeface="Kalinga"/>
+        <a:font script="Mlym" typeface="Kartika"/>
+        <a:font script="Laoo" typeface="DokChampa"/>
+        <a:font script="Sinh" typeface="Iskoola Pota"/>
+        <a:font script="Mong" typeface="Mongolian Baiti"/>
+        <a:font script="Viet" typeface="Arial"/>
+        <a:font script="Uigh" typeface="Microsoft Uighur"/>
+        <a:font script="Geor" typeface="Sylfaen"/>
+      </a:minorFont>
+    </a:fontScheme>
+    <a:fmtScheme name="Office">
+      <a:fillStyleLst>
+        <a:solidFill>
+          <a:schemeClr val="phClr"/>
+        </a:solidFill>
+        <a:gradFill rotWithShape="1">
+          <a:gsLst>
+            <a:gs pos="0">
+              <a:schemeClr val="phClr">
+                <a:lumMod val="110000"/>
+                <a:satMod val="105000"/>
+                <a:tint val="67000"/>
+              </a:schemeClr>
+            </a:gs>
+            <a:gs pos="50000">
+              <a:schemeClr val="phClr">
+                <a:lumMod val="105000"/>
+                <a:satMod val="103000"/>
+                <a:tint val="73000"/>
+              </a:schemeClr>
+            </a:gs>
+            <a:gs pos="100000">
+              <a:schemeClr val="phClr">
+                <a:lumMod val="105000"/>
+                <a:satMod val="109000"/>
+                <a:tint val="81000"/>
+              </a:schemeClr>
+            </a:gs>
+          </a:gsLst>
+          <a:lin ang="5400000" scaled="0"/>
+        </a:gradFill>
+        <a:gradFill rotWithShape="1">
+          <a:gsLst>
+            <a:gs pos="0">
+              <a:schemeClr val="phClr">
+                <a:satMod val="103000"/>
+                <a:lumMod val="102000"/>
+                <a:tint val="94000"/>
+              </a:schemeClr>
+            </a:gs>
+            <a:gs pos="50000">
+              <a:schemeClr val="phClr">
+                <a:satMod val="110000"/>
+                <a:lumMod val="100000"/>
+                <a:shade val="100000"/>
+              </a:schemeClr>
+            </a:gs>
+            <a:gs pos="100000">
+              <a:schemeClr val="phClr">
+                <a:lumMod val="99000"/>
+                <a:satMod val="120000"/>
+                <a:shade val="78000"/>
+              </a:schemeClr>
+            </a:gs>
+          </a:gsLst>
+          <a:lin ang="5400000" scaled="0"/>
+        </a:gradFill>
+      </a:fillStyleLst>
+      <a:lnStyleLst>
+        <a:ln w="6350" cap="flat" cmpd="sng" algn="ctr">
+          <a:solidFill>
+            <a:schemeClr val="phClr"/>
+          </a:solidFill>
+          <a:prstDash val="solid"/>
+          <a:miter lim="800000"/>
+        </a:ln>
+        <a:ln w="12700" cap="flat" cmpd="sng" algn="ctr">
+          <a:solidFill>
+            <a:schemeClr val="phClr"/>
+          </a:solidFill>
+          <a:prstDash val="solid"/>
+          <a:miter lim="800000"/>
+        </a:ln>
+        <a:ln w="19050" cap="flat" cmpd="sng" algn="ctr">
+          <a:solidFill>
+            <a:schemeClr val="phClr"/>
+          </a:solidFill>
+          <a:prstDash val="solid"/>
+          <a:miter lim="800000"/>
+        </a:ln>
+      </a:lnStyleLst>
+      <a:effectStyleLst>
+        <a:effectStyle>
+          <a:effectLst/>
+        </a:effectStyle>
+        <a:effectStyle>
+          <a:effectLst/>
+        </a:effectStyle>
+        <a:effectStyle>
+          <a:effectLst>
+            <a:outerShdw blurRad="57150" dist="19050" dir="5400000" algn="ctr" rotWithShape="0">
+              <a:srgbClr val="000000">
+                <a:alpha val="63000"/>
+              </a:srgbClr>
+            </a:outerShdw>
+          </a:effectLst>
+        </a:effectStyle>
+      </a:effectStyleLst>
+      <a:bgFillStyleLst>
+        <a:solidFill>
+          <a:schemeClr val="phClr"/>
+        </a:solidFill>
+        <a:solidFill>
+          <a:schemeClr val="phClr">
+            <a:tint val="95000"/>
+            <a:satMod val="170000"/>
+          </a:schemeClr>
+        </a:solidFill>
+        <a:gradFill rotWithShape="1">
+          <a:gsLst>
+            <a:gs pos="0">
+              <a:schemeClr val="phClr">
+                <a:tint val="93000"/>
+                <a:satMod val="150000"/>
+                <a:shade val="98000"/>
+                <a:lumMod val="102000"/>
+              </a:schemeClr>
+            </a:gs>
+            <a:gs pos="50000">
+              <a:schemeClr val="phClr">
+                <a:tint val="98000"/>
+                <a:satMod val="130000"/>
+                <a:shade val="90000"/>
+                <a:lumMod val="103000"/>
+              </a:schemeClr>
+            </a:gs>
+            <a:gs pos="100000">
+              <a:schemeClr val="phClr">
+                <a:shade val="63000"/>
+                <a:satMod val="120000"/>
+              </a:schemeClr>
+            </a:gs>
+          </a:gsLst>
+          <a:lin ang="5400000" scaled="0"/>
+        </a:gradFill>
+      </a:bgFillStyleLst>
+    </a:fmtScheme>
+  </a:themeElements>
+  <a:extLst>
+    <a:ext uri="{05A4C25C-085E-4340-85A3-A5531E510DB2}">
+      <thm15:themeFamily xmlns:thm15="http://schemas.microsoft.com/office/thememl/2012/main" name="Office Theme" id="{62F939B6-93AF-4DB8-9C6B-D6C7DFDC589F}" vid="{4A3C46E8-61CC-4603-A589-7422A47A8E4A}"/>
+    </a:ext>
+  </a:extLst>
+</a:theme>
 </file>
</xml_diff>

<commit_message>
Final PPT, use to prepare presentation
</commit_message>
<xml_diff>
--- a/urlinfo_presentation.pptx
+++ b/urlinfo_presentation.pptx
@@ -18,25 +18,24 @@
     <p:sldId id="263" r:id="rId11"/>
     <p:sldId id="304" r:id="rId12"/>
     <p:sldId id="258" r:id="rId13"/>
-    <p:sldId id="259" r:id="rId14"/>
-    <p:sldId id="265" r:id="rId15"/>
-    <p:sldId id="266" r:id="rId16"/>
-    <p:sldId id="305" r:id="rId17"/>
-    <p:sldId id="272" r:id="rId18"/>
-    <p:sldId id="301" r:id="rId19"/>
-    <p:sldId id="268" r:id="rId20"/>
-    <p:sldId id="299" r:id="rId21"/>
-    <p:sldId id="306" r:id="rId22"/>
-    <p:sldId id="270" r:id="rId23"/>
-    <p:sldId id="271" r:id="rId24"/>
-    <p:sldId id="307" r:id="rId25"/>
-    <p:sldId id="275" r:id="rId26"/>
-    <p:sldId id="276" r:id="rId27"/>
-    <p:sldId id="308" r:id="rId28"/>
-    <p:sldId id="277" r:id="rId29"/>
-    <p:sldId id="310" r:id="rId30"/>
-    <p:sldId id="309" r:id="rId31"/>
-    <p:sldId id="279" r:id="rId32"/>
+    <p:sldId id="327" r:id="rId14"/>
+    <p:sldId id="266" r:id="rId15"/>
+    <p:sldId id="305" r:id="rId16"/>
+    <p:sldId id="272" r:id="rId17"/>
+    <p:sldId id="301" r:id="rId18"/>
+    <p:sldId id="268" r:id="rId19"/>
+    <p:sldId id="299" r:id="rId20"/>
+    <p:sldId id="306" r:id="rId21"/>
+    <p:sldId id="270" r:id="rId22"/>
+    <p:sldId id="271" r:id="rId23"/>
+    <p:sldId id="307" r:id="rId24"/>
+    <p:sldId id="275" r:id="rId25"/>
+    <p:sldId id="276" r:id="rId26"/>
+    <p:sldId id="308" r:id="rId27"/>
+    <p:sldId id="277" r:id="rId28"/>
+    <p:sldId id="310" r:id="rId29"/>
+    <p:sldId id="309" r:id="rId30"/>
+    <p:sldId id="279" r:id="rId31"/>
   </p:sldIdLst>
   <p:sldSz cx="12192000" cy="6858000"/>
   <p:notesSz cx="6858000" cy="9144000"/>
@@ -517,7 +516,11 @@
         <p:txBody>
           <a:bodyPr/>
           <a:p>
-            <a:endParaRPr lang="zh-CN" altLang="en-US"/>
+            <a:r>
+              <a:rPr lang="en-US" altLang="zh-CN"/>
+              <a:t>Sorry for no whiteboard</a:t>
+            </a:r>
+            <a:endParaRPr lang="en-US" altLang="zh-CN"/>
           </a:p>
         </p:txBody>
       </p:sp>
@@ -561,6 +564,99 @@
         <p:txBody>
           <a:bodyPr/>
           <a:p>
+            <a:r>
+              <a:rPr lang="zh-CN" altLang="en-US"/>
+              <a:t>service distribute on multiple datacenters, </a:t>
+            </a:r>
+            <a:r>
+              <a:rPr lang="en-US" altLang="zh-CN"/>
+              <a:t>include</a:t>
+            </a:r>
+            <a:r>
+              <a:rPr lang="zh-CN" altLang="en-US"/>
+              <a:t> 7 </a:t>
+            </a:r>
+            <a:r>
+              <a:rPr lang="en-US" altLang="zh-CN"/>
+              <a:t>data </a:t>
+            </a:r>
+            <a:r>
+              <a:rPr lang="zh-CN" altLang="en-US"/>
+              <a:t>zone</a:t>
+            </a:r>
+            <a:r>
+              <a:rPr lang="en-US" altLang="zh-CN"/>
+              <a:t>s</a:t>
+            </a:r>
+            <a:r>
+              <a:rPr lang="zh-CN" altLang="en-US"/>
+              <a:t> and 38 </a:t>
+            </a:r>
+            <a:r>
+              <a:rPr lang="en-US" altLang="zh-CN"/>
+              <a:t>Data</a:t>
+            </a:r>
+            <a:r>
+              <a:rPr lang="zh-CN" altLang="en-US"/>
+              <a:t> center.</a:t>
+            </a:r>
+            <a:endParaRPr lang="zh-CN" altLang="en-US"/>
+          </a:p>
+          <a:p>
+            <a:r>
+              <a:rPr lang="zh-CN" altLang="en-US"/>
+              <a:t>high performance, low latence, geographical locations optimized.</a:t>
+            </a:r>
+            <a:endParaRPr lang="zh-CN" altLang="en-US"/>
+          </a:p>
+          <a:p>
+            <a:r>
+              <a:rPr lang="zh-CN" altLang="en-US"/>
+              <a:t>high accuracy, low FP, the best data feed from local partners.</a:t>
+            </a:r>
+            <a:endParaRPr lang="zh-CN" altLang="en-US"/>
+          </a:p>
+          <a:p>
+            <a:r>
+              <a:rPr lang="zh-CN" altLang="en-US"/>
+              <a:t>Local OEM support team</a:t>
+            </a:r>
+            <a:endParaRPr lang="zh-CN" altLang="en-US"/>
+          </a:p>
+          <a:p>
+            <a:r>
+              <a:rPr lang="zh-CN" altLang="en-US"/>
+              <a:t>malicious feeds real time update, in second level.</a:t>
+            </a:r>
+            <a:endParaRPr lang="zh-CN" altLang="en-US"/>
+          </a:p>
+          <a:p>
+            <a:r>
+              <a:rPr lang="zh-CN" altLang="en-US"/>
+              <a:t>multiple blacklist sources, </a:t>
+            </a:r>
+            <a:r>
+              <a:rPr lang="zh-CN" altLang="en-US">
+                <a:sym typeface="+mn-ea"/>
+              </a:rPr>
+              <a:t>includes </a:t>
+            </a:r>
+            <a:r>
+              <a:rPr lang="en-US" altLang="zh-CN">
+                <a:sym typeface="+mn-ea"/>
+              </a:rPr>
+              <a:t>scaned result</a:t>
+            </a:r>
+            <a:r>
+              <a:rPr lang="zh-CN" altLang="en-US">
+                <a:sym typeface="+mn-ea"/>
+              </a:rPr>
+              <a:t> from Avast ThreatLab</a:t>
+            </a:r>
+            <a:r>
+              <a:rPr lang="zh-CN" altLang="en-US"/>
+              <a:t> VPS</a:t>
+            </a:r>
             <a:endParaRPr lang="zh-CN" altLang="en-US"/>
           </a:p>
         </p:txBody>
@@ -605,7 +701,21 @@
         <p:txBody>
           <a:bodyPr/>
           <a:p>
-            <a:endParaRPr lang="zh-CN" altLang="en-US"/>
+            <a:r>
+              <a:rPr lang="en-US" altLang="zh-CN"/>
+              <a:t>Sound good right? </a:t>
+            </a:r>
+            <a:endParaRPr lang="en-US" altLang="zh-CN"/>
+          </a:p>
+          <a:p>
+            <a:endParaRPr lang="en-US" altLang="zh-CN"/>
+          </a:p>
+          <a:p>
+            <a:r>
+              <a:rPr lang="en-US" altLang="zh-CN"/>
+              <a:t>Along these years, We cooprate with our partners in different environments, and we summarize the following scenarios for you to reference.</a:t>
+            </a:r>
+            <a:endParaRPr lang="en-US" altLang="zh-CN"/>
           </a:p>
         </p:txBody>
       </p:sp>
@@ -649,27 +759,6 @@
         <p:txBody>
           <a:bodyPr/>
           <a:p>
-            <a:r>
-              <a:rPr lang="zh-CN" altLang="en-US">
-                <a:sym typeface="+mn-ea"/>
-              </a:rPr>
-              <a:t>Identifies all harmful sites, notifies user or administrator </a:t>
-            </a:r>
-            <a:r>
-              <a:rPr lang="en-US" altLang="zh-CN">
-                <a:sym typeface="+mn-ea"/>
-              </a:rPr>
-              <a:t>to </a:t>
-            </a:r>
-            <a:r>
-              <a:rPr lang="zh-CN" altLang="en-US">
-                <a:sym typeface="+mn-ea"/>
-              </a:rPr>
-              <a:t>stay away from online threats.</a:t>
-            </a:r>
-            <a:endParaRPr lang="zh-CN" altLang="en-US"/>
-          </a:p>
-          <a:p>
             <a:endParaRPr lang="zh-CN" altLang="en-US"/>
           </a:p>
         </p:txBody>
@@ -758,6 +847,27 @@
         <p:txBody>
           <a:bodyPr/>
           <a:p>
+            <a:r>
+              <a:rPr lang="zh-CN" altLang="en-US">
+                <a:sym typeface="+mn-ea"/>
+              </a:rPr>
+              <a:t>Identifies all harmful sites, notifies user or administrator </a:t>
+            </a:r>
+            <a:r>
+              <a:rPr lang="en-US" altLang="zh-CN">
+                <a:sym typeface="+mn-ea"/>
+              </a:rPr>
+              <a:t>to </a:t>
+            </a:r>
+            <a:r>
+              <a:rPr lang="zh-CN" altLang="en-US">
+                <a:sym typeface="+mn-ea"/>
+              </a:rPr>
+              <a:t>stay away from online threats.</a:t>
+            </a:r>
+            <a:endParaRPr lang="zh-CN" altLang="en-US"/>
+          </a:p>
+          <a:p>
             <a:endParaRPr lang="zh-CN" altLang="en-US"/>
           </a:p>
         </p:txBody>
@@ -848,30 +958,149 @@
           <a:p>
             <a:r>
               <a:rPr lang="zh-CN" altLang="en-US"/>
-              <a:t>Which mobile anti-malware security solution do you primarily use on your smartphone?</a:t>
-            </a:r>
+              <a:t>Compare in 5 dimensions</a:t>
+            </a:r>
+            <a:r>
+              <a:rPr lang="en-US" altLang="zh-CN"/>
+              <a:t>, I can say, no matter which dimension, Avast URLinfo is the best. </a:t>
+            </a:r>
+            <a:endParaRPr lang="en-US" altLang="zh-CN"/>
+          </a:p>
+        </p:txBody>
+      </p:sp>
+    </p:spTree>
+  </p:cSld>
+  <p:clrMapOvr>
+    <a:masterClrMapping/>
+  </p:clrMapOvr>
+</p:notes>
+</file>
+
+<file path=ppt/notesSlides/notesSlide17.xml><?xml version="1.0" encoding="utf-8"?>
+<p:notes xmlns:a="http://schemas.openxmlformats.org/drawingml/2006/main" xmlns:r="http://schemas.openxmlformats.org/officeDocument/2006/relationships" xmlns:p="http://schemas.openxmlformats.org/presentationml/2006/main">
+  <p:cSld>
+    <p:spTree>
+      <p:nvGrpSpPr>
+        <p:cNvPr id="1" name=""/>
+        <p:cNvGrpSpPr/>
+        <p:nvPr/>
+      </p:nvGrpSpPr>
+      <p:grpSpPr/>
+      <p:sp>
+        <p:nvSpPr>
+          <p:cNvPr id="2" name="幻灯片图像占位符 1"/>
+          <p:cNvSpPr/>
+          <p:nvPr>
+            <p:ph type="sldImg" idx="2"/>
+          </p:nvPr>
+        </p:nvSpPr>
+        <p:spPr/>
+      </p:sp>
+      <p:sp>
+        <p:nvSpPr>
+          <p:cNvPr id="3" name="文本占位符 2"/>
+          <p:cNvSpPr/>
+          <p:nvPr>
+            <p:ph type="body" idx="3"/>
+          </p:nvPr>
+        </p:nvSpPr>
+        <p:spPr/>
+        <p:txBody>
+          <a:bodyPr/>
+          <a:p>
             <a:endParaRPr lang="zh-CN" altLang="en-US"/>
           </a:p>
+        </p:txBody>
+      </p:sp>
+    </p:spTree>
+  </p:cSld>
+  <p:clrMapOvr>
+    <a:masterClrMapping/>
+  </p:clrMapOvr>
+</p:notes>
+</file>
+
+<file path=ppt/notesSlides/notesSlide18.xml><?xml version="1.0" encoding="utf-8"?>
+<p:notes xmlns:a="http://schemas.openxmlformats.org/drawingml/2006/main" xmlns:r="http://schemas.openxmlformats.org/officeDocument/2006/relationships" xmlns:p="http://schemas.openxmlformats.org/presentationml/2006/main">
+  <p:cSld>
+    <p:spTree>
+      <p:nvGrpSpPr>
+        <p:cNvPr id="1" name=""/>
+        <p:cNvGrpSpPr/>
+        <p:nvPr/>
+      </p:nvGrpSpPr>
+      <p:grpSpPr/>
+      <p:sp>
+        <p:nvSpPr>
+          <p:cNvPr id="2" name="幻灯片图像占位符 1"/>
+          <p:cNvSpPr/>
+          <p:nvPr>
+            <p:ph type="sldImg" idx="2"/>
+          </p:nvPr>
+        </p:nvSpPr>
+        <p:spPr/>
+      </p:sp>
+      <p:sp>
+        <p:nvSpPr>
+          <p:cNvPr id="3" name="文本占位符 2"/>
+          <p:cNvSpPr/>
+          <p:nvPr>
+            <p:ph type="body" idx="3"/>
+          </p:nvPr>
+        </p:nvSpPr>
+        <p:spPr/>
+        <p:txBody>
+          <a:bodyPr/>
+          <a:p>
+            <a:endParaRPr lang="zh-CN" altLang="en-US"/>
+          </a:p>
+        </p:txBody>
+      </p:sp>
+    </p:spTree>
+  </p:cSld>
+  <p:clrMapOvr>
+    <a:masterClrMapping/>
+  </p:clrMapOvr>
+</p:notes>
+</file>
+
+<file path=ppt/notesSlides/notesSlide19.xml><?xml version="1.0" encoding="utf-8"?>
+<p:notes xmlns:a="http://schemas.openxmlformats.org/drawingml/2006/main" xmlns:r="http://schemas.openxmlformats.org/officeDocument/2006/relationships" xmlns:p="http://schemas.openxmlformats.org/presentationml/2006/main">
+  <p:cSld>
+    <p:spTree>
+      <p:nvGrpSpPr>
+        <p:cNvPr id="1" name=""/>
+        <p:cNvGrpSpPr/>
+        <p:nvPr/>
+      </p:nvGrpSpPr>
+      <p:grpSpPr/>
+      <p:sp>
+        <p:nvSpPr>
+          <p:cNvPr id="2" name="幻灯片图像占位符 1"/>
+          <p:cNvSpPr/>
+          <p:nvPr>
+            <p:ph type="sldImg" idx="2"/>
+          </p:nvPr>
+        </p:nvSpPr>
+        <p:spPr/>
+      </p:sp>
+      <p:sp>
+        <p:nvSpPr>
+          <p:cNvPr id="3" name="文本占位符 2"/>
+          <p:cNvSpPr/>
+          <p:nvPr>
+            <p:ph type="body" idx="3"/>
+          </p:nvPr>
+        </p:nvSpPr>
+        <p:spPr/>
+        <p:txBody>
+          <a:bodyPr/>
           <a:p>
             <a:r>
               <a:rPr lang="en-US" altLang="zh-CN"/>
-              <a:t>High performance, high </a:t>
-            </a:r>
-            <a:r>
-              <a:rPr lang="zh-CN" altLang="en-US">
-                <a:sym typeface="+mn-ea"/>
-              </a:rPr>
-              <a:t>accuracy</a:t>
-            </a:r>
-            <a:r>
-              <a:rPr lang="en-US" altLang="zh-CN">
-                <a:sym typeface="+mn-ea"/>
-              </a:rPr>
-              <a:t>, most user chosen mobile security solution on smartphone.</a:t>
-            </a:r>
-            <a:endParaRPr lang="en-US" altLang="zh-CN">
-              <a:sym typeface="+mn-ea"/>
-            </a:endParaRPr>
+              <a:t>So, in conclusion, </a:t>
+            </a:r>
+            <a:endParaRPr lang="en-US" altLang="zh-CN"/>
           </a:p>
         </p:txBody>
       </p:sp>
@@ -915,7 +1144,231 @@
         <p:txBody>
           <a:bodyPr/>
           <a:p>
+            <a:endParaRPr lang="en-US" altLang="zh-CN"/>
+          </a:p>
+        </p:txBody>
+      </p:sp>
+    </p:spTree>
+  </p:cSld>
+  <p:clrMapOvr>
+    <a:masterClrMapping/>
+  </p:clrMapOvr>
+</p:notes>
+</file>
+
+<file path=ppt/notesSlides/notesSlide20.xml><?xml version="1.0" encoding="utf-8"?>
+<p:notes xmlns:a="http://schemas.openxmlformats.org/drawingml/2006/main" xmlns:r="http://schemas.openxmlformats.org/officeDocument/2006/relationships" xmlns:p="http://schemas.openxmlformats.org/presentationml/2006/main">
+  <p:cSld>
+    <p:spTree>
+      <p:nvGrpSpPr>
+        <p:cNvPr id="1" name=""/>
+        <p:cNvGrpSpPr/>
+        <p:nvPr/>
+      </p:nvGrpSpPr>
+      <p:grpSpPr/>
+      <p:sp>
+        <p:nvSpPr>
+          <p:cNvPr id="2" name="幻灯片图像占位符 1"/>
+          <p:cNvSpPr/>
+          <p:nvPr>
+            <p:ph type="sldImg" idx="2"/>
+          </p:nvPr>
+        </p:nvSpPr>
+        <p:spPr/>
+      </p:sp>
+      <p:sp>
+        <p:nvSpPr>
+          <p:cNvPr id="3" name="文本占位符 2"/>
+          <p:cNvSpPr/>
+          <p:nvPr>
+            <p:ph type="body" idx="3"/>
+          </p:nvPr>
+        </p:nvSpPr>
+        <p:spPr/>
+        <p:txBody>
+          <a:bodyPr/>
+          <a:p>
+            <a:r>
+              <a:rPr lang="en-US" altLang="zh-CN">
+                <a:sym typeface="+mn-ea"/>
+              </a:rPr>
+              <a:t>1. High performance, </a:t>
+            </a:r>
+            <a:endParaRPr lang="en-US" altLang="zh-CN">
+              <a:sym typeface="+mn-ea"/>
+            </a:endParaRPr>
+          </a:p>
+          <a:p>
+            <a:r>
+              <a:rPr lang="en-US" altLang="zh-CN">
+                <a:sym typeface="+mn-ea"/>
+              </a:rPr>
+              <a:t>2. High </a:t>
+            </a:r>
+            <a:r>
+              <a:rPr lang="zh-CN" altLang="en-US">
+                <a:sym typeface="+mn-ea"/>
+              </a:rPr>
+              <a:t>accuracy</a:t>
+            </a:r>
+            <a:r>
+              <a:rPr lang="en-US" altLang="zh-CN">
+                <a:sym typeface="+mn-ea"/>
+              </a:rPr>
+              <a:t>, </a:t>
+            </a:r>
+            <a:endParaRPr lang="en-US" altLang="zh-CN">
+              <a:sym typeface="+mn-ea"/>
+            </a:endParaRPr>
+          </a:p>
+          <a:p>
+            <a:r>
+              <a:rPr lang="en-US" altLang="zh-CN">
+                <a:sym typeface="+mn-ea"/>
+              </a:rPr>
+              <a:t>3. most user chosen mobile security solution on smartphone.</a:t>
+            </a:r>
             <a:endParaRPr lang="zh-CN" altLang="en-US"/>
+          </a:p>
+          <a:p>
+            <a:endParaRPr lang="en-US" altLang="zh-CN">
+              <a:sym typeface="+mn-ea"/>
+            </a:endParaRPr>
+          </a:p>
+        </p:txBody>
+      </p:sp>
+    </p:spTree>
+  </p:cSld>
+  <p:clrMapOvr>
+    <a:masterClrMapping/>
+  </p:clrMapOvr>
+</p:notes>
+</file>
+
+<file path=ppt/notesSlides/notesSlide21.xml><?xml version="1.0" encoding="utf-8"?>
+<p:notes xmlns:a="http://schemas.openxmlformats.org/drawingml/2006/main" xmlns:r="http://schemas.openxmlformats.org/officeDocument/2006/relationships" xmlns:p="http://schemas.openxmlformats.org/presentationml/2006/main">
+  <p:cSld>
+    <p:spTree>
+      <p:nvGrpSpPr>
+        <p:cNvPr id="1" name=""/>
+        <p:cNvGrpSpPr/>
+        <p:nvPr/>
+      </p:nvGrpSpPr>
+      <p:grpSpPr/>
+      <p:sp>
+        <p:nvSpPr>
+          <p:cNvPr id="2" name="幻灯片图像占位符 1"/>
+          <p:cNvSpPr/>
+          <p:nvPr>
+            <p:ph type="sldImg" idx="2"/>
+          </p:nvPr>
+        </p:nvSpPr>
+        <p:spPr/>
+      </p:sp>
+      <p:sp>
+        <p:nvSpPr>
+          <p:cNvPr id="3" name="文本占位符 2"/>
+          <p:cNvSpPr/>
+          <p:nvPr>
+            <p:ph type="body" idx="3"/>
+          </p:nvPr>
+        </p:nvSpPr>
+        <p:spPr/>
+        <p:txBody>
+          <a:bodyPr/>
+          <a:p>
+            <a:r>
+              <a:rPr lang="en-US" altLang="zh-CN"/>
+              <a:t>local team, local language</a:t>
+            </a:r>
+            <a:endParaRPr lang="en-US" altLang="zh-CN"/>
+          </a:p>
+          <a:p>
+            <a:r>
+              <a:rPr lang="en-US" altLang="zh-CN"/>
+              <a:t>local data, local datacenter </a:t>
+            </a:r>
+            <a:endParaRPr lang="en-US" altLang="zh-CN"/>
+          </a:p>
+          <a:p>
+            <a:endParaRPr lang="en-US" altLang="zh-CN"/>
+          </a:p>
+          <a:p>
+            <a:r>
+              <a:rPr lang="en-US" altLang="zh-CN"/>
+              <a:t>to guarantee our product beyond good..</a:t>
+            </a:r>
+            <a:endParaRPr lang="en-US" altLang="zh-CN"/>
+          </a:p>
+        </p:txBody>
+      </p:sp>
+    </p:spTree>
+  </p:cSld>
+  <p:clrMapOvr>
+    <a:masterClrMapping/>
+  </p:clrMapOvr>
+</p:notes>
+</file>
+
+<file path=ppt/notesSlides/notesSlide22.xml><?xml version="1.0" encoding="utf-8"?>
+<p:notes xmlns:a="http://schemas.openxmlformats.org/drawingml/2006/main" xmlns:r="http://schemas.openxmlformats.org/officeDocument/2006/relationships" xmlns:p="http://schemas.openxmlformats.org/presentationml/2006/main">
+  <p:cSld>
+    <p:spTree>
+      <p:nvGrpSpPr>
+        <p:cNvPr id="1" name=""/>
+        <p:cNvGrpSpPr/>
+        <p:nvPr/>
+      </p:nvGrpSpPr>
+      <p:grpSpPr/>
+      <p:sp>
+        <p:nvSpPr>
+          <p:cNvPr id="2" name="幻灯片图像占位符 1"/>
+          <p:cNvSpPr/>
+          <p:nvPr>
+            <p:ph type="sldImg" idx="2"/>
+          </p:nvPr>
+        </p:nvSpPr>
+        <p:spPr/>
+      </p:sp>
+      <p:sp>
+        <p:nvSpPr>
+          <p:cNvPr id="3" name="文本占位符 2"/>
+          <p:cNvSpPr/>
+          <p:nvPr>
+            <p:ph type="body" idx="3"/>
+          </p:nvPr>
+        </p:nvSpPr>
+        <p:spPr/>
+        <p:txBody>
+          <a:bodyPr/>
+          <a:p>
+            <a:r>
+              <a:rPr lang="zh-CN" altLang="en-US"/>
+              <a:t>we are not those who sell you a product then go away, </a:t>
+            </a:r>
+            <a:endParaRPr lang="zh-CN" altLang="en-US"/>
+          </a:p>
+          <a:p>
+            <a:endParaRPr lang="zh-CN" altLang="en-US"/>
+          </a:p>
+          <a:p>
+            <a:r>
+              <a:rPr lang="zh-CN" altLang="en-US"/>
+              <a:t>we want our solution </a:t>
+            </a:r>
+            <a:r>
+              <a:rPr lang="en-US" altLang="zh-CN"/>
+              <a:t>really can help </a:t>
+            </a:r>
+            <a:r>
+              <a:rPr lang="zh-CN" altLang="en-US"/>
+              <a:t>your </a:t>
+            </a:r>
+            <a:r>
+              <a:rPr lang="en-US" altLang="zh-CN"/>
+              <a:t>business, from short term to long cooperation, but of course, we want to be great together with you</a:t>
+            </a:r>
+            <a:endParaRPr lang="en-US" altLang="zh-CN"/>
           </a:p>
         </p:txBody>
       </p:sp>
@@ -960,21 +1413,40 @@
           <a:bodyPr/>
           <a:p>
             <a:r>
-              <a:rPr lang="en-US" altLang="zh-CN">
-                <a:sym typeface="+mn-ea"/>
-              </a:rPr>
-              <a:t>Long response time after webmasters receiving notifications that their sites have been compromised. (60 days)</a:t>
-            </a:r>
-            <a:endParaRPr lang="en-US" altLang="zh-CN">
-              <a:sym typeface="+mn-ea"/>
-            </a:endParaRPr>
-          </a:p>
-          <a:p>
-            <a:r>
-              <a:rPr lang="zh-CN" altLang="en-US"/>
-              <a:t>Even after a site has been cleaned, it can become reinfected if an underlying vulnerability remains.</a:t>
-            </a:r>
-            <a:endParaRPr lang="zh-CN" altLang="en-US"/>
+              <a:rPr lang="en-US" altLang="zh-CN"/>
+              <a:t>2 sites/ a second, </a:t>
+            </a:r>
+            <a:endParaRPr lang="en-US" altLang="zh-CN"/>
+          </a:p>
+          <a:p>
+            <a:endParaRPr lang="en-US" altLang="zh-CN"/>
+          </a:p>
+          <a:p>
+            <a:r>
+              <a:rPr lang="en-US" altLang="zh-CN"/>
+              <a:t>1/5 of them was doing further bad things. </a:t>
+            </a:r>
+            <a:endParaRPr lang="en-US" altLang="zh-CN"/>
+          </a:p>
+          <a:p>
+            <a:endParaRPr lang="en-US" altLang="zh-CN"/>
+          </a:p>
+          <a:p>
+            <a:r>
+              <a:rPr lang="en-US" altLang="zh-CN"/>
+              <a:t>third party, DNS hijack</a:t>
+            </a:r>
+            <a:endParaRPr lang="en-US" altLang="zh-CN"/>
+          </a:p>
+          <a:p>
+            <a:endParaRPr lang="en-US" altLang="zh-CN"/>
+          </a:p>
+          <a:p>
+            <a:r>
+              <a:rPr lang="en-US" altLang="zh-CN"/>
+              <a:t>when a website was hacked, after webmaster get notifiacation, it took him...</a:t>
+            </a:r>
+            <a:endParaRPr lang="en-US" altLang="zh-CN"/>
           </a:p>
         </p:txBody>
       </p:sp>
@@ -1019,8 +1491,68 @@
           <a:bodyPr/>
           <a:p>
             <a:r>
+              <a:rPr lang="en-US" altLang="zh-CN">
+                <a:sym typeface="+mn-ea"/>
+              </a:rPr>
+              <a:t>Long response time after webmasters receiving notifications that their sites have been compromised. (60 days)</a:t>
+            </a:r>
+            <a:endParaRPr lang="en-US" altLang="zh-CN">
+              <a:sym typeface="+mn-ea"/>
+            </a:endParaRPr>
+          </a:p>
+          <a:p>
+            <a:endParaRPr lang="en-US" altLang="zh-CN">
+              <a:sym typeface="+mn-ea"/>
+            </a:endParaRPr>
+          </a:p>
+          <a:p>
+            <a:r>
+              <a:rPr lang="zh-CN" altLang="en-US"/>
+              <a:t>Even after a site has been cleaned, it can become reinfected if an underlying vulnerability remains.</a:t>
+            </a:r>
+            <a:endParaRPr lang="zh-CN" altLang="en-US"/>
+          </a:p>
+          <a:p>
+            <a:endParaRPr lang="zh-CN" altLang="en-US"/>
+          </a:p>
+          <a:p>
+            <a:r>
               <a:rPr lang="en-US" altLang="zh-CN"/>
-              <a:t>What can happen if your device or a website was hacked. </a:t>
+              <a:t>I hear a lot people say...</a:t>
+            </a:r>
+            <a:endParaRPr lang="en-US" altLang="zh-CN"/>
+          </a:p>
+          <a:p>
+            <a:r>
+              <a:rPr lang="en-US" altLang="zh-CN"/>
+              <a:t>This do help to protect....</a:t>
+            </a:r>
+            <a:endParaRPr lang="en-US" altLang="zh-CN"/>
+          </a:p>
+          <a:p>
+            <a:r>
+              <a:rPr lang="en-US" altLang="zh-CN"/>
+              <a:t>But you can NEVER say....</a:t>
+            </a:r>
+            <a:endParaRPr lang="en-US" altLang="zh-CN"/>
+          </a:p>
+          <a:p>
+            <a:endParaRPr lang="en-US" altLang="zh-CN"/>
+          </a:p>
+          <a:p>
+            <a:r>
+              <a:rPr lang="en-US" altLang="zh-CN"/>
+              <a:t>Even us know many ways...</a:t>
+            </a:r>
+            <a:endParaRPr lang="en-US" altLang="zh-CN"/>
+          </a:p>
+          <a:p>
+            <a:endParaRPr lang="en-US" altLang="zh-CN"/>
+          </a:p>
+          <a:p>
+            <a:r>
+              <a:rPr lang="en-US" altLang="zh-CN"/>
+              <a:t>Really?</a:t>
             </a:r>
             <a:endParaRPr lang="en-US" altLang="zh-CN"/>
           </a:p>
@@ -1066,7 +1598,7 @@
         <p:txBody>
           <a:bodyPr/>
           <a:p>
-            <a:endParaRPr lang="zh-CN" altLang="en-US"/>
+            <a:endParaRPr lang="en-US" altLang="zh-CN"/>
           </a:p>
         </p:txBody>
       </p:sp>
@@ -1110,7 +1642,31 @@
         <p:txBody>
           <a:bodyPr/>
           <a:p>
-            <a:endParaRPr lang="zh-CN" altLang="en-US"/>
+            <a:r>
+              <a:rPr lang="en-US" altLang="zh-CN"/>
+              <a:t>What can happen if your device or a website was hacked. </a:t>
+            </a:r>
+            <a:endParaRPr lang="en-US" altLang="zh-CN"/>
+          </a:p>
+          <a:p>
+            <a:endParaRPr lang="en-US" altLang="zh-CN"/>
+          </a:p>
+          <a:p>
+            <a:r>
+              <a:rPr lang="en-US" altLang="zh-CN"/>
+              <a:t>Let's imagine, you visit your company website everyday</a:t>
+            </a:r>
+            <a:endParaRPr lang="en-US" altLang="zh-CN"/>
+          </a:p>
+          <a:p>
+            <a:endParaRPr lang="en-US" altLang="zh-CN"/>
+          </a:p>
+          <a:p>
+            <a:r>
+              <a:rPr lang="en-US" altLang="zh-CN"/>
+              <a:t>Hackers have thousands of ways to use your device, more than you know..</a:t>
+            </a:r>
+            <a:endParaRPr lang="en-US" altLang="zh-CN"/>
           </a:p>
         </p:txBody>
       </p:sp>
@@ -1155,79 +1711,42 @@
           <a:bodyPr/>
           <a:p>
             <a:r>
+              <a:rPr lang="zh-CN" altLang="en-US"/>
+              <a:t>So, </a:t>
+            </a:r>
+            <a:r>
               <a:rPr lang="en-US" altLang="zh-CN">
                 <a:sym typeface="+mn-ea"/>
               </a:rPr>
-              <a:t>C</a:t>
+              <a:t>security</a:t>
             </a:r>
             <a:r>
               <a:rPr lang="zh-CN" altLang="en-US">
                 <a:sym typeface="+mn-ea"/>
               </a:rPr>
-              <a:t>heck URLs or IP addresses to determine if they are </a:t>
-            </a:r>
-            <a:r>
-              <a:rPr lang="en-US">
-                <a:sym typeface="+mn-ea"/>
-              </a:rPr>
-              <a:t>harmful</a:t>
-            </a:r>
-            <a:r>
-              <a:rPr lang="en-US" altLang="zh-CN">
-                <a:sym typeface="+mn-ea"/>
-              </a:rPr>
-              <a:t>, </a:t>
-            </a:r>
-            <a:r>
-              <a:rPr lang="zh-CN" altLang="en-US">
-                <a:sym typeface="+mn-ea"/>
-              </a:rPr>
-              <a:t>typo, tracking or unwanted spam</a:t>
-            </a:r>
-            <a:r>
-              <a:rPr lang="en-US" altLang="zh-CN">
-                <a:sym typeface="+mn-ea"/>
-              </a:rPr>
-              <a:t>, </a:t>
-            </a:r>
-            <a:r>
-              <a:rPr lang="zh-CN" altLang="en-US">
-                <a:sym typeface="+mn-ea"/>
-              </a:rPr>
-              <a:t>Identify malicious, phishing, and fraudulent websites in real-time.</a:t>
+              <a:t> </a:t>
+            </a:r>
+            <a:r>
+              <a:rPr lang="zh-CN" altLang="en-US"/>
+              <a:t>should </a:t>
+            </a:r>
+            <a:r>
+              <a:rPr lang="en-US" altLang="zh-CN"/>
+              <a:t>be </a:t>
+            </a:r>
+            <a:r>
+              <a:rPr lang="zh-CN" altLang="en-US"/>
+              <a:t>not only your PC or mobile protection or only bowser client side's thing, it should be a set of solution. </a:t>
             </a:r>
             <a:endParaRPr lang="zh-CN" altLang="en-US"/>
           </a:p>
           <a:p>
-            <a:r>
-              <a:rPr lang="en-US" altLang="zh-CN">
-                <a:sym typeface="+mn-ea"/>
-              </a:rPr>
-              <a:t>C</a:t>
-            </a:r>
-            <a:r>
-              <a:rPr lang="zh-CN" altLang="en-US">
-                <a:sym typeface="+mn-ea"/>
-              </a:rPr>
-              <a:t>heck domain reputation based on massive Avast users voting</a:t>
-            </a:r>
             <a:endParaRPr lang="zh-CN" altLang="en-US"/>
           </a:p>
           <a:p>
             <a:r>
-              <a:rPr lang="zh-CN" altLang="en-US">
-                <a:sym typeface="+mn-ea"/>
-              </a:rPr>
-              <a:t>cloud service frontend for Avast backend virus lab service </a:t>
-            </a:r>
-            <a:endParaRPr lang="zh-CN" altLang="en-US"/>
-          </a:p>
-          <a:p>
-            <a:r>
-              <a:rPr lang="zh-CN" altLang="en-US">
-                <a:sym typeface="+mn-ea"/>
-              </a:rPr>
-              <a:t>provide simple HTTP/HTTPS web API for integration, support JSON/GPB protocol.</a:t>
+              <a:rPr lang="zh-CN" altLang="en-US"/>
+              <a:t>And first of all, you need a well defined, widly used, and high organized mechanism to tell you what is right and what is wrong from web access origin.</a:t>
             </a:r>
             <a:endParaRPr lang="zh-CN" altLang="en-US"/>
           </a:p>
@@ -1273,98 +1792,6 @@
         <p:txBody>
           <a:bodyPr/>
           <a:p>
-            <a:r>
-              <a:rPr lang="zh-CN" altLang="en-US"/>
-              <a:t>service distributed on multiple datacenters, service distributed in 7 zone and 38 dc center.</a:t>
-            </a:r>
-            <a:endParaRPr lang="zh-CN" altLang="en-US"/>
-          </a:p>
-          <a:p>
-            <a:r>
-              <a:rPr lang="zh-CN" altLang="en-US"/>
-              <a:t>high performance, low latence, geographical locations optimized.</a:t>
-            </a:r>
-            <a:endParaRPr lang="zh-CN" altLang="en-US"/>
-          </a:p>
-          <a:p>
-            <a:r>
-              <a:rPr lang="zh-CN" altLang="en-US"/>
-              <a:t>high accuracy, low FP, the best data feed from local partners.</a:t>
-            </a:r>
-            <a:endParaRPr lang="zh-CN" altLang="en-US"/>
-          </a:p>
-          <a:p>
-            <a:r>
-              <a:rPr lang="zh-CN" altLang="en-US"/>
-              <a:t>Local OEM support team</a:t>
-            </a:r>
-            <a:endParaRPr lang="zh-CN" altLang="en-US"/>
-          </a:p>
-          <a:p>
-            <a:r>
-              <a:rPr lang="zh-CN" altLang="en-US"/>
-              <a:t>malicious feeds real time update, in second level.</a:t>
-            </a:r>
-            <a:endParaRPr lang="zh-CN" altLang="en-US"/>
-          </a:p>
-          <a:p>
-            <a:r>
-              <a:rPr lang="zh-CN" altLang="en-US"/>
-              <a:t>multiple blacklist sources, </a:t>
-            </a:r>
-            <a:r>
-              <a:rPr lang="zh-CN" altLang="en-US">
-                <a:sym typeface="+mn-ea"/>
-              </a:rPr>
-              <a:t>includes </a:t>
-            </a:r>
-            <a:r>
-              <a:rPr lang="en-US" altLang="zh-CN">
-                <a:sym typeface="+mn-ea"/>
-              </a:rPr>
-              <a:t>scaned result</a:t>
-            </a:r>
-            <a:r>
-              <a:rPr lang="zh-CN" altLang="en-US">
-                <a:sym typeface="+mn-ea"/>
-              </a:rPr>
-              <a:t> from Avast ThreatLab</a:t>
-            </a:r>
-            <a:r>
-              <a:rPr lang="zh-CN" altLang="en-US"/>
-              <a:t> VPS</a:t>
-            </a:r>
-            <a:endParaRPr lang="zh-CN" altLang="en-US"/>
-          </a:p>
-          <a:p>
-            <a:r>
-              <a:rPr lang="zh-CN" altLang="en-US"/>
-              <a:t>1</a:t>
-            </a:r>
-            <a:r>
-              <a:rPr lang="en-US" altLang="zh-CN"/>
-              <a:t>0</a:t>
-            </a:r>
-            <a:r>
-              <a:rPr lang="zh-CN" altLang="en-US"/>
-              <a:t> million bad URLs (</a:t>
-            </a:r>
-            <a:r>
-              <a:rPr lang="en-US" altLang="zh-CN"/>
-              <a:t>1m if </a:t>
-            </a:r>
-            <a:r>
-              <a:rPr lang="zh-CN" altLang="en-US"/>
-              <a:t>only </a:t>
-            </a:r>
-            <a:r>
-              <a:rPr lang="en-US" altLang="zh-CN"/>
-              <a:t>from </a:t>
-            </a:r>
-            <a:r>
-              <a:rPr lang="zh-CN" altLang="en-US"/>
-              <a:t>safebrowsing, 800k ph, 200k mal)</a:t>
-            </a:r>
             <a:endParaRPr lang="zh-CN" altLang="en-US"/>
           </a:p>
         </p:txBody>
@@ -1408,6 +1835,94 @@
         <p:spPr/>
         <p:txBody>
           <a:bodyPr/>
+          <a:p>
+            <a:r>
+              <a:rPr lang="en-US" altLang="zh-CN">
+                <a:sym typeface="+mn-ea"/>
+              </a:rPr>
+              <a:t>IP, the whole URL</a:t>
+            </a:r>
+            <a:endParaRPr lang="en-US" altLang="zh-CN">
+              <a:sym typeface="+mn-ea"/>
+            </a:endParaRPr>
+          </a:p>
+          <a:p>
+            <a:endParaRPr lang="en-US" altLang="zh-CN">
+              <a:sym typeface="+mn-ea"/>
+            </a:endParaRPr>
+          </a:p>
+          <a:p>
+            <a:r>
+              <a:rPr lang="en-US" altLang="zh-CN">
+                <a:sym typeface="+mn-ea"/>
+              </a:rPr>
+              <a:t>C</a:t>
+            </a:r>
+            <a:r>
+              <a:rPr lang="zh-CN" altLang="en-US">
+                <a:sym typeface="+mn-ea"/>
+              </a:rPr>
+              <a:t>heck URLs to determine if they are </a:t>
+            </a:r>
+            <a:r>
+              <a:rPr lang="en-US">
+                <a:sym typeface="+mn-ea"/>
+              </a:rPr>
+              <a:t>harmful</a:t>
+            </a:r>
+            <a:r>
+              <a:rPr lang="en-US" altLang="zh-CN">
+                <a:sym typeface="+mn-ea"/>
+              </a:rPr>
+              <a:t>, </a:t>
+            </a:r>
+            <a:r>
+              <a:rPr lang="zh-CN" altLang="en-US">
+                <a:sym typeface="+mn-ea"/>
+              </a:rPr>
+              <a:t>typo, tracking or unwanted spam</a:t>
+            </a:r>
+            <a:r>
+              <a:rPr lang="en-US" altLang="zh-CN">
+                <a:sym typeface="+mn-ea"/>
+              </a:rPr>
+              <a:t>, </a:t>
+            </a:r>
+            <a:r>
+              <a:rPr lang="zh-CN" altLang="en-US">
+                <a:sym typeface="+mn-ea"/>
+              </a:rPr>
+              <a:t>Identify malicious, phishing, and fraudulent websites in real-time.</a:t>
+            </a:r>
+            <a:endParaRPr lang="zh-CN" altLang="en-US">
+              <a:sym typeface="+mn-ea"/>
+            </a:endParaRPr>
+          </a:p>
+          <a:p>
+            <a:endParaRPr lang="en-US" altLang="zh-CN">
+              <a:sym typeface="+mn-ea"/>
+            </a:endParaRPr>
+          </a:p>
+          <a:p>
+            <a:r>
+              <a:rPr lang="en-US" altLang="zh-CN">
+                <a:sym typeface="+mn-ea"/>
+              </a:rPr>
+              <a:t>C</a:t>
+            </a:r>
+            <a:r>
+              <a:rPr lang="zh-CN" altLang="en-US">
+                <a:sym typeface="+mn-ea"/>
+              </a:rPr>
+              <a:t>heck domain reputation based on massive Avast users voting</a:t>
+            </a:r>
+            <a:endParaRPr lang="zh-CN" altLang="en-US">
+              <a:sym typeface="+mn-ea"/>
+            </a:endParaRPr>
+          </a:p>
+          <a:p>
+            <a:endParaRPr lang="zh-CN" altLang="en-US"/>
+          </a:p>
           <a:p>
             <a:endParaRPr lang="zh-CN" altLang="en-US"/>
           </a:p>
@@ -5212,21 +5727,174 @@
           <a:p>
             <a:r>
               <a:rPr lang="en-US" altLang="zh-CN"/>
-              <a:t>Architecture overview</a:t>
+              <a:t>Feature overview</a:t>
             </a:r>
             <a:endParaRPr lang="en-US" altLang="zh-CN"/>
+          </a:p>
+        </p:txBody>
+      </p:sp>
+      <p:sp>
+        <p:nvSpPr>
+          <p:cNvPr id="3" name="内容占位符 2"/>
+          <p:cNvSpPr>
+            <a:spLocks noGrp="1"/>
+          </p:cNvSpPr>
+          <p:nvPr>
+            <p:ph idx="1"/>
+          </p:nvPr>
+        </p:nvSpPr>
+        <p:spPr>
+          <a:xfrm>
+            <a:off x="838200" y="1825625"/>
+            <a:ext cx="6501130" cy="3782060"/>
+          </a:xfrm>
+        </p:spPr>
+        <p:txBody>
+          <a:bodyPr/>
+          <a:p>
+            <a:pPr>
+              <a:buFont typeface="Wingdings" panose="05000000000000000000" charset="0"/>
+              <a:buChar char=""/>
+            </a:pPr>
+            <a:r>
+              <a:rPr lang="en-US" altLang="zh-CN" sz="2600"/>
+              <a:t>C</a:t>
+            </a:r>
+            <a:r>
+              <a:rPr lang="zh-CN" altLang="en-US" sz="2600"/>
+              <a:t>heck </a:t>
+            </a:r>
+            <a:r>
+              <a:rPr lang="en-US" altLang="zh-CN" sz="2600" b="1"/>
+              <a:t>both </a:t>
+            </a:r>
+            <a:r>
+              <a:rPr lang="zh-CN" altLang="en-US" sz="2600"/>
+              <a:t>IP address </a:t>
+            </a:r>
+            <a:r>
+              <a:rPr lang="en-US" altLang="zh-CN" sz="2600"/>
+              <a:t>and </a:t>
+            </a:r>
+            <a:r>
+              <a:rPr lang="en-US" altLang="zh-CN" sz="2600">
+                <a:sym typeface="+mn-ea"/>
+              </a:rPr>
+              <a:t>whole </a:t>
+            </a:r>
+            <a:r>
+              <a:rPr lang="zh-CN" altLang="en-US" sz="2600">
+                <a:sym typeface="+mn-ea"/>
+              </a:rPr>
+              <a:t>U</a:t>
+            </a:r>
+            <a:r>
+              <a:rPr lang="en-US" altLang="zh-CN" sz="2600">
+                <a:sym typeface="+mn-ea"/>
+              </a:rPr>
+              <a:t>rl.</a:t>
+            </a:r>
+            <a:endParaRPr lang="en-US" altLang="zh-CN" sz="2600"/>
+          </a:p>
+          <a:p>
+            <a:pPr>
+              <a:buFont typeface="Wingdings" panose="05000000000000000000" charset="0"/>
+              <a:buChar char=""/>
+            </a:pPr>
+            <a:r>
+              <a:rPr lang="zh-CN" altLang="en-US" sz="2600">
+                <a:sym typeface="+mn-ea"/>
+              </a:rPr>
+              <a:t>Identify malicious, phishing, fraudulent websites in </a:t>
+            </a:r>
+            <a:r>
+              <a:rPr lang="zh-CN" altLang="en-US" sz="2600" b="1">
+                <a:sym typeface="+mn-ea"/>
+              </a:rPr>
+              <a:t>real-time.</a:t>
+            </a:r>
+            <a:endParaRPr lang="zh-CN" altLang="en-US" sz="2600" b="1"/>
+          </a:p>
+          <a:p>
+            <a:pPr>
+              <a:buFont typeface="Wingdings" panose="05000000000000000000" charset="0"/>
+              <a:buChar char=""/>
+            </a:pPr>
+            <a:r>
+              <a:rPr lang="en-US" altLang="zh-CN" sz="2600"/>
+              <a:t>C</a:t>
+            </a:r>
+            <a:r>
+              <a:rPr lang="zh-CN" altLang="en-US" sz="2600"/>
+              <a:t>heck domain </a:t>
+            </a:r>
+            <a:r>
+              <a:rPr lang="zh-CN" altLang="en-US" sz="2600" b="1"/>
+              <a:t>reputation</a:t>
+            </a:r>
+            <a:r>
+              <a:rPr lang="en-US" altLang="zh-CN" sz="2600"/>
+              <a:t>.</a:t>
+            </a:r>
+            <a:endParaRPr lang="zh-CN" altLang="en-US" sz="2600"/>
+          </a:p>
+          <a:p>
+            <a:pPr>
+              <a:buFont typeface="Wingdings" panose="05000000000000000000" charset="0"/>
+              <a:buChar char=""/>
+            </a:pPr>
+            <a:r>
+              <a:rPr lang="en-US" altLang="zh-CN" sz="2600"/>
+              <a:t>C</a:t>
+            </a:r>
+            <a:r>
+              <a:rPr lang="zh-CN" altLang="en-US" sz="2600"/>
+              <a:t>loud frontend </a:t>
+            </a:r>
+            <a:r>
+              <a:rPr lang="en-US" altLang="zh-CN" sz="2600"/>
+              <a:t>of Avast VPS </a:t>
+            </a:r>
+            <a:r>
+              <a:rPr lang="en-US" altLang="zh-CN" sz="2600">
+                <a:sym typeface="+mn-ea"/>
+              </a:rPr>
+              <a:t>engine</a:t>
+            </a:r>
+            <a:r>
+              <a:rPr lang="en-US" altLang="zh-CN" sz="2600"/>
+              <a:t>.</a:t>
+            </a:r>
+            <a:endParaRPr lang="zh-CN" altLang="en-US" sz="2600"/>
+          </a:p>
+          <a:p>
+            <a:pPr>
+              <a:buFont typeface="Wingdings" panose="05000000000000000000" charset="0"/>
+              <a:buChar char=""/>
+            </a:pPr>
+            <a:r>
+              <a:rPr lang="en-US" altLang="zh-CN" sz="2600"/>
+              <a:t>P</a:t>
+            </a:r>
+            <a:r>
+              <a:rPr lang="zh-CN" altLang="en-US" sz="2600"/>
+              <a:t>rovide simple HTTPS API for integration</a:t>
+            </a:r>
+            <a:r>
+              <a:rPr lang="en-US" altLang="zh-CN" sz="2600"/>
+              <a:t>. Multi-proto support.</a:t>
+            </a:r>
+            <a:endParaRPr lang="en-US" altLang="zh-CN" sz="2600"/>
           </a:p>
         </p:txBody>
       </p:sp>
       <p:pic>
         <p:nvPicPr>
-          <p:cNvPr id="5" name="内容占位符 4" descr="urlinfo-structure"/>
+          <p:cNvPr id="7" name="图片 6" descr="urlinfo-structure-s"/>
           <p:cNvPicPr>
             <a:picLocks noChangeAspect="1"/>
           </p:cNvPicPr>
-          <p:nvPr>
-            <p:ph idx="1"/>
-          </p:nvPr>
+          <p:nvPr/>
         </p:nvPicPr>
         <p:blipFill>
           <a:blip r:embed="rId1"/>
@@ -5236,8 +5904,8 @@
         </p:blipFill>
         <p:spPr>
           <a:xfrm>
-            <a:off x="1832610" y="1483995"/>
-            <a:ext cx="7825740" cy="5035550"/>
+            <a:off x="6635750" y="1825625"/>
+            <a:ext cx="5055870" cy="4276725"/>
           </a:xfrm>
           <a:prstGeom prst="rect">
             <a:avLst/>
@@ -5286,7 +5954,7 @@
           <a:p>
             <a:r>
               <a:rPr lang="en-US" altLang="zh-CN"/>
-              <a:t>Feature: scan Urls for all threats</a:t>
+              <a:t>Our advantages</a:t>
             </a:r>
             <a:endParaRPr lang="en-US" altLang="zh-CN"/>
           </a:p>
@@ -5305,87 +5973,187 @@
         <p:spPr>
           <a:xfrm>
             <a:off x="838200" y="1825625"/>
-            <a:ext cx="10515600" cy="3782060"/>
+            <a:ext cx="11059160" cy="4351655"/>
           </a:xfrm>
         </p:spPr>
         <p:txBody>
           <a:bodyPr/>
           <a:p>
-            <a:pPr>
-              <a:buFont typeface="Wingdings" panose="05000000000000000000" charset="0"/>
-              <a:buChar char=""/>
-            </a:pPr>
-            <a:r>
-              <a:rPr lang="en-US" altLang="zh-CN"/>
-              <a:t>C</a:t>
-            </a:r>
-            <a:r>
-              <a:rPr lang="zh-CN" altLang="en-US"/>
-              <a:t>heck </a:t>
-            </a:r>
-            <a:r>
-              <a:rPr lang="en-US" altLang="zh-CN" b="1"/>
-              <a:t>both </a:t>
-            </a:r>
-            <a:r>
-              <a:rPr lang="zh-CN" altLang="en-US"/>
-              <a:t>IP address </a:t>
-            </a:r>
-            <a:r>
-              <a:rPr lang="en-US" altLang="zh-CN"/>
-              <a:t>and </a:t>
+            <a:r>
+              <a:rPr lang="zh-CN" altLang="en-US" b="1">
+                <a:sym typeface="+mn-ea"/>
+              </a:rPr>
+              <a:t>1</a:t>
+            </a:r>
+            <a:r>
+              <a:rPr lang="en-US" altLang="zh-CN" b="1">
+                <a:sym typeface="+mn-ea"/>
+              </a:rPr>
+              <a:t>0+</a:t>
+            </a:r>
+            <a:r>
+              <a:rPr lang="zh-CN" altLang="en-US" b="1">
+                <a:sym typeface="+mn-ea"/>
+              </a:rPr>
+              <a:t> million</a:t>
+            </a:r>
+            <a:r>
+              <a:rPr lang="zh-CN" altLang="en-US">
+                <a:sym typeface="+mn-ea"/>
+              </a:rPr>
+              <a:t> </a:t>
             </a:r>
             <a:r>
               <a:rPr lang="en-US" altLang="zh-CN">
                 <a:sym typeface="+mn-ea"/>
               </a:rPr>
-              <a:t>whole </a:t>
+              <a:t>harmful</a:t>
             </a:r>
             <a:r>
               <a:rPr lang="zh-CN" altLang="en-US">
                 <a:sym typeface="+mn-ea"/>
               </a:rPr>
-              <a:t>URL</a:t>
+              <a:t> URL </a:t>
             </a:r>
             <a:r>
               <a:rPr lang="en-US" altLang="zh-CN">
                 <a:sym typeface="+mn-ea"/>
               </a:rPr>
-              <a:t>.</a:t>
-            </a:r>
-            <a:endParaRPr lang="en-US" altLang="zh-CN"/>
-          </a:p>
-          <a:p>
-            <a:pPr>
-              <a:buFont typeface="Wingdings" panose="05000000000000000000" charset="0"/>
-              <a:buChar char=""/>
-            </a:pPr>
+              <a:t>fingerprints from </a:t>
+            </a:r>
             <a:r>
               <a:rPr lang="zh-CN" altLang="en-US">
                 <a:sym typeface="+mn-ea"/>
               </a:rPr>
-              <a:t>Identify malicious, phishing, fraudulent websites in </a:t>
+              <a:t>Avast </a:t>
+            </a:r>
+            <a:r>
+              <a:rPr lang="en-US" altLang="zh-CN">
+                <a:sym typeface="+mn-ea"/>
+              </a:rPr>
+              <a:t>ourself </a:t>
+            </a:r>
+            <a:r>
+              <a:rPr lang="zh-CN" altLang="en-US">
+                <a:sym typeface="+mn-ea"/>
+              </a:rPr>
+              <a:t>ThreatLab</a:t>
+            </a:r>
+            <a:r>
+              <a:rPr lang="en-US" altLang="zh-CN">
+                <a:sym typeface="+mn-ea"/>
+              </a:rPr>
+              <a:t>.</a:t>
+            </a:r>
+            <a:endParaRPr lang="en-US" altLang="zh-CN">
+              <a:sym typeface="+mn-ea"/>
+            </a:endParaRPr>
+          </a:p>
+          <a:p>
+            <a:r>
+              <a:rPr lang="en-US" altLang="zh-CN" b="1">
+                <a:sym typeface="+mn-ea"/>
+              </a:rPr>
+              <a:t>M</a:t>
             </a:r>
             <a:r>
               <a:rPr lang="zh-CN" altLang="en-US" b="1">
                 <a:sym typeface="+mn-ea"/>
               </a:rPr>
-              <a:t>real-time.</a:t>
-            </a:r>
-            <a:endParaRPr lang="zh-CN" altLang="en-US" b="1"/>
-          </a:p>
-          <a:p>
-            <a:pPr>
-              <a:buFont typeface="Wingdings" panose="05000000000000000000" charset="0"/>
-              <a:buChar char=""/>
-            </a:pPr>
+              <a:t>ultiple </a:t>
+            </a:r>
+            <a:r>
+              <a:rPr lang="en-US" altLang="zh-CN" b="1">
+                <a:sym typeface="+mn-ea"/>
+              </a:rPr>
+              <a:t>URL fingerprint feeds.</a:t>
+            </a:r>
+            <a:endParaRPr lang="en-US" altLang="zh-CN" b="1">
+              <a:sym typeface="+mn-ea"/>
+            </a:endParaRPr>
+          </a:p>
+          <a:p>
+            <a:r>
+              <a:t>Distributed service</a:t>
+            </a:r>
+            <a:r>
+              <a:rPr lang="zh-CN" altLang="en-US"/>
+              <a:t>. </a:t>
+            </a:r>
+            <a:r>
+              <a:rPr lang="en-US" altLang="zh-CN" b="1"/>
+              <a:t>multiple DC</a:t>
+            </a:r>
             <a:r>
               <a:rPr lang="en-US" altLang="zh-CN"/>
-              <a:t>C</a:t>
+              <a:t>. </a:t>
+            </a:r>
+            <a:r>
+              <a:rPr lang="en-US" altLang="zh-CN">
+                <a:sym typeface="+mn-ea"/>
+              </a:rPr>
+              <a:t>GEO optimized. </a:t>
+            </a:r>
+            <a:endParaRPr lang="zh-CN" altLang="en-US"/>
+          </a:p>
+          <a:p>
+            <a:r>
+              <a:rPr lang="en-US" altLang="zh-CN"/>
+              <a:t>H</a:t>
             </a:r>
             <a:r>
               <a:rPr lang="zh-CN" altLang="en-US"/>
-              <a:t>heck domain reputation</a:t>
+              <a:t>igh performance</a:t>
+            </a:r>
+            <a:r>
+              <a:rPr lang="en-US" altLang="zh-CN"/>
+              <a:t>. RT at </a:t>
+            </a:r>
+            <a:r>
+              <a:rPr lang="en-US" altLang="zh-CN" b="1"/>
+              <a:t>minisecond </a:t>
+            </a:r>
+            <a:r>
+              <a:rPr lang="en-US" altLang="zh-CN"/>
+              <a:t>level.</a:t>
+            </a:r>
+            <a:endParaRPr lang="en-US" altLang="zh-CN"/>
+          </a:p>
+          <a:p>
+            <a:r>
+              <a:rPr lang="en-US" altLang="zh-CN">
+                <a:sym typeface="+mn-ea"/>
+              </a:rPr>
+              <a:t>H</a:t>
+            </a:r>
+            <a:r>
+              <a:rPr lang="zh-CN" altLang="en-US">
+                <a:sym typeface="+mn-ea"/>
+              </a:rPr>
+              <a:t>igh accuracy, </a:t>
+            </a:r>
+            <a:r>
+              <a:rPr lang="en-US" altLang="zh-CN" b="1">
+                <a:sym typeface="+mn-ea"/>
+              </a:rPr>
+              <a:t>local optimized </a:t>
+            </a:r>
+            <a:r>
+              <a:rPr lang="en-US" altLang="zh-CN">
+                <a:sym typeface="+mn-ea"/>
+              </a:rPr>
+              <a:t>feed sources.</a:t>
+            </a:r>
+            <a:endParaRPr lang="zh-CN" altLang="en-US"/>
+          </a:p>
+          <a:p>
+            <a:r>
+              <a:rPr lang="zh-CN" altLang="en-US" b="1"/>
+              <a:t>Local </a:t>
+            </a:r>
+            <a:r>
+              <a:rPr lang="zh-CN" altLang="en-US"/>
+              <a:t>OEM support team</a:t>
             </a:r>
             <a:r>
               <a:rPr lang="en-US" altLang="zh-CN"/>
@@ -5394,69 +6162,49 @@
             <a:endParaRPr lang="zh-CN" altLang="en-US"/>
           </a:p>
           <a:p>
-            <a:pPr>
-              <a:buFont typeface="Wingdings" panose="05000000000000000000" charset="0"/>
-              <a:buChar char=""/>
-            </a:pPr>
-            <a:r>
-              <a:rPr lang="en-US" altLang="zh-CN"/>
-              <a:t>C</a:t>
-            </a:r>
-            <a:r>
-              <a:rPr lang="zh-CN" altLang="en-US"/>
-              <a:t>loud service frontend</a:t>
-            </a:r>
-            <a:r>
-              <a:rPr lang="en-US" altLang="zh-CN"/>
-              <a:t>.</a:t>
+            <a:r>
+              <a:rPr lang="en-US" altLang="zh-CN">
+                <a:sym typeface="+mn-ea"/>
+              </a:rPr>
+              <a:t>M</a:t>
+            </a:r>
+            <a:r>
+              <a:rPr lang="zh-CN" altLang="en-US">
+                <a:sym typeface="+mn-ea"/>
+              </a:rPr>
+              <a:t>alicious feeds </a:t>
+            </a:r>
+            <a:r>
+              <a:rPr lang="zh-CN" altLang="en-US" b="1">
+                <a:sym typeface="+mn-ea"/>
+              </a:rPr>
+              <a:t>real time update</a:t>
+            </a:r>
+            <a:r>
+              <a:rPr lang="zh-CN" altLang="en-US">
+                <a:sym typeface="+mn-ea"/>
+              </a:rPr>
+              <a:t>, </a:t>
+            </a:r>
+            <a:r>
+              <a:rPr lang="en-US" altLang="zh-CN">
+                <a:sym typeface="+mn-ea"/>
+              </a:rPr>
+              <a:t>at </a:t>
+            </a:r>
+            <a:r>
+              <a:rPr lang="zh-CN" altLang="en-US">
+                <a:sym typeface="+mn-ea"/>
+              </a:rPr>
+              <a:t>second level.</a:t>
             </a:r>
             <a:endParaRPr lang="zh-CN" altLang="en-US"/>
           </a:p>
           <a:p>
-            <a:pPr>
-              <a:buFont typeface="Wingdings" panose="05000000000000000000" charset="0"/>
-              <a:buChar char=""/>
-            </a:pPr>
-            <a:r>
-              <a:rPr lang="en-US" altLang="zh-CN"/>
-              <a:t>P</a:t>
-            </a:r>
-            <a:r>
-              <a:rPr lang="zh-CN" altLang="en-US"/>
-              <a:t>rovide simple HTTPS API for integration</a:t>
-            </a:r>
-            <a:r>
-              <a:rPr lang="en-US" altLang="zh-CN"/>
-              <a:t>.         Multi-proto.</a:t>
-            </a:r>
             <a:endParaRPr lang="en-US" altLang="zh-CN"/>
           </a:p>
         </p:txBody>
       </p:sp>
-      <p:pic>
-        <p:nvPicPr>
-          <p:cNvPr id="4" name="图片 3" descr="inspector"/>
-          <p:cNvPicPr>
-            <a:picLocks noChangeAspect="1"/>
-          </p:cNvPicPr>
-          <p:nvPr/>
-        </p:nvPicPr>
-        <p:blipFill>
-          <a:blip r:embed="rId1"/>
-          <a:stretch>
-            <a:fillRect/>
-          </a:stretch>
-        </p:blipFill>
-        <p:spPr>
-          <a:xfrm>
-            <a:off x="6790055" y="2441575"/>
-            <a:ext cx="3048000" cy="4308475"/>
-          </a:xfrm>
-          <a:prstGeom prst="rect">
-            <a:avLst/>
-          </a:prstGeom>
-        </p:spPr>
-      </p:pic>
     </p:spTree>
   </p:cSld>
   <p:clrMapOvr>
@@ -5485,231 +6233,6 @@
       <p:grpSpPr/>
       <p:sp>
         <p:nvSpPr>
-          <p:cNvPr id="2" name="标题 1"/>
-          <p:cNvSpPr>
-            <a:spLocks noGrp="1"/>
-          </p:cNvSpPr>
-          <p:nvPr>
-            <p:ph type="title"/>
-          </p:nvPr>
-        </p:nvSpPr>
-        <p:spPr/>
-        <p:txBody>
-          <a:bodyPr/>
-          <a:p>
-            <a:r>
-              <a:rPr lang="en-US" altLang="zh-CN"/>
-              <a:t>Our advantages</a:t>
-            </a:r>
-            <a:endParaRPr lang="en-US" altLang="zh-CN"/>
-          </a:p>
-        </p:txBody>
-      </p:sp>
-      <p:sp>
-        <p:nvSpPr>
-          <p:cNvPr id="3" name="内容占位符 2"/>
-          <p:cNvSpPr>
-            <a:spLocks noGrp="1"/>
-          </p:cNvSpPr>
-          <p:nvPr>
-            <p:ph idx="1"/>
-          </p:nvPr>
-        </p:nvSpPr>
-        <p:spPr/>
-        <p:txBody>
-          <a:bodyPr/>
-          <a:p>
-            <a:r>
-              <a:t>Distributed service</a:t>
-            </a:r>
-            <a:r>
-              <a:rPr lang="zh-CN" altLang="en-US"/>
-              <a:t>. </a:t>
-            </a:r>
-            <a:r>
-              <a:rPr lang="en-US" altLang="zh-CN"/>
-              <a:t>multiple DC.</a:t>
-            </a:r>
-            <a:endParaRPr lang="zh-CN" altLang="en-US"/>
-          </a:p>
-          <a:p>
-            <a:r>
-              <a:rPr lang="en-US" altLang="zh-CN"/>
-              <a:t>H</a:t>
-            </a:r>
-            <a:r>
-              <a:rPr lang="zh-CN" altLang="en-US"/>
-              <a:t>igh performance</a:t>
-            </a:r>
-            <a:r>
-              <a:rPr lang="en-US" altLang="zh-CN"/>
-              <a:t>. GEO optimized. RT at Minisecond level.</a:t>
-            </a:r>
-            <a:endParaRPr lang="en-US" altLang="zh-CN"/>
-          </a:p>
-          <a:p>
-            <a:r>
-              <a:rPr lang="zh-CN" altLang="en-US"/>
-              <a:t>Local OEM support team</a:t>
-            </a:r>
-            <a:r>
-              <a:rPr lang="en-US" altLang="zh-CN"/>
-              <a:t>.</a:t>
-            </a:r>
-            <a:endParaRPr lang="zh-CN" altLang="en-US"/>
-          </a:p>
-          <a:p>
-            <a:r>
-              <a:rPr lang="en-US" altLang="zh-CN">
-                <a:sym typeface="+mn-ea"/>
-              </a:rPr>
-              <a:t>M</a:t>
-            </a:r>
-            <a:r>
-              <a:rPr lang="zh-CN" altLang="en-US">
-                <a:sym typeface="+mn-ea"/>
-              </a:rPr>
-              <a:t>ultiple </a:t>
-            </a:r>
-            <a:r>
-              <a:rPr lang="en-US" altLang="zh-CN">
-                <a:sym typeface="+mn-ea"/>
-              </a:rPr>
-              <a:t>feed </a:t>
-            </a:r>
-            <a:r>
-              <a:rPr lang="zh-CN" altLang="en-US">
-                <a:sym typeface="+mn-ea"/>
-              </a:rPr>
-              <a:t>sources, </a:t>
-            </a:r>
-            <a:r>
-              <a:rPr lang="en-US">
-                <a:sym typeface="+mn-ea"/>
-              </a:rPr>
-              <a:t>not only</a:t>
-            </a:r>
-            <a:r>
-              <a:rPr lang="zh-CN" altLang="en-US">
-                <a:sym typeface="+mn-ea"/>
-              </a:rPr>
-              <a:t> from Avast ThreatLab</a:t>
-            </a:r>
-            <a:r>
-              <a:rPr lang="en-US">
-                <a:sym typeface="+mn-ea"/>
-              </a:rPr>
-              <a:t>.</a:t>
-            </a:r>
-            <a:endParaRPr lang="zh-CN" altLang="en-US"/>
-          </a:p>
-          <a:p>
-            <a:r>
-              <a:rPr lang="en-US" altLang="zh-CN">
-                <a:sym typeface="+mn-ea"/>
-              </a:rPr>
-              <a:t>H</a:t>
-            </a:r>
-            <a:r>
-              <a:rPr lang="zh-CN" altLang="en-US">
-                <a:sym typeface="+mn-ea"/>
-              </a:rPr>
-              <a:t>igh accuracy,</a:t>
-            </a:r>
-            <a:r>
-              <a:rPr lang="zh-CN" altLang="en-US">
-                <a:sym typeface="+mn-ea"/>
-              </a:rPr>
-              <a:t> </a:t>
-            </a:r>
-            <a:r>
-              <a:rPr lang="en-US" altLang="zh-CN">
-                <a:sym typeface="+mn-ea"/>
-              </a:rPr>
-              <a:t>local feed sources.</a:t>
-            </a:r>
-            <a:endParaRPr lang="zh-CN" altLang="en-US"/>
-          </a:p>
-          <a:p>
-            <a:r>
-              <a:rPr lang="en-US" altLang="zh-CN"/>
-              <a:t>M</a:t>
-            </a:r>
-            <a:r>
-              <a:rPr lang="zh-CN" altLang="en-US"/>
-              <a:t>alicious feeds real time update, </a:t>
-            </a:r>
-            <a:r>
-              <a:rPr lang="en-US" altLang="zh-CN"/>
-              <a:t>at</a:t>
-            </a:r>
-            <a:r>
-              <a:rPr lang="en-US" altLang="zh-CN"/>
-              <a:t> </a:t>
-            </a:r>
-            <a:r>
-              <a:rPr lang="zh-CN" altLang="en-US"/>
-              <a:t>second level.</a:t>
-            </a:r>
-            <a:endParaRPr lang="zh-CN" altLang="en-US"/>
-          </a:p>
-          <a:p>
-            <a:r>
-              <a:rPr lang="zh-CN" altLang="en-US"/>
-              <a:t>1</a:t>
-            </a:r>
-            <a:r>
-              <a:rPr lang="en-US" altLang="zh-CN"/>
-              <a:t>0+</a:t>
-            </a:r>
-            <a:r>
-              <a:rPr lang="zh-CN" altLang="en-US"/>
-              <a:t> million </a:t>
-            </a:r>
-            <a:r>
-              <a:rPr lang="en-US" altLang="zh-CN"/>
-              <a:t>harmful</a:t>
-            </a:r>
-            <a:r>
-              <a:rPr lang="zh-CN" altLang="en-US"/>
-              <a:t> URL </a:t>
-            </a:r>
-            <a:r>
-              <a:rPr lang="en-US" altLang="zh-CN"/>
-              <a:t>fingerprints.</a:t>
-            </a:r>
-            <a:endParaRPr lang="en-US" altLang="zh-CN"/>
-          </a:p>
-        </p:txBody>
-      </p:sp>
-    </p:spTree>
-  </p:cSld>
-  <p:clrMapOvr>
-    <a:masterClrMapping/>
-  </p:clrMapOvr>
-  <mc:AlternateContent xmlns:mc="http://schemas.openxmlformats.org/markup-compatibility/2006">
-    <mc:Choice xmlns:p14="http://schemas.microsoft.com/office/powerpoint/2010/main" Requires="p14">
-      <p:transition p14:dur="500"/>
-    </mc:Choice>
-    <mc:Fallback>
-      <p:transition/>
-    </mc:Fallback>
-  </mc:AlternateContent>
-</p:sld>
-</file>
-
-<file path=ppt/slides/slide14.xml><?xml version="1.0" encoding="utf-8"?>
-<p:sld xmlns:a="http://schemas.openxmlformats.org/drawingml/2006/main" xmlns:r="http://schemas.openxmlformats.org/officeDocument/2006/relationships" xmlns:p="http://schemas.openxmlformats.org/presentationml/2006/main">
-  <p:cSld>
-    <p:spTree>
-      <p:nvGrpSpPr>
-        <p:cNvPr id="1" name=""/>
-        <p:cNvGrpSpPr/>
-        <p:nvPr/>
-      </p:nvGrpSpPr>
-      <p:grpSpPr/>
-      <p:sp>
-        <p:nvSpPr>
           <p:cNvPr id="10" name="文本框 9"/>
           <p:cNvSpPr txBox="1"/>
           <p:nvPr/>
@@ -5792,12 +6315,44 @@
           </a:p>
           <a:p>
             <a:r>
+              <a:rPr lang="en-US" altLang="zh-CN">
+                <a:solidFill>
+                  <a:srgbClr val="FF923F"/>
+                </a:solidFill>
+              </a:rPr>
+              <a:t>What can it help me? What b</a:t>
+            </a:r>
+            <a:r>
               <a:rPr lang="zh-CN" altLang="en-US">
                 <a:solidFill>
                   <a:srgbClr val="FF923F"/>
                 </a:solidFill>
               </a:rPr>
-              <a:t>Benefits come with the service</a:t>
+              <a:t>enefits come with </a:t>
+            </a:r>
+            <a:r>
+              <a:rPr lang="en-US" altLang="zh-CN">
+                <a:solidFill>
+                  <a:srgbClr val="FF923F"/>
+                </a:solidFill>
+              </a:rPr>
+              <a:t>this</a:t>
+            </a:r>
+            <a:r>
+              <a:rPr lang="zh-CN" altLang="en-US">
+                <a:solidFill>
+                  <a:srgbClr val="FF923F"/>
+                </a:solidFill>
+              </a:rPr>
+              <a:t> service</a:t>
+            </a:r>
+            <a:r>
+              <a:rPr lang="en-US" altLang="zh-CN">
+                <a:solidFill>
+                  <a:srgbClr val="FF923F"/>
+                </a:solidFill>
+              </a:rPr>
+              <a:t>?</a:t>
             </a:r>
             <a:endParaRPr lang="zh-CN" altLang="en-US"/>
           </a:p>
@@ -5908,7 +6463,7 @@
 </p:sld>
 </file>
 
-<file path=ppt/slides/slide15.xml><?xml version="1.0" encoding="utf-8"?>
+<file path=ppt/slides/slide14.xml><?xml version="1.0" encoding="utf-8"?>
 <p:sld xmlns:a="http://schemas.openxmlformats.org/drawingml/2006/main" xmlns:r="http://schemas.openxmlformats.org/officeDocument/2006/relationships" xmlns:p="http://schemas.openxmlformats.org/presentationml/2006/main">
   <p:cSld>
     <p:spTree>
@@ -5961,6 +6516,9 @@
             <a:normAutofit/>
           </a:bodyPr>
           <a:p>
+            <a:pPr marL="514350" indent="-514350">
+              <a:buAutoNum type="arabicPeriod"/>
+            </a:pPr>
             <a:r>
               <a:rPr lang="zh-CN" altLang="en-US"/>
               <a:t>Client side web access hardening</a:t>
@@ -5972,6 +6530,9 @@
             <a:endParaRPr lang="zh-CN" altLang="en-US"/>
           </a:p>
           <a:p>
+            <a:pPr marL="514350" indent="-514350">
+              <a:buAutoNum type="arabicPeriod"/>
+            </a:pPr>
             <a:r>
               <a:rPr lang="zh-CN" altLang="en-US"/>
               <a:t>Mobile application hardening</a:t>
@@ -5987,6 +6548,9 @@
             <a:endParaRPr lang="zh-CN" altLang="en-US"/>
           </a:p>
           <a:p>
+            <a:pPr marL="514350" indent="-514350">
+              <a:buAutoNum type="arabicPeriod"/>
+            </a:pPr>
             <a:r>
               <a:rPr lang="en-US" altLang="zh-CN"/>
               <a:t>U</a:t>
@@ -6009,11 +6573,14 @@
             </a:r>
             <a:r>
               <a:rPr lang="en-US" altLang="zh-CN"/>
-              <a:t>)</a:t>
+              <a:t>, IM)</a:t>
             </a:r>
             <a:endParaRPr lang="zh-CN" altLang="en-US"/>
           </a:p>
           <a:p>
+            <a:pPr marL="514350" indent="-514350">
+              <a:buAutoNum type="arabicPeriod"/>
+            </a:pPr>
             <a:r>
               <a:rPr lang="en-US" altLang="zh-CN"/>
               <a:t>S</a:t>
@@ -6025,6 +6592,9 @@
             <a:endParaRPr lang="zh-CN" altLang="en-US"/>
           </a:p>
           <a:p>
+            <a:pPr marL="514350" indent="-514350">
+              <a:buAutoNum type="arabicPeriod"/>
+            </a:pPr>
             <a:endParaRPr lang="zh-CN" altLang="en-US"/>
           </a:p>
         </p:txBody>
@@ -6066,13 +6636,73 @@
               <a:rPr lang="en-US" altLang="zh-CN" sz="2600">
                 <a:sym typeface="+mn-ea"/>
               </a:rPr>
-              <a:t>and</a:t>
+              <a:t>any</a:t>
             </a:r>
             <a:r>
               <a:rPr lang="zh-CN" altLang="en-US" sz="2600">
                 <a:sym typeface="+mn-ea"/>
               </a:rPr>
-              <a:t> Endpoints, Network Appliances, and Cloud Infrastructure</a:t>
+              <a:t> </a:t>
+            </a:r>
+            <a:r>
+              <a:rPr lang="en-US" altLang="zh-CN" sz="2600">
+                <a:sym typeface="+mn-ea"/>
+              </a:rPr>
+              <a:t>e</a:t>
+            </a:r>
+            <a:r>
+              <a:rPr lang="zh-CN" altLang="en-US" sz="2600">
+                <a:sym typeface="+mn-ea"/>
+              </a:rPr>
+              <a:t>ndpoints, </a:t>
+            </a:r>
+            <a:r>
+              <a:rPr lang="en-US" altLang="zh-CN" sz="2600">
+                <a:sym typeface="+mn-ea"/>
+              </a:rPr>
+              <a:t>n</a:t>
+            </a:r>
+            <a:r>
+              <a:rPr lang="zh-CN" altLang="en-US" sz="2600">
+                <a:sym typeface="+mn-ea"/>
+              </a:rPr>
+              <a:t>etwork </a:t>
+            </a:r>
+            <a:r>
+              <a:rPr lang="en-US" altLang="zh-CN" sz="2600">
+                <a:sym typeface="+mn-ea"/>
+              </a:rPr>
+              <a:t>a</a:t>
+            </a:r>
+            <a:r>
+              <a:rPr lang="zh-CN" altLang="en-US" sz="2600">
+                <a:sym typeface="+mn-ea"/>
+              </a:rPr>
+              <a:t>ppliances, and </a:t>
+            </a:r>
+            <a:r>
+              <a:rPr lang="en-US" altLang="zh-CN" sz="2600">
+                <a:sym typeface="+mn-ea"/>
+              </a:rPr>
+              <a:t>c</a:t>
+            </a:r>
+            <a:r>
+              <a:rPr lang="zh-CN" altLang="en-US" sz="2600">
+                <a:sym typeface="+mn-ea"/>
+              </a:rPr>
+              <a:t>loud </a:t>
+            </a:r>
+            <a:r>
+              <a:rPr lang="en-US" altLang="zh-CN" sz="2600">
+                <a:sym typeface="+mn-ea"/>
+              </a:rPr>
+              <a:t>i</a:t>
+            </a:r>
+            <a:r>
+              <a:rPr lang="zh-CN" altLang="en-US" sz="2600">
+                <a:sym typeface="+mn-ea"/>
+              </a:rPr>
+              <a:t>nfrastructure</a:t>
             </a:r>
             <a:r>
               <a:rPr lang="en-US" altLang="zh-CN" sz="2600">
@@ -6088,7 +6718,7 @@
       </p:sp>
       <p:pic>
         <p:nvPicPr>
-          <p:cNvPr id="5" name="图片 4" descr="browser"/>
+          <p:cNvPr id="13" name="图片 12" descr="sms"/>
           <p:cNvPicPr>
             <a:picLocks noChangeAspect="1"/>
           </p:cNvPicPr>
@@ -6102,65 +6732,80 @@
         </p:blipFill>
         <p:spPr>
           <a:xfrm>
-            <a:off x="3652520" y="5310505"/>
-            <a:ext cx="3566795" cy="710565"/>
+            <a:off x="3768090" y="5302250"/>
+            <a:ext cx="800100" cy="800100"/>
           </a:xfrm>
           <a:prstGeom prst="rect">
             <a:avLst/>
           </a:prstGeom>
         </p:spPr>
       </p:pic>
+      <p:grpSp>
+        <p:nvGrpSpPr>
+          <p:cNvPr id="10" name="组合 9"/>
+          <p:cNvGrpSpPr/>
+          <p:nvPr/>
+        </p:nvGrpSpPr>
+        <p:grpSpPr>
+          <a:xfrm>
+            <a:off x="9127490" y="5547995"/>
+            <a:ext cx="2604770" cy="486410"/>
+            <a:chOff x="836" y="8607"/>
+            <a:chExt cx="4102" cy="766"/>
+          </a:xfrm>
+        </p:grpSpPr>
+        <p:pic>
+          <p:nvPicPr>
+            <p:cNvPr id="9" name="图片 8" descr="google"/>
+            <p:cNvPicPr>
+              <a:picLocks noChangeAspect="1"/>
+            </p:cNvPicPr>
+            <p:nvPr/>
+          </p:nvPicPr>
+          <p:blipFill>
+            <a:blip r:embed="rId2"/>
+            <a:stretch>
+              <a:fillRect/>
+            </a:stretch>
+          </p:blipFill>
+          <p:spPr>
+            <a:xfrm>
+              <a:off x="836" y="8607"/>
+              <a:ext cx="2264" cy="766"/>
+            </a:xfrm>
+            <a:prstGeom prst="rect">
+              <a:avLst/>
+            </a:prstGeom>
+          </p:spPr>
+        </p:pic>
+        <p:pic>
+          <p:nvPicPr>
+            <p:cNvPr id="14" name="图片 13" descr="yandex"/>
+            <p:cNvPicPr>
+              <a:picLocks noChangeAspect="1"/>
+            </p:cNvPicPr>
+            <p:nvPr/>
+          </p:nvPicPr>
+          <p:blipFill>
+            <a:blip r:embed="rId3"/>
+            <a:stretch>
+              <a:fillRect/>
+            </a:stretch>
+          </p:blipFill>
+          <p:spPr>
+            <a:xfrm>
+              <a:off x="3472" y="8613"/>
+              <a:ext cx="1467" cy="579"/>
+            </a:xfrm>
+            <a:prstGeom prst="rect">
+              <a:avLst/>
+            </a:prstGeom>
+          </p:spPr>
+        </p:pic>
+      </p:grpSp>
       <p:pic>
         <p:nvPicPr>
-          <p:cNvPr id="6" name="图片 5" descr="wikipedia1"/>
-          <p:cNvPicPr>
-            <a:picLocks noChangeAspect="1"/>
-          </p:cNvPicPr>
-          <p:nvPr/>
-        </p:nvPicPr>
-        <p:blipFill>
-          <a:blip r:embed="rId2"/>
-          <a:stretch>
-            <a:fillRect/>
-          </a:stretch>
-        </p:blipFill>
-        <p:spPr>
-          <a:xfrm>
-            <a:off x="9857105" y="5315585"/>
-            <a:ext cx="789940" cy="786765"/>
-          </a:xfrm>
-          <a:prstGeom prst="rect">
-            <a:avLst/>
-          </a:prstGeom>
-        </p:spPr>
-      </p:pic>
-      <p:pic>
-        <p:nvPicPr>
-          <p:cNvPr id="9" name="图片 8" descr="google"/>
-          <p:cNvPicPr>
-            <a:picLocks noChangeAspect="1"/>
-          </p:cNvPicPr>
-          <p:nvPr/>
-        </p:nvPicPr>
-        <p:blipFill>
-          <a:blip r:embed="rId3"/>
-          <a:stretch>
-            <a:fillRect/>
-          </a:stretch>
-        </p:blipFill>
-        <p:spPr>
-          <a:xfrm>
-            <a:off x="530860" y="5465445"/>
-            <a:ext cx="1437640" cy="486410"/>
-          </a:xfrm>
-          <a:prstGeom prst="rect">
-            <a:avLst/>
-          </a:prstGeom>
-        </p:spPr>
-      </p:pic>
-      <p:pic>
-        <p:nvPicPr>
-          <p:cNvPr id="11" name="图片 10" descr="WordPress-logotype-wmark"/>
+          <p:cNvPr id="7" name="图片 6" descr="browser"/>
           <p:cNvPicPr>
             <a:picLocks noChangeAspect="1"/>
           </p:cNvPicPr>
@@ -6174,86 +6819,125 @@
         </p:blipFill>
         <p:spPr>
           <a:xfrm>
-            <a:off x="9001760" y="5315585"/>
-            <a:ext cx="722630" cy="722630"/>
+            <a:off x="357505" y="5344160"/>
+            <a:ext cx="3007360" cy="730250"/>
           </a:xfrm>
           <a:prstGeom prst="rect">
             <a:avLst/>
           </a:prstGeom>
         </p:spPr>
       </p:pic>
-      <p:pic>
-        <p:nvPicPr>
-          <p:cNvPr id="13" name="图片 12" descr="sms"/>
-          <p:cNvPicPr>
-            <a:picLocks noChangeAspect="1"/>
-          </p:cNvPicPr>
+      <p:grpSp>
+        <p:nvGrpSpPr>
+          <p:cNvPr id="12" name="组合 11"/>
+          <p:cNvGrpSpPr/>
           <p:nvPr/>
-        </p:nvPicPr>
-        <p:blipFill>
-          <a:blip r:embed="rId5"/>
-          <a:stretch>
-            <a:fillRect/>
-          </a:stretch>
-        </p:blipFill>
-        <p:spPr>
+        </p:nvGrpSpPr>
+        <p:grpSpPr>
           <a:xfrm>
-            <a:off x="10895965" y="5265420"/>
-            <a:ext cx="800100" cy="800100"/>
+            <a:off x="5097780" y="5351780"/>
+            <a:ext cx="3433445" cy="849630"/>
+            <a:chOff x="9862" y="8272"/>
+            <a:chExt cx="5407" cy="1338"/>
           </a:xfrm>
-          <a:prstGeom prst="rect">
-            <a:avLst/>
-          </a:prstGeom>
-        </p:spPr>
-      </p:pic>
-      <p:pic>
-        <p:nvPicPr>
-          <p:cNvPr id="14" name="图片 13" descr="yandex"/>
-          <p:cNvPicPr>
-            <a:picLocks noChangeAspect="1"/>
-          </p:cNvPicPr>
-          <p:nvPr/>
-        </p:nvPicPr>
-        <p:blipFill>
-          <a:blip r:embed="rId6"/>
-          <a:stretch>
-            <a:fillRect/>
-          </a:stretch>
-        </p:blipFill>
-        <p:spPr>
-          <a:xfrm>
-            <a:off x="2204720" y="5493385"/>
-            <a:ext cx="931545" cy="367665"/>
-          </a:xfrm>
-          <a:prstGeom prst="rect">
-            <a:avLst/>
-          </a:prstGeom>
-        </p:spPr>
-      </p:pic>
-      <p:pic>
-        <p:nvPicPr>
-          <p:cNvPr id="15" name="图片 14" descr="Facebook"/>
-          <p:cNvPicPr>
-            <a:picLocks noChangeAspect="1"/>
-          </p:cNvPicPr>
-          <p:nvPr/>
-        </p:nvPicPr>
-        <p:blipFill>
-          <a:blip r:embed="rId7"/>
-          <a:stretch>
-            <a:fillRect/>
-          </a:stretch>
-        </p:blipFill>
-        <p:spPr>
-          <a:xfrm>
-            <a:off x="8143240" y="5315585"/>
-            <a:ext cx="641350" cy="641350"/>
-          </a:xfrm>
-          <a:prstGeom prst="rect">
-            <a:avLst/>
-          </a:prstGeom>
-        </p:spPr>
-      </p:pic>
+        </p:grpSpPr>
+        <p:pic>
+          <p:nvPicPr>
+            <p:cNvPr id="6" name="图片 5" descr="wikipedia1"/>
+            <p:cNvPicPr>
+              <a:picLocks noChangeAspect="1"/>
+            </p:cNvPicPr>
+            <p:nvPr/>
+          </p:nvPicPr>
+          <p:blipFill>
+            <a:blip r:embed="rId5"/>
+            <a:stretch>
+              <a:fillRect/>
+            </a:stretch>
+          </p:blipFill>
+          <p:spPr>
+            <a:xfrm>
+              <a:off x="11280" y="8372"/>
+              <a:ext cx="1244" cy="1239"/>
+            </a:xfrm>
+            <a:prstGeom prst="rect">
+              <a:avLst/>
+            </a:prstGeom>
+          </p:spPr>
+        </p:pic>
+        <p:pic>
+          <p:nvPicPr>
+            <p:cNvPr id="11" name="图片 10" descr="WordPress-logotype-wmark"/>
+            <p:cNvPicPr>
+              <a:picLocks noChangeAspect="1"/>
+            </p:cNvPicPr>
+            <p:nvPr/>
+          </p:nvPicPr>
+          <p:blipFill>
+            <a:blip r:embed="rId6"/>
+            <a:stretch>
+              <a:fillRect/>
+            </a:stretch>
+          </p:blipFill>
+          <p:spPr>
+            <a:xfrm>
+              <a:off x="9862" y="8272"/>
+              <a:ext cx="1138" cy="1138"/>
+            </a:xfrm>
+            <a:prstGeom prst="rect">
+              <a:avLst/>
+            </a:prstGeom>
+          </p:spPr>
+        </p:pic>
+        <p:pic>
+          <p:nvPicPr>
+            <p:cNvPr id="15" name="图片 14" descr="Facebook"/>
+            <p:cNvPicPr>
+              <a:picLocks noChangeAspect="1"/>
+            </p:cNvPicPr>
+            <p:nvPr/>
+          </p:nvPicPr>
+          <p:blipFill>
+            <a:blip r:embed="rId7"/>
+            <a:stretch>
+              <a:fillRect/>
+            </a:stretch>
+          </p:blipFill>
+          <p:spPr>
+            <a:xfrm>
+              <a:off x="12824" y="8371"/>
+              <a:ext cx="1010" cy="1010"/>
+            </a:xfrm>
+            <a:prstGeom prst="rect">
+              <a:avLst/>
+            </a:prstGeom>
+          </p:spPr>
+        </p:pic>
+        <p:pic>
+          <p:nvPicPr>
+            <p:cNvPr id="8" name="图片 7" descr="Skype_logo"/>
+            <p:cNvPicPr>
+              <a:picLocks noChangeAspect="1"/>
+            </p:cNvPicPr>
+            <p:nvPr/>
+          </p:nvPicPr>
+          <p:blipFill>
+            <a:blip r:embed="rId8"/>
+            <a:stretch>
+              <a:fillRect/>
+            </a:stretch>
+          </p:blipFill>
+          <p:spPr>
+            <a:xfrm>
+              <a:off x="14219" y="8342"/>
+              <a:ext cx="1051" cy="1068"/>
+            </a:xfrm>
+            <a:prstGeom prst="rect">
+              <a:avLst/>
+            </a:prstGeom>
+          </p:spPr>
+        </p:pic>
+      </p:grpSp>
     </p:spTree>
   </p:cSld>
   <p:clrMapOvr>
@@ -6270,7 +6954,7 @@
 </p:sld>
 </file>
 
-<file path=ppt/slides/slide16.xml><?xml version="1.0" encoding="utf-8"?>
+<file path=ppt/slides/slide15.xml><?xml version="1.0" encoding="utf-8"?>
 <p:sld xmlns:a="http://schemas.openxmlformats.org/drawingml/2006/main" xmlns:r="http://schemas.openxmlformats.org/officeDocument/2006/relationships" xmlns:p="http://schemas.openxmlformats.org/presentationml/2006/main">
   <p:cSld>
     <p:spTree>
@@ -6323,16 +7007,28 @@
             <a:normAutofit/>
           </a:bodyPr>
           <a:p>
+            <a:pPr marL="514350" indent="-514350">
+              <a:buFont typeface="+mj-lt"/>
+              <a:buAutoNum type="arabicPeriod" startAt="5"/>
+            </a:pPr>
             <a:r>
               <a:t>Firewall, router Url filtering.</a:t>
             </a:r>
           </a:p>
           <a:p>
+            <a:pPr marL="514350" indent="-514350">
+              <a:buFont typeface="+mj-lt"/>
+              <a:buAutoNum type="arabicPeriod" startAt="5"/>
+            </a:pPr>
             <a:r>
               <a:t>Integrate/OEM as a cloud service of SaaS provider.</a:t>
             </a:r>
           </a:p>
           <a:p>
+            <a:pPr marL="514350" indent="-514350">
+              <a:buFont typeface="+mj-lt"/>
+              <a:buAutoNum type="arabicPeriod" startAt="5"/>
+            </a:pPr>
             <a:r>
               <a:t>Use in sandbox for ongoing threatened behavior detection.</a:t>
             </a:r>
@@ -6579,7 +7275,7 @@
         </p:blipFill>
         <p:spPr>
           <a:xfrm>
-            <a:off x="8497570" y="4828540"/>
+            <a:off x="8630285" y="4828540"/>
             <a:ext cx="2021205" cy="1142365"/>
           </a:xfrm>
           <a:prstGeom prst="rect">
@@ -6603,7 +7299,7 @@
 </p:sld>
 </file>
 
-<file path=ppt/slides/slide17.xml><?xml version="1.0" encoding="utf-8"?>
+<file path=ppt/slides/slide16.xml><?xml version="1.0" encoding="utf-8"?>
 <p:sld xmlns:a="http://schemas.openxmlformats.org/drawingml/2006/main" xmlns:r="http://schemas.openxmlformats.org/officeDocument/2006/relationships" xmlns:p="http://schemas.openxmlformats.org/presentationml/2006/main">
   <p:cSld>
     <p:spTree>
@@ -6741,8 +7437,12 @@
           </a:p>
           <a:p>
             <a:r>
+              <a:rPr lang="en-US" altLang="zh-CN"/>
+              <a:t>H</a:t>
+            </a:r>
+            <a:r>
               <a:rPr lang="zh-CN" altLang="en-US"/>
-              <a:t>harden your devices/applications/services, to keep </a:t>
+              <a:t>arden your devices/applications/services, to keep </a:t>
             </a:r>
             <a:r>
               <a:rPr lang="en-US" altLang="zh-CN"/>
@@ -6779,7 +7479,7 @@
 </p:sld>
 </file>
 
-<file path=ppt/slides/slide18.xml><?xml version="1.0" encoding="utf-8"?>
+<file path=ppt/slides/slide17.xml><?xml version="1.0" encoding="utf-8"?>
 <p:sld xmlns:a="http://schemas.openxmlformats.org/drawingml/2006/main" xmlns:r="http://schemas.openxmlformats.org/officeDocument/2006/relationships" xmlns:p="http://schemas.openxmlformats.org/presentationml/2006/main">
   <p:cSld>
     <p:spTree>
@@ -6913,7 +7613,7 @@
 </p:sld>
 </file>
 
-<file path=ppt/slides/slide19.xml><?xml version="1.0" encoding="utf-8"?>
+<file path=ppt/slides/slide18.xml><?xml version="1.0" encoding="utf-8"?>
 <p:sld xmlns:a="http://schemas.openxmlformats.org/drawingml/2006/main" xmlns:r="http://schemas.openxmlformats.org/officeDocument/2006/relationships" xmlns:p="http://schemas.openxmlformats.org/presentationml/2006/main">
   <p:cSld>
     <p:spTree>
@@ -7007,8 +7707,10 @@
           </a:p>
           <a:p>
             <a:r>
-              <a:rPr lang="zh-CN" altLang="en-US"/>
-              <a:t>Benefits come with the service</a:t>
+              <a:rPr lang="zh-CN" altLang="en-US">
+                <a:sym typeface="+mn-ea"/>
+              </a:rPr>
+              <a:t>What benefits come with this service?</a:t>
             </a:r>
             <a:endParaRPr lang="zh-CN" altLang="en-US"/>
           </a:p>
@@ -7127,6 +7829,154 @@
 </p:sld>
 </file>
 
+<file path=ppt/slides/slide19.xml><?xml version="1.0" encoding="utf-8"?>
+<p:sld xmlns:a="http://schemas.openxmlformats.org/drawingml/2006/main" xmlns:r="http://schemas.openxmlformats.org/officeDocument/2006/relationships" xmlns:p="http://schemas.openxmlformats.org/presentationml/2006/main">
+  <p:cSld>
+    <p:spTree>
+      <p:nvGrpSpPr>
+        <p:cNvPr id="1" name=""/>
+        <p:cNvGrpSpPr/>
+        <p:nvPr/>
+      </p:nvGrpSpPr>
+      <p:grpSpPr/>
+      <p:sp>
+        <p:nvSpPr>
+          <p:cNvPr id="2" name="标题 1"/>
+          <p:cNvSpPr>
+            <a:spLocks noGrp="1"/>
+          </p:cNvSpPr>
+          <p:nvPr>
+            <p:ph type="title"/>
+          </p:nvPr>
+        </p:nvSpPr>
+        <p:spPr/>
+        <p:txBody>
+          <a:bodyPr/>
+          <a:p>
+            <a:r>
+              <a:rPr lang="en-US" altLang="zh-CN">
+                <a:sym typeface="+mn-ea"/>
+              </a:rPr>
+              <a:t>S</a:t>
+            </a:r>
+            <a:r>
+              <a:rPr lang="zh-CN" altLang="en-US">
+                <a:sym typeface="+mn-ea"/>
+              </a:rPr>
+              <a:t>imilar solutions in the market</a:t>
+            </a:r>
+            <a:endParaRPr lang="zh-CN" altLang="en-US"/>
+          </a:p>
+        </p:txBody>
+      </p:sp>
+      <p:sp>
+        <p:nvSpPr>
+          <p:cNvPr id="3" name="内容占位符 2"/>
+          <p:cNvSpPr>
+            <a:spLocks noGrp="1"/>
+          </p:cNvSpPr>
+          <p:nvPr>
+            <p:ph idx="1"/>
+          </p:nvPr>
+        </p:nvSpPr>
+        <p:spPr/>
+        <p:txBody>
+          <a:bodyPr/>
+          <a:p>
+            <a:r>
+              <a:rPr lang="en-US" altLang="zh-CN"/>
+              <a:t>N</a:t>
+            </a:r>
+            <a:r>
+              <a:rPr lang="zh-CN" altLang="en-US"/>
+              <a:t>orton - safeweb </a:t>
+            </a:r>
+            <a:endParaRPr lang="zh-CN" altLang="en-US"/>
+          </a:p>
+          <a:p>
+            <a:r>
+              <a:rPr lang="en-US" altLang="zh-CN"/>
+              <a:t>C</a:t>
+            </a:r>
+            <a:r>
+              <a:rPr lang="zh-CN" altLang="en-US"/>
+              <a:t>omodo - webinspector</a:t>
+            </a:r>
+            <a:endParaRPr lang="zh-CN" altLang="en-US"/>
+          </a:p>
+          <a:p>
+            <a:r>
+              <a:rPr lang="en-US" altLang="zh-CN"/>
+              <a:t>C</a:t>
+            </a:r>
+            <a:r>
+              <a:rPr lang="zh-CN" altLang="en-US"/>
+              <a:t>yren</a:t>
+            </a:r>
+            <a:endParaRPr lang="zh-CN" altLang="en-US"/>
+          </a:p>
+          <a:p>
+            <a:r>
+              <a:rPr lang="zh-CN" altLang="en-US">
+                <a:sym typeface="+mn-ea"/>
+              </a:rPr>
+              <a:t>ESET</a:t>
+            </a:r>
+            <a:endParaRPr lang="zh-CN" altLang="en-US">
+              <a:sym typeface="+mn-ea"/>
+            </a:endParaRPr>
+          </a:p>
+          <a:p>
+            <a:r>
+              <a:rPr lang="en-US" altLang="zh-CN">
+                <a:sym typeface="+mn-ea"/>
+              </a:rPr>
+              <a:t>Bitdefender</a:t>
+            </a:r>
+            <a:endParaRPr lang="zh-CN" altLang="en-US">
+              <a:sym typeface="+mn-ea"/>
+            </a:endParaRPr>
+          </a:p>
+          <a:p>
+            <a:r>
+              <a:rPr lang="en-US" altLang="zh-CN">
+                <a:sym typeface="+mn-ea"/>
+              </a:rPr>
+              <a:t>Qihoo - 360 webscan</a:t>
+            </a:r>
+            <a:r>
+              <a:rPr lang="zh-CN" altLang="en-US"/>
+              <a:t> </a:t>
+            </a:r>
+            <a:r>
+              <a:rPr lang="en-US" altLang="zh-CN"/>
+              <a:t>(China local brand)</a:t>
+            </a:r>
+            <a:endParaRPr lang="zh-CN" altLang="en-US">
+              <a:sym typeface="+mn-ea"/>
+            </a:endParaRPr>
+          </a:p>
+          <a:p>
+            <a:endParaRPr lang="zh-CN" altLang="en-US"/>
+          </a:p>
+        </p:txBody>
+      </p:sp>
+    </p:spTree>
+  </p:cSld>
+  <p:clrMapOvr>
+    <a:masterClrMapping/>
+  </p:clrMapOvr>
+  <mc:AlternateContent xmlns:mc="http://schemas.openxmlformats.org/markup-compatibility/2006">
+    <mc:Choice xmlns:p14="http://schemas.microsoft.com/office/powerpoint/2010/main" Requires="p14">
+      <p:transition p14:dur="500"/>
+    </mc:Choice>
+    <mc:Fallback>
+      <p:transition/>
+    </mc:Fallback>
+  </mc:AlternateContent>
+</p:sld>
+</file>
+
 <file path=ppt/slides/slide2.xml><?xml version="1.0" encoding="utf-8"?>
 <p:sld xmlns:a="http://schemas.openxmlformats.org/drawingml/2006/main" xmlns:r="http://schemas.openxmlformats.org/officeDocument/2006/relationships" xmlns:p="http://schemas.openxmlformats.org/presentationml/2006/main">
   <p:cSld>
@@ -7222,7 +8072,7 @@
           <a:p>
             <a:r>
               <a:rPr lang="zh-CN" altLang="en-US"/>
-              <a:t>Benefits come with the service</a:t>
+              <a:t>What benefits come with this service?</a:t>
             </a:r>
             <a:endParaRPr lang="zh-CN" altLang="en-US"/>
           </a:p>
@@ -7334,149 +8184,6 @@
 </file>
 
 <file path=ppt/slides/slide20.xml><?xml version="1.0" encoding="utf-8"?>
-<p:sld xmlns:a="http://schemas.openxmlformats.org/drawingml/2006/main" xmlns:r="http://schemas.openxmlformats.org/officeDocument/2006/relationships" xmlns:p="http://schemas.openxmlformats.org/presentationml/2006/main">
-  <p:cSld>
-    <p:spTree>
-      <p:nvGrpSpPr>
-        <p:cNvPr id="1" name=""/>
-        <p:cNvGrpSpPr/>
-        <p:nvPr/>
-      </p:nvGrpSpPr>
-      <p:grpSpPr/>
-      <p:sp>
-        <p:nvSpPr>
-          <p:cNvPr id="2" name="标题 1"/>
-          <p:cNvSpPr>
-            <a:spLocks noGrp="1"/>
-          </p:cNvSpPr>
-          <p:nvPr>
-            <p:ph type="title"/>
-          </p:nvPr>
-        </p:nvSpPr>
-        <p:spPr/>
-        <p:txBody>
-          <a:bodyPr/>
-          <a:p>
-            <a:r>
-              <a:rPr lang="en-US" altLang="zh-CN">
-                <a:sym typeface="+mn-ea"/>
-              </a:rPr>
-              <a:t>S</a:t>
-            </a:r>
-            <a:r>
-              <a:rPr lang="zh-CN" altLang="en-US">
-                <a:sym typeface="+mn-ea"/>
-              </a:rPr>
-              <a:t>imilar solutions in the market</a:t>
-            </a:r>
-            <a:endParaRPr lang="zh-CN" altLang="en-US"/>
-          </a:p>
-        </p:txBody>
-      </p:sp>
-      <p:sp>
-        <p:nvSpPr>
-          <p:cNvPr id="3" name="内容占位符 2"/>
-          <p:cNvSpPr>
-            <a:spLocks noGrp="1"/>
-          </p:cNvSpPr>
-          <p:nvPr>
-            <p:ph idx="1"/>
-          </p:nvPr>
-        </p:nvSpPr>
-        <p:spPr/>
-        <p:txBody>
-          <a:bodyPr/>
-          <a:p>
-            <a:r>
-              <a:rPr lang="en-US" altLang="zh-CN"/>
-              <a:t>N</a:t>
-            </a:r>
-            <a:r>
-              <a:rPr lang="zh-CN" altLang="en-US"/>
-              <a:t>orton - safeweb </a:t>
-            </a:r>
-            <a:endParaRPr lang="zh-CN" altLang="en-US"/>
-          </a:p>
-          <a:p>
-            <a:r>
-              <a:rPr lang="en-US" altLang="zh-CN"/>
-              <a:t>C</a:t>
-            </a:r>
-            <a:r>
-              <a:rPr lang="zh-CN" altLang="en-US"/>
-              <a:t>omodo - webinspector</a:t>
-            </a:r>
-            <a:endParaRPr lang="zh-CN" altLang="en-US"/>
-          </a:p>
-          <a:p>
-            <a:r>
-              <a:rPr lang="en-US" altLang="zh-CN"/>
-              <a:t>C</a:t>
-            </a:r>
-            <a:r>
-              <a:rPr lang="zh-CN" altLang="en-US"/>
-              <a:t>yren</a:t>
-            </a:r>
-            <a:endParaRPr lang="zh-CN" altLang="en-US"/>
-          </a:p>
-          <a:p>
-            <a:r>
-              <a:rPr lang="zh-CN" altLang="en-US">
-                <a:sym typeface="+mn-ea"/>
-              </a:rPr>
-              <a:t>ESET</a:t>
-            </a:r>
-            <a:endParaRPr lang="zh-CN" altLang="en-US">
-              <a:sym typeface="+mn-ea"/>
-            </a:endParaRPr>
-          </a:p>
-          <a:p>
-            <a:r>
-              <a:rPr lang="en-US" altLang="zh-CN">
-                <a:sym typeface="+mn-ea"/>
-              </a:rPr>
-              <a:t>Bitdefender</a:t>
-            </a:r>
-            <a:endParaRPr lang="zh-CN" altLang="en-US">
-              <a:sym typeface="+mn-ea"/>
-            </a:endParaRPr>
-          </a:p>
-          <a:p>
-            <a:r>
-              <a:rPr lang="en-US" altLang="zh-CN">
-                <a:sym typeface="+mn-ea"/>
-              </a:rPr>
-              <a:t>360 webscan</a:t>
-            </a:r>
-            <a:endParaRPr lang="zh-CN" altLang="en-US"/>
-          </a:p>
-          <a:p>
-            <a:endParaRPr lang="zh-CN" altLang="en-US">
-              <a:sym typeface="+mn-ea"/>
-            </a:endParaRPr>
-          </a:p>
-          <a:p>
-            <a:endParaRPr lang="zh-CN" altLang="en-US"/>
-          </a:p>
-        </p:txBody>
-      </p:sp>
-    </p:spTree>
-  </p:cSld>
-  <p:clrMapOvr>
-    <a:masterClrMapping/>
-  </p:clrMapOvr>
-  <mc:AlternateContent xmlns:mc="http://schemas.openxmlformats.org/markup-compatibility/2006">
-    <mc:Choice xmlns:p14="http://schemas.microsoft.com/office/powerpoint/2010/main" Requires="p14">
-      <p:transition p14:dur="500"/>
-    </mc:Choice>
-    <mc:Fallback>
-      <p:transition/>
-    </mc:Fallback>
-  </mc:AlternateContent>
-</p:sld>
-</file>
-
-<file path=ppt/slides/slide21.xml><?xml version="1.0" encoding="utf-8"?>
 <p:sld xmlns:a="http://schemas.openxmlformats.org/drawingml/2006/main" xmlns:r="http://schemas.openxmlformats.org/officeDocument/2006/relationships" xmlns:p="http://schemas.openxmlformats.org/presentationml/2006/main">
   <p:cSld>
     <p:spTree>
@@ -8448,7 +9155,7 @@
 </p:sld>
 </file>
 
-<file path=ppt/slides/slide22.xml><?xml version="1.0" encoding="utf-8"?>
+<file path=ppt/slides/slide21.xml><?xml version="1.0" encoding="utf-8"?>
 <p:sld xmlns:a="http://schemas.openxmlformats.org/drawingml/2006/main" xmlns:r="http://schemas.openxmlformats.org/officeDocument/2006/relationships" xmlns:p="http://schemas.openxmlformats.org/presentationml/2006/main">
   <p:cSld>
     <p:spTree>
@@ -8542,8 +9249,10 @@
           </a:p>
           <a:p>
             <a:r>
-              <a:rPr lang="zh-CN" altLang="en-US"/>
-              <a:t>Benefits come with the service</a:t>
+              <a:rPr lang="zh-CN" altLang="en-US">
+                <a:sym typeface="+mn-ea"/>
+              </a:rPr>
+              <a:t>What benefits come with this service?</a:t>
             </a:r>
             <a:endParaRPr lang="zh-CN" altLang="en-US"/>
           </a:p>
@@ -8660,7 +9369,7 @@
 </p:sld>
 </file>
 
-<file path=ppt/slides/slide23.xml><?xml version="1.0" encoding="utf-8"?>
+<file path=ppt/slides/slide22.xml><?xml version="1.0" encoding="utf-8"?>
 <p:sld xmlns:a="http://schemas.openxmlformats.org/drawingml/2006/main" xmlns:r="http://schemas.openxmlformats.org/officeDocument/2006/relationships" xmlns:p="http://schemas.openxmlformats.org/presentationml/2006/main">
   <p:cSld>
     <p:spTree>
@@ -9437,7 +10146,7 @@
                 <a:latin typeface="微软雅黑" panose="020B0503020204020204" pitchFamily="34" charset="-122"/>
                 <a:ea typeface="微软雅黑" panose="020B0503020204020204" pitchFamily="34" charset="-122"/>
               </a:rPr>
-              <a:t>Contact our local team, get API access key</a:t>
+              <a:t>Contact our local team, get an API access key</a:t>
             </a:r>
             <a:endParaRPr lang="en-US" sz="1400" dirty="0">
               <a:solidFill>
@@ -9479,7 +10188,7 @@
                 <a:latin typeface="微软雅黑" panose="020B0503020204020204" pitchFamily="34" charset="-122"/>
                 <a:ea typeface="微软雅黑" panose="020B0503020204020204" pitchFamily="34" charset="-122"/>
               </a:rPr>
-              <a:t>Try our service with your license mode, access key and provided demo.</a:t>
+              <a:t>Try our service with the access key on provided demo codes, to query what URLs you want.</a:t>
             </a:r>
             <a:endParaRPr lang="en-US" altLang="zh-HK" sz="1400" dirty="0">
               <a:solidFill>
@@ -9500,7 +10209,7 @@
         <p:spPr>
           <a:xfrm>
             <a:off x="8778240" y="4707255"/>
-            <a:ext cx="2853055" cy="953135"/>
+            <a:ext cx="2853055" cy="737235"/>
           </a:xfrm>
           <a:prstGeom prst="rect">
             <a:avLst/>
@@ -9521,37 +10230,7 @@
                 <a:latin typeface="微软雅黑" panose="020B0503020204020204" pitchFamily="34" charset="-122"/>
                 <a:ea typeface="微软雅黑" panose="020B0503020204020204" pitchFamily="34" charset="-122"/>
               </a:rPr>
-              <a:t>Get Url health status result, and do further processing.</a:t>
-            </a:r>
-            <a:endParaRPr lang="en-US" sz="1400" dirty="0">
-              <a:solidFill>
-                <a:srgbClr val="485766"/>
-              </a:solidFill>
-              <a:latin typeface="微软雅黑" panose="020B0503020204020204" pitchFamily="34" charset="-122"/>
-              <a:ea typeface="微软雅黑" panose="020B0503020204020204" pitchFamily="34" charset="-122"/>
-            </a:endParaRPr>
-          </a:p>
-          <a:p>
-            <a:pPr algn="l"/>
-            <a:endParaRPr lang="en-US" sz="1400" dirty="0">
-              <a:solidFill>
-                <a:srgbClr val="485766"/>
-              </a:solidFill>
-              <a:latin typeface="微软雅黑" panose="020B0503020204020204" pitchFamily="34" charset="-122"/>
-              <a:ea typeface="微软雅黑" panose="020B0503020204020204" pitchFamily="34" charset="-122"/>
-            </a:endParaRPr>
-          </a:p>
-          <a:p>
-            <a:pPr algn="l"/>
-            <a:r>
-              <a:rPr lang="en-US" sz="1400" dirty="0">
-                <a:solidFill>
-                  <a:srgbClr val="485766"/>
-                </a:solidFill>
-                <a:latin typeface="微软雅黑" panose="020B0503020204020204" pitchFamily="34" charset="-122"/>
-                <a:ea typeface="微软雅黑" panose="020B0503020204020204" pitchFamily="34" charset="-122"/>
-              </a:rPr>
-              <a:t>That's it.</a:t>
+              <a:t>Get Url health status result in miniseconds, then do your further processing.</a:t>
             </a:r>
             <a:endParaRPr lang="en-US" sz="1400" dirty="0">
               <a:solidFill>
@@ -9711,7 +10390,24 @@
                 </a:solidFill>
                 <a:latin typeface="Arial" panose="020B0604020202020204" pitchFamily="34" charset="0"/>
               </a:rPr>
-              <a:t>Get AccessKey</a:t>
+              <a:t>Apply</a:t>
+            </a:r>
+            <a:br>
+              <a:rPr lang="en-US" altLang="x-none" b="1" dirty="0">
+                <a:solidFill>
+                  <a:schemeClr val="bg1"/>
+                </a:solidFill>
+                <a:latin typeface="Arial" panose="020B0604020202020204" pitchFamily="34" charset="0"/>
+              </a:rPr>
+            </a:br>
+            <a:r>
+              <a:rPr lang="en-US" altLang="x-none" b="1" dirty="0">
+                <a:solidFill>
+                  <a:schemeClr val="bg1"/>
+                </a:solidFill>
+                <a:latin typeface="Arial" panose="020B0604020202020204" pitchFamily="34" charset="0"/>
+              </a:rPr>
+              <a:t>AccessKey</a:t>
             </a:r>
             <a:endParaRPr lang="en-US" altLang="x-none" b="1" dirty="0">
               <a:solidFill>
@@ -10090,7 +10786,7 @@
 </p:sld>
 </file>
 
-<file path=ppt/slides/slide24.xml><?xml version="1.0" encoding="utf-8"?>
+<file path=ppt/slides/slide23.xml><?xml version="1.0" encoding="utf-8"?>
 <p:sld xmlns:a="http://schemas.openxmlformats.org/drawingml/2006/main" xmlns:r="http://schemas.openxmlformats.org/officeDocument/2006/relationships" xmlns:p="http://schemas.openxmlformats.org/presentationml/2006/main">
   <p:cSld>
     <p:spTree>
@@ -10152,16 +10848,25 @@
         </p:nvSpPr>
         <p:spPr>
           <a:xfrm>
-            <a:off x="3378200" y="5927725"/>
-            <a:ext cx="4893945" cy="743585"/>
+            <a:off x="3251835" y="5763260"/>
+            <a:ext cx="2392045" cy="743585"/>
           </a:xfrm>
         </p:spPr>
         <p:txBody>
-          <a:bodyPr/>
+          <a:bodyPr>
+            <a:normAutofit fontScale="60000"/>
+          </a:bodyPr>
           <a:p>
             <a:r>
               <a:rPr lang="en-US" altLang="zh-CN"/>
-              <a:t>API Doc tour    &amp;    Demo</a:t>
+              <a:t>API Doc tour </a:t>
+            </a:r>
+            <a:endParaRPr lang="en-US" altLang="zh-CN"/>
+          </a:p>
+          <a:p>
+            <a:r>
+              <a:rPr lang="en-US" altLang="zh-CN"/>
+              <a:t>Demo request</a:t>
             </a:r>
             <a:endParaRPr lang="en-US" altLang="zh-CN"/>
           </a:p>
@@ -10194,6 +10899,210 @@
           </a:prstGeom>
         </p:spPr>
       </p:pic>
+      <p:sp>
+        <p:nvSpPr>
+          <p:cNvPr id="4" name="内容占位符 2"/>
+          <p:cNvSpPr>
+            <a:spLocks noGrp="1"/>
+          </p:cNvSpPr>
+          <p:nvPr/>
+        </p:nvSpPr>
+        <p:spPr>
+          <a:xfrm>
+            <a:off x="5643880" y="5763260"/>
+            <a:ext cx="2741295" cy="743585"/>
+          </a:xfrm>
+          <a:prstGeom prst="rect">
+            <a:avLst/>
+          </a:prstGeom>
+        </p:spPr>
+        <p:txBody>
+          <a:bodyPr vert="horz" lIns="91440" tIns="45720" rIns="91440" bIns="45720" rtlCol="0">
+            <a:normAutofit fontScale="60000"/>
+          </a:bodyPr>
+          <a:lstStyle>
+            <a:lvl1pPr marL="228600" indent="-228600" algn="l" defTabSz="914400" rtl="0" eaLnBrk="1" latinLnBrk="0" hangingPunct="1">
+              <a:lnSpc>
+                <a:spcPct val="90000"/>
+              </a:lnSpc>
+              <a:spcBef>
+                <a:spcPts val="1000"/>
+              </a:spcBef>
+              <a:buFont typeface="Arial" panose="020B0604020202020204" pitchFamily="34" charset="0"/>
+              <a:buChar char="•"/>
+              <a:defRPr sz="2800" kern="1200">
+                <a:solidFill>
+                  <a:schemeClr val="tx1"/>
+                </a:solidFill>
+                <a:latin typeface="+mn-lt"/>
+                <a:ea typeface="+mn-ea"/>
+                <a:cs typeface="+mn-cs"/>
+              </a:defRPr>
+            </a:lvl1pPr>
+            <a:lvl2pPr marL="685800" indent="-228600" algn="l" defTabSz="914400" rtl="0" eaLnBrk="1" latinLnBrk="0" hangingPunct="1">
+              <a:lnSpc>
+                <a:spcPct val="90000"/>
+              </a:lnSpc>
+              <a:spcBef>
+                <a:spcPts val="500"/>
+              </a:spcBef>
+              <a:buFont typeface="Arial" panose="020B0604020202020204" pitchFamily="34" charset="0"/>
+              <a:buChar char="•"/>
+              <a:defRPr sz="2400" kern="1200">
+                <a:solidFill>
+                  <a:schemeClr val="tx1"/>
+                </a:solidFill>
+                <a:latin typeface="+mn-lt"/>
+                <a:ea typeface="+mn-ea"/>
+                <a:cs typeface="+mn-cs"/>
+              </a:defRPr>
+            </a:lvl2pPr>
+            <a:lvl3pPr marL="1143000" indent="-228600" algn="l" defTabSz="914400" rtl="0" eaLnBrk="1" latinLnBrk="0" hangingPunct="1">
+              <a:lnSpc>
+                <a:spcPct val="90000"/>
+              </a:lnSpc>
+              <a:spcBef>
+                <a:spcPts val="500"/>
+              </a:spcBef>
+              <a:buFont typeface="Arial" panose="020B0604020202020204" pitchFamily="34" charset="0"/>
+              <a:buChar char="•"/>
+              <a:defRPr sz="2000" kern="1200">
+                <a:solidFill>
+                  <a:schemeClr val="tx1"/>
+                </a:solidFill>
+                <a:latin typeface="+mn-lt"/>
+                <a:ea typeface="+mn-ea"/>
+                <a:cs typeface="+mn-cs"/>
+              </a:defRPr>
+            </a:lvl3pPr>
+            <a:lvl4pPr marL="1600200" indent="-228600" algn="l" defTabSz="914400" rtl="0" eaLnBrk="1" latinLnBrk="0" hangingPunct="1">
+              <a:lnSpc>
+                <a:spcPct val="90000"/>
+              </a:lnSpc>
+              <a:spcBef>
+                <a:spcPts val="500"/>
+              </a:spcBef>
+              <a:buFont typeface="Arial" panose="020B0604020202020204" pitchFamily="34" charset="0"/>
+              <a:buChar char="•"/>
+              <a:defRPr sz="1800" kern="1200">
+                <a:solidFill>
+                  <a:schemeClr val="tx1"/>
+                </a:solidFill>
+                <a:latin typeface="+mn-lt"/>
+                <a:ea typeface="+mn-ea"/>
+                <a:cs typeface="+mn-cs"/>
+              </a:defRPr>
+            </a:lvl4pPr>
+            <a:lvl5pPr marL="2057400" indent="-228600" algn="l" defTabSz="914400" rtl="0" eaLnBrk="1" latinLnBrk="0" hangingPunct="1">
+              <a:lnSpc>
+                <a:spcPct val="90000"/>
+              </a:lnSpc>
+              <a:spcBef>
+                <a:spcPts val="500"/>
+              </a:spcBef>
+              <a:buFont typeface="Arial" panose="020B0604020202020204" pitchFamily="34" charset="0"/>
+              <a:buChar char="•"/>
+              <a:defRPr sz="1800" kern="1200">
+                <a:solidFill>
+                  <a:schemeClr val="tx1"/>
+                </a:solidFill>
+                <a:latin typeface="+mn-lt"/>
+                <a:ea typeface="+mn-ea"/>
+                <a:cs typeface="+mn-cs"/>
+              </a:defRPr>
+            </a:lvl5pPr>
+            <a:lvl6pPr marL="2514600" indent="-228600" algn="l" defTabSz="914400" rtl="0" eaLnBrk="1" latinLnBrk="0" hangingPunct="1">
+              <a:lnSpc>
+                <a:spcPct val="90000"/>
+              </a:lnSpc>
+              <a:spcBef>
+                <a:spcPts val="500"/>
+              </a:spcBef>
+              <a:buFont typeface="Arial" panose="020B0604020202020204" pitchFamily="34" charset="0"/>
+              <a:buChar char="•"/>
+              <a:defRPr sz="1800" kern="1200">
+                <a:solidFill>
+                  <a:schemeClr val="tx1"/>
+                </a:solidFill>
+                <a:latin typeface="+mn-lt"/>
+                <a:ea typeface="+mn-ea"/>
+                <a:cs typeface="+mn-cs"/>
+              </a:defRPr>
+            </a:lvl6pPr>
+            <a:lvl7pPr marL="2971800" indent="-228600" algn="l" defTabSz="914400" rtl="0" eaLnBrk="1" latinLnBrk="0" hangingPunct="1">
+              <a:lnSpc>
+                <a:spcPct val="90000"/>
+              </a:lnSpc>
+              <a:spcBef>
+                <a:spcPts val="500"/>
+              </a:spcBef>
+              <a:buFont typeface="Arial" panose="020B0604020202020204" pitchFamily="34" charset="0"/>
+              <a:buChar char="•"/>
+              <a:defRPr sz="1800" kern="1200">
+                <a:solidFill>
+                  <a:schemeClr val="tx1"/>
+                </a:solidFill>
+                <a:latin typeface="+mn-lt"/>
+                <a:ea typeface="+mn-ea"/>
+                <a:cs typeface="+mn-cs"/>
+              </a:defRPr>
+            </a:lvl7pPr>
+            <a:lvl8pPr marL="3429000" indent="-228600" algn="l" defTabSz="914400" rtl="0" eaLnBrk="1" latinLnBrk="0" hangingPunct="1">
+              <a:lnSpc>
+                <a:spcPct val="90000"/>
+              </a:lnSpc>
+              <a:spcBef>
+                <a:spcPts val="500"/>
+              </a:spcBef>
+              <a:buFont typeface="Arial" panose="020B0604020202020204" pitchFamily="34" charset="0"/>
+              <a:buChar char="•"/>
+              <a:defRPr sz="1800" kern="1200">
+                <a:solidFill>
+                  <a:schemeClr val="tx1"/>
+                </a:solidFill>
+                <a:latin typeface="+mn-lt"/>
+                <a:ea typeface="+mn-ea"/>
+                <a:cs typeface="+mn-cs"/>
+              </a:defRPr>
+            </a:lvl8pPr>
+            <a:lvl9pPr marL="3886200" indent="-228600" algn="l" defTabSz="914400" rtl="0" eaLnBrk="1" latinLnBrk="0" hangingPunct="1">
+              <a:lnSpc>
+                <a:spcPct val="90000"/>
+              </a:lnSpc>
+              <a:spcBef>
+                <a:spcPts val="500"/>
+              </a:spcBef>
+              <a:buFont typeface="Arial" panose="020B0604020202020204" pitchFamily="34" charset="0"/>
+              <a:buChar char="•"/>
+              <a:defRPr sz="1800" kern="1200">
+                <a:solidFill>
+                  <a:schemeClr val="tx1"/>
+                </a:solidFill>
+                <a:latin typeface="+mn-lt"/>
+                <a:ea typeface="+mn-ea"/>
+                <a:cs typeface="+mn-cs"/>
+              </a:defRPr>
+            </a:lvl9pPr>
+          </a:lstStyle>
+          <a:p>
+            <a:r>
+              <a:rPr lang="en-US" altLang="zh-CN"/>
+              <a:t>Sample harmful URLs </a:t>
+            </a:r>
+            <a:endParaRPr lang="en-US" altLang="zh-CN"/>
+          </a:p>
+          <a:p>
+            <a:r>
+              <a:rPr lang="en-US" altLang="zh-CN"/>
+              <a:t>Measurement</a:t>
+            </a:r>
+            <a:endParaRPr lang="en-US" altLang="zh-CN"/>
+          </a:p>
+          <a:p>
+            <a:endParaRPr lang="en-US" altLang="zh-CN"/>
+          </a:p>
+        </p:txBody>
+      </p:sp>
     </p:spTree>
   </p:cSld>
   <p:clrMapOvr>
@@ -10210,7 +11119,7 @@
 </p:sld>
 </file>
 
-<file path=ppt/slides/slide25.xml><?xml version="1.0" encoding="utf-8"?>
+<file path=ppt/slides/slide24.xml><?xml version="1.0" encoding="utf-8"?>
 <p:sld xmlns:a="http://schemas.openxmlformats.org/drawingml/2006/main" xmlns:r="http://schemas.openxmlformats.org/officeDocument/2006/relationships" xmlns:p="http://schemas.openxmlformats.org/presentationml/2006/main">
   <p:cSld>
     <p:spTree>
@@ -10304,8 +11213,10 @@
           </a:p>
           <a:p>
             <a:r>
-              <a:rPr lang="zh-CN" altLang="en-US"/>
-              <a:t>Benefits come with the service</a:t>
+              <a:rPr lang="zh-CN" altLang="en-US">
+                <a:sym typeface="+mn-ea"/>
+              </a:rPr>
+              <a:t>What benefits come with this service?</a:t>
             </a:r>
             <a:endParaRPr lang="zh-CN" altLang="en-US"/>
           </a:p>
@@ -10420,7 +11331,7 @@
 </p:sld>
 </file>
 
-<file path=ppt/slides/slide26.xml><?xml version="1.0" encoding="utf-8"?>
+<file path=ppt/slides/slide25.xml><?xml version="1.0" encoding="utf-8"?>
 <p:sld xmlns:a="http://schemas.openxmlformats.org/drawingml/2006/main" xmlns:r="http://schemas.openxmlformats.org/officeDocument/2006/relationships" xmlns:p="http://schemas.openxmlformats.org/presentationml/2006/main">
   <p:cSld>
     <p:spTree>
@@ -10587,7 +11498,7 @@
 </p:sld>
 </file>
 
-<file path=ppt/slides/slide27.xml><?xml version="1.0" encoding="utf-8"?>
+<file path=ppt/slides/slide26.xml><?xml version="1.0" encoding="utf-8"?>
 <p:sld xmlns:a="http://schemas.openxmlformats.org/drawingml/2006/main" xmlns:r="http://schemas.openxmlformats.org/officeDocument/2006/relationships" xmlns:p="http://schemas.openxmlformats.org/presentationml/2006/main">
   <p:cSld>
     <p:spTree>
@@ -10675,7 +11586,24 @@
               <a:rPr lang="zh-CN" altLang="en-US">
                 <a:sym typeface="+mn-ea"/>
               </a:rPr>
-              <a:t>support </a:t>
+              <a:t>support</a:t>
+            </a:r>
+            <a:r>
+              <a:rPr lang="en-US" altLang="zh-CN">
+                <a:sym typeface="+mn-ea"/>
+              </a:rPr>
+              <a:t>,</a:t>
+            </a:r>
+            <a:br>
+              <a:rPr lang="zh-CN" altLang="en-US">
+                <a:sym typeface="+mn-ea"/>
+              </a:rPr>
+            </a:br>
+            <a:r>
+              <a:rPr lang="en-US" altLang="zh-CN">
+                <a:sym typeface="+mn-ea"/>
+              </a:rPr>
+              <a:t>Local language, local requirement</a:t>
             </a:r>
             <a:endParaRPr lang="zh-CN" altLang="en-US"/>
           </a:p>
@@ -10700,7 +11628,7 @@
         </p:blipFill>
         <p:spPr>
           <a:xfrm>
-            <a:off x="2790825" y="2938780"/>
+            <a:off x="2740660" y="3179445"/>
             <a:ext cx="5749290" cy="3238500"/>
           </a:xfrm>
           <a:prstGeom prst="rect">
@@ -10731,7 +11659,7 @@
 </p:sld>
 </file>
 
-<file path=ppt/slides/slide28.xml><?xml version="1.0" encoding="utf-8"?>
+<file path=ppt/slides/slide27.xml><?xml version="1.0" encoding="utf-8"?>
 <p:sld xmlns:a="http://schemas.openxmlformats.org/drawingml/2006/main" xmlns:r="http://schemas.openxmlformats.org/officeDocument/2006/relationships" xmlns:p="http://schemas.openxmlformats.org/presentationml/2006/main">
   <p:cSld>
     <p:spTree>
@@ -10978,7 +11906,7 @@
 </p:sld>
 </file>
 
-<file path=ppt/slides/slide29.xml><?xml version="1.0" encoding="utf-8"?>
+<file path=ppt/slides/slide28.xml><?xml version="1.0" encoding="utf-8"?>
 <p:sld xmlns:a="http://schemas.openxmlformats.org/drawingml/2006/main" xmlns:r="http://schemas.openxmlformats.org/officeDocument/2006/relationships" xmlns:p="http://schemas.openxmlformats.org/presentationml/2006/main">
   <p:cSld>
     <p:spTree>
@@ -11107,7 +12035,19 @@
             </a:r>
             <a:r>
               <a:rPr lang="zh-CN" altLang="en-US"/>
-              <a:t>+ new blacklisted siteds daily </a:t>
+              <a:t>+ new blacklisted siteds daily</a:t>
+            </a:r>
+            <a:r>
+              <a:rPr lang="en-US" altLang="zh-CN"/>
+              <a:t>( in our DB</a:t>
+            </a:r>
+            <a:r>
+              <a:rPr lang="zh-CN" altLang="en-US"/>
+              <a:t> </a:t>
+            </a:r>
+            <a:r>
+              <a:rPr lang="en-US" altLang="zh-CN"/>
+              <a:t>)</a:t>
             </a:r>
             <a:endParaRPr lang="zh-CN" altLang="en-US"/>
           </a:p>
@@ -11456,7 +12396,7 @@
               <a:rPr lang="en-US" altLang="zh-CN">
                 <a:sym typeface="+mn-ea"/>
               </a:rPr>
-              <a:t>etc..</a:t>
+              <a:t>and so on..</a:t>
             </a:r>
             <a:endParaRPr lang="zh-CN" altLang="en-US"/>
           </a:p>
@@ -11566,6 +12506,10 @@
             <a:r>
               <a:rPr lang="zh-CN" altLang="en-US"/>
               <a:t>rute force password</a:t>
+            </a:r>
+            <a:r>
+              <a:rPr lang="en-US" altLang="zh-CN"/>
+              <a:t>, account, path</a:t>
             </a:r>
             <a:endParaRPr lang="zh-CN" altLang="en-US"/>
           </a:p>
@@ -12047,7 +12991,7 @@
           <a:p>
             <a:r>
               <a:rPr lang="zh-CN" altLang="en-US"/>
-              <a:t>Benefits come with the service</a:t>
+              <a:t>What benefits come with this service?</a:t>
             </a:r>
             <a:endParaRPr lang="zh-CN" altLang="en-US"/>
           </a:p>

</xml_diff>